<commit_message>
Apresentação da Aula 4.
</commit_message>
<xml_diff>
--- a/Power Point/Curso de HTML e CSS.pptx
+++ b/Power Point/Curso de HTML e CSS.pptx
@@ -64,6 +64,21 @@
     <p:sldId id="312" r:id="rId58"/>
     <p:sldId id="313" r:id="rId59"/>
     <p:sldId id="314" r:id="rId60"/>
+    <p:sldId id="315" r:id="rId61"/>
+    <p:sldId id="316" r:id="rId62"/>
+    <p:sldId id="317" r:id="rId63"/>
+    <p:sldId id="318" r:id="rId64"/>
+    <p:sldId id="319" r:id="rId65"/>
+    <p:sldId id="320" r:id="rId66"/>
+    <p:sldId id="321" r:id="rId67"/>
+    <p:sldId id="322" r:id="rId68"/>
+    <p:sldId id="324" r:id="rId69"/>
+    <p:sldId id="325" r:id="rId70"/>
+    <p:sldId id="326" r:id="rId71"/>
+    <p:sldId id="327" r:id="rId72"/>
+    <p:sldId id="328" r:id="rId73"/>
+    <p:sldId id="329" r:id="rId74"/>
+    <p:sldId id="330" r:id="rId75"/>
   </p:sldIdLst>
   <p:sldSz cx="12192000" cy="6858000"/>
   <p:notesSz cx="6858000" cy="9144000"/>
@@ -326,7 +341,7 @@
           <a:p>
             <a:fld id="{02AC24A9-CCB6-4F8D-B8DB-C2F3692CFA5A}" type="datetimeFigureOut">
               <a:rPr lang="en-US" smtClean="0"/>
-              <a:t>4/7/2024</a:t>
+              <a:t>3/6/2025</a:t>
             </a:fld>
             <a:endParaRPr lang="en-US" dirty="0"/>
           </a:p>
@@ -696,7 +711,7 @@
           <a:p>
             <a:fld id="{02AC24A9-CCB6-4F8D-B8DB-C2F3692CFA5A}" type="datetimeFigureOut">
               <a:rPr lang="en-US" smtClean="0"/>
-              <a:t>4/7/2024</a:t>
+              <a:t>3/6/2025</a:t>
             </a:fld>
             <a:endParaRPr lang="en-US"/>
           </a:p>
@@ -905,7 +920,7 @@
           <a:p>
             <a:fld id="{02AC24A9-CCB6-4F8D-B8DB-C2F3692CFA5A}" type="datetimeFigureOut">
               <a:rPr lang="en-US" smtClean="0"/>
-              <a:t>4/7/2024</a:t>
+              <a:t>3/6/2025</a:t>
             </a:fld>
             <a:endParaRPr lang="en-US"/>
           </a:p>
@@ -1375,7 +1390,7 @@
           <a:p>
             <a:fld id="{02AC24A9-CCB6-4F8D-B8DB-C2F3692CFA5A}" type="datetimeFigureOut">
               <a:rPr lang="en-US" smtClean="0"/>
-              <a:t>4/7/2024</a:t>
+              <a:t>3/6/2025</a:t>
             </a:fld>
             <a:endParaRPr lang="en-US"/>
           </a:p>
@@ -1829,7 +1844,7 @@
           <a:p>
             <a:fld id="{02AC24A9-CCB6-4F8D-B8DB-C2F3692CFA5A}" type="datetimeFigureOut">
               <a:rPr lang="en-US" smtClean="0"/>
-              <a:t>4/7/2024</a:t>
+              <a:t>3/6/2025</a:t>
             </a:fld>
             <a:endParaRPr lang="en-US"/>
           </a:p>
@@ -2361,7 +2376,7 @@
           <a:p>
             <a:fld id="{02AC24A9-CCB6-4F8D-B8DB-C2F3692CFA5A}" type="datetimeFigureOut">
               <a:rPr lang="en-US" smtClean="0"/>
-              <a:t>4/7/2024</a:t>
+              <a:t>3/6/2025</a:t>
             </a:fld>
             <a:endParaRPr lang="en-US"/>
           </a:p>
@@ -3060,7 +3075,7 @@
           <a:p>
             <a:fld id="{02AC24A9-CCB6-4F8D-B8DB-C2F3692CFA5A}" type="datetimeFigureOut">
               <a:rPr lang="en-US" smtClean="0"/>
-              <a:t>4/7/2024</a:t>
+              <a:t>3/6/2025</a:t>
             </a:fld>
             <a:endParaRPr lang="en-US"/>
           </a:p>
@@ -3389,7 +3404,7 @@
           <a:p>
             <a:fld id="{02AC24A9-CCB6-4F8D-B8DB-C2F3692CFA5A}" type="datetimeFigureOut">
               <a:rPr lang="en-US" smtClean="0"/>
-              <a:t>4/7/2024</a:t>
+              <a:t>3/6/2025</a:t>
             </a:fld>
             <a:endParaRPr lang="en-US"/>
           </a:p>
@@ -3502,7 +3517,7 @@
           <a:p>
             <a:fld id="{02AC24A9-CCB6-4F8D-B8DB-C2F3692CFA5A}" type="datetimeFigureOut">
               <a:rPr lang="en-US" smtClean="0"/>
-              <a:t>4/7/2024</a:t>
+              <a:t>3/6/2025</a:t>
             </a:fld>
             <a:endParaRPr lang="en-US"/>
           </a:p>
@@ -3997,7 +4012,7 @@
           <a:p>
             <a:fld id="{02AC24A9-CCB6-4F8D-B8DB-C2F3692CFA5A}" type="datetimeFigureOut">
               <a:rPr lang="en-US" smtClean="0"/>
-              <a:t>4/7/2024</a:t>
+              <a:t>3/6/2025</a:t>
             </a:fld>
             <a:endParaRPr lang="en-US" dirty="0"/>
           </a:p>
@@ -4474,7 +4489,7 @@
           <a:p>
             <a:fld id="{02AC24A9-CCB6-4F8D-B8DB-C2F3692CFA5A}" type="datetimeFigureOut">
               <a:rPr lang="en-US" smtClean="0"/>
-              <a:t>4/7/2024</a:t>
+              <a:t>3/6/2025</a:t>
             </a:fld>
             <a:endParaRPr lang="en-US"/>
           </a:p>
@@ -4717,7 +4732,7 @@
           <a:p>
             <a:fld id="{02AC24A9-CCB6-4F8D-B8DB-C2F3692CFA5A}" type="datetimeFigureOut">
               <a:rPr lang="en-US" smtClean="0"/>
-              <a:t>4/7/2024</a:t>
+              <a:t>3/6/2025</a:t>
             </a:fld>
             <a:endParaRPr lang="en-US"/>
           </a:p>
@@ -19024,6 +19039,2857 @@
 </p:sld>
 </file>
 
+<file path=ppt/slides/slide60.xml><?xml version="1.0" encoding="utf-8"?>
+<p:sld xmlns:a="http://schemas.openxmlformats.org/drawingml/2006/main" xmlns:r="http://schemas.openxmlformats.org/officeDocument/2006/relationships" xmlns:p="http://schemas.openxmlformats.org/presentationml/2006/main">
+  <p:cSld>
+    <p:bg>
+      <p:bgPr>
+        <a:solidFill>
+          <a:schemeClr val="bg1"/>
+        </a:solidFill>
+        <a:effectLst/>
+      </p:bgPr>
+    </p:bg>
+    <p:spTree>
+      <p:nvGrpSpPr>
+        <p:cNvPr id="1" name=""/>
+        <p:cNvGrpSpPr/>
+        <p:nvPr/>
+      </p:nvGrpSpPr>
+      <p:grpSpPr>
+        <a:xfrm>
+          <a:off x="0" y="0"/>
+          <a:ext cx="0" cy="0"/>
+          <a:chOff x="0" y="0"/>
+          <a:chExt cx="0" cy="0"/>
+        </a:xfrm>
+      </p:grpSpPr>
+      <p:sp>
+        <p:nvSpPr>
+          <p:cNvPr id="10" name="Rectangle 9">
+            <a:extLst>
+              <a:ext uri="{FF2B5EF4-FFF2-40B4-BE49-F238E27FC236}">
+                <a16:creationId xmlns:a16="http://schemas.microsoft.com/office/drawing/2014/main" id="{8D06CE56-3881-4ADA-8CEF-D18B02C242A3}"/>
+              </a:ext>
+              <a:ext uri="{C183D7F6-B498-43B3-948B-1728B52AA6E4}">
+                <adec:decorative xmlns:adec="http://schemas.microsoft.com/office/drawing/2017/decorative" val="1"/>
+              </a:ext>
+            </a:extLst>
+          </p:cNvPr>
+          <p:cNvSpPr>
+            <a:spLocks noGrp="1" noRot="1" noChangeAspect="1" noMove="1" noResize="1" noEditPoints="1" noAdjustHandles="1" noChangeArrowheads="1" noChangeShapeType="1" noTextEdit="1"/>
+          </p:cNvSpPr>
+          <p:nvPr>
+            <p:extLst>
+              <p:ext uri="{386F3935-93C4-4BCD-93E2-E3B085C9AB24}">
+                <p16:designElem xmlns:p16="http://schemas.microsoft.com/office/powerpoint/2015/main" val="1"/>
+              </p:ext>
+            </p:extLst>
+          </p:nvPr>
+        </p:nvSpPr>
+        <p:spPr>
+          <a:xfrm rot="5400000">
+            <a:off x="857544" y="346791"/>
+            <a:ext cx="146304" cy="704088"/>
+          </a:xfrm>
+          <a:prstGeom prst="rect">
+            <a:avLst/>
+          </a:prstGeom>
+          <a:solidFill>
+            <a:schemeClr val="accent1"/>
+          </a:solidFill>
+          <a:ln>
+            <a:noFill/>
+          </a:ln>
+        </p:spPr>
+        <p:style>
+          <a:lnRef idx="2">
+            <a:schemeClr val="accent1">
+              <a:shade val="50000"/>
+            </a:schemeClr>
+          </a:lnRef>
+          <a:fillRef idx="1">
+            <a:schemeClr val="accent1"/>
+          </a:fillRef>
+          <a:effectRef idx="0">
+            <a:schemeClr val="accent1"/>
+          </a:effectRef>
+          <a:fontRef idx="minor">
+            <a:schemeClr val="lt1"/>
+          </a:fontRef>
+        </p:style>
+        <p:txBody>
+          <a:bodyPr rtlCol="0" anchor="ctr"/>
+          <a:lstStyle/>
+          <a:p>
+            <a:pPr marL="0" marR="0" lvl="0" indent="0" algn="ctr" defTabSz="914400" rtl="0" eaLnBrk="1" fontAlgn="auto" latinLnBrk="0" hangingPunct="1">
+              <a:lnSpc>
+                <a:spcPct val="100000"/>
+              </a:lnSpc>
+              <a:spcBef>
+                <a:spcPts val="0"/>
+              </a:spcBef>
+              <a:spcAft>
+                <a:spcPts val="0"/>
+              </a:spcAft>
+              <a:buClrTx/>
+              <a:buSzTx/>
+              <a:buFontTx/>
+              <a:buNone/>
+              <a:tabLst/>
+              <a:defRPr/>
+            </a:pPr>
+            <a:endParaRPr kumimoji="0" lang="en-US" sz="1800" b="0" i="0" u="none" strike="noStrike" kern="1200" cap="none" spc="0" normalizeH="0" baseline="0" noProof="0">
+              <a:ln>
+                <a:noFill/>
+              </a:ln>
+              <a:solidFill>
+                <a:prstClr val="white"/>
+              </a:solidFill>
+              <a:effectLst/>
+              <a:uLnTx/>
+              <a:uFillTx/>
+              <a:latin typeface="Calibri" panose="020F0502020204030204"/>
+              <a:ea typeface="+mn-ea"/>
+              <a:cs typeface="+mn-cs"/>
+            </a:endParaRPr>
+          </a:p>
+        </p:txBody>
+      </p:sp>
+      <p:sp>
+        <p:nvSpPr>
+          <p:cNvPr id="12" name="Rectangle 11">
+            <a:extLst>
+              <a:ext uri="{FF2B5EF4-FFF2-40B4-BE49-F238E27FC236}">
+                <a16:creationId xmlns:a16="http://schemas.microsoft.com/office/drawing/2014/main" id="{79F3C543-62EC-4433-9C93-A2CD8764E9B4}"/>
+              </a:ext>
+              <a:ext uri="{C183D7F6-B498-43B3-948B-1728B52AA6E4}">
+                <adec:decorative xmlns:adec="http://schemas.microsoft.com/office/drawing/2017/decorative" val="1"/>
+              </a:ext>
+            </a:extLst>
+          </p:cNvPr>
+          <p:cNvSpPr>
+            <a:spLocks noGrp="1" noRot="1" noChangeAspect="1" noMove="1" noResize="1" noEditPoints="1" noAdjustHandles="1" noChangeArrowheads="1" noChangeShapeType="1" noTextEdit="1"/>
+          </p:cNvSpPr>
+          <p:nvPr>
+            <p:extLst>
+              <p:ext uri="{386F3935-93C4-4BCD-93E2-E3B085C9AB24}">
+                <p16:designElem xmlns:p16="http://schemas.microsoft.com/office/powerpoint/2015/main" val="1"/>
+              </p:ext>
+            </p:extLst>
+          </p:nvPr>
+        </p:nvSpPr>
+        <p:spPr>
+          <a:xfrm flipV="1">
+            <a:off x="578652" y="4501201"/>
+            <a:ext cx="11034696" cy="18288"/>
+          </a:xfrm>
+          <a:prstGeom prst="rect">
+            <a:avLst/>
+          </a:prstGeom>
+          <a:solidFill>
+            <a:schemeClr val="tx2">
+              <a:lumMod val="25000"/>
+              <a:lumOff val="75000"/>
+            </a:schemeClr>
+          </a:solidFill>
+          <a:ln w="3175">
+            <a:noFill/>
+          </a:ln>
+          <a:effectLst/>
+        </p:spPr>
+        <p:style>
+          <a:lnRef idx="2">
+            <a:schemeClr val="accent1">
+              <a:shade val="50000"/>
+            </a:schemeClr>
+          </a:lnRef>
+          <a:fillRef idx="1">
+            <a:schemeClr val="accent1"/>
+          </a:fillRef>
+          <a:effectRef idx="0">
+            <a:schemeClr val="accent1"/>
+          </a:effectRef>
+          <a:fontRef idx="minor">
+            <a:schemeClr val="lt1"/>
+          </a:fontRef>
+        </p:style>
+        <p:txBody>
+          <a:bodyPr rtlCol="0" anchor="ctr"/>
+          <a:lstStyle/>
+          <a:p>
+            <a:pPr marL="0" marR="0" lvl="0" indent="0" algn="ctr" defTabSz="914400" rtl="0" eaLnBrk="1" fontAlgn="auto" latinLnBrk="0" hangingPunct="1">
+              <a:lnSpc>
+                <a:spcPct val="100000"/>
+              </a:lnSpc>
+              <a:spcBef>
+                <a:spcPts val="0"/>
+              </a:spcBef>
+              <a:spcAft>
+                <a:spcPts val="0"/>
+              </a:spcAft>
+              <a:buClrTx/>
+              <a:buSzTx/>
+              <a:buFontTx/>
+              <a:buNone/>
+              <a:tabLst/>
+              <a:defRPr/>
+            </a:pPr>
+            <a:endParaRPr kumimoji="0" lang="en-US" sz="1800" b="0" i="0" u="none" strike="noStrike" kern="1200" cap="none" spc="0" normalizeH="0" baseline="0" noProof="0">
+              <a:ln>
+                <a:noFill/>
+              </a:ln>
+              <a:solidFill>
+                <a:prstClr val="white"/>
+              </a:solidFill>
+              <a:effectLst/>
+              <a:uLnTx/>
+              <a:uFillTx/>
+              <a:latin typeface="Calibri" panose="020F0502020204030204"/>
+              <a:ea typeface="+mn-ea"/>
+              <a:cs typeface="+mn-cs"/>
+            </a:endParaRPr>
+          </a:p>
+        </p:txBody>
+      </p:sp>
+      <p:sp useBgFill="1">
+        <p:nvSpPr>
+          <p:cNvPr id="14" name="Rectangle 13">
+            <a:extLst>
+              <a:ext uri="{FF2B5EF4-FFF2-40B4-BE49-F238E27FC236}">
+                <a16:creationId xmlns:a16="http://schemas.microsoft.com/office/drawing/2014/main" id="{E91DC736-0EF8-4F87-9146-EBF1D2EE4D3D}"/>
+              </a:ext>
+              <a:ext uri="{C183D7F6-B498-43B3-948B-1728B52AA6E4}">
+                <adec:decorative xmlns:adec="http://schemas.microsoft.com/office/drawing/2017/decorative" val="1"/>
+              </a:ext>
+            </a:extLst>
+          </p:cNvPr>
+          <p:cNvSpPr>
+            <a:spLocks noGrp="1" noRot="1" noChangeAspect="1" noMove="1" noResize="1" noEditPoints="1" noAdjustHandles="1" noChangeArrowheads="1" noChangeShapeType="1" noTextEdit="1"/>
+          </p:cNvSpPr>
+          <p:nvPr>
+            <p:extLst>
+              <p:ext uri="{386F3935-93C4-4BCD-93E2-E3B085C9AB24}">
+                <p16:designElem xmlns:p16="http://schemas.microsoft.com/office/powerpoint/2015/main" val="1"/>
+              </p:ext>
+            </p:extLst>
+          </p:nvPr>
+        </p:nvSpPr>
+        <p:spPr>
+          <a:xfrm>
+            <a:off x="0" y="0"/>
+            <a:ext cx="12192000" cy="6858000"/>
+          </a:xfrm>
+          <a:prstGeom prst="rect">
+            <a:avLst/>
+          </a:prstGeom>
+          <a:ln>
+            <a:noFill/>
+          </a:ln>
+        </p:spPr>
+        <p:style>
+          <a:lnRef idx="2">
+            <a:schemeClr val="accent1">
+              <a:shade val="50000"/>
+            </a:schemeClr>
+          </a:lnRef>
+          <a:fillRef idx="1">
+            <a:schemeClr val="accent1"/>
+          </a:fillRef>
+          <a:effectRef idx="0">
+            <a:schemeClr val="accent1"/>
+          </a:effectRef>
+          <a:fontRef idx="minor">
+            <a:schemeClr val="lt1"/>
+          </a:fontRef>
+        </p:style>
+        <p:txBody>
+          <a:bodyPr rtlCol="0" anchor="ctr"/>
+          <a:lstStyle/>
+          <a:p>
+            <a:pPr algn="ctr"/>
+            <a:endParaRPr lang="en-US"/>
+          </a:p>
+        </p:txBody>
+      </p:sp>
+      <p:pic>
+        <p:nvPicPr>
+          <p:cNvPr id="4" name="Content Placeholder 3" descr="Fundo do vetor de cores vibrantes salpicando">
+            <a:extLst>
+              <a:ext uri="{FF2B5EF4-FFF2-40B4-BE49-F238E27FC236}">
+                <a16:creationId xmlns:a16="http://schemas.microsoft.com/office/drawing/2014/main" id="{34B40899-91E7-E7D2-CD17-C442FE24D4D1}"/>
+              </a:ext>
+            </a:extLst>
+          </p:cNvPr>
+          <p:cNvPicPr>
+            <a:picLocks noChangeAspect="1"/>
+          </p:cNvPicPr>
+          <p:nvPr/>
+        </p:nvPicPr>
+        <p:blipFill rotWithShape="1">
+          <a:blip r:embed="rId2"/>
+          <a:srcRect l="10975" r="3072" b="-1"/>
+          <a:stretch/>
+        </p:blipFill>
+        <p:spPr>
+          <a:xfrm>
+            <a:off x="3523488" y="10"/>
+            <a:ext cx="8668512" cy="6857990"/>
+          </a:xfrm>
+          <a:prstGeom prst="rect">
+            <a:avLst/>
+          </a:prstGeom>
+        </p:spPr>
+      </p:pic>
+      <p:sp>
+        <p:nvSpPr>
+          <p:cNvPr id="16" name="Rectangle 15">
+            <a:extLst>
+              <a:ext uri="{FF2B5EF4-FFF2-40B4-BE49-F238E27FC236}">
+                <a16:creationId xmlns:a16="http://schemas.microsoft.com/office/drawing/2014/main" id="{097CD68E-23E3-4007-8847-CD0944C4F7BE}"/>
+              </a:ext>
+              <a:ext uri="{C183D7F6-B498-43B3-948B-1728B52AA6E4}">
+                <adec:decorative xmlns:adec="http://schemas.microsoft.com/office/drawing/2017/decorative" val="1"/>
+              </a:ext>
+            </a:extLst>
+          </p:cNvPr>
+          <p:cNvSpPr>
+            <a:spLocks noGrp="1" noRot="1" noChangeAspect="1" noMove="1" noResize="1" noEditPoints="1" noAdjustHandles="1" noChangeArrowheads="1" noChangeShapeType="1" noTextEdit="1"/>
+          </p:cNvSpPr>
+          <p:nvPr>
+            <p:extLst>
+              <p:ext uri="{386F3935-93C4-4BCD-93E2-E3B085C9AB24}">
+                <p16:designElem xmlns:p16="http://schemas.microsoft.com/office/powerpoint/2015/main" val="1"/>
+              </p:ext>
+            </p:extLst>
+          </p:nvPr>
+        </p:nvSpPr>
+        <p:spPr>
+          <a:xfrm>
+            <a:off x="0" y="0"/>
+            <a:ext cx="9756601" cy="6858000"/>
+          </a:xfrm>
+          <a:prstGeom prst="rect">
+            <a:avLst/>
+          </a:prstGeom>
+          <a:gradFill>
+            <a:gsLst>
+              <a:gs pos="58000">
+                <a:schemeClr val="bg1"/>
+              </a:gs>
+              <a:gs pos="35000">
+                <a:schemeClr val="bg1">
+                  <a:alpha val="79000"/>
+                </a:schemeClr>
+              </a:gs>
+              <a:gs pos="19000">
+                <a:schemeClr val="bg1">
+                  <a:alpha val="38000"/>
+                </a:schemeClr>
+              </a:gs>
+              <a:gs pos="0">
+                <a:schemeClr val="bg1">
+                  <a:alpha val="0"/>
+                </a:schemeClr>
+              </a:gs>
+              <a:gs pos="100000">
+                <a:schemeClr val="bg1"/>
+              </a:gs>
+            </a:gsLst>
+            <a:lin ang="10800000" scaled="0"/>
+          </a:gradFill>
+          <a:ln>
+            <a:noFill/>
+          </a:ln>
+        </p:spPr>
+        <p:style>
+          <a:lnRef idx="2">
+            <a:schemeClr val="accent1">
+              <a:shade val="50000"/>
+            </a:schemeClr>
+          </a:lnRef>
+          <a:fillRef idx="1">
+            <a:schemeClr val="accent1"/>
+          </a:fillRef>
+          <a:effectRef idx="0">
+            <a:schemeClr val="accent1"/>
+          </a:effectRef>
+          <a:fontRef idx="minor">
+            <a:schemeClr val="lt1"/>
+          </a:fontRef>
+        </p:style>
+        <p:txBody>
+          <a:bodyPr rtlCol="0" anchor="ctr"/>
+          <a:lstStyle/>
+          <a:p>
+            <a:pPr algn="ctr"/>
+            <a:endParaRPr lang="en-US" dirty="0"/>
+          </a:p>
+        </p:txBody>
+      </p:sp>
+      <p:sp>
+        <p:nvSpPr>
+          <p:cNvPr id="5" name="Título 1">
+            <a:extLst>
+              <a:ext uri="{FF2B5EF4-FFF2-40B4-BE49-F238E27FC236}">
+                <a16:creationId xmlns:a16="http://schemas.microsoft.com/office/drawing/2014/main" id="{D8E01A83-ECB9-D0EB-F669-E676BD0A43A5}"/>
+              </a:ext>
+            </a:extLst>
+          </p:cNvPr>
+          <p:cNvSpPr>
+            <a:spLocks noGrp="1"/>
+          </p:cNvSpPr>
+          <p:nvPr>
+            <p:ph type="title"/>
+          </p:nvPr>
+        </p:nvSpPr>
+        <p:spPr>
+          <a:xfrm>
+            <a:off x="477981" y="1122363"/>
+            <a:ext cx="4023360" cy="3204134"/>
+          </a:xfrm>
+        </p:spPr>
+        <p:txBody>
+          <a:bodyPr vert="horz" lIns="91440" tIns="45720" rIns="91440" bIns="45720" rtlCol="0" anchor="b">
+            <a:normAutofit/>
+          </a:bodyPr>
+          <a:lstStyle/>
+          <a:p>
+            <a:r>
+              <a:rPr lang="en-US" sz="4800" dirty="0"/>
+              <a:t>Aula 3 – </a:t>
+            </a:r>
+            <a:r>
+              <a:rPr lang="en-US" sz="4800" dirty="0" err="1"/>
+              <a:t>Estrutura</a:t>
+            </a:r>
+            <a:r>
+              <a:rPr lang="en-US" sz="4800" dirty="0"/>
+              <a:t> </a:t>
+            </a:r>
+            <a:r>
+              <a:rPr lang="en-US" sz="4800" dirty="0" err="1"/>
+              <a:t>Básica</a:t>
+            </a:r>
+            <a:r>
+              <a:rPr lang="en-US" sz="4800" dirty="0"/>
+              <a:t> do HTML</a:t>
+            </a:r>
+          </a:p>
+        </p:txBody>
+      </p:sp>
+      <p:sp>
+        <p:nvSpPr>
+          <p:cNvPr id="18" name="Rectangle 17">
+            <a:extLst>
+              <a:ext uri="{FF2B5EF4-FFF2-40B4-BE49-F238E27FC236}">
+                <a16:creationId xmlns:a16="http://schemas.microsoft.com/office/drawing/2014/main" id="{AF2F604E-43BE-4DC3-B983-E071523364F8}"/>
+              </a:ext>
+              <a:ext uri="{C183D7F6-B498-43B3-948B-1728B52AA6E4}">
+                <adec:decorative xmlns:adec="http://schemas.microsoft.com/office/drawing/2017/decorative" val="1"/>
+              </a:ext>
+            </a:extLst>
+          </p:cNvPr>
+          <p:cNvSpPr>
+            <a:spLocks noGrp="1" noRot="1" noChangeAspect="1" noMove="1" noResize="1" noEditPoints="1" noAdjustHandles="1" noChangeArrowheads="1" noChangeShapeType="1" noTextEdit="1"/>
+          </p:cNvSpPr>
+          <p:nvPr>
+            <p:extLst>
+              <p:ext uri="{386F3935-93C4-4BCD-93E2-E3B085C9AB24}">
+                <p16:designElem xmlns:p16="http://schemas.microsoft.com/office/powerpoint/2015/main" val="1"/>
+              </p:ext>
+            </p:extLst>
+          </p:nvPr>
+        </p:nvSpPr>
+        <p:spPr>
+          <a:xfrm rot="5400000">
+            <a:off x="759921" y="346791"/>
+            <a:ext cx="146304" cy="704088"/>
+          </a:xfrm>
+          <a:prstGeom prst="rect">
+            <a:avLst/>
+          </a:prstGeom>
+          <a:solidFill>
+            <a:schemeClr val="accent1"/>
+          </a:solidFill>
+          <a:ln>
+            <a:noFill/>
+          </a:ln>
+        </p:spPr>
+        <p:style>
+          <a:lnRef idx="2">
+            <a:schemeClr val="accent1">
+              <a:shade val="50000"/>
+            </a:schemeClr>
+          </a:lnRef>
+          <a:fillRef idx="1">
+            <a:schemeClr val="accent1"/>
+          </a:fillRef>
+          <a:effectRef idx="0">
+            <a:schemeClr val="accent1"/>
+          </a:effectRef>
+          <a:fontRef idx="minor">
+            <a:schemeClr val="lt1"/>
+          </a:fontRef>
+        </p:style>
+        <p:txBody>
+          <a:bodyPr rtlCol="0" anchor="ctr"/>
+          <a:lstStyle/>
+          <a:p>
+            <a:pPr marL="0" marR="0" lvl="0" indent="0" algn="ctr" defTabSz="914400" rtl="0" eaLnBrk="1" fontAlgn="auto" latinLnBrk="0" hangingPunct="1">
+              <a:lnSpc>
+                <a:spcPct val="100000"/>
+              </a:lnSpc>
+              <a:spcBef>
+                <a:spcPts val="0"/>
+              </a:spcBef>
+              <a:spcAft>
+                <a:spcPts val="0"/>
+              </a:spcAft>
+              <a:buClrTx/>
+              <a:buSzTx/>
+              <a:buFontTx/>
+              <a:buNone/>
+              <a:tabLst/>
+              <a:defRPr/>
+            </a:pPr>
+            <a:endParaRPr kumimoji="0" lang="en-US" sz="1800" b="0" i="0" u="none" strike="noStrike" kern="1200" cap="none" spc="0" normalizeH="0" baseline="0" noProof="0">
+              <a:ln>
+                <a:noFill/>
+              </a:ln>
+              <a:solidFill>
+                <a:prstClr val="white"/>
+              </a:solidFill>
+              <a:effectLst/>
+              <a:uLnTx/>
+              <a:uFillTx/>
+              <a:latin typeface="Calibri" panose="020F0502020204030204"/>
+              <a:ea typeface="+mn-ea"/>
+              <a:cs typeface="+mn-cs"/>
+            </a:endParaRPr>
+          </a:p>
+        </p:txBody>
+      </p:sp>
+      <p:sp>
+        <p:nvSpPr>
+          <p:cNvPr id="20" name="Rectangle 19">
+            <a:extLst>
+              <a:ext uri="{FF2B5EF4-FFF2-40B4-BE49-F238E27FC236}">
+                <a16:creationId xmlns:a16="http://schemas.microsoft.com/office/drawing/2014/main" id="{08C9B587-E65E-4B52-B37C-ABEBB6E87928}"/>
+              </a:ext>
+              <a:ext uri="{C183D7F6-B498-43B3-948B-1728B52AA6E4}">
+                <adec:decorative xmlns:adec="http://schemas.microsoft.com/office/drawing/2017/decorative" val="1"/>
+              </a:ext>
+            </a:extLst>
+          </p:cNvPr>
+          <p:cNvSpPr>
+            <a:spLocks noGrp="1" noRot="1" noChangeAspect="1" noMove="1" noResize="1" noEditPoints="1" noAdjustHandles="1" noChangeArrowheads="1" noChangeShapeType="1" noTextEdit="1"/>
+          </p:cNvSpPr>
+          <p:nvPr>
+            <p:extLst>
+              <p:ext uri="{386F3935-93C4-4BCD-93E2-E3B085C9AB24}">
+                <p16:designElem xmlns:p16="http://schemas.microsoft.com/office/powerpoint/2015/main" val="1"/>
+              </p:ext>
+            </p:extLst>
+          </p:nvPr>
+        </p:nvSpPr>
+        <p:spPr>
+          <a:xfrm>
+            <a:off x="481029" y="4546920"/>
+            <a:ext cx="3977640" cy="18288"/>
+          </a:xfrm>
+          <a:prstGeom prst="rect">
+            <a:avLst/>
+          </a:prstGeom>
+          <a:solidFill>
+            <a:schemeClr val="tx2">
+              <a:lumMod val="25000"/>
+              <a:lumOff val="75000"/>
+            </a:schemeClr>
+          </a:solidFill>
+          <a:ln w="3175">
+            <a:solidFill>
+              <a:schemeClr val="tx2">
+                <a:lumMod val="25000"/>
+                <a:lumOff val="75000"/>
+              </a:schemeClr>
+            </a:solidFill>
+          </a:ln>
+          <a:effectLst/>
+        </p:spPr>
+        <p:style>
+          <a:lnRef idx="2">
+            <a:schemeClr val="accent1">
+              <a:shade val="50000"/>
+            </a:schemeClr>
+          </a:lnRef>
+          <a:fillRef idx="1">
+            <a:schemeClr val="accent1"/>
+          </a:fillRef>
+          <a:effectRef idx="0">
+            <a:schemeClr val="accent1"/>
+          </a:effectRef>
+          <a:fontRef idx="minor">
+            <a:schemeClr val="lt1"/>
+          </a:fontRef>
+        </p:style>
+        <p:txBody>
+          <a:bodyPr rtlCol="0" anchor="ctr"/>
+          <a:lstStyle/>
+          <a:p>
+            <a:pPr marL="0" marR="0" lvl="0" indent="0" algn="ctr" defTabSz="914400" rtl="0" eaLnBrk="1" fontAlgn="auto" latinLnBrk="0" hangingPunct="1">
+              <a:lnSpc>
+                <a:spcPct val="100000"/>
+              </a:lnSpc>
+              <a:spcBef>
+                <a:spcPts val="0"/>
+              </a:spcBef>
+              <a:spcAft>
+                <a:spcPts val="0"/>
+              </a:spcAft>
+              <a:buClrTx/>
+              <a:buSzTx/>
+              <a:buFontTx/>
+              <a:buNone/>
+              <a:tabLst/>
+              <a:defRPr/>
+            </a:pPr>
+            <a:endParaRPr kumimoji="0" lang="en-US" sz="1800" b="0" i="0" u="none" strike="noStrike" kern="1200" cap="none" spc="0" normalizeH="0" baseline="0" noProof="0">
+              <a:ln>
+                <a:noFill/>
+              </a:ln>
+              <a:solidFill>
+                <a:prstClr val="white"/>
+              </a:solidFill>
+              <a:effectLst/>
+              <a:uLnTx/>
+              <a:uFillTx/>
+              <a:latin typeface="Calibri" panose="020F0502020204030204"/>
+              <a:ea typeface="+mn-ea"/>
+              <a:cs typeface="+mn-cs"/>
+            </a:endParaRPr>
+          </a:p>
+        </p:txBody>
+      </p:sp>
+    </p:spTree>
+    <p:extLst>
+      <p:ext uri="{BB962C8B-B14F-4D97-AF65-F5344CB8AC3E}">
+        <p14:creationId xmlns:p14="http://schemas.microsoft.com/office/powerpoint/2010/main" val="1739275303"/>
+      </p:ext>
+    </p:extLst>
+  </p:cSld>
+  <p:clrMapOvr>
+    <a:masterClrMapping/>
+  </p:clrMapOvr>
+  <p:timing>
+    <p:tnLst>
+      <p:par>
+        <p:cTn id="1" dur="indefinite" restart="never" nodeType="tmRoot">
+          <p:childTnLst>
+            <p:seq concurrent="1" nextAc="seek">
+              <p:cTn id="2" dur="indefinite" nodeType="mainSeq">
+                <p:childTnLst>
+                  <p:par>
+                    <p:cTn id="3" fill="hold">
+                      <p:stCondLst>
+                        <p:cond delay="indefinite"/>
+                        <p:cond evt="onBegin" delay="0">
+                          <p:tn val="2"/>
+                        </p:cond>
+                      </p:stCondLst>
+                      <p:childTnLst>
+                        <p:par>
+                          <p:cTn id="4" fill="hold">
+                            <p:stCondLst>
+                              <p:cond delay="0"/>
+                            </p:stCondLst>
+                            <p:childTnLst>
+                              <p:par>
+                                <p:cTn id="5" presetID="10" presetClass="entr" presetSubtype="0" fill="hold" grpId="0" nodeType="withEffect">
+                                  <p:stCondLst>
+                                    <p:cond delay="1000"/>
+                                  </p:stCondLst>
+                                  <p:iterate type="lt">
+                                    <p:tmPct val="10000"/>
+                                  </p:iterate>
+                                  <p:childTnLst>
+                                    <p:set>
+                                      <p:cBhvr>
+                                        <p:cTn id="6" dur="1" fill="hold">
+                                          <p:stCondLst>
+                                            <p:cond delay="0"/>
+                                          </p:stCondLst>
+                                        </p:cTn>
+                                        <p:tgtEl>
+                                          <p:spTgt spid="5"/>
+                                        </p:tgtEl>
+                                        <p:attrNameLst>
+                                          <p:attrName>style.visibility</p:attrName>
+                                        </p:attrNameLst>
+                                      </p:cBhvr>
+                                      <p:to>
+                                        <p:strVal val="visible"/>
+                                      </p:to>
+                                    </p:set>
+                                    <p:animEffect transition="in" filter="fade">
+                                      <p:cBhvr>
+                                        <p:cTn id="7" dur="400"/>
+                                        <p:tgtEl>
+                                          <p:spTgt spid="5"/>
+                                        </p:tgtEl>
+                                      </p:cBhvr>
+                                    </p:animEffect>
+                                  </p:childTnLst>
+                                </p:cTn>
+                              </p:par>
+                            </p:childTnLst>
+                          </p:cTn>
+                        </p:par>
+                      </p:childTnLst>
+                    </p:cTn>
+                  </p:par>
+                </p:childTnLst>
+              </p:cTn>
+              <p:prevCondLst>
+                <p:cond evt="onPrev" delay="0">
+                  <p:tgtEl>
+                    <p:sldTgt/>
+                  </p:tgtEl>
+                </p:cond>
+              </p:prevCondLst>
+              <p:nextCondLst>
+                <p:cond evt="onNext" delay="0">
+                  <p:tgtEl>
+                    <p:sldTgt/>
+                  </p:tgtEl>
+                </p:cond>
+              </p:nextCondLst>
+            </p:seq>
+          </p:childTnLst>
+        </p:cTn>
+      </p:par>
+    </p:tnLst>
+    <p:bldLst>
+      <p:bldP spid="5" grpId="0"/>
+    </p:bldLst>
+  </p:timing>
+</p:sld>
+</file>
+
+<file path=ppt/slides/slide61.xml><?xml version="1.0" encoding="utf-8"?>
+<p:sld xmlns:a="http://schemas.openxmlformats.org/drawingml/2006/main" xmlns:r="http://schemas.openxmlformats.org/officeDocument/2006/relationships" xmlns:p="http://schemas.openxmlformats.org/presentationml/2006/main">
+  <p:cSld>
+    <p:bg>
+      <p:bgPr>
+        <a:solidFill>
+          <a:schemeClr val="bg1"/>
+        </a:solidFill>
+        <a:effectLst/>
+      </p:bgPr>
+    </p:bg>
+    <p:spTree>
+      <p:nvGrpSpPr>
+        <p:cNvPr id="1" name=""/>
+        <p:cNvGrpSpPr/>
+        <p:nvPr/>
+      </p:nvGrpSpPr>
+      <p:grpSpPr>
+        <a:xfrm>
+          <a:off x="0" y="0"/>
+          <a:ext cx="0" cy="0"/>
+          <a:chOff x="0" y="0"/>
+          <a:chExt cx="0" cy="0"/>
+        </a:xfrm>
+      </p:grpSpPr>
+      <p:sp>
+        <p:nvSpPr>
+          <p:cNvPr id="10" name="Rectangle 9">
+            <a:extLst>
+              <a:ext uri="{FF2B5EF4-FFF2-40B4-BE49-F238E27FC236}">
+                <a16:creationId xmlns:a16="http://schemas.microsoft.com/office/drawing/2014/main" id="{8D06CE56-3881-4ADA-8CEF-D18B02C242A3}"/>
+              </a:ext>
+              <a:ext uri="{C183D7F6-B498-43B3-948B-1728B52AA6E4}">
+                <adec:decorative xmlns:adec="http://schemas.microsoft.com/office/drawing/2017/decorative" val="1"/>
+              </a:ext>
+            </a:extLst>
+          </p:cNvPr>
+          <p:cNvSpPr>
+            <a:spLocks noGrp="1" noRot="1" noChangeAspect="1" noMove="1" noResize="1" noEditPoints="1" noAdjustHandles="1" noChangeArrowheads="1" noChangeShapeType="1" noTextEdit="1"/>
+          </p:cNvSpPr>
+          <p:nvPr>
+            <p:extLst>
+              <p:ext uri="{386F3935-93C4-4BCD-93E2-E3B085C9AB24}">
+                <p16:designElem xmlns:p16="http://schemas.microsoft.com/office/powerpoint/2015/main" val="1"/>
+              </p:ext>
+            </p:extLst>
+          </p:nvPr>
+        </p:nvSpPr>
+        <p:spPr>
+          <a:xfrm rot="5400000">
+            <a:off x="857544" y="346791"/>
+            <a:ext cx="146304" cy="704088"/>
+          </a:xfrm>
+          <a:prstGeom prst="rect">
+            <a:avLst/>
+          </a:prstGeom>
+          <a:solidFill>
+            <a:schemeClr val="accent1"/>
+          </a:solidFill>
+          <a:ln>
+            <a:noFill/>
+          </a:ln>
+        </p:spPr>
+        <p:style>
+          <a:lnRef idx="2">
+            <a:schemeClr val="accent1">
+              <a:shade val="50000"/>
+            </a:schemeClr>
+          </a:lnRef>
+          <a:fillRef idx="1">
+            <a:schemeClr val="accent1"/>
+          </a:fillRef>
+          <a:effectRef idx="0">
+            <a:schemeClr val="accent1"/>
+          </a:effectRef>
+          <a:fontRef idx="minor">
+            <a:schemeClr val="lt1"/>
+          </a:fontRef>
+        </p:style>
+        <p:txBody>
+          <a:bodyPr rtlCol="0" anchor="ctr"/>
+          <a:lstStyle/>
+          <a:p>
+            <a:pPr marL="0" marR="0" lvl="0" indent="0" algn="ctr" defTabSz="914400" rtl="0" eaLnBrk="1" fontAlgn="auto" latinLnBrk="0" hangingPunct="1">
+              <a:lnSpc>
+                <a:spcPct val="100000"/>
+              </a:lnSpc>
+              <a:spcBef>
+                <a:spcPts val="0"/>
+              </a:spcBef>
+              <a:spcAft>
+                <a:spcPts val="0"/>
+              </a:spcAft>
+              <a:buClrTx/>
+              <a:buSzTx/>
+              <a:buFontTx/>
+              <a:buNone/>
+              <a:tabLst/>
+              <a:defRPr/>
+            </a:pPr>
+            <a:endParaRPr kumimoji="0" lang="en-US" sz="1800" b="0" i="0" u="none" strike="noStrike" kern="1200" cap="none" spc="0" normalizeH="0" baseline="0" noProof="0">
+              <a:ln>
+                <a:noFill/>
+              </a:ln>
+              <a:solidFill>
+                <a:prstClr val="white"/>
+              </a:solidFill>
+              <a:effectLst/>
+              <a:uLnTx/>
+              <a:uFillTx/>
+              <a:latin typeface="Calibri" panose="020F0502020204030204"/>
+              <a:ea typeface="+mn-ea"/>
+              <a:cs typeface="+mn-cs"/>
+            </a:endParaRPr>
+          </a:p>
+        </p:txBody>
+      </p:sp>
+      <p:sp>
+        <p:nvSpPr>
+          <p:cNvPr id="12" name="Rectangle 11">
+            <a:extLst>
+              <a:ext uri="{FF2B5EF4-FFF2-40B4-BE49-F238E27FC236}">
+                <a16:creationId xmlns:a16="http://schemas.microsoft.com/office/drawing/2014/main" id="{79F3C543-62EC-4433-9C93-A2CD8764E9B4}"/>
+              </a:ext>
+              <a:ext uri="{C183D7F6-B498-43B3-948B-1728B52AA6E4}">
+                <adec:decorative xmlns:adec="http://schemas.microsoft.com/office/drawing/2017/decorative" val="1"/>
+              </a:ext>
+            </a:extLst>
+          </p:cNvPr>
+          <p:cNvSpPr>
+            <a:spLocks noGrp="1" noRot="1" noChangeAspect="1" noMove="1" noResize="1" noEditPoints="1" noAdjustHandles="1" noChangeArrowheads="1" noChangeShapeType="1" noTextEdit="1"/>
+          </p:cNvSpPr>
+          <p:nvPr>
+            <p:extLst>
+              <p:ext uri="{386F3935-93C4-4BCD-93E2-E3B085C9AB24}">
+                <p16:designElem xmlns:p16="http://schemas.microsoft.com/office/powerpoint/2015/main" val="1"/>
+              </p:ext>
+            </p:extLst>
+          </p:nvPr>
+        </p:nvSpPr>
+        <p:spPr>
+          <a:xfrm flipV="1">
+            <a:off x="578652" y="4501201"/>
+            <a:ext cx="11034696" cy="18288"/>
+          </a:xfrm>
+          <a:prstGeom prst="rect">
+            <a:avLst/>
+          </a:prstGeom>
+          <a:solidFill>
+            <a:schemeClr val="tx2">
+              <a:lumMod val="25000"/>
+              <a:lumOff val="75000"/>
+            </a:schemeClr>
+          </a:solidFill>
+          <a:ln w="3175">
+            <a:noFill/>
+          </a:ln>
+          <a:effectLst/>
+        </p:spPr>
+        <p:style>
+          <a:lnRef idx="2">
+            <a:schemeClr val="accent1">
+              <a:shade val="50000"/>
+            </a:schemeClr>
+          </a:lnRef>
+          <a:fillRef idx="1">
+            <a:schemeClr val="accent1"/>
+          </a:fillRef>
+          <a:effectRef idx="0">
+            <a:schemeClr val="accent1"/>
+          </a:effectRef>
+          <a:fontRef idx="minor">
+            <a:schemeClr val="lt1"/>
+          </a:fontRef>
+        </p:style>
+        <p:txBody>
+          <a:bodyPr rtlCol="0" anchor="ctr"/>
+          <a:lstStyle/>
+          <a:p>
+            <a:pPr marL="0" marR="0" lvl="0" indent="0" algn="ctr" defTabSz="914400" rtl="0" eaLnBrk="1" fontAlgn="auto" latinLnBrk="0" hangingPunct="1">
+              <a:lnSpc>
+                <a:spcPct val="100000"/>
+              </a:lnSpc>
+              <a:spcBef>
+                <a:spcPts val="0"/>
+              </a:spcBef>
+              <a:spcAft>
+                <a:spcPts val="0"/>
+              </a:spcAft>
+              <a:buClrTx/>
+              <a:buSzTx/>
+              <a:buFontTx/>
+              <a:buNone/>
+              <a:tabLst/>
+              <a:defRPr/>
+            </a:pPr>
+            <a:endParaRPr kumimoji="0" lang="en-US" sz="1800" b="0" i="0" u="none" strike="noStrike" kern="1200" cap="none" spc="0" normalizeH="0" baseline="0" noProof="0">
+              <a:ln>
+                <a:noFill/>
+              </a:ln>
+              <a:solidFill>
+                <a:prstClr val="white"/>
+              </a:solidFill>
+              <a:effectLst/>
+              <a:uLnTx/>
+              <a:uFillTx/>
+              <a:latin typeface="Calibri" panose="020F0502020204030204"/>
+              <a:ea typeface="+mn-ea"/>
+              <a:cs typeface="+mn-cs"/>
+            </a:endParaRPr>
+          </a:p>
+        </p:txBody>
+      </p:sp>
+      <p:sp>
+        <p:nvSpPr>
+          <p:cNvPr id="14" name="Rectangle 13">
+            <a:extLst>
+              <a:ext uri="{FF2B5EF4-FFF2-40B4-BE49-F238E27FC236}">
+                <a16:creationId xmlns:a16="http://schemas.microsoft.com/office/drawing/2014/main" id="{0EECA69B-4C2A-7F31-8019-E90DB3BD49CB}"/>
+              </a:ext>
+              <a:ext uri="{C183D7F6-B498-43B3-948B-1728B52AA6E4}">
+                <adec:decorative xmlns:adec="http://schemas.microsoft.com/office/drawing/2017/decorative" val="1"/>
+              </a:ext>
+            </a:extLst>
+          </p:cNvPr>
+          <p:cNvSpPr>
+            <a:spLocks noGrp="1" noRot="1" noChangeAspect="1" noMove="1" noResize="1" noEditPoints="1" noAdjustHandles="1" noChangeArrowheads="1" noChangeShapeType="1" noTextEdit="1"/>
+          </p:cNvSpPr>
+          <p:nvPr>
+            <p:extLst>
+              <p:ext uri="{386F3935-93C4-4BCD-93E2-E3B085C9AB24}">
+                <p16:designElem xmlns:p16="http://schemas.microsoft.com/office/powerpoint/2015/main" val="1"/>
+              </p:ext>
+            </p:extLst>
+          </p:nvPr>
+        </p:nvSpPr>
+        <p:spPr>
+          <a:xfrm>
+            <a:off x="0" y="0"/>
+            <a:ext cx="12192000" cy="6858000"/>
+          </a:xfrm>
+          <a:prstGeom prst="rect">
+            <a:avLst/>
+          </a:prstGeom>
+          <a:solidFill>
+            <a:schemeClr val="bg1"/>
+          </a:solidFill>
+          <a:ln w="12700" cap="flat" cmpd="sng" algn="ctr">
+            <a:noFill/>
+            <a:prstDash val="solid"/>
+            <a:miter lim="800000"/>
+          </a:ln>
+          <a:effectLst/>
+          <a:extLst>
+            <a:ext uri="{91240B29-F687-4F45-9708-019B960494DF}">
+              <a14:hiddenLine xmlns:a14="http://schemas.microsoft.com/office/drawing/2010/main" w="12700" cap="flat" cmpd="sng" algn="ctr">
+                <a:solidFill>
+                  <a:schemeClr val="accent1">
+                    <a:shade val="15000"/>
+                  </a:schemeClr>
+                </a:solidFill>
+                <a:prstDash val="solid"/>
+                <a:miter lim="800000"/>
+              </a14:hiddenLine>
+            </a:ext>
+          </a:extLst>
+        </p:spPr>
+        <p:style>
+          <a:lnRef idx="2">
+            <a:schemeClr val="accent1">
+              <a:shade val="15000"/>
+            </a:schemeClr>
+          </a:lnRef>
+          <a:fillRef idx="1">
+            <a:schemeClr val="accent1"/>
+          </a:fillRef>
+          <a:effectRef idx="0">
+            <a:schemeClr val="accent1"/>
+          </a:effectRef>
+          <a:fontRef idx="minor">
+            <a:schemeClr val="lt1"/>
+          </a:fontRef>
+        </p:style>
+        <p:txBody>
+          <a:bodyPr rtlCol="0" anchor="ctr"/>
+          <a:lstStyle/>
+          <a:p>
+            <a:pPr marL="0" marR="0" lvl="0" indent="0" algn="ctr" defTabSz="914400" rtl="0" eaLnBrk="1" fontAlgn="auto" latinLnBrk="0" hangingPunct="1">
+              <a:lnSpc>
+                <a:spcPct val="100000"/>
+              </a:lnSpc>
+              <a:spcBef>
+                <a:spcPts val="0"/>
+              </a:spcBef>
+              <a:spcAft>
+                <a:spcPts val="0"/>
+              </a:spcAft>
+              <a:buClrTx/>
+              <a:buSzTx/>
+              <a:buFontTx/>
+              <a:buNone/>
+              <a:tabLst/>
+              <a:defRPr/>
+            </a:pPr>
+            <a:endParaRPr kumimoji="0" lang="en-US" sz="1800" b="0" i="0" u="none" strike="noStrike" kern="1200" cap="none" spc="0" normalizeH="0" baseline="0" noProof="0">
+              <a:ln>
+                <a:noFill/>
+              </a:ln>
+              <a:solidFill>
+                <a:prstClr val="white"/>
+              </a:solidFill>
+              <a:effectLst/>
+              <a:uLnTx/>
+              <a:uFillTx/>
+              <a:latin typeface="Avenir Next LT Pro"/>
+              <a:ea typeface="+mn-ea"/>
+              <a:cs typeface="+mn-cs"/>
+            </a:endParaRPr>
+          </a:p>
+        </p:txBody>
+      </p:sp>
+      <p:pic>
+        <p:nvPicPr>
+          <p:cNvPr id="5" name="Espaço Reservado para Conteúdo 4" descr="Diagrama sobre a árvore do HTML.">
+            <a:extLst>
+              <a:ext uri="{FF2B5EF4-FFF2-40B4-BE49-F238E27FC236}">
+                <a16:creationId xmlns:a16="http://schemas.microsoft.com/office/drawing/2014/main" id="{B99D9B56-6E5C-3753-89CB-66E71BA029D3}"/>
+              </a:ext>
+            </a:extLst>
+          </p:cNvPr>
+          <p:cNvPicPr>
+            <a:picLocks noGrp="1" noChangeAspect="1"/>
+          </p:cNvPicPr>
+          <p:nvPr>
+            <p:ph idx="1"/>
+          </p:nvPr>
+        </p:nvPicPr>
+        <p:blipFill>
+          <a:blip r:embed="rId2">
+            <a:extLst>
+              <a:ext uri="{28A0092B-C50C-407E-A947-70E740481C1C}">
+                <a14:useLocalDpi xmlns:a14="http://schemas.microsoft.com/office/drawing/2010/main" val="0"/>
+              </a:ext>
+            </a:extLst>
+          </a:blip>
+          <a:srcRect/>
+          <a:stretch/>
+        </p:blipFill>
+        <p:spPr>
+          <a:xfrm>
+            <a:off x="20" y="10"/>
+            <a:ext cx="12191980" cy="6857990"/>
+          </a:xfrm>
+          <a:prstGeom prst="rect">
+            <a:avLst/>
+          </a:prstGeom>
+        </p:spPr>
+      </p:pic>
+      <p:sp>
+        <p:nvSpPr>
+          <p:cNvPr id="16" name="Rectangle 15">
+            <a:extLst>
+              <a:ext uri="{FF2B5EF4-FFF2-40B4-BE49-F238E27FC236}">
+                <a16:creationId xmlns:a16="http://schemas.microsoft.com/office/drawing/2014/main" id="{857DEAC1-B3AA-6569-0A44-A191DF2F3C67}"/>
+              </a:ext>
+              <a:ext uri="{C183D7F6-B498-43B3-948B-1728B52AA6E4}">
+                <adec:decorative xmlns:adec="http://schemas.microsoft.com/office/drawing/2017/decorative" val="1"/>
+              </a:ext>
+            </a:extLst>
+          </p:cNvPr>
+          <p:cNvSpPr>
+            <a:spLocks noGrp="1" noRot="1" noChangeAspect="1" noMove="1" noResize="1" noEditPoints="1" noAdjustHandles="1" noChangeArrowheads="1" noChangeShapeType="1" noTextEdit="1"/>
+          </p:cNvSpPr>
+          <p:nvPr>
+            <p:extLst>
+              <p:ext uri="{386F3935-93C4-4BCD-93E2-E3B085C9AB24}">
+                <p16:designElem xmlns:p16="http://schemas.microsoft.com/office/powerpoint/2015/main" val="1"/>
+              </p:ext>
+            </p:extLst>
+          </p:nvPr>
+        </p:nvSpPr>
+        <p:spPr>
+          <a:xfrm>
+            <a:off x="0" y="5702155"/>
+            <a:ext cx="12191999" cy="1155845"/>
+          </a:xfrm>
+          <a:prstGeom prst="rect">
+            <a:avLst/>
+          </a:prstGeom>
+          <a:solidFill>
+            <a:schemeClr val="bg1">
+              <a:alpha val="50000"/>
+            </a:schemeClr>
+          </a:solidFill>
+          <a:ln>
+            <a:noFill/>
+          </a:ln>
+        </p:spPr>
+        <p:style>
+          <a:lnRef idx="2">
+            <a:schemeClr val="accent1">
+              <a:shade val="50000"/>
+            </a:schemeClr>
+          </a:lnRef>
+          <a:fillRef idx="1">
+            <a:schemeClr val="accent1"/>
+          </a:fillRef>
+          <a:effectRef idx="0">
+            <a:schemeClr val="accent1"/>
+          </a:effectRef>
+          <a:fontRef idx="minor">
+            <a:schemeClr val="lt1"/>
+          </a:fontRef>
+        </p:style>
+        <p:txBody>
+          <a:bodyPr rtlCol="0" anchor="ctr"/>
+          <a:lstStyle/>
+          <a:p>
+            <a:pPr marL="0" marR="0" lvl="0" indent="0" algn="ctr" defTabSz="914400" rtl="0" eaLnBrk="1" fontAlgn="auto" latinLnBrk="0" hangingPunct="1">
+              <a:lnSpc>
+                <a:spcPct val="100000"/>
+              </a:lnSpc>
+              <a:spcBef>
+                <a:spcPts val="0"/>
+              </a:spcBef>
+              <a:spcAft>
+                <a:spcPts val="0"/>
+              </a:spcAft>
+              <a:buClrTx/>
+              <a:buSzTx/>
+              <a:buFontTx/>
+              <a:buNone/>
+              <a:tabLst/>
+              <a:defRPr/>
+            </a:pPr>
+            <a:endParaRPr kumimoji="0" lang="en-US" sz="1800" b="0" i="0" u="none" strike="noStrike" kern="1200" cap="none" spc="0" normalizeH="0" baseline="0" noProof="0">
+              <a:ln>
+                <a:noFill/>
+              </a:ln>
+              <a:solidFill>
+                <a:prstClr val="white"/>
+              </a:solidFill>
+              <a:effectLst/>
+              <a:uLnTx/>
+              <a:uFillTx/>
+              <a:latin typeface="Avenir Next LT Pro"/>
+              <a:ea typeface="+mn-ea"/>
+              <a:cs typeface="+mn-cs"/>
+            </a:endParaRPr>
+          </a:p>
+        </p:txBody>
+      </p:sp>
+      <p:sp>
+        <p:nvSpPr>
+          <p:cNvPr id="18" name="Rectangle 17">
+            <a:extLst>
+              <a:ext uri="{FF2B5EF4-FFF2-40B4-BE49-F238E27FC236}">
+                <a16:creationId xmlns:a16="http://schemas.microsoft.com/office/drawing/2014/main" id="{47F32F7B-3250-A16C-13CF-57F728E049F6}"/>
+              </a:ext>
+              <a:ext uri="{C183D7F6-B498-43B3-948B-1728B52AA6E4}">
+                <adec:decorative xmlns:adec="http://schemas.microsoft.com/office/drawing/2017/decorative" val="1"/>
+              </a:ext>
+            </a:extLst>
+          </p:cNvPr>
+          <p:cNvSpPr>
+            <a:spLocks noGrp="1" noRot="1" noChangeAspect="1" noMove="1" noResize="1" noEditPoints="1" noAdjustHandles="1" noChangeArrowheads="1" noChangeShapeType="1" noTextEdit="1"/>
+          </p:cNvSpPr>
+          <p:nvPr>
+            <p:extLst>
+              <p:ext uri="{386F3935-93C4-4BCD-93E2-E3B085C9AB24}">
+                <p16:designElem xmlns:p16="http://schemas.microsoft.com/office/powerpoint/2015/main" val="1"/>
+              </p:ext>
+            </p:extLst>
+          </p:nvPr>
+        </p:nvSpPr>
+        <p:spPr>
+          <a:xfrm>
+            <a:off x="0" y="5924386"/>
+            <a:ext cx="128016" cy="653903"/>
+          </a:xfrm>
+          <a:prstGeom prst="rect">
+            <a:avLst/>
+          </a:prstGeom>
+          <a:solidFill>
+            <a:schemeClr val="accent1"/>
+          </a:solidFill>
+          <a:ln>
+            <a:noFill/>
+          </a:ln>
+        </p:spPr>
+        <p:style>
+          <a:lnRef idx="2">
+            <a:schemeClr val="accent1">
+              <a:shade val="50000"/>
+            </a:schemeClr>
+          </a:lnRef>
+          <a:fillRef idx="1">
+            <a:schemeClr val="accent1"/>
+          </a:fillRef>
+          <a:effectRef idx="0">
+            <a:schemeClr val="accent1"/>
+          </a:effectRef>
+          <a:fontRef idx="minor">
+            <a:schemeClr val="lt1"/>
+          </a:fontRef>
+        </p:style>
+        <p:txBody>
+          <a:bodyPr rtlCol="0" anchor="ctr"/>
+          <a:lstStyle/>
+          <a:p>
+            <a:pPr marL="0" marR="0" lvl="0" indent="0" algn="ctr" defTabSz="914400" rtl="0" eaLnBrk="1" fontAlgn="auto" latinLnBrk="0" hangingPunct="1">
+              <a:lnSpc>
+                <a:spcPct val="100000"/>
+              </a:lnSpc>
+              <a:spcBef>
+                <a:spcPts val="0"/>
+              </a:spcBef>
+              <a:spcAft>
+                <a:spcPts val="0"/>
+              </a:spcAft>
+              <a:buClrTx/>
+              <a:buSzTx/>
+              <a:buFontTx/>
+              <a:buNone/>
+              <a:tabLst/>
+              <a:defRPr/>
+            </a:pPr>
+            <a:endParaRPr kumimoji="0" lang="en-US" sz="1800" b="0" i="0" u="none" strike="noStrike" kern="1200" cap="none" spc="0" normalizeH="0" baseline="0" noProof="0">
+              <a:ln>
+                <a:noFill/>
+              </a:ln>
+              <a:solidFill>
+                <a:prstClr val="white"/>
+              </a:solidFill>
+              <a:effectLst/>
+              <a:uLnTx/>
+              <a:uFillTx/>
+              <a:latin typeface="Calibri" panose="020F0502020204030204"/>
+              <a:ea typeface="+mn-ea"/>
+              <a:cs typeface="+mn-cs"/>
+            </a:endParaRPr>
+          </a:p>
+        </p:txBody>
+      </p:sp>
+      <p:sp>
+        <p:nvSpPr>
+          <p:cNvPr id="20" name="Rectangle 19">
+            <a:extLst>
+              <a:ext uri="{FF2B5EF4-FFF2-40B4-BE49-F238E27FC236}">
+                <a16:creationId xmlns:a16="http://schemas.microsoft.com/office/drawing/2014/main" id="{98DE8DCB-6F40-A3E0-5DE3-7510A3C2A35F}"/>
+              </a:ext>
+              <a:ext uri="{C183D7F6-B498-43B3-948B-1728B52AA6E4}">
+                <adec:decorative xmlns:adec="http://schemas.microsoft.com/office/drawing/2017/decorative" val="1"/>
+              </a:ext>
+            </a:extLst>
+          </p:cNvPr>
+          <p:cNvSpPr>
+            <a:spLocks noGrp="1" noRot="1" noChangeAspect="1" noMove="1" noResize="1" noEditPoints="1" noAdjustHandles="1" noChangeArrowheads="1" noChangeShapeType="1" noTextEdit="1"/>
+          </p:cNvSpPr>
+          <p:nvPr>
+            <p:extLst>
+              <p:ext uri="{386F3935-93C4-4BCD-93E2-E3B085C9AB24}">
+                <p16:designElem xmlns:p16="http://schemas.microsoft.com/office/powerpoint/2015/main" val="1"/>
+              </p:ext>
+            </p:extLst>
+          </p:nvPr>
+        </p:nvSpPr>
+        <p:spPr>
+          <a:xfrm rot="5400000">
+            <a:off x="7758348" y="6276696"/>
+            <a:ext cx="731520" cy="9144"/>
+          </a:xfrm>
+          <a:prstGeom prst="rect">
+            <a:avLst/>
+          </a:prstGeom>
+          <a:solidFill>
+            <a:schemeClr val="tx2">
+              <a:lumMod val="25000"/>
+              <a:lumOff val="75000"/>
+            </a:schemeClr>
+          </a:solidFill>
+          <a:ln w="3175">
+            <a:noFill/>
+          </a:ln>
+          <a:effectLst/>
+        </p:spPr>
+        <p:style>
+          <a:lnRef idx="2">
+            <a:schemeClr val="accent1">
+              <a:shade val="50000"/>
+            </a:schemeClr>
+          </a:lnRef>
+          <a:fillRef idx="1">
+            <a:schemeClr val="accent1"/>
+          </a:fillRef>
+          <a:effectRef idx="0">
+            <a:schemeClr val="accent1"/>
+          </a:effectRef>
+          <a:fontRef idx="minor">
+            <a:schemeClr val="lt1"/>
+          </a:fontRef>
+        </p:style>
+        <p:txBody>
+          <a:bodyPr rtlCol="0" anchor="ctr"/>
+          <a:lstStyle/>
+          <a:p>
+            <a:pPr marL="0" marR="0" lvl="0" indent="0" algn="ctr" defTabSz="914400" rtl="0" eaLnBrk="1" fontAlgn="auto" latinLnBrk="0" hangingPunct="1">
+              <a:lnSpc>
+                <a:spcPct val="100000"/>
+              </a:lnSpc>
+              <a:spcBef>
+                <a:spcPts val="0"/>
+              </a:spcBef>
+              <a:spcAft>
+                <a:spcPts val="0"/>
+              </a:spcAft>
+              <a:buClrTx/>
+              <a:buSzTx/>
+              <a:buFontTx/>
+              <a:buNone/>
+              <a:tabLst/>
+              <a:defRPr/>
+            </a:pPr>
+            <a:endParaRPr kumimoji="0" lang="en-US" sz="1800" b="0" i="0" u="none" strike="noStrike" kern="1200" cap="none" spc="0" normalizeH="0" baseline="0" noProof="0">
+              <a:ln>
+                <a:noFill/>
+              </a:ln>
+              <a:solidFill>
+                <a:prstClr val="white"/>
+              </a:solidFill>
+              <a:effectLst/>
+              <a:uLnTx/>
+              <a:uFillTx/>
+              <a:latin typeface="Calibri" panose="020F0502020204030204"/>
+              <a:ea typeface="+mn-ea"/>
+              <a:cs typeface="+mn-cs"/>
+            </a:endParaRPr>
+          </a:p>
+        </p:txBody>
+      </p:sp>
+    </p:spTree>
+    <p:extLst>
+      <p:ext uri="{BB962C8B-B14F-4D97-AF65-F5344CB8AC3E}">
+        <p14:creationId xmlns:p14="http://schemas.microsoft.com/office/powerpoint/2010/main" val="468309060"/>
+      </p:ext>
+    </p:extLst>
+  </p:cSld>
+  <p:clrMapOvr>
+    <a:overrideClrMapping bg1="dk1" tx1="lt1" bg2="dk2" tx2="lt2" accent1="accent1" accent2="accent2" accent3="accent3" accent4="accent4" accent5="accent5" accent6="accent6" hlink="hlink" folHlink="folHlink"/>
+  </p:clrMapOvr>
+</p:sld>
+</file>
+
+<file path=ppt/slides/slide62.xml><?xml version="1.0" encoding="utf-8"?>
+<p:sld xmlns:a="http://schemas.openxmlformats.org/drawingml/2006/main" xmlns:r="http://schemas.openxmlformats.org/officeDocument/2006/relationships" xmlns:p="http://schemas.openxmlformats.org/presentationml/2006/main">
+  <p:cSld>
+    <p:spTree>
+      <p:nvGrpSpPr>
+        <p:cNvPr id="1" name=""/>
+        <p:cNvGrpSpPr/>
+        <p:nvPr/>
+      </p:nvGrpSpPr>
+      <p:grpSpPr>
+        <a:xfrm>
+          <a:off x="0" y="0"/>
+          <a:ext cx="0" cy="0"/>
+          <a:chOff x="0" y="0"/>
+          <a:chExt cx="0" cy="0"/>
+        </a:xfrm>
+      </p:grpSpPr>
+      <p:sp>
+        <p:nvSpPr>
+          <p:cNvPr id="2" name="Título 1">
+            <a:extLst>
+              <a:ext uri="{FF2B5EF4-FFF2-40B4-BE49-F238E27FC236}">
+                <a16:creationId xmlns:a16="http://schemas.microsoft.com/office/drawing/2014/main" id="{20708B49-733B-BF0B-BC43-2CDC3F4B2715}"/>
+              </a:ext>
+            </a:extLst>
+          </p:cNvPr>
+          <p:cNvSpPr>
+            <a:spLocks noGrp="1"/>
+          </p:cNvSpPr>
+          <p:nvPr>
+            <p:ph type="title"/>
+          </p:nvPr>
+        </p:nvSpPr>
+        <p:spPr/>
+        <p:txBody>
+          <a:bodyPr>
+            <a:normAutofit/>
+          </a:bodyPr>
+          <a:lstStyle/>
+          <a:p>
+            <a:r>
+              <a:rPr lang="pt-BR" dirty="0"/>
+              <a:t>Head – Cabeçalho</a:t>
+            </a:r>
+          </a:p>
+        </p:txBody>
+      </p:sp>
+      <p:sp>
+        <p:nvSpPr>
+          <p:cNvPr id="3" name="Espaço Reservado para Conteúdo 2">
+            <a:extLst>
+              <a:ext uri="{FF2B5EF4-FFF2-40B4-BE49-F238E27FC236}">
+                <a16:creationId xmlns:a16="http://schemas.microsoft.com/office/drawing/2014/main" id="{2F21AFF4-7022-8DAC-6EC8-C2B70C3005ED}"/>
+              </a:ext>
+            </a:extLst>
+          </p:cNvPr>
+          <p:cNvSpPr>
+            <a:spLocks noGrp="1"/>
+          </p:cNvSpPr>
+          <p:nvPr>
+            <p:ph idx="1"/>
+          </p:nvPr>
+        </p:nvSpPr>
+        <p:spPr/>
+        <p:txBody>
+          <a:bodyPr/>
+          <a:lstStyle/>
+          <a:p>
+            <a:r>
+              <a:rPr lang="pt-BR" dirty="0"/>
+              <a:t>O cabeçalho é o local que contém as configurações de uma página, tais como:</a:t>
+            </a:r>
+          </a:p>
+          <a:p>
+            <a:pPr marL="914400" lvl="1" indent="-457200">
+              <a:buFont typeface="+mj-lt"/>
+              <a:buAutoNum type="arabicPeriod"/>
+            </a:pPr>
+            <a:r>
+              <a:rPr lang="pt-BR" dirty="0"/>
+              <a:t>Título;</a:t>
+            </a:r>
+          </a:p>
+          <a:p>
+            <a:pPr marL="914400" lvl="1" indent="-457200">
+              <a:buFont typeface="+mj-lt"/>
+              <a:buAutoNum type="arabicPeriod"/>
+            </a:pPr>
+            <a:r>
+              <a:rPr lang="pt-BR" dirty="0"/>
+              <a:t>Codificação;</a:t>
+            </a:r>
+          </a:p>
+          <a:p>
+            <a:pPr marL="914400" lvl="1" indent="-457200">
+              <a:buFont typeface="+mj-lt"/>
+              <a:buAutoNum type="arabicPeriod"/>
+            </a:pPr>
+            <a:r>
+              <a:rPr lang="pt-BR" dirty="0"/>
+              <a:t>Estilos....</a:t>
+            </a:r>
+          </a:p>
+        </p:txBody>
+      </p:sp>
+    </p:spTree>
+    <p:extLst>
+      <p:ext uri="{BB962C8B-B14F-4D97-AF65-F5344CB8AC3E}">
+        <p14:creationId xmlns:p14="http://schemas.microsoft.com/office/powerpoint/2010/main" val="3096371945"/>
+      </p:ext>
+    </p:extLst>
+  </p:cSld>
+  <p:clrMapOvr>
+    <a:masterClrMapping/>
+  </p:clrMapOvr>
+</p:sld>
+</file>
+
+<file path=ppt/slides/slide63.xml><?xml version="1.0" encoding="utf-8"?>
+<p:sld xmlns:a="http://schemas.openxmlformats.org/drawingml/2006/main" xmlns:r="http://schemas.openxmlformats.org/officeDocument/2006/relationships" xmlns:p="http://schemas.openxmlformats.org/presentationml/2006/main">
+  <p:cSld>
+    <p:spTree>
+      <p:nvGrpSpPr>
+        <p:cNvPr id="1" name=""/>
+        <p:cNvGrpSpPr/>
+        <p:nvPr/>
+      </p:nvGrpSpPr>
+      <p:grpSpPr>
+        <a:xfrm>
+          <a:off x="0" y="0"/>
+          <a:ext cx="0" cy="0"/>
+          <a:chOff x="0" y="0"/>
+          <a:chExt cx="0" cy="0"/>
+        </a:xfrm>
+      </p:grpSpPr>
+      <p:sp>
+        <p:nvSpPr>
+          <p:cNvPr id="2" name="Título 1">
+            <a:extLst>
+              <a:ext uri="{FF2B5EF4-FFF2-40B4-BE49-F238E27FC236}">
+                <a16:creationId xmlns:a16="http://schemas.microsoft.com/office/drawing/2014/main" id="{952E5379-B3AA-94FE-630F-D9038CCBC5FE}"/>
+              </a:ext>
+            </a:extLst>
+          </p:cNvPr>
+          <p:cNvSpPr>
+            <a:spLocks noGrp="1"/>
+          </p:cNvSpPr>
+          <p:nvPr>
+            <p:ph type="title"/>
+          </p:nvPr>
+        </p:nvSpPr>
+        <p:spPr/>
+        <p:txBody>
+          <a:bodyPr/>
+          <a:lstStyle/>
+          <a:p>
+            <a:r>
+              <a:rPr lang="pt-BR" dirty="0"/>
+              <a:t>Body – Corpo</a:t>
+            </a:r>
+          </a:p>
+        </p:txBody>
+      </p:sp>
+      <p:sp>
+        <p:nvSpPr>
+          <p:cNvPr id="3" name="Espaço Reservado para Conteúdo 2">
+            <a:extLst>
+              <a:ext uri="{FF2B5EF4-FFF2-40B4-BE49-F238E27FC236}">
+                <a16:creationId xmlns:a16="http://schemas.microsoft.com/office/drawing/2014/main" id="{E4A9D119-AEAF-7F37-86F2-1D8E58B2B811}"/>
+              </a:ext>
+            </a:extLst>
+          </p:cNvPr>
+          <p:cNvSpPr>
+            <a:spLocks noGrp="1"/>
+          </p:cNvSpPr>
+          <p:nvPr>
+            <p:ph idx="1"/>
+          </p:nvPr>
+        </p:nvSpPr>
+        <p:spPr/>
+        <p:txBody>
+          <a:bodyPr/>
+          <a:lstStyle/>
+          <a:p>
+            <a:r>
+              <a:rPr lang="pt-BR" dirty="0"/>
+              <a:t>É o conteúdo da página propriamente dito. </a:t>
+            </a:r>
+          </a:p>
+          <a:p>
+            <a:r>
+              <a:rPr lang="pt-BR" dirty="0"/>
+              <a:t>Títulos;</a:t>
+            </a:r>
+          </a:p>
+          <a:p>
+            <a:r>
+              <a:rPr lang="pt-BR" dirty="0"/>
+              <a:t>Textos;</a:t>
+            </a:r>
+          </a:p>
+          <a:p>
+            <a:r>
+              <a:rPr lang="pt-BR" dirty="0"/>
+              <a:t>Imagens....</a:t>
+            </a:r>
+          </a:p>
+        </p:txBody>
+      </p:sp>
+    </p:spTree>
+    <p:extLst>
+      <p:ext uri="{BB962C8B-B14F-4D97-AF65-F5344CB8AC3E}">
+        <p14:creationId xmlns:p14="http://schemas.microsoft.com/office/powerpoint/2010/main" val="1641097225"/>
+      </p:ext>
+    </p:extLst>
+  </p:cSld>
+  <p:clrMapOvr>
+    <a:masterClrMapping/>
+  </p:clrMapOvr>
+</p:sld>
+</file>
+
+<file path=ppt/slides/slide64.xml><?xml version="1.0" encoding="utf-8"?>
+<p:sld xmlns:a="http://schemas.openxmlformats.org/drawingml/2006/main" xmlns:r="http://schemas.openxmlformats.org/officeDocument/2006/relationships" xmlns:p="http://schemas.openxmlformats.org/presentationml/2006/main">
+  <p:cSld>
+    <p:spTree>
+      <p:nvGrpSpPr>
+        <p:cNvPr id="1" name=""/>
+        <p:cNvGrpSpPr/>
+        <p:nvPr/>
+      </p:nvGrpSpPr>
+      <p:grpSpPr>
+        <a:xfrm>
+          <a:off x="0" y="0"/>
+          <a:ext cx="0" cy="0"/>
+          <a:chOff x="0" y="0"/>
+          <a:chExt cx="0" cy="0"/>
+        </a:xfrm>
+      </p:grpSpPr>
+      <p:sp>
+        <p:nvSpPr>
+          <p:cNvPr id="2" name="Título 1">
+            <a:extLst>
+              <a:ext uri="{FF2B5EF4-FFF2-40B4-BE49-F238E27FC236}">
+                <a16:creationId xmlns:a16="http://schemas.microsoft.com/office/drawing/2014/main" id="{D1230989-08A4-DBB7-D064-0CC6478722A0}"/>
+              </a:ext>
+            </a:extLst>
+          </p:cNvPr>
+          <p:cNvSpPr>
+            <a:spLocks noGrp="1"/>
+          </p:cNvSpPr>
+          <p:nvPr>
+            <p:ph type="title"/>
+          </p:nvPr>
+        </p:nvSpPr>
+        <p:spPr/>
+        <p:txBody>
+          <a:bodyPr/>
+          <a:lstStyle/>
+          <a:p>
+            <a:r>
+              <a:rPr lang="pt-BR" dirty="0"/>
+              <a:t>Construção da Render </a:t>
+            </a:r>
+            <a:r>
+              <a:rPr lang="pt-BR" dirty="0" err="1"/>
+              <a:t>Tree</a:t>
+            </a:r>
+            <a:endParaRPr lang="pt-BR" dirty="0"/>
+          </a:p>
+        </p:txBody>
+      </p:sp>
+      <p:sp>
+        <p:nvSpPr>
+          <p:cNvPr id="3" name="Espaço Reservado para Conteúdo 2">
+            <a:extLst>
+              <a:ext uri="{FF2B5EF4-FFF2-40B4-BE49-F238E27FC236}">
+                <a16:creationId xmlns:a16="http://schemas.microsoft.com/office/drawing/2014/main" id="{EA3A945B-A7B6-53E8-A65D-7B14095DF232}"/>
+              </a:ext>
+            </a:extLst>
+          </p:cNvPr>
+          <p:cNvSpPr>
+            <a:spLocks noGrp="1"/>
+          </p:cNvSpPr>
+          <p:nvPr>
+            <p:ph idx="1"/>
+          </p:nvPr>
+        </p:nvSpPr>
+        <p:spPr/>
+        <p:txBody>
+          <a:bodyPr/>
+          <a:lstStyle/>
+          <a:p>
+            <a:r>
+              <a:rPr lang="pt-BR" dirty="0"/>
+              <a:t>O </a:t>
+            </a:r>
+            <a:r>
+              <a:rPr lang="pt-BR" dirty="0" err="1"/>
+              <a:t>head</a:t>
+            </a:r>
+            <a:r>
+              <a:rPr lang="pt-BR" dirty="0"/>
+              <a:t> mostra ao navegador como a página deve se comportar, portanto, ele vem primeiro. </a:t>
+            </a:r>
+          </a:p>
+          <a:p>
+            <a:r>
+              <a:rPr lang="pt-BR" dirty="0"/>
+              <a:t>Não vou explicar com mais detalhes.</a:t>
+            </a:r>
+          </a:p>
+        </p:txBody>
+      </p:sp>
+    </p:spTree>
+    <p:extLst>
+      <p:ext uri="{BB962C8B-B14F-4D97-AF65-F5344CB8AC3E}">
+        <p14:creationId xmlns:p14="http://schemas.microsoft.com/office/powerpoint/2010/main" val="3478900677"/>
+      </p:ext>
+    </p:extLst>
+  </p:cSld>
+  <p:clrMapOvr>
+    <a:masterClrMapping/>
+  </p:clrMapOvr>
+</p:sld>
+</file>
+
+<file path=ppt/slides/slide65.xml><?xml version="1.0" encoding="utf-8"?>
+<p:sld xmlns:a="http://schemas.openxmlformats.org/drawingml/2006/main" xmlns:r="http://schemas.openxmlformats.org/officeDocument/2006/relationships" xmlns:p="http://schemas.openxmlformats.org/presentationml/2006/main">
+  <p:cSld>
+    <p:spTree>
+      <p:nvGrpSpPr>
+        <p:cNvPr id="1" name=""/>
+        <p:cNvGrpSpPr/>
+        <p:nvPr/>
+      </p:nvGrpSpPr>
+      <p:grpSpPr>
+        <a:xfrm>
+          <a:off x="0" y="0"/>
+          <a:ext cx="0" cy="0"/>
+          <a:chOff x="0" y="0"/>
+          <a:chExt cx="0" cy="0"/>
+        </a:xfrm>
+      </p:grpSpPr>
+      <p:sp>
+        <p:nvSpPr>
+          <p:cNvPr id="2" name="Título 1">
+            <a:extLst>
+              <a:ext uri="{FF2B5EF4-FFF2-40B4-BE49-F238E27FC236}">
+                <a16:creationId xmlns:a16="http://schemas.microsoft.com/office/drawing/2014/main" id="{8004D666-42ED-02BE-2951-DAAF5997ACC5}"/>
+              </a:ext>
+            </a:extLst>
+          </p:cNvPr>
+          <p:cNvSpPr>
+            <a:spLocks noGrp="1"/>
+          </p:cNvSpPr>
+          <p:nvPr>
+            <p:ph type="title"/>
+          </p:nvPr>
+        </p:nvSpPr>
+        <p:spPr/>
+        <p:txBody>
+          <a:bodyPr/>
+          <a:lstStyle/>
+          <a:p>
+            <a:r>
+              <a:rPr lang="pt-BR" dirty="0"/>
+              <a:t>Lição para a Casa (curiosos).</a:t>
+            </a:r>
+          </a:p>
+        </p:txBody>
+      </p:sp>
+      <p:sp>
+        <p:nvSpPr>
+          <p:cNvPr id="3" name="Espaço Reservado para Conteúdo 2">
+            <a:extLst>
+              <a:ext uri="{FF2B5EF4-FFF2-40B4-BE49-F238E27FC236}">
+                <a16:creationId xmlns:a16="http://schemas.microsoft.com/office/drawing/2014/main" id="{21D900DB-3CD4-60E0-D053-C028B4B9585C}"/>
+              </a:ext>
+            </a:extLst>
+          </p:cNvPr>
+          <p:cNvSpPr>
+            <a:spLocks noGrp="1"/>
+          </p:cNvSpPr>
+          <p:nvPr>
+            <p:ph idx="1"/>
+          </p:nvPr>
+        </p:nvSpPr>
+        <p:spPr/>
+        <p:txBody>
+          <a:bodyPr/>
+          <a:lstStyle/>
+          <a:p>
+            <a:r>
+              <a:rPr lang="pt-BR" dirty="0"/>
+              <a:t>Estudar e entender melhor sobre como funciona a Render </a:t>
+            </a:r>
+            <a:r>
+              <a:rPr lang="pt-BR" dirty="0" err="1"/>
+              <a:t>Tree</a:t>
+            </a:r>
+            <a:r>
+              <a:rPr lang="pt-BR" dirty="0"/>
+              <a:t>, o DOM e o CSSOM. </a:t>
+            </a:r>
+          </a:p>
+        </p:txBody>
+      </p:sp>
+    </p:spTree>
+    <p:extLst>
+      <p:ext uri="{BB962C8B-B14F-4D97-AF65-F5344CB8AC3E}">
+        <p14:creationId xmlns:p14="http://schemas.microsoft.com/office/powerpoint/2010/main" val="4121440734"/>
+      </p:ext>
+    </p:extLst>
+  </p:cSld>
+  <p:clrMapOvr>
+    <a:masterClrMapping/>
+  </p:clrMapOvr>
+</p:sld>
+</file>
+
+<file path=ppt/slides/slide66.xml><?xml version="1.0" encoding="utf-8"?>
+<p:sld xmlns:a="http://schemas.openxmlformats.org/drawingml/2006/main" xmlns:r="http://schemas.openxmlformats.org/officeDocument/2006/relationships" xmlns:p="http://schemas.openxmlformats.org/presentationml/2006/main">
+  <p:cSld>
+    <p:bg>
+      <p:bgPr>
+        <a:solidFill>
+          <a:schemeClr val="bg1"/>
+        </a:solidFill>
+        <a:effectLst/>
+      </p:bgPr>
+    </p:bg>
+    <p:spTree>
+      <p:nvGrpSpPr>
+        <p:cNvPr id="1" name=""/>
+        <p:cNvGrpSpPr/>
+        <p:nvPr/>
+      </p:nvGrpSpPr>
+      <p:grpSpPr>
+        <a:xfrm>
+          <a:off x="0" y="0"/>
+          <a:ext cx="0" cy="0"/>
+          <a:chOff x="0" y="0"/>
+          <a:chExt cx="0" cy="0"/>
+        </a:xfrm>
+      </p:grpSpPr>
+      <p:sp>
+        <p:nvSpPr>
+          <p:cNvPr id="10" name="Rectangle 9">
+            <a:extLst>
+              <a:ext uri="{FF2B5EF4-FFF2-40B4-BE49-F238E27FC236}">
+                <a16:creationId xmlns:a16="http://schemas.microsoft.com/office/drawing/2014/main" id="{8D06CE56-3881-4ADA-8CEF-D18B02C242A3}"/>
+              </a:ext>
+              <a:ext uri="{C183D7F6-B498-43B3-948B-1728B52AA6E4}">
+                <adec:decorative xmlns:adec="http://schemas.microsoft.com/office/drawing/2017/decorative" val="1"/>
+              </a:ext>
+            </a:extLst>
+          </p:cNvPr>
+          <p:cNvSpPr>
+            <a:spLocks noGrp="1" noRot="1" noChangeAspect="1" noMove="1" noResize="1" noEditPoints="1" noAdjustHandles="1" noChangeArrowheads="1" noChangeShapeType="1" noTextEdit="1"/>
+          </p:cNvSpPr>
+          <p:nvPr>
+            <p:extLst>
+              <p:ext uri="{386F3935-93C4-4BCD-93E2-E3B085C9AB24}">
+                <p16:designElem xmlns:p16="http://schemas.microsoft.com/office/powerpoint/2015/main" val="1"/>
+              </p:ext>
+            </p:extLst>
+          </p:nvPr>
+        </p:nvSpPr>
+        <p:spPr>
+          <a:xfrm rot="5400000">
+            <a:off x="857544" y="346791"/>
+            <a:ext cx="146304" cy="704088"/>
+          </a:xfrm>
+          <a:prstGeom prst="rect">
+            <a:avLst/>
+          </a:prstGeom>
+          <a:solidFill>
+            <a:schemeClr val="accent1"/>
+          </a:solidFill>
+          <a:ln>
+            <a:noFill/>
+          </a:ln>
+        </p:spPr>
+        <p:style>
+          <a:lnRef idx="2">
+            <a:schemeClr val="accent1">
+              <a:shade val="50000"/>
+            </a:schemeClr>
+          </a:lnRef>
+          <a:fillRef idx="1">
+            <a:schemeClr val="accent1"/>
+          </a:fillRef>
+          <a:effectRef idx="0">
+            <a:schemeClr val="accent1"/>
+          </a:effectRef>
+          <a:fontRef idx="minor">
+            <a:schemeClr val="lt1"/>
+          </a:fontRef>
+        </p:style>
+        <p:txBody>
+          <a:bodyPr rtlCol="0" anchor="ctr"/>
+          <a:lstStyle/>
+          <a:p>
+            <a:pPr marL="0" marR="0" lvl="0" indent="0" algn="ctr" defTabSz="914400" rtl="0" eaLnBrk="1" fontAlgn="auto" latinLnBrk="0" hangingPunct="1">
+              <a:lnSpc>
+                <a:spcPct val="100000"/>
+              </a:lnSpc>
+              <a:spcBef>
+                <a:spcPts val="0"/>
+              </a:spcBef>
+              <a:spcAft>
+                <a:spcPts val="0"/>
+              </a:spcAft>
+              <a:buClrTx/>
+              <a:buSzTx/>
+              <a:buFontTx/>
+              <a:buNone/>
+              <a:tabLst/>
+              <a:defRPr/>
+            </a:pPr>
+            <a:endParaRPr kumimoji="0" lang="en-US" sz="1800" b="0" i="0" u="none" strike="noStrike" kern="1200" cap="none" spc="0" normalizeH="0" baseline="0" noProof="0">
+              <a:ln>
+                <a:noFill/>
+              </a:ln>
+              <a:solidFill>
+                <a:prstClr val="white"/>
+              </a:solidFill>
+              <a:effectLst/>
+              <a:uLnTx/>
+              <a:uFillTx/>
+              <a:latin typeface="Calibri" panose="020F0502020204030204"/>
+              <a:ea typeface="+mn-ea"/>
+              <a:cs typeface="+mn-cs"/>
+            </a:endParaRPr>
+          </a:p>
+        </p:txBody>
+      </p:sp>
+      <p:sp>
+        <p:nvSpPr>
+          <p:cNvPr id="12" name="Rectangle 11">
+            <a:extLst>
+              <a:ext uri="{FF2B5EF4-FFF2-40B4-BE49-F238E27FC236}">
+                <a16:creationId xmlns:a16="http://schemas.microsoft.com/office/drawing/2014/main" id="{79F3C543-62EC-4433-9C93-A2CD8764E9B4}"/>
+              </a:ext>
+              <a:ext uri="{C183D7F6-B498-43B3-948B-1728B52AA6E4}">
+                <adec:decorative xmlns:adec="http://schemas.microsoft.com/office/drawing/2017/decorative" val="1"/>
+              </a:ext>
+            </a:extLst>
+          </p:cNvPr>
+          <p:cNvSpPr>
+            <a:spLocks noGrp="1" noRot="1" noChangeAspect="1" noMove="1" noResize="1" noEditPoints="1" noAdjustHandles="1" noChangeArrowheads="1" noChangeShapeType="1" noTextEdit="1"/>
+          </p:cNvSpPr>
+          <p:nvPr>
+            <p:extLst>
+              <p:ext uri="{386F3935-93C4-4BCD-93E2-E3B085C9AB24}">
+                <p16:designElem xmlns:p16="http://schemas.microsoft.com/office/powerpoint/2015/main" val="1"/>
+              </p:ext>
+            </p:extLst>
+          </p:nvPr>
+        </p:nvSpPr>
+        <p:spPr>
+          <a:xfrm flipV="1">
+            <a:off x="578652" y="4501201"/>
+            <a:ext cx="11034696" cy="18288"/>
+          </a:xfrm>
+          <a:prstGeom prst="rect">
+            <a:avLst/>
+          </a:prstGeom>
+          <a:solidFill>
+            <a:schemeClr val="tx2">
+              <a:lumMod val="25000"/>
+              <a:lumOff val="75000"/>
+            </a:schemeClr>
+          </a:solidFill>
+          <a:ln w="3175">
+            <a:noFill/>
+          </a:ln>
+          <a:effectLst/>
+        </p:spPr>
+        <p:style>
+          <a:lnRef idx="2">
+            <a:schemeClr val="accent1">
+              <a:shade val="50000"/>
+            </a:schemeClr>
+          </a:lnRef>
+          <a:fillRef idx="1">
+            <a:schemeClr val="accent1"/>
+          </a:fillRef>
+          <a:effectRef idx="0">
+            <a:schemeClr val="accent1"/>
+          </a:effectRef>
+          <a:fontRef idx="minor">
+            <a:schemeClr val="lt1"/>
+          </a:fontRef>
+        </p:style>
+        <p:txBody>
+          <a:bodyPr rtlCol="0" anchor="ctr"/>
+          <a:lstStyle/>
+          <a:p>
+            <a:pPr marL="0" marR="0" lvl="0" indent="0" algn="ctr" defTabSz="914400" rtl="0" eaLnBrk="1" fontAlgn="auto" latinLnBrk="0" hangingPunct="1">
+              <a:lnSpc>
+                <a:spcPct val="100000"/>
+              </a:lnSpc>
+              <a:spcBef>
+                <a:spcPts val="0"/>
+              </a:spcBef>
+              <a:spcAft>
+                <a:spcPts val="0"/>
+              </a:spcAft>
+              <a:buClrTx/>
+              <a:buSzTx/>
+              <a:buFontTx/>
+              <a:buNone/>
+              <a:tabLst/>
+              <a:defRPr/>
+            </a:pPr>
+            <a:endParaRPr kumimoji="0" lang="en-US" sz="1800" b="0" i="0" u="none" strike="noStrike" kern="1200" cap="none" spc="0" normalizeH="0" baseline="0" noProof="0">
+              <a:ln>
+                <a:noFill/>
+              </a:ln>
+              <a:solidFill>
+                <a:prstClr val="white"/>
+              </a:solidFill>
+              <a:effectLst/>
+              <a:uLnTx/>
+              <a:uFillTx/>
+              <a:latin typeface="Calibri" panose="020F0502020204030204"/>
+              <a:ea typeface="+mn-ea"/>
+              <a:cs typeface="+mn-cs"/>
+            </a:endParaRPr>
+          </a:p>
+        </p:txBody>
+      </p:sp>
+      <p:sp useBgFill="1">
+        <p:nvSpPr>
+          <p:cNvPr id="14" name="Rectangle 13">
+            <a:extLst>
+              <a:ext uri="{FF2B5EF4-FFF2-40B4-BE49-F238E27FC236}">
+                <a16:creationId xmlns:a16="http://schemas.microsoft.com/office/drawing/2014/main" id="{E91DC736-0EF8-4F87-9146-EBF1D2EE4D3D}"/>
+              </a:ext>
+              <a:ext uri="{C183D7F6-B498-43B3-948B-1728B52AA6E4}">
+                <adec:decorative xmlns:adec="http://schemas.microsoft.com/office/drawing/2017/decorative" val="1"/>
+              </a:ext>
+            </a:extLst>
+          </p:cNvPr>
+          <p:cNvSpPr>
+            <a:spLocks noGrp="1" noRot="1" noChangeAspect="1" noMove="1" noResize="1" noEditPoints="1" noAdjustHandles="1" noChangeArrowheads="1" noChangeShapeType="1" noTextEdit="1"/>
+          </p:cNvSpPr>
+          <p:nvPr>
+            <p:extLst>
+              <p:ext uri="{386F3935-93C4-4BCD-93E2-E3B085C9AB24}">
+                <p16:designElem xmlns:p16="http://schemas.microsoft.com/office/powerpoint/2015/main" val="1"/>
+              </p:ext>
+            </p:extLst>
+          </p:nvPr>
+        </p:nvSpPr>
+        <p:spPr>
+          <a:xfrm>
+            <a:off x="0" y="0"/>
+            <a:ext cx="12192000" cy="6858000"/>
+          </a:xfrm>
+          <a:prstGeom prst="rect">
+            <a:avLst/>
+          </a:prstGeom>
+          <a:ln>
+            <a:noFill/>
+          </a:ln>
+        </p:spPr>
+        <p:style>
+          <a:lnRef idx="2">
+            <a:schemeClr val="accent1">
+              <a:shade val="50000"/>
+            </a:schemeClr>
+          </a:lnRef>
+          <a:fillRef idx="1">
+            <a:schemeClr val="accent1"/>
+          </a:fillRef>
+          <a:effectRef idx="0">
+            <a:schemeClr val="accent1"/>
+          </a:effectRef>
+          <a:fontRef idx="minor">
+            <a:schemeClr val="lt1"/>
+          </a:fontRef>
+        </p:style>
+        <p:txBody>
+          <a:bodyPr rtlCol="0" anchor="ctr"/>
+          <a:lstStyle/>
+          <a:p>
+            <a:pPr algn="ctr"/>
+            <a:endParaRPr lang="en-US"/>
+          </a:p>
+        </p:txBody>
+      </p:sp>
+      <p:pic>
+        <p:nvPicPr>
+          <p:cNvPr id="4" name="Content Placeholder 3" descr="Fundo do vetor de cores vibrantes salpicando">
+            <a:extLst>
+              <a:ext uri="{FF2B5EF4-FFF2-40B4-BE49-F238E27FC236}">
+                <a16:creationId xmlns:a16="http://schemas.microsoft.com/office/drawing/2014/main" id="{C8392F0A-776A-C295-D1C5-822935EFB308}"/>
+              </a:ext>
+            </a:extLst>
+          </p:cNvPr>
+          <p:cNvPicPr>
+            <a:picLocks noChangeAspect="1"/>
+          </p:cNvPicPr>
+          <p:nvPr/>
+        </p:nvPicPr>
+        <p:blipFill rotWithShape="1">
+          <a:blip r:embed="rId2"/>
+          <a:srcRect l="10975" r="3072" b="-1"/>
+          <a:stretch/>
+        </p:blipFill>
+        <p:spPr>
+          <a:xfrm>
+            <a:off x="3523488" y="10"/>
+            <a:ext cx="8668512" cy="6857990"/>
+          </a:xfrm>
+          <a:prstGeom prst="rect">
+            <a:avLst/>
+          </a:prstGeom>
+        </p:spPr>
+      </p:pic>
+      <p:sp>
+        <p:nvSpPr>
+          <p:cNvPr id="16" name="Rectangle 15">
+            <a:extLst>
+              <a:ext uri="{FF2B5EF4-FFF2-40B4-BE49-F238E27FC236}">
+                <a16:creationId xmlns:a16="http://schemas.microsoft.com/office/drawing/2014/main" id="{097CD68E-23E3-4007-8847-CD0944C4F7BE}"/>
+              </a:ext>
+              <a:ext uri="{C183D7F6-B498-43B3-948B-1728B52AA6E4}">
+                <adec:decorative xmlns:adec="http://schemas.microsoft.com/office/drawing/2017/decorative" val="1"/>
+              </a:ext>
+            </a:extLst>
+          </p:cNvPr>
+          <p:cNvSpPr>
+            <a:spLocks noGrp="1" noRot="1" noChangeAspect="1" noMove="1" noResize="1" noEditPoints="1" noAdjustHandles="1" noChangeArrowheads="1" noChangeShapeType="1" noTextEdit="1"/>
+          </p:cNvSpPr>
+          <p:nvPr>
+            <p:extLst>
+              <p:ext uri="{386F3935-93C4-4BCD-93E2-E3B085C9AB24}">
+                <p16:designElem xmlns:p16="http://schemas.microsoft.com/office/powerpoint/2015/main" val="1"/>
+              </p:ext>
+            </p:extLst>
+          </p:nvPr>
+        </p:nvSpPr>
+        <p:spPr>
+          <a:xfrm>
+            <a:off x="0" y="0"/>
+            <a:ext cx="9756601" cy="6858000"/>
+          </a:xfrm>
+          <a:prstGeom prst="rect">
+            <a:avLst/>
+          </a:prstGeom>
+          <a:gradFill>
+            <a:gsLst>
+              <a:gs pos="58000">
+                <a:schemeClr val="bg1"/>
+              </a:gs>
+              <a:gs pos="35000">
+                <a:schemeClr val="bg1">
+                  <a:alpha val="79000"/>
+                </a:schemeClr>
+              </a:gs>
+              <a:gs pos="19000">
+                <a:schemeClr val="bg1">
+                  <a:alpha val="38000"/>
+                </a:schemeClr>
+              </a:gs>
+              <a:gs pos="0">
+                <a:schemeClr val="bg1">
+                  <a:alpha val="0"/>
+                </a:schemeClr>
+              </a:gs>
+              <a:gs pos="100000">
+                <a:schemeClr val="bg1"/>
+              </a:gs>
+            </a:gsLst>
+            <a:lin ang="10800000" scaled="0"/>
+          </a:gradFill>
+          <a:ln>
+            <a:noFill/>
+          </a:ln>
+        </p:spPr>
+        <p:style>
+          <a:lnRef idx="2">
+            <a:schemeClr val="accent1">
+              <a:shade val="50000"/>
+            </a:schemeClr>
+          </a:lnRef>
+          <a:fillRef idx="1">
+            <a:schemeClr val="accent1"/>
+          </a:fillRef>
+          <a:effectRef idx="0">
+            <a:schemeClr val="accent1"/>
+          </a:effectRef>
+          <a:fontRef idx="minor">
+            <a:schemeClr val="lt1"/>
+          </a:fontRef>
+        </p:style>
+        <p:txBody>
+          <a:bodyPr rtlCol="0" anchor="ctr"/>
+          <a:lstStyle/>
+          <a:p>
+            <a:pPr algn="ctr"/>
+            <a:endParaRPr lang="en-US" dirty="0"/>
+          </a:p>
+        </p:txBody>
+      </p:sp>
+      <p:sp>
+        <p:nvSpPr>
+          <p:cNvPr id="5" name="Título 1">
+            <a:extLst>
+              <a:ext uri="{FF2B5EF4-FFF2-40B4-BE49-F238E27FC236}">
+                <a16:creationId xmlns:a16="http://schemas.microsoft.com/office/drawing/2014/main" id="{F1EE6D04-0066-E1FD-8D79-56D664854896}"/>
+              </a:ext>
+            </a:extLst>
+          </p:cNvPr>
+          <p:cNvSpPr>
+            <a:spLocks noGrp="1"/>
+          </p:cNvSpPr>
+          <p:nvPr>
+            <p:ph type="title"/>
+          </p:nvPr>
+        </p:nvSpPr>
+        <p:spPr>
+          <a:xfrm>
+            <a:off x="477981" y="1122363"/>
+            <a:ext cx="4023360" cy="3204134"/>
+          </a:xfrm>
+        </p:spPr>
+        <p:txBody>
+          <a:bodyPr vert="horz" lIns="91440" tIns="45720" rIns="91440" bIns="45720" rtlCol="0" anchor="b">
+            <a:normAutofit/>
+          </a:bodyPr>
+          <a:lstStyle/>
+          <a:p>
+            <a:r>
+              <a:rPr lang="en-US" sz="4800" dirty="0"/>
+              <a:t>Aula 4 – Tags no HTML</a:t>
+            </a:r>
+          </a:p>
+        </p:txBody>
+      </p:sp>
+      <p:sp>
+        <p:nvSpPr>
+          <p:cNvPr id="18" name="Rectangle 17">
+            <a:extLst>
+              <a:ext uri="{FF2B5EF4-FFF2-40B4-BE49-F238E27FC236}">
+                <a16:creationId xmlns:a16="http://schemas.microsoft.com/office/drawing/2014/main" id="{AF2F604E-43BE-4DC3-B983-E071523364F8}"/>
+              </a:ext>
+              <a:ext uri="{C183D7F6-B498-43B3-948B-1728B52AA6E4}">
+                <adec:decorative xmlns:adec="http://schemas.microsoft.com/office/drawing/2017/decorative" val="1"/>
+              </a:ext>
+            </a:extLst>
+          </p:cNvPr>
+          <p:cNvSpPr>
+            <a:spLocks noGrp="1" noRot="1" noChangeAspect="1" noMove="1" noResize="1" noEditPoints="1" noAdjustHandles="1" noChangeArrowheads="1" noChangeShapeType="1" noTextEdit="1"/>
+          </p:cNvSpPr>
+          <p:nvPr>
+            <p:extLst>
+              <p:ext uri="{386F3935-93C4-4BCD-93E2-E3B085C9AB24}">
+                <p16:designElem xmlns:p16="http://schemas.microsoft.com/office/powerpoint/2015/main" val="1"/>
+              </p:ext>
+            </p:extLst>
+          </p:nvPr>
+        </p:nvSpPr>
+        <p:spPr>
+          <a:xfrm rot="5400000">
+            <a:off x="759921" y="346791"/>
+            <a:ext cx="146304" cy="704088"/>
+          </a:xfrm>
+          <a:prstGeom prst="rect">
+            <a:avLst/>
+          </a:prstGeom>
+          <a:solidFill>
+            <a:schemeClr val="accent1"/>
+          </a:solidFill>
+          <a:ln>
+            <a:noFill/>
+          </a:ln>
+        </p:spPr>
+        <p:style>
+          <a:lnRef idx="2">
+            <a:schemeClr val="accent1">
+              <a:shade val="50000"/>
+            </a:schemeClr>
+          </a:lnRef>
+          <a:fillRef idx="1">
+            <a:schemeClr val="accent1"/>
+          </a:fillRef>
+          <a:effectRef idx="0">
+            <a:schemeClr val="accent1"/>
+          </a:effectRef>
+          <a:fontRef idx="minor">
+            <a:schemeClr val="lt1"/>
+          </a:fontRef>
+        </p:style>
+        <p:txBody>
+          <a:bodyPr rtlCol="0" anchor="ctr"/>
+          <a:lstStyle/>
+          <a:p>
+            <a:pPr marL="0" marR="0" lvl="0" indent="0" algn="ctr" defTabSz="914400" rtl="0" eaLnBrk="1" fontAlgn="auto" latinLnBrk="0" hangingPunct="1">
+              <a:lnSpc>
+                <a:spcPct val="100000"/>
+              </a:lnSpc>
+              <a:spcBef>
+                <a:spcPts val="0"/>
+              </a:spcBef>
+              <a:spcAft>
+                <a:spcPts val="0"/>
+              </a:spcAft>
+              <a:buClrTx/>
+              <a:buSzTx/>
+              <a:buFontTx/>
+              <a:buNone/>
+              <a:tabLst/>
+              <a:defRPr/>
+            </a:pPr>
+            <a:endParaRPr kumimoji="0" lang="en-US" sz="1800" b="0" i="0" u="none" strike="noStrike" kern="1200" cap="none" spc="0" normalizeH="0" baseline="0" noProof="0">
+              <a:ln>
+                <a:noFill/>
+              </a:ln>
+              <a:solidFill>
+                <a:prstClr val="white"/>
+              </a:solidFill>
+              <a:effectLst/>
+              <a:uLnTx/>
+              <a:uFillTx/>
+              <a:latin typeface="Calibri" panose="020F0502020204030204"/>
+              <a:ea typeface="+mn-ea"/>
+              <a:cs typeface="+mn-cs"/>
+            </a:endParaRPr>
+          </a:p>
+        </p:txBody>
+      </p:sp>
+      <p:sp>
+        <p:nvSpPr>
+          <p:cNvPr id="20" name="Rectangle 19">
+            <a:extLst>
+              <a:ext uri="{FF2B5EF4-FFF2-40B4-BE49-F238E27FC236}">
+                <a16:creationId xmlns:a16="http://schemas.microsoft.com/office/drawing/2014/main" id="{08C9B587-E65E-4B52-B37C-ABEBB6E87928}"/>
+              </a:ext>
+              <a:ext uri="{C183D7F6-B498-43B3-948B-1728B52AA6E4}">
+                <adec:decorative xmlns:adec="http://schemas.microsoft.com/office/drawing/2017/decorative" val="1"/>
+              </a:ext>
+            </a:extLst>
+          </p:cNvPr>
+          <p:cNvSpPr>
+            <a:spLocks noGrp="1" noRot="1" noChangeAspect="1" noMove="1" noResize="1" noEditPoints="1" noAdjustHandles="1" noChangeArrowheads="1" noChangeShapeType="1" noTextEdit="1"/>
+          </p:cNvSpPr>
+          <p:nvPr>
+            <p:extLst>
+              <p:ext uri="{386F3935-93C4-4BCD-93E2-E3B085C9AB24}">
+                <p16:designElem xmlns:p16="http://schemas.microsoft.com/office/powerpoint/2015/main" val="1"/>
+              </p:ext>
+            </p:extLst>
+          </p:nvPr>
+        </p:nvSpPr>
+        <p:spPr>
+          <a:xfrm>
+            <a:off x="481029" y="4546920"/>
+            <a:ext cx="3977640" cy="18288"/>
+          </a:xfrm>
+          <a:prstGeom prst="rect">
+            <a:avLst/>
+          </a:prstGeom>
+          <a:solidFill>
+            <a:schemeClr val="tx2">
+              <a:lumMod val="25000"/>
+              <a:lumOff val="75000"/>
+            </a:schemeClr>
+          </a:solidFill>
+          <a:ln w="3175">
+            <a:solidFill>
+              <a:schemeClr val="tx2">
+                <a:lumMod val="25000"/>
+                <a:lumOff val="75000"/>
+              </a:schemeClr>
+            </a:solidFill>
+          </a:ln>
+          <a:effectLst/>
+        </p:spPr>
+        <p:style>
+          <a:lnRef idx="2">
+            <a:schemeClr val="accent1">
+              <a:shade val="50000"/>
+            </a:schemeClr>
+          </a:lnRef>
+          <a:fillRef idx="1">
+            <a:schemeClr val="accent1"/>
+          </a:fillRef>
+          <a:effectRef idx="0">
+            <a:schemeClr val="accent1"/>
+          </a:effectRef>
+          <a:fontRef idx="minor">
+            <a:schemeClr val="lt1"/>
+          </a:fontRef>
+        </p:style>
+        <p:txBody>
+          <a:bodyPr rtlCol="0" anchor="ctr"/>
+          <a:lstStyle/>
+          <a:p>
+            <a:pPr marL="0" marR="0" lvl="0" indent="0" algn="ctr" defTabSz="914400" rtl="0" eaLnBrk="1" fontAlgn="auto" latinLnBrk="0" hangingPunct="1">
+              <a:lnSpc>
+                <a:spcPct val="100000"/>
+              </a:lnSpc>
+              <a:spcBef>
+                <a:spcPts val="0"/>
+              </a:spcBef>
+              <a:spcAft>
+                <a:spcPts val="0"/>
+              </a:spcAft>
+              <a:buClrTx/>
+              <a:buSzTx/>
+              <a:buFontTx/>
+              <a:buNone/>
+              <a:tabLst/>
+              <a:defRPr/>
+            </a:pPr>
+            <a:endParaRPr kumimoji="0" lang="en-US" sz="1800" b="0" i="0" u="none" strike="noStrike" kern="1200" cap="none" spc="0" normalizeH="0" baseline="0" noProof="0">
+              <a:ln>
+                <a:noFill/>
+              </a:ln>
+              <a:solidFill>
+                <a:prstClr val="white"/>
+              </a:solidFill>
+              <a:effectLst/>
+              <a:uLnTx/>
+              <a:uFillTx/>
+              <a:latin typeface="Calibri" panose="020F0502020204030204"/>
+              <a:ea typeface="+mn-ea"/>
+              <a:cs typeface="+mn-cs"/>
+            </a:endParaRPr>
+          </a:p>
+        </p:txBody>
+      </p:sp>
+    </p:spTree>
+    <p:extLst>
+      <p:ext uri="{BB962C8B-B14F-4D97-AF65-F5344CB8AC3E}">
+        <p14:creationId xmlns:p14="http://schemas.microsoft.com/office/powerpoint/2010/main" val="3162603356"/>
+      </p:ext>
+    </p:extLst>
+  </p:cSld>
+  <p:clrMapOvr>
+    <a:masterClrMapping/>
+  </p:clrMapOvr>
+  <p:timing>
+    <p:tnLst>
+      <p:par>
+        <p:cTn id="1" dur="indefinite" restart="never" nodeType="tmRoot">
+          <p:childTnLst>
+            <p:seq concurrent="1" nextAc="seek">
+              <p:cTn id="2" dur="indefinite" nodeType="mainSeq">
+                <p:childTnLst>
+                  <p:par>
+                    <p:cTn id="3" fill="hold">
+                      <p:stCondLst>
+                        <p:cond delay="indefinite"/>
+                        <p:cond evt="onBegin" delay="0">
+                          <p:tn val="2"/>
+                        </p:cond>
+                      </p:stCondLst>
+                      <p:childTnLst>
+                        <p:par>
+                          <p:cTn id="4" fill="hold">
+                            <p:stCondLst>
+                              <p:cond delay="0"/>
+                            </p:stCondLst>
+                            <p:childTnLst>
+                              <p:par>
+                                <p:cTn id="5" presetID="10" presetClass="entr" presetSubtype="0" fill="hold" grpId="0" nodeType="withEffect">
+                                  <p:stCondLst>
+                                    <p:cond delay="1000"/>
+                                  </p:stCondLst>
+                                  <p:iterate type="lt">
+                                    <p:tmPct val="10000"/>
+                                  </p:iterate>
+                                  <p:childTnLst>
+                                    <p:set>
+                                      <p:cBhvr>
+                                        <p:cTn id="6" dur="1" fill="hold">
+                                          <p:stCondLst>
+                                            <p:cond delay="0"/>
+                                          </p:stCondLst>
+                                        </p:cTn>
+                                        <p:tgtEl>
+                                          <p:spTgt spid="5"/>
+                                        </p:tgtEl>
+                                        <p:attrNameLst>
+                                          <p:attrName>style.visibility</p:attrName>
+                                        </p:attrNameLst>
+                                      </p:cBhvr>
+                                      <p:to>
+                                        <p:strVal val="visible"/>
+                                      </p:to>
+                                    </p:set>
+                                    <p:animEffect transition="in" filter="fade">
+                                      <p:cBhvr>
+                                        <p:cTn id="7" dur="400"/>
+                                        <p:tgtEl>
+                                          <p:spTgt spid="5"/>
+                                        </p:tgtEl>
+                                      </p:cBhvr>
+                                    </p:animEffect>
+                                  </p:childTnLst>
+                                </p:cTn>
+                              </p:par>
+                            </p:childTnLst>
+                          </p:cTn>
+                        </p:par>
+                      </p:childTnLst>
+                    </p:cTn>
+                  </p:par>
+                </p:childTnLst>
+              </p:cTn>
+              <p:prevCondLst>
+                <p:cond evt="onPrev" delay="0">
+                  <p:tgtEl>
+                    <p:sldTgt/>
+                  </p:tgtEl>
+                </p:cond>
+              </p:prevCondLst>
+              <p:nextCondLst>
+                <p:cond evt="onNext" delay="0">
+                  <p:tgtEl>
+                    <p:sldTgt/>
+                  </p:tgtEl>
+                </p:cond>
+              </p:nextCondLst>
+            </p:seq>
+          </p:childTnLst>
+        </p:cTn>
+      </p:par>
+    </p:tnLst>
+    <p:bldLst>
+      <p:bldP spid="5" grpId="0"/>
+    </p:bldLst>
+  </p:timing>
+</p:sld>
+</file>
+
+<file path=ppt/slides/slide67.xml><?xml version="1.0" encoding="utf-8"?>
+<p:sld xmlns:a="http://schemas.openxmlformats.org/drawingml/2006/main" xmlns:r="http://schemas.openxmlformats.org/officeDocument/2006/relationships" xmlns:p="http://schemas.openxmlformats.org/presentationml/2006/main">
+  <p:cSld>
+    <p:spTree>
+      <p:nvGrpSpPr>
+        <p:cNvPr id="1" name=""/>
+        <p:cNvGrpSpPr/>
+        <p:nvPr/>
+      </p:nvGrpSpPr>
+      <p:grpSpPr>
+        <a:xfrm>
+          <a:off x="0" y="0"/>
+          <a:ext cx="0" cy="0"/>
+          <a:chOff x="0" y="0"/>
+          <a:chExt cx="0" cy="0"/>
+        </a:xfrm>
+      </p:grpSpPr>
+      <p:sp>
+        <p:nvSpPr>
+          <p:cNvPr id="2" name="Título 1">
+            <a:extLst>
+              <a:ext uri="{FF2B5EF4-FFF2-40B4-BE49-F238E27FC236}">
+                <a16:creationId xmlns:a16="http://schemas.microsoft.com/office/drawing/2014/main" id="{7278AF70-61E9-9E46-A6A1-DBE049454456}"/>
+              </a:ext>
+            </a:extLst>
+          </p:cNvPr>
+          <p:cNvSpPr>
+            <a:spLocks noGrp="1"/>
+          </p:cNvSpPr>
+          <p:nvPr>
+            <p:ph type="title"/>
+          </p:nvPr>
+        </p:nvSpPr>
+        <p:spPr/>
+        <p:txBody>
+          <a:bodyPr/>
+          <a:lstStyle/>
+          <a:p>
+            <a:r>
+              <a:rPr lang="pt-BR" dirty="0"/>
+              <a:t>O que são </a:t>
+            </a:r>
+            <a:r>
+              <a:rPr lang="pt-BR" dirty="0" err="1"/>
+              <a:t>tags</a:t>
+            </a:r>
+            <a:r>
+              <a:rPr lang="pt-BR" dirty="0"/>
+              <a:t>?</a:t>
+            </a:r>
+          </a:p>
+        </p:txBody>
+      </p:sp>
+      <p:sp>
+        <p:nvSpPr>
+          <p:cNvPr id="3" name="Espaço Reservado para Conteúdo 2">
+            <a:extLst>
+              <a:ext uri="{FF2B5EF4-FFF2-40B4-BE49-F238E27FC236}">
+                <a16:creationId xmlns:a16="http://schemas.microsoft.com/office/drawing/2014/main" id="{24E31802-8213-D376-F805-0B4AC3123FC7}"/>
+              </a:ext>
+            </a:extLst>
+          </p:cNvPr>
+          <p:cNvSpPr>
+            <a:spLocks noGrp="1"/>
+          </p:cNvSpPr>
+          <p:nvPr>
+            <p:ph idx="1"/>
+          </p:nvPr>
+        </p:nvSpPr>
+        <p:spPr/>
+        <p:txBody>
+          <a:bodyPr/>
+          <a:lstStyle/>
+          <a:p>
+            <a:r>
+              <a:rPr lang="pt-BR" dirty="0" err="1"/>
+              <a:t>Tags</a:t>
+            </a:r>
+            <a:r>
+              <a:rPr lang="pt-BR" dirty="0"/>
+              <a:t> são as marcações feitas para exibir elementos na tela, a linguagem HTML é bem pré-definida quando se fala disso, algumas </a:t>
+            </a:r>
+            <a:r>
+              <a:rPr lang="pt-BR" dirty="0" err="1"/>
+              <a:t>tags</a:t>
+            </a:r>
+            <a:r>
+              <a:rPr lang="pt-BR" dirty="0"/>
+              <a:t> foram feitas para títulos, outras para botões e outras para entrada de dados.</a:t>
+            </a:r>
+          </a:p>
+          <a:p>
+            <a:r>
+              <a:rPr lang="pt-BR" dirty="0"/>
+              <a:t>O caractere &lt; é responsável por abrir uma </a:t>
+            </a:r>
+            <a:r>
+              <a:rPr lang="pt-BR" dirty="0" err="1"/>
+              <a:t>tag</a:t>
+            </a:r>
+            <a:r>
+              <a:rPr lang="pt-BR" dirty="0"/>
+              <a:t> e o caractere &gt; é responsável por fechar uma </a:t>
+            </a:r>
+            <a:r>
+              <a:rPr lang="pt-BR" dirty="0" err="1"/>
+              <a:t>tag</a:t>
+            </a:r>
+            <a:r>
+              <a:rPr lang="pt-BR" dirty="0"/>
+              <a:t>. </a:t>
+            </a:r>
+          </a:p>
+        </p:txBody>
+      </p:sp>
+    </p:spTree>
+    <p:extLst>
+      <p:ext uri="{BB962C8B-B14F-4D97-AF65-F5344CB8AC3E}">
+        <p14:creationId xmlns:p14="http://schemas.microsoft.com/office/powerpoint/2010/main" val="4116858993"/>
+      </p:ext>
+    </p:extLst>
+  </p:cSld>
+  <p:clrMapOvr>
+    <a:masterClrMapping/>
+  </p:clrMapOvr>
+</p:sld>
+</file>
+
+<file path=ppt/slides/slide68.xml><?xml version="1.0" encoding="utf-8"?>
+<p:sld xmlns:a="http://schemas.openxmlformats.org/drawingml/2006/main" xmlns:r="http://schemas.openxmlformats.org/officeDocument/2006/relationships" xmlns:p="http://schemas.openxmlformats.org/presentationml/2006/main">
+  <p:cSld>
+    <p:spTree>
+      <p:nvGrpSpPr>
+        <p:cNvPr id="1" name=""/>
+        <p:cNvGrpSpPr/>
+        <p:nvPr/>
+      </p:nvGrpSpPr>
+      <p:grpSpPr>
+        <a:xfrm>
+          <a:off x="0" y="0"/>
+          <a:ext cx="0" cy="0"/>
+          <a:chOff x="0" y="0"/>
+          <a:chExt cx="0" cy="0"/>
+        </a:xfrm>
+      </p:grpSpPr>
+      <p:sp>
+        <p:nvSpPr>
+          <p:cNvPr id="2" name="Título 1">
+            <a:extLst>
+              <a:ext uri="{FF2B5EF4-FFF2-40B4-BE49-F238E27FC236}">
+                <a16:creationId xmlns:a16="http://schemas.microsoft.com/office/drawing/2014/main" id="{B0E7EA2E-EB88-BAA6-7439-D175C1DCFAAD}"/>
+              </a:ext>
+            </a:extLst>
+          </p:cNvPr>
+          <p:cNvSpPr>
+            <a:spLocks noGrp="1"/>
+          </p:cNvSpPr>
+          <p:nvPr>
+            <p:ph type="title"/>
+          </p:nvPr>
+        </p:nvSpPr>
+        <p:spPr/>
+        <p:txBody>
+          <a:bodyPr/>
+          <a:lstStyle/>
+          <a:p>
+            <a:r>
+              <a:rPr lang="pt-BR" dirty="0" err="1"/>
+              <a:t>Tags</a:t>
+            </a:r>
+            <a:r>
+              <a:rPr lang="pt-BR" dirty="0"/>
+              <a:t> Autônomas</a:t>
+            </a:r>
+          </a:p>
+        </p:txBody>
+      </p:sp>
+      <p:pic>
+        <p:nvPicPr>
+          <p:cNvPr id="5" name="Espaço Reservado para Conteúdo 4">
+            <a:extLst>
+              <a:ext uri="{FF2B5EF4-FFF2-40B4-BE49-F238E27FC236}">
+                <a16:creationId xmlns:a16="http://schemas.microsoft.com/office/drawing/2014/main" id="{A094D9E6-9276-CE83-F220-5D59E7751E1F}"/>
+              </a:ext>
+            </a:extLst>
+          </p:cNvPr>
+          <p:cNvPicPr>
+            <a:picLocks noGrp="1" noChangeAspect="1"/>
+          </p:cNvPicPr>
+          <p:nvPr>
+            <p:ph idx="1"/>
+          </p:nvPr>
+        </p:nvPicPr>
+        <p:blipFill>
+          <a:blip r:embed="rId2"/>
+          <a:stretch>
+            <a:fillRect/>
+          </a:stretch>
+        </p:blipFill>
+        <p:spPr>
+          <a:xfrm>
+            <a:off x="2891417" y="2415396"/>
+            <a:ext cx="6409165" cy="3350248"/>
+          </a:xfrm>
+        </p:spPr>
+      </p:pic>
+    </p:spTree>
+    <p:extLst>
+      <p:ext uri="{BB962C8B-B14F-4D97-AF65-F5344CB8AC3E}">
+        <p14:creationId xmlns:p14="http://schemas.microsoft.com/office/powerpoint/2010/main" val="1321070360"/>
+      </p:ext>
+    </p:extLst>
+  </p:cSld>
+  <p:clrMapOvr>
+    <a:masterClrMapping/>
+  </p:clrMapOvr>
+</p:sld>
+</file>
+
+<file path=ppt/slides/slide69.xml><?xml version="1.0" encoding="utf-8"?>
+<p:sld xmlns:a="http://schemas.openxmlformats.org/drawingml/2006/main" xmlns:r="http://schemas.openxmlformats.org/officeDocument/2006/relationships" xmlns:p="http://schemas.openxmlformats.org/presentationml/2006/main">
+  <p:cSld>
+    <p:spTree>
+      <p:nvGrpSpPr>
+        <p:cNvPr id="1" name=""/>
+        <p:cNvGrpSpPr/>
+        <p:nvPr/>
+      </p:nvGrpSpPr>
+      <p:grpSpPr>
+        <a:xfrm>
+          <a:off x="0" y="0"/>
+          <a:ext cx="0" cy="0"/>
+          <a:chOff x="0" y="0"/>
+          <a:chExt cx="0" cy="0"/>
+        </a:xfrm>
+      </p:grpSpPr>
+      <p:sp>
+        <p:nvSpPr>
+          <p:cNvPr id="2" name="Título 1">
+            <a:extLst>
+              <a:ext uri="{FF2B5EF4-FFF2-40B4-BE49-F238E27FC236}">
+                <a16:creationId xmlns:a16="http://schemas.microsoft.com/office/drawing/2014/main" id="{3A765F31-6210-2273-237D-1C23FC4AD3BE}"/>
+              </a:ext>
+            </a:extLst>
+          </p:cNvPr>
+          <p:cNvSpPr>
+            <a:spLocks noGrp="1"/>
+          </p:cNvSpPr>
+          <p:nvPr>
+            <p:ph type="title"/>
+          </p:nvPr>
+        </p:nvSpPr>
+        <p:spPr/>
+        <p:txBody>
+          <a:bodyPr/>
+          <a:lstStyle/>
+          <a:p>
+            <a:r>
+              <a:rPr lang="pt-BR" dirty="0"/>
+              <a:t>Como surgiram as </a:t>
+            </a:r>
+            <a:r>
+              <a:rPr lang="pt-BR" dirty="0" err="1"/>
+              <a:t>tags</a:t>
+            </a:r>
+            <a:r>
+              <a:rPr lang="pt-BR" dirty="0"/>
+              <a:t>?</a:t>
+            </a:r>
+          </a:p>
+        </p:txBody>
+      </p:sp>
+      <p:sp>
+        <p:nvSpPr>
+          <p:cNvPr id="3" name="Espaço Reservado para Conteúdo 2">
+            <a:extLst>
+              <a:ext uri="{FF2B5EF4-FFF2-40B4-BE49-F238E27FC236}">
+                <a16:creationId xmlns:a16="http://schemas.microsoft.com/office/drawing/2014/main" id="{C1FDC3B8-918F-283D-C245-D2CCADF62BA8}"/>
+              </a:ext>
+            </a:extLst>
+          </p:cNvPr>
+          <p:cNvSpPr>
+            <a:spLocks noGrp="1"/>
+          </p:cNvSpPr>
+          <p:nvPr>
+            <p:ph idx="1"/>
+          </p:nvPr>
+        </p:nvSpPr>
+        <p:spPr/>
+        <p:txBody>
+          <a:bodyPr/>
+          <a:lstStyle/>
+          <a:p>
+            <a:r>
+              <a:rPr lang="pt-BR" dirty="0"/>
+              <a:t>Você assistiu ao nosso curso de C#?</a:t>
+            </a:r>
+          </a:p>
+          <a:p>
+            <a:r>
+              <a:rPr lang="pt-BR" dirty="0"/>
+              <a:t>Você então certamente sabe que o C# é parente da linguagem C, aí que vêm a origem do HTML.</a:t>
+            </a:r>
+          </a:p>
+        </p:txBody>
+      </p:sp>
+    </p:spTree>
+    <p:extLst>
+      <p:ext uri="{BB962C8B-B14F-4D97-AF65-F5344CB8AC3E}">
+        <p14:creationId xmlns:p14="http://schemas.microsoft.com/office/powerpoint/2010/main" val="551100778"/>
+      </p:ext>
+    </p:extLst>
+  </p:cSld>
+  <p:clrMapOvr>
+    <a:masterClrMapping/>
+  </p:clrMapOvr>
+</p:sld>
+</file>
+
 <file path=ppt/slides/slide7.xml><?xml version="1.0" encoding="utf-8"?>
 <p:sld xmlns:a="http://schemas.openxmlformats.org/drawingml/2006/main" xmlns:r="http://schemas.openxmlformats.org/officeDocument/2006/relationships" xmlns:p="http://schemas.openxmlformats.org/presentationml/2006/main">
   <p:cSld>
@@ -19101,6 +21967,1067 @@
     <p:extLst>
       <p:ext uri="{BB962C8B-B14F-4D97-AF65-F5344CB8AC3E}">
         <p14:creationId xmlns:p14="http://schemas.microsoft.com/office/powerpoint/2010/main" val="1587583215"/>
+      </p:ext>
+    </p:extLst>
+  </p:cSld>
+  <p:clrMapOvr>
+    <a:masterClrMapping/>
+  </p:clrMapOvr>
+</p:sld>
+</file>
+
+<file path=ppt/slides/slide70.xml><?xml version="1.0" encoding="utf-8"?>
+<p:sld xmlns:a="http://schemas.openxmlformats.org/drawingml/2006/main" xmlns:r="http://schemas.openxmlformats.org/officeDocument/2006/relationships" xmlns:p="http://schemas.openxmlformats.org/presentationml/2006/main">
+  <p:cSld>
+    <p:spTree>
+      <p:nvGrpSpPr>
+        <p:cNvPr id="1" name=""/>
+        <p:cNvGrpSpPr/>
+        <p:nvPr/>
+      </p:nvGrpSpPr>
+      <p:grpSpPr>
+        <a:xfrm>
+          <a:off x="0" y="0"/>
+          <a:ext cx="0" cy="0"/>
+          <a:chOff x="0" y="0"/>
+          <a:chExt cx="0" cy="0"/>
+        </a:xfrm>
+      </p:grpSpPr>
+      <p:sp>
+        <p:nvSpPr>
+          <p:cNvPr id="2" name="Título 1">
+            <a:extLst>
+              <a:ext uri="{FF2B5EF4-FFF2-40B4-BE49-F238E27FC236}">
+                <a16:creationId xmlns:a16="http://schemas.microsoft.com/office/drawing/2014/main" id="{C02069EC-6170-490E-8484-6936DD36C8E4}"/>
+              </a:ext>
+            </a:extLst>
+          </p:cNvPr>
+          <p:cNvSpPr>
+            <a:spLocks noGrp="1"/>
+          </p:cNvSpPr>
+          <p:nvPr>
+            <p:ph type="title"/>
+          </p:nvPr>
+        </p:nvSpPr>
+        <p:spPr/>
+        <p:txBody>
+          <a:bodyPr/>
+          <a:lstStyle/>
+          <a:p>
+            <a:r>
+              <a:rPr lang="pt-BR" dirty="0"/>
+              <a:t>Origem do HTML – GML</a:t>
+            </a:r>
+          </a:p>
+        </p:txBody>
+      </p:sp>
+      <p:sp>
+        <p:nvSpPr>
+          <p:cNvPr id="3" name="Espaço Reservado para Conteúdo 2">
+            <a:extLst>
+              <a:ext uri="{FF2B5EF4-FFF2-40B4-BE49-F238E27FC236}">
+                <a16:creationId xmlns:a16="http://schemas.microsoft.com/office/drawing/2014/main" id="{D8324815-69FB-452C-253E-7AAA5469350D}"/>
+              </a:ext>
+            </a:extLst>
+          </p:cNvPr>
+          <p:cNvSpPr>
+            <a:spLocks noGrp="1"/>
+          </p:cNvSpPr>
+          <p:nvPr>
+            <p:ph idx="1"/>
+          </p:nvPr>
+        </p:nvSpPr>
+        <p:spPr/>
+        <p:txBody>
+          <a:bodyPr/>
+          <a:lstStyle/>
+          <a:p>
+            <a:r>
+              <a:rPr lang="pt-BR" dirty="0"/>
+              <a:t>Leitura de dados mais fácil;</a:t>
+            </a:r>
+          </a:p>
+          <a:p>
+            <a:r>
+              <a:rPr lang="pt-BR" dirty="0"/>
+              <a:t>Dados flexíveis e pouco estruturados;</a:t>
+            </a:r>
+          </a:p>
+        </p:txBody>
+      </p:sp>
+    </p:spTree>
+    <p:extLst>
+      <p:ext uri="{BB962C8B-B14F-4D97-AF65-F5344CB8AC3E}">
+        <p14:creationId xmlns:p14="http://schemas.microsoft.com/office/powerpoint/2010/main" val="4261098857"/>
+      </p:ext>
+    </p:extLst>
+  </p:cSld>
+  <p:clrMapOvr>
+    <a:masterClrMapping/>
+  </p:clrMapOvr>
+</p:sld>
+</file>
+
+<file path=ppt/slides/slide71.xml><?xml version="1.0" encoding="utf-8"?>
+<p:sld xmlns:a="http://schemas.openxmlformats.org/drawingml/2006/main" xmlns:r="http://schemas.openxmlformats.org/officeDocument/2006/relationships" xmlns:p="http://schemas.openxmlformats.org/presentationml/2006/main">
+  <p:cSld>
+    <p:spTree>
+      <p:nvGrpSpPr>
+        <p:cNvPr id="1" name=""/>
+        <p:cNvGrpSpPr/>
+        <p:nvPr/>
+      </p:nvGrpSpPr>
+      <p:grpSpPr>
+        <a:xfrm>
+          <a:off x="0" y="0"/>
+          <a:ext cx="0" cy="0"/>
+          <a:chOff x="0" y="0"/>
+          <a:chExt cx="0" cy="0"/>
+        </a:xfrm>
+      </p:grpSpPr>
+      <p:sp>
+        <p:nvSpPr>
+          <p:cNvPr id="2" name="Título 1">
+            <a:extLst>
+              <a:ext uri="{FF2B5EF4-FFF2-40B4-BE49-F238E27FC236}">
+                <a16:creationId xmlns:a16="http://schemas.microsoft.com/office/drawing/2014/main" id="{05B9BB5B-4AB7-9D03-5686-24CA27CB856D}"/>
+              </a:ext>
+            </a:extLst>
+          </p:cNvPr>
+          <p:cNvSpPr>
+            <a:spLocks noGrp="1"/>
+          </p:cNvSpPr>
+          <p:nvPr>
+            <p:ph type="title"/>
+          </p:nvPr>
+        </p:nvSpPr>
+        <p:spPr/>
+        <p:txBody>
+          <a:bodyPr/>
+          <a:lstStyle/>
+          <a:p>
+            <a:r>
+              <a:rPr lang="pt-BR" dirty="0"/>
+              <a:t>Pseudocódigo GML</a:t>
+            </a:r>
+          </a:p>
+        </p:txBody>
+      </p:sp>
+      <p:pic>
+        <p:nvPicPr>
+          <p:cNvPr id="5" name="Espaço Reservado para Conteúdo 4">
+            <a:extLst>
+              <a:ext uri="{FF2B5EF4-FFF2-40B4-BE49-F238E27FC236}">
+                <a16:creationId xmlns:a16="http://schemas.microsoft.com/office/drawing/2014/main" id="{22E5F19A-25B4-1433-75D5-0FF1562ECE31}"/>
+              </a:ext>
+            </a:extLst>
+          </p:cNvPr>
+          <p:cNvPicPr>
+            <a:picLocks noGrp="1" noChangeAspect="1"/>
+          </p:cNvPicPr>
+          <p:nvPr>
+            <p:ph idx="1"/>
+          </p:nvPr>
+        </p:nvPicPr>
+        <p:blipFill>
+          <a:blip r:embed="rId2"/>
+          <a:stretch>
+            <a:fillRect/>
+          </a:stretch>
+        </p:blipFill>
+        <p:spPr>
+          <a:xfrm>
+            <a:off x="1731665" y="2789971"/>
+            <a:ext cx="8728670" cy="2339814"/>
+          </a:xfrm>
+        </p:spPr>
+      </p:pic>
+    </p:spTree>
+    <p:extLst>
+      <p:ext uri="{BB962C8B-B14F-4D97-AF65-F5344CB8AC3E}">
+        <p14:creationId xmlns:p14="http://schemas.microsoft.com/office/powerpoint/2010/main" val="2483069946"/>
+      </p:ext>
+    </p:extLst>
+  </p:cSld>
+  <p:clrMapOvr>
+    <a:masterClrMapping/>
+  </p:clrMapOvr>
+</p:sld>
+</file>
+
+<file path=ppt/slides/slide72.xml><?xml version="1.0" encoding="utf-8"?>
+<p:sld xmlns:a="http://schemas.openxmlformats.org/drawingml/2006/main" xmlns:r="http://schemas.openxmlformats.org/officeDocument/2006/relationships" xmlns:p="http://schemas.openxmlformats.org/presentationml/2006/main">
+  <p:cSld>
+    <p:bg>
+      <p:bgPr>
+        <a:solidFill>
+          <a:schemeClr val="bg1"/>
+        </a:solidFill>
+        <a:effectLst/>
+      </p:bgPr>
+    </p:bg>
+    <p:spTree>
+      <p:nvGrpSpPr>
+        <p:cNvPr id="1" name=""/>
+        <p:cNvGrpSpPr/>
+        <p:nvPr/>
+      </p:nvGrpSpPr>
+      <p:grpSpPr>
+        <a:xfrm>
+          <a:off x="0" y="0"/>
+          <a:ext cx="0" cy="0"/>
+          <a:chOff x="0" y="0"/>
+          <a:chExt cx="0" cy="0"/>
+        </a:xfrm>
+      </p:grpSpPr>
+      <p:sp>
+        <p:nvSpPr>
+          <p:cNvPr id="8" name="Rectangle 7">
+            <a:extLst>
+              <a:ext uri="{FF2B5EF4-FFF2-40B4-BE49-F238E27FC236}">
+                <a16:creationId xmlns:a16="http://schemas.microsoft.com/office/drawing/2014/main" id="{8D06CE56-3881-4ADA-8CEF-D18B02C242A3}"/>
+              </a:ext>
+              <a:ext uri="{C183D7F6-B498-43B3-948B-1728B52AA6E4}">
+                <adec:decorative xmlns:adec="http://schemas.microsoft.com/office/drawing/2017/decorative" val="1"/>
+              </a:ext>
+            </a:extLst>
+          </p:cNvPr>
+          <p:cNvSpPr>
+            <a:spLocks noGrp="1" noRot="1" noChangeAspect="1" noMove="1" noResize="1" noEditPoints="1" noAdjustHandles="1" noChangeArrowheads="1" noChangeShapeType="1" noTextEdit="1"/>
+          </p:cNvSpPr>
+          <p:nvPr>
+            <p:extLst>
+              <p:ext uri="{386F3935-93C4-4BCD-93E2-E3B085C9AB24}">
+                <p16:designElem xmlns:p16="http://schemas.microsoft.com/office/powerpoint/2015/main" val="1"/>
+              </p:ext>
+            </p:extLst>
+          </p:nvPr>
+        </p:nvSpPr>
+        <p:spPr>
+          <a:xfrm rot="5400000">
+            <a:off x="857544" y="346791"/>
+            <a:ext cx="146304" cy="704088"/>
+          </a:xfrm>
+          <a:prstGeom prst="rect">
+            <a:avLst/>
+          </a:prstGeom>
+          <a:solidFill>
+            <a:schemeClr val="accent1"/>
+          </a:solidFill>
+          <a:ln>
+            <a:noFill/>
+          </a:ln>
+        </p:spPr>
+        <p:style>
+          <a:lnRef idx="2">
+            <a:schemeClr val="accent1">
+              <a:shade val="50000"/>
+            </a:schemeClr>
+          </a:lnRef>
+          <a:fillRef idx="1">
+            <a:schemeClr val="accent1"/>
+          </a:fillRef>
+          <a:effectRef idx="0">
+            <a:schemeClr val="accent1"/>
+          </a:effectRef>
+          <a:fontRef idx="minor">
+            <a:schemeClr val="lt1"/>
+          </a:fontRef>
+        </p:style>
+        <p:txBody>
+          <a:bodyPr rtlCol="0" anchor="ctr"/>
+          <a:lstStyle/>
+          <a:p>
+            <a:pPr marL="0" marR="0" lvl="0" indent="0" algn="ctr" defTabSz="914400" rtl="0" eaLnBrk="1" fontAlgn="auto" latinLnBrk="0" hangingPunct="1">
+              <a:lnSpc>
+                <a:spcPct val="100000"/>
+              </a:lnSpc>
+              <a:spcBef>
+                <a:spcPts val="0"/>
+              </a:spcBef>
+              <a:spcAft>
+                <a:spcPts val="0"/>
+              </a:spcAft>
+              <a:buClrTx/>
+              <a:buSzTx/>
+              <a:buFontTx/>
+              <a:buNone/>
+              <a:tabLst/>
+              <a:defRPr/>
+            </a:pPr>
+            <a:endParaRPr kumimoji="0" lang="en-US" sz="1800" b="0" i="0" u="none" strike="noStrike" kern="1200" cap="none" spc="0" normalizeH="0" baseline="0" noProof="0">
+              <a:ln>
+                <a:noFill/>
+              </a:ln>
+              <a:solidFill>
+                <a:prstClr val="white"/>
+              </a:solidFill>
+              <a:effectLst/>
+              <a:uLnTx/>
+              <a:uFillTx/>
+              <a:latin typeface="Calibri" panose="020F0502020204030204"/>
+              <a:ea typeface="+mn-ea"/>
+              <a:cs typeface="+mn-cs"/>
+            </a:endParaRPr>
+          </a:p>
+        </p:txBody>
+      </p:sp>
+      <p:sp>
+        <p:nvSpPr>
+          <p:cNvPr id="10" name="Rectangle 9">
+            <a:extLst>
+              <a:ext uri="{FF2B5EF4-FFF2-40B4-BE49-F238E27FC236}">
+                <a16:creationId xmlns:a16="http://schemas.microsoft.com/office/drawing/2014/main" id="{79F3C543-62EC-4433-9C93-A2CD8764E9B4}"/>
+              </a:ext>
+              <a:ext uri="{C183D7F6-B498-43B3-948B-1728B52AA6E4}">
+                <adec:decorative xmlns:adec="http://schemas.microsoft.com/office/drawing/2017/decorative" val="1"/>
+              </a:ext>
+            </a:extLst>
+          </p:cNvPr>
+          <p:cNvSpPr>
+            <a:spLocks noGrp="1" noRot="1" noChangeAspect="1" noMove="1" noResize="1" noEditPoints="1" noAdjustHandles="1" noChangeArrowheads="1" noChangeShapeType="1" noTextEdit="1"/>
+          </p:cNvSpPr>
+          <p:nvPr>
+            <p:extLst>
+              <p:ext uri="{386F3935-93C4-4BCD-93E2-E3B085C9AB24}">
+                <p16:designElem xmlns:p16="http://schemas.microsoft.com/office/powerpoint/2015/main" val="1"/>
+              </p:ext>
+            </p:extLst>
+          </p:nvPr>
+        </p:nvSpPr>
+        <p:spPr>
+          <a:xfrm flipV="1">
+            <a:off x="578652" y="4501201"/>
+            <a:ext cx="11034696" cy="18288"/>
+          </a:xfrm>
+          <a:prstGeom prst="rect">
+            <a:avLst/>
+          </a:prstGeom>
+          <a:solidFill>
+            <a:schemeClr val="tx2">
+              <a:lumMod val="25000"/>
+              <a:lumOff val="75000"/>
+            </a:schemeClr>
+          </a:solidFill>
+          <a:ln w="3175">
+            <a:noFill/>
+          </a:ln>
+          <a:effectLst/>
+        </p:spPr>
+        <p:style>
+          <a:lnRef idx="2">
+            <a:schemeClr val="accent1">
+              <a:shade val="50000"/>
+            </a:schemeClr>
+          </a:lnRef>
+          <a:fillRef idx="1">
+            <a:schemeClr val="accent1"/>
+          </a:fillRef>
+          <a:effectRef idx="0">
+            <a:schemeClr val="accent1"/>
+          </a:effectRef>
+          <a:fontRef idx="minor">
+            <a:schemeClr val="lt1"/>
+          </a:fontRef>
+        </p:style>
+        <p:txBody>
+          <a:bodyPr rtlCol="0" anchor="ctr"/>
+          <a:lstStyle/>
+          <a:p>
+            <a:pPr marL="0" marR="0" lvl="0" indent="0" algn="ctr" defTabSz="914400" rtl="0" eaLnBrk="1" fontAlgn="auto" latinLnBrk="0" hangingPunct="1">
+              <a:lnSpc>
+                <a:spcPct val="100000"/>
+              </a:lnSpc>
+              <a:spcBef>
+                <a:spcPts val="0"/>
+              </a:spcBef>
+              <a:spcAft>
+                <a:spcPts val="0"/>
+              </a:spcAft>
+              <a:buClrTx/>
+              <a:buSzTx/>
+              <a:buFontTx/>
+              <a:buNone/>
+              <a:tabLst/>
+              <a:defRPr/>
+            </a:pPr>
+            <a:endParaRPr kumimoji="0" lang="en-US" sz="1800" b="0" i="0" u="none" strike="noStrike" kern="1200" cap="none" spc="0" normalizeH="0" baseline="0" noProof="0">
+              <a:ln>
+                <a:noFill/>
+              </a:ln>
+              <a:solidFill>
+                <a:prstClr val="white"/>
+              </a:solidFill>
+              <a:effectLst/>
+              <a:uLnTx/>
+              <a:uFillTx/>
+              <a:latin typeface="Calibri" panose="020F0502020204030204"/>
+              <a:ea typeface="+mn-ea"/>
+              <a:cs typeface="+mn-cs"/>
+            </a:endParaRPr>
+          </a:p>
+        </p:txBody>
+      </p:sp>
+      <p:sp useBgFill="1">
+        <p:nvSpPr>
+          <p:cNvPr id="12" name="Rectangle 11">
+            <a:extLst>
+              <a:ext uri="{FF2B5EF4-FFF2-40B4-BE49-F238E27FC236}">
+                <a16:creationId xmlns:a16="http://schemas.microsoft.com/office/drawing/2014/main" id="{76C2F857-5AB8-615A-1350-5EAF0D726639}"/>
+              </a:ext>
+              <a:ext uri="{C183D7F6-B498-43B3-948B-1728B52AA6E4}">
+                <adec:decorative xmlns:adec="http://schemas.microsoft.com/office/drawing/2017/decorative" val="1"/>
+              </a:ext>
+            </a:extLst>
+          </p:cNvPr>
+          <p:cNvSpPr>
+            <a:spLocks noGrp="1" noRot="1" noChangeAspect="1" noMove="1" noResize="1" noEditPoints="1" noAdjustHandles="1" noChangeArrowheads="1" noChangeShapeType="1" noTextEdit="1"/>
+          </p:cNvSpPr>
+          <p:nvPr>
+            <p:extLst>
+              <p:ext uri="{386F3935-93C4-4BCD-93E2-E3B085C9AB24}">
+                <p16:designElem xmlns:p16="http://schemas.microsoft.com/office/powerpoint/2015/main" val="1"/>
+              </p:ext>
+            </p:extLst>
+          </p:nvPr>
+        </p:nvSpPr>
+        <p:spPr>
+          <a:xfrm>
+            <a:off x="0" y="0"/>
+            <a:ext cx="12192000" cy="6858000"/>
+          </a:xfrm>
+          <a:prstGeom prst="rect">
+            <a:avLst/>
+          </a:prstGeom>
+          <a:ln>
+            <a:noFill/>
+          </a:ln>
+        </p:spPr>
+        <p:style>
+          <a:lnRef idx="2">
+            <a:schemeClr val="accent1">
+              <a:shade val="50000"/>
+            </a:schemeClr>
+          </a:lnRef>
+          <a:fillRef idx="1">
+            <a:schemeClr val="accent1"/>
+          </a:fillRef>
+          <a:effectRef idx="0">
+            <a:schemeClr val="accent1"/>
+          </a:effectRef>
+          <a:fontRef idx="minor">
+            <a:schemeClr val="lt1"/>
+          </a:fontRef>
+        </p:style>
+        <p:txBody>
+          <a:bodyPr rtlCol="0" anchor="ctr"/>
+          <a:lstStyle/>
+          <a:p>
+            <a:pPr algn="ctr"/>
+            <a:endParaRPr lang="en-US"/>
+          </a:p>
+        </p:txBody>
+      </p:sp>
+      <p:sp useBgFill="1">
+        <p:nvSpPr>
+          <p:cNvPr id="14" name="Rectangle 13">
+            <a:extLst>
+              <a:ext uri="{FF2B5EF4-FFF2-40B4-BE49-F238E27FC236}">
+                <a16:creationId xmlns:a16="http://schemas.microsoft.com/office/drawing/2014/main" id="{9694448E-BF42-15A8-BEE4-C15BAE1DD4A0}"/>
+              </a:ext>
+              <a:ext uri="{C183D7F6-B498-43B3-948B-1728B52AA6E4}">
+                <adec:decorative xmlns:adec="http://schemas.microsoft.com/office/drawing/2017/decorative" val="1"/>
+              </a:ext>
+            </a:extLst>
+          </p:cNvPr>
+          <p:cNvSpPr>
+            <a:spLocks noGrp="1" noRot="1" noChangeAspect="1" noMove="1" noResize="1" noEditPoints="1" noAdjustHandles="1" noChangeArrowheads="1" noChangeShapeType="1" noTextEdit="1"/>
+          </p:cNvSpPr>
+          <p:nvPr>
+            <p:extLst>
+              <p:ext uri="{386F3935-93C4-4BCD-93E2-E3B085C9AB24}">
+                <p16:designElem xmlns:p16="http://schemas.microsoft.com/office/powerpoint/2015/main" val="1"/>
+              </p:ext>
+            </p:extLst>
+          </p:nvPr>
+        </p:nvSpPr>
+        <p:spPr>
+          <a:xfrm>
+            <a:off x="625332" y="625331"/>
+            <a:ext cx="10941336" cy="5594493"/>
+          </a:xfrm>
+          <a:prstGeom prst="rect">
+            <a:avLst/>
+          </a:prstGeom>
+          <a:ln w="12700">
+            <a:solidFill>
+              <a:schemeClr val="tx2">
+                <a:lumMod val="10000"/>
+                <a:lumOff val="90000"/>
+              </a:schemeClr>
+            </a:solidFill>
+          </a:ln>
+          <a:effectLst>
+            <a:outerShdw blurRad="50800" dist="38100" dir="2700000" algn="tl" rotWithShape="0">
+              <a:schemeClr val="bg2">
+                <a:lumMod val="85000"/>
+                <a:alpha val="30000"/>
+              </a:schemeClr>
+            </a:outerShdw>
+          </a:effectLst>
+        </p:spPr>
+        <p:style>
+          <a:lnRef idx="2">
+            <a:schemeClr val="accent1">
+              <a:shade val="50000"/>
+            </a:schemeClr>
+          </a:lnRef>
+          <a:fillRef idx="1">
+            <a:schemeClr val="accent1"/>
+          </a:fillRef>
+          <a:effectRef idx="0">
+            <a:schemeClr val="accent1"/>
+          </a:effectRef>
+          <a:fontRef idx="minor">
+            <a:schemeClr val="lt1"/>
+          </a:fontRef>
+        </p:style>
+        <p:txBody>
+          <a:bodyPr rtlCol="0" anchor="ctr"/>
+          <a:lstStyle/>
+          <a:p>
+            <a:pPr marL="0" marR="0" lvl="0" indent="0" algn="ctr" defTabSz="914400" rtl="0" eaLnBrk="1" fontAlgn="auto" latinLnBrk="0" hangingPunct="1">
+              <a:lnSpc>
+                <a:spcPct val="100000"/>
+              </a:lnSpc>
+              <a:spcBef>
+                <a:spcPts val="0"/>
+              </a:spcBef>
+              <a:spcAft>
+                <a:spcPts val="0"/>
+              </a:spcAft>
+              <a:buClrTx/>
+              <a:buSzTx/>
+              <a:buFontTx/>
+              <a:buNone/>
+              <a:tabLst/>
+              <a:defRPr/>
+            </a:pPr>
+            <a:endParaRPr kumimoji="0" lang="en-US" sz="1800" b="0" i="0" u="none" strike="noStrike" kern="1200" cap="none" spc="0" normalizeH="0" baseline="0" noProof="0">
+              <a:ln>
+                <a:noFill/>
+              </a:ln>
+              <a:solidFill>
+                <a:prstClr val="white"/>
+              </a:solidFill>
+              <a:effectLst/>
+              <a:uLnTx/>
+              <a:uFillTx/>
+              <a:latin typeface="Calibri" panose="020F0502020204030204"/>
+              <a:ea typeface="+mn-ea"/>
+              <a:cs typeface="+mn-cs"/>
+            </a:endParaRPr>
+          </a:p>
+        </p:txBody>
+      </p:sp>
+      <p:sp>
+        <p:nvSpPr>
+          <p:cNvPr id="2" name="Título 1">
+            <a:extLst>
+              <a:ext uri="{FF2B5EF4-FFF2-40B4-BE49-F238E27FC236}">
+                <a16:creationId xmlns:a16="http://schemas.microsoft.com/office/drawing/2014/main" id="{9109A971-B9C4-680B-8808-B36545E989B8}"/>
+              </a:ext>
+            </a:extLst>
+          </p:cNvPr>
+          <p:cNvSpPr>
+            <a:spLocks noGrp="1"/>
+          </p:cNvSpPr>
+          <p:nvPr>
+            <p:ph type="title"/>
+          </p:nvPr>
+        </p:nvSpPr>
+        <p:spPr>
+          <a:xfrm>
+            <a:off x="1313595" y="1393977"/>
+            <a:ext cx="9211463" cy="2446674"/>
+          </a:xfrm>
+        </p:spPr>
+        <p:txBody>
+          <a:bodyPr vert="horz" lIns="91440" tIns="45720" rIns="91440" bIns="45720" rtlCol="0" anchor="b">
+            <a:normAutofit/>
+          </a:bodyPr>
+          <a:lstStyle/>
+          <a:p>
+            <a:r>
+              <a:rPr lang="en-US" sz="6700"/>
+              <a:t>Por que não usar simplesmente GML?</a:t>
+            </a:r>
+          </a:p>
+        </p:txBody>
+      </p:sp>
+      <p:sp>
+        <p:nvSpPr>
+          <p:cNvPr id="3" name="Espaço Reservado para Conteúdo 2">
+            <a:extLst>
+              <a:ext uri="{FF2B5EF4-FFF2-40B4-BE49-F238E27FC236}">
+                <a16:creationId xmlns:a16="http://schemas.microsoft.com/office/drawing/2014/main" id="{45B99232-BFF7-8F66-6EFB-07AF7B7FB4F4}"/>
+              </a:ext>
+            </a:extLst>
+          </p:cNvPr>
+          <p:cNvSpPr>
+            <a:spLocks noGrp="1"/>
+          </p:cNvSpPr>
+          <p:nvPr>
+            <p:ph idx="1"/>
+          </p:nvPr>
+        </p:nvSpPr>
+        <p:spPr>
+          <a:xfrm>
+            <a:off x="1385799" y="4959529"/>
+            <a:ext cx="9139259" cy="1031695"/>
+          </a:xfrm>
+        </p:spPr>
+        <p:txBody>
+          <a:bodyPr vert="horz" lIns="91440" tIns="45720" rIns="91440" bIns="45720" rtlCol="0" anchor="t">
+            <a:normAutofit/>
+          </a:bodyPr>
+          <a:lstStyle/>
+          <a:p>
+            <a:pPr marL="0" indent="0">
+              <a:buNone/>
+            </a:pPr>
+            <a:r>
+              <a:rPr lang="en-US"/>
+              <a:t>Isso seria bem complicado para o navegador....</a:t>
+            </a:r>
+          </a:p>
+        </p:txBody>
+      </p:sp>
+      <p:sp>
+        <p:nvSpPr>
+          <p:cNvPr id="16" name="Rectangle 15">
+            <a:extLst>
+              <a:ext uri="{FF2B5EF4-FFF2-40B4-BE49-F238E27FC236}">
+                <a16:creationId xmlns:a16="http://schemas.microsoft.com/office/drawing/2014/main" id="{383A1451-0198-70EC-23FC-FD618A74C27A}"/>
+              </a:ext>
+              <a:ext uri="{C183D7F6-B498-43B3-948B-1728B52AA6E4}">
+                <adec:decorative xmlns:adec="http://schemas.microsoft.com/office/drawing/2017/decorative" val="1"/>
+              </a:ext>
+            </a:extLst>
+          </p:cNvPr>
+          <p:cNvSpPr>
+            <a:spLocks noGrp="1" noRot="1" noChangeAspect="1" noMove="1" noResize="1" noEditPoints="1" noAdjustHandles="1" noChangeArrowheads="1" noChangeShapeType="1" noTextEdit="1"/>
+          </p:cNvSpPr>
+          <p:nvPr>
+            <p:extLst>
+              <p:ext uri="{386F3935-93C4-4BCD-93E2-E3B085C9AB24}">
+                <p16:designElem xmlns:p16="http://schemas.microsoft.com/office/powerpoint/2015/main" val="1"/>
+              </p:ext>
+            </p:extLst>
+          </p:nvPr>
+        </p:nvSpPr>
+        <p:spPr>
+          <a:xfrm>
+            <a:off x="552180" y="4923526"/>
+            <a:ext cx="146304" cy="548640"/>
+          </a:xfrm>
+          <a:prstGeom prst="rect">
+            <a:avLst/>
+          </a:prstGeom>
+          <a:solidFill>
+            <a:schemeClr val="accent1"/>
+          </a:solidFill>
+          <a:ln>
+            <a:noFill/>
+          </a:ln>
+        </p:spPr>
+        <p:style>
+          <a:lnRef idx="2">
+            <a:schemeClr val="accent1">
+              <a:shade val="50000"/>
+            </a:schemeClr>
+          </a:lnRef>
+          <a:fillRef idx="1">
+            <a:schemeClr val="accent1"/>
+          </a:fillRef>
+          <a:effectRef idx="0">
+            <a:schemeClr val="accent1"/>
+          </a:effectRef>
+          <a:fontRef idx="minor">
+            <a:schemeClr val="lt1"/>
+          </a:fontRef>
+        </p:style>
+        <p:txBody>
+          <a:bodyPr rtlCol="0" anchor="ctr"/>
+          <a:lstStyle/>
+          <a:p>
+            <a:pPr marL="0" marR="0" lvl="0" indent="0" algn="ctr" defTabSz="914400" rtl="0" eaLnBrk="1" fontAlgn="auto" latinLnBrk="0" hangingPunct="1">
+              <a:lnSpc>
+                <a:spcPct val="100000"/>
+              </a:lnSpc>
+              <a:spcBef>
+                <a:spcPts val="0"/>
+              </a:spcBef>
+              <a:spcAft>
+                <a:spcPts val="0"/>
+              </a:spcAft>
+              <a:buClrTx/>
+              <a:buSzTx/>
+              <a:buFontTx/>
+              <a:buNone/>
+              <a:tabLst/>
+              <a:defRPr/>
+            </a:pPr>
+            <a:endParaRPr kumimoji="0" lang="en-US" sz="1800" b="0" i="0" u="none" strike="noStrike" kern="1200" cap="none" spc="0" normalizeH="0" baseline="0" noProof="0">
+              <a:ln>
+                <a:noFill/>
+              </a:ln>
+              <a:solidFill>
+                <a:prstClr val="white"/>
+              </a:solidFill>
+              <a:effectLst/>
+              <a:uLnTx/>
+              <a:uFillTx/>
+              <a:latin typeface="Calibri" panose="020F0502020204030204"/>
+              <a:ea typeface="+mn-ea"/>
+              <a:cs typeface="+mn-cs"/>
+            </a:endParaRPr>
+          </a:p>
+        </p:txBody>
+      </p:sp>
+      <p:sp>
+        <p:nvSpPr>
+          <p:cNvPr id="18" name="Freeform: Shape 17">
+            <a:extLst>
+              <a:ext uri="{FF2B5EF4-FFF2-40B4-BE49-F238E27FC236}">
+                <a16:creationId xmlns:a16="http://schemas.microsoft.com/office/drawing/2014/main" id="{EA34F140-C432-A78F-A450-1EF26C7A5E90}"/>
+              </a:ext>
+              <a:ext uri="{C183D7F6-B498-43B3-948B-1728B52AA6E4}">
+                <adec:decorative xmlns:adec="http://schemas.microsoft.com/office/drawing/2017/decorative" val="1"/>
+              </a:ext>
+            </a:extLst>
+          </p:cNvPr>
+          <p:cNvSpPr>
+            <a:spLocks noGrp="1" noRot="1" noChangeAspect="1" noMove="1" noResize="1" noEditPoints="1" noAdjustHandles="1" noChangeArrowheads="1" noChangeShapeType="1" noTextEdit="1"/>
+          </p:cNvSpPr>
+          <p:nvPr>
+            <p:extLst>
+              <p:ext uri="{386F3935-93C4-4BCD-93E2-E3B085C9AB24}">
+                <p16:designElem xmlns:p16="http://schemas.microsoft.com/office/powerpoint/2015/main" val="1"/>
+              </p:ext>
+            </p:extLst>
+          </p:nvPr>
+        </p:nvSpPr>
+        <p:spPr>
+          <a:xfrm flipV="1">
+            <a:off x="1476678" y="4269049"/>
+            <a:ext cx="9147364" cy="18288"/>
+          </a:xfrm>
+          <a:custGeom>
+            <a:avLst/>
+            <a:gdLst>
+              <a:gd name="connsiteX0" fmla="*/ 0 w 9147364"/>
+              <a:gd name="connsiteY0" fmla="*/ 18288 h 18288"/>
+              <a:gd name="connsiteX1" fmla="*/ 9147364 w 9147364"/>
+              <a:gd name="connsiteY1" fmla="*/ 18288 h 18288"/>
+              <a:gd name="connsiteX2" fmla="*/ 9147364 w 9147364"/>
+              <a:gd name="connsiteY2" fmla="*/ 0 h 18288"/>
+              <a:gd name="connsiteX3" fmla="*/ 0 w 9147364"/>
+              <a:gd name="connsiteY3" fmla="*/ 0 h 18288"/>
+            </a:gdLst>
+            <a:ahLst/>
+            <a:cxnLst>
+              <a:cxn ang="0">
+                <a:pos x="connsiteX0" y="connsiteY0"/>
+              </a:cxn>
+              <a:cxn ang="0">
+                <a:pos x="connsiteX1" y="connsiteY1"/>
+              </a:cxn>
+              <a:cxn ang="0">
+                <a:pos x="connsiteX2" y="connsiteY2"/>
+              </a:cxn>
+              <a:cxn ang="0">
+                <a:pos x="connsiteX3" y="connsiteY3"/>
+              </a:cxn>
+            </a:cxnLst>
+            <a:rect l="l" t="t" r="r" b="b"/>
+            <a:pathLst>
+              <a:path w="9147364" h="18288">
+                <a:moveTo>
+                  <a:pt x="0" y="18288"/>
+                </a:moveTo>
+                <a:lnTo>
+                  <a:pt x="9147364" y="18288"/>
+                </a:lnTo>
+                <a:lnTo>
+                  <a:pt x="9147364" y="0"/>
+                </a:lnTo>
+                <a:lnTo>
+                  <a:pt x="0" y="0"/>
+                </a:lnTo>
+                <a:close/>
+              </a:path>
+            </a:pathLst>
+          </a:custGeom>
+          <a:solidFill>
+            <a:schemeClr val="tx2">
+              <a:lumMod val="25000"/>
+              <a:lumOff val="75000"/>
+            </a:schemeClr>
+          </a:solidFill>
+          <a:ln w="3175">
+            <a:noFill/>
+          </a:ln>
+          <a:effectLst/>
+        </p:spPr>
+        <p:style>
+          <a:lnRef idx="2">
+            <a:schemeClr val="accent1">
+              <a:shade val="50000"/>
+            </a:schemeClr>
+          </a:lnRef>
+          <a:fillRef idx="1">
+            <a:schemeClr val="accent1"/>
+          </a:fillRef>
+          <a:effectRef idx="0">
+            <a:schemeClr val="accent1"/>
+          </a:effectRef>
+          <a:fontRef idx="minor">
+            <a:schemeClr val="lt1"/>
+          </a:fontRef>
+        </p:style>
+        <p:txBody>
+          <a:bodyPr wrap="square" rtlCol="0" anchor="ctr">
+            <a:noAutofit/>
+          </a:bodyPr>
+          <a:lstStyle/>
+          <a:p>
+            <a:pPr marL="0" marR="0" lvl="0" indent="0" algn="ctr" defTabSz="914400" rtl="0" eaLnBrk="1" fontAlgn="auto" latinLnBrk="0" hangingPunct="1">
+              <a:lnSpc>
+                <a:spcPct val="100000"/>
+              </a:lnSpc>
+              <a:spcBef>
+                <a:spcPts val="0"/>
+              </a:spcBef>
+              <a:spcAft>
+                <a:spcPts val="0"/>
+              </a:spcAft>
+              <a:buClrTx/>
+              <a:buSzTx/>
+              <a:buFontTx/>
+              <a:buNone/>
+              <a:tabLst/>
+              <a:defRPr/>
+            </a:pPr>
+            <a:endParaRPr kumimoji="0" lang="en-US" sz="1800" b="0" i="0" u="none" strike="noStrike" kern="1200" cap="none" spc="0" normalizeH="0" baseline="0" noProof="0">
+              <a:ln>
+                <a:noFill/>
+              </a:ln>
+              <a:solidFill>
+                <a:prstClr val="white"/>
+              </a:solidFill>
+              <a:effectLst/>
+              <a:uLnTx/>
+              <a:uFillTx/>
+              <a:latin typeface="Calibri" panose="020F0502020204030204"/>
+              <a:ea typeface="+mn-ea"/>
+              <a:cs typeface="+mn-cs"/>
+            </a:endParaRPr>
+          </a:p>
+        </p:txBody>
+      </p:sp>
+    </p:spTree>
+    <p:extLst>
+      <p:ext uri="{BB962C8B-B14F-4D97-AF65-F5344CB8AC3E}">
+        <p14:creationId xmlns:p14="http://schemas.microsoft.com/office/powerpoint/2010/main" val="3534556025"/>
+      </p:ext>
+    </p:extLst>
+  </p:cSld>
+  <p:clrMapOvr>
+    <a:masterClrMapping/>
+  </p:clrMapOvr>
+</p:sld>
+</file>
+
+<file path=ppt/slides/slide73.xml><?xml version="1.0" encoding="utf-8"?>
+<p:sld xmlns:a="http://schemas.openxmlformats.org/drawingml/2006/main" xmlns:r="http://schemas.openxmlformats.org/officeDocument/2006/relationships" xmlns:p="http://schemas.openxmlformats.org/presentationml/2006/main">
+  <p:cSld>
+    <p:spTree>
+      <p:nvGrpSpPr>
+        <p:cNvPr id="1" name=""/>
+        <p:cNvGrpSpPr/>
+        <p:nvPr/>
+      </p:nvGrpSpPr>
+      <p:grpSpPr>
+        <a:xfrm>
+          <a:off x="0" y="0"/>
+          <a:ext cx="0" cy="0"/>
+          <a:chOff x="0" y="0"/>
+          <a:chExt cx="0" cy="0"/>
+        </a:xfrm>
+      </p:grpSpPr>
+      <p:sp>
+        <p:nvSpPr>
+          <p:cNvPr id="2" name="Título 1">
+            <a:extLst>
+              <a:ext uri="{FF2B5EF4-FFF2-40B4-BE49-F238E27FC236}">
+                <a16:creationId xmlns:a16="http://schemas.microsoft.com/office/drawing/2014/main" id="{FBB64099-5FA3-B115-000F-E0CA572C92AF}"/>
+              </a:ext>
+            </a:extLst>
+          </p:cNvPr>
+          <p:cNvSpPr>
+            <a:spLocks noGrp="1"/>
+          </p:cNvSpPr>
+          <p:nvPr>
+            <p:ph type="title"/>
+          </p:nvPr>
+        </p:nvSpPr>
+        <p:spPr/>
+        <p:txBody>
+          <a:bodyPr/>
+          <a:lstStyle/>
+          <a:p>
+            <a:r>
+              <a:rPr lang="pt-BR" dirty="0"/>
+              <a:t>As </a:t>
+            </a:r>
+            <a:r>
+              <a:rPr lang="pt-BR" dirty="0" err="1"/>
+              <a:t>Tags</a:t>
+            </a:r>
+            <a:r>
+              <a:rPr lang="pt-BR" dirty="0"/>
+              <a:t> HTML</a:t>
+            </a:r>
+          </a:p>
+        </p:txBody>
+      </p:sp>
+      <p:sp>
+        <p:nvSpPr>
+          <p:cNvPr id="3" name="Espaço Reservado para Conteúdo 2">
+            <a:extLst>
+              <a:ext uri="{FF2B5EF4-FFF2-40B4-BE49-F238E27FC236}">
+                <a16:creationId xmlns:a16="http://schemas.microsoft.com/office/drawing/2014/main" id="{12BAE4BF-19AB-ACE5-0790-5FAAC616E37C}"/>
+              </a:ext>
+            </a:extLst>
+          </p:cNvPr>
+          <p:cNvSpPr>
+            <a:spLocks noGrp="1"/>
+          </p:cNvSpPr>
+          <p:nvPr>
+            <p:ph idx="1"/>
+          </p:nvPr>
+        </p:nvSpPr>
+        <p:spPr/>
+        <p:txBody>
+          <a:bodyPr/>
+          <a:lstStyle/>
+          <a:p>
+            <a:r>
+              <a:rPr lang="pt-BR" dirty="0"/>
+              <a:t>O HTML deve ser muito bem estruturado...</a:t>
+            </a:r>
+          </a:p>
+        </p:txBody>
+      </p:sp>
+    </p:spTree>
+    <p:extLst>
+      <p:ext uri="{BB962C8B-B14F-4D97-AF65-F5344CB8AC3E}">
+        <p14:creationId xmlns:p14="http://schemas.microsoft.com/office/powerpoint/2010/main" val="510683568"/>
+      </p:ext>
+    </p:extLst>
+  </p:cSld>
+  <p:clrMapOvr>
+    <a:masterClrMapping/>
+  </p:clrMapOvr>
+</p:sld>
+</file>
+
+<file path=ppt/slides/slide74.xml><?xml version="1.0" encoding="utf-8"?>
+<p:sld xmlns:a="http://schemas.openxmlformats.org/drawingml/2006/main" xmlns:r="http://schemas.openxmlformats.org/officeDocument/2006/relationships" xmlns:p="http://schemas.openxmlformats.org/presentationml/2006/main">
+  <p:cSld>
+    <p:spTree>
+      <p:nvGrpSpPr>
+        <p:cNvPr id="1" name=""/>
+        <p:cNvGrpSpPr/>
+        <p:nvPr/>
+      </p:nvGrpSpPr>
+      <p:grpSpPr>
+        <a:xfrm>
+          <a:off x="0" y="0"/>
+          <a:ext cx="0" cy="0"/>
+          <a:chOff x="0" y="0"/>
+          <a:chExt cx="0" cy="0"/>
+        </a:xfrm>
+      </p:grpSpPr>
+      <p:sp>
+        <p:nvSpPr>
+          <p:cNvPr id="2" name="Título 1">
+            <a:extLst>
+              <a:ext uri="{FF2B5EF4-FFF2-40B4-BE49-F238E27FC236}">
+                <a16:creationId xmlns:a16="http://schemas.microsoft.com/office/drawing/2014/main" id="{B78F175A-F4E8-04A9-4C99-09B4F800B233}"/>
+              </a:ext>
+            </a:extLst>
+          </p:cNvPr>
+          <p:cNvSpPr>
+            <a:spLocks noGrp="1"/>
+          </p:cNvSpPr>
+          <p:nvPr>
+            <p:ph type="title"/>
+          </p:nvPr>
+        </p:nvSpPr>
+        <p:spPr/>
+        <p:txBody>
+          <a:bodyPr/>
+          <a:lstStyle/>
+          <a:p>
+            <a:r>
+              <a:rPr lang="pt-BR" dirty="0"/>
+              <a:t>Lição de Casa</a:t>
+            </a:r>
+          </a:p>
+        </p:txBody>
+      </p:sp>
+      <p:sp>
+        <p:nvSpPr>
+          <p:cNvPr id="3" name="Espaço Reservado para Conteúdo 2">
+            <a:extLst>
+              <a:ext uri="{FF2B5EF4-FFF2-40B4-BE49-F238E27FC236}">
+                <a16:creationId xmlns:a16="http://schemas.microsoft.com/office/drawing/2014/main" id="{9CF78191-4E22-58CC-4502-A49752ABA3BC}"/>
+              </a:ext>
+            </a:extLst>
+          </p:cNvPr>
+          <p:cNvSpPr>
+            <a:spLocks noGrp="1"/>
+          </p:cNvSpPr>
+          <p:nvPr>
+            <p:ph idx="1"/>
+          </p:nvPr>
+        </p:nvSpPr>
+        <p:spPr/>
+        <p:txBody>
+          <a:bodyPr/>
+          <a:lstStyle/>
+          <a:p>
+            <a:r>
+              <a:rPr lang="pt-BR" dirty="0"/>
+              <a:t>Busque sobre outras linguagens de marcação, tais como </a:t>
+            </a:r>
+            <a:r>
+              <a:rPr lang="pt-BR" dirty="0" err="1"/>
+              <a:t>Markdown</a:t>
+            </a:r>
+            <a:r>
+              <a:rPr lang="pt-BR" dirty="0"/>
+              <a:t>, XML ou até mesmo linguagens com regras muito claras como o JSON para se aprofundar no tema. </a:t>
+            </a:r>
+          </a:p>
+        </p:txBody>
+      </p:sp>
+    </p:spTree>
+    <p:extLst>
+      <p:ext uri="{BB962C8B-B14F-4D97-AF65-F5344CB8AC3E}">
+        <p14:creationId xmlns:p14="http://schemas.microsoft.com/office/powerpoint/2010/main" val="966981860"/>
       </p:ext>
     </p:extLst>
   </p:cSld>

</xml_diff>

<commit_message>
Gravada a Aula 7 de Textos no HTML
</commit_message>
<xml_diff>
--- a/Power Point/Curso de HTML e CSS.pptx
+++ b/Power Point/Curso de HTML e CSS.pptx
@@ -101,6 +101,21 @@
     <p:sldId id="349" r:id="rId95"/>
     <p:sldId id="350" r:id="rId96"/>
     <p:sldId id="351" r:id="rId97"/>
+    <p:sldId id="353" r:id="rId98"/>
+    <p:sldId id="354" r:id="rId99"/>
+    <p:sldId id="355" r:id="rId100"/>
+    <p:sldId id="356" r:id="rId101"/>
+    <p:sldId id="357" r:id="rId102"/>
+    <p:sldId id="358" r:id="rId103"/>
+    <p:sldId id="359" r:id="rId104"/>
+    <p:sldId id="360" r:id="rId105"/>
+    <p:sldId id="361" r:id="rId106"/>
+    <p:sldId id="362" r:id="rId107"/>
+    <p:sldId id="363" r:id="rId108"/>
+    <p:sldId id="364" r:id="rId109"/>
+    <p:sldId id="365" r:id="rId110"/>
+    <p:sldId id="366" r:id="rId111"/>
+    <p:sldId id="367" r:id="rId112"/>
   </p:sldIdLst>
   <p:sldSz cx="12192000" cy="6858000"/>
   <p:notesSz cx="6858000" cy="9144000"/>
@@ -363,7 +378,7 @@
           <a:p>
             <a:fld id="{02AC24A9-CCB6-4F8D-B8DB-C2F3692CFA5A}" type="datetimeFigureOut">
               <a:rPr lang="en-US" smtClean="0"/>
-              <a:t>3/10/2025</a:t>
+              <a:t>3/13/2025</a:t>
             </a:fld>
             <a:endParaRPr lang="en-US" dirty="0"/>
           </a:p>
@@ -733,7 +748,7 @@
           <a:p>
             <a:fld id="{02AC24A9-CCB6-4F8D-B8DB-C2F3692CFA5A}" type="datetimeFigureOut">
               <a:rPr lang="en-US" smtClean="0"/>
-              <a:t>3/10/2025</a:t>
+              <a:t>3/13/2025</a:t>
             </a:fld>
             <a:endParaRPr lang="en-US"/>
           </a:p>
@@ -942,7 +957,7 @@
           <a:p>
             <a:fld id="{02AC24A9-CCB6-4F8D-B8DB-C2F3692CFA5A}" type="datetimeFigureOut">
               <a:rPr lang="en-US" smtClean="0"/>
-              <a:t>3/10/2025</a:t>
+              <a:t>3/13/2025</a:t>
             </a:fld>
             <a:endParaRPr lang="en-US"/>
           </a:p>
@@ -1412,7 +1427,7 @@
           <a:p>
             <a:fld id="{02AC24A9-CCB6-4F8D-B8DB-C2F3692CFA5A}" type="datetimeFigureOut">
               <a:rPr lang="en-US" smtClean="0"/>
-              <a:t>3/10/2025</a:t>
+              <a:t>3/13/2025</a:t>
             </a:fld>
             <a:endParaRPr lang="en-US"/>
           </a:p>
@@ -1866,7 +1881,7 @@
           <a:p>
             <a:fld id="{02AC24A9-CCB6-4F8D-B8DB-C2F3692CFA5A}" type="datetimeFigureOut">
               <a:rPr lang="en-US" smtClean="0"/>
-              <a:t>3/10/2025</a:t>
+              <a:t>3/13/2025</a:t>
             </a:fld>
             <a:endParaRPr lang="en-US"/>
           </a:p>
@@ -2398,7 +2413,7 @@
           <a:p>
             <a:fld id="{02AC24A9-CCB6-4F8D-B8DB-C2F3692CFA5A}" type="datetimeFigureOut">
               <a:rPr lang="en-US" smtClean="0"/>
-              <a:t>3/10/2025</a:t>
+              <a:t>3/13/2025</a:t>
             </a:fld>
             <a:endParaRPr lang="en-US"/>
           </a:p>
@@ -3097,7 +3112,7 @@
           <a:p>
             <a:fld id="{02AC24A9-CCB6-4F8D-B8DB-C2F3692CFA5A}" type="datetimeFigureOut">
               <a:rPr lang="en-US" smtClean="0"/>
-              <a:t>3/10/2025</a:t>
+              <a:t>3/13/2025</a:t>
             </a:fld>
             <a:endParaRPr lang="en-US"/>
           </a:p>
@@ -3426,7 +3441,7 @@
           <a:p>
             <a:fld id="{02AC24A9-CCB6-4F8D-B8DB-C2F3692CFA5A}" type="datetimeFigureOut">
               <a:rPr lang="en-US" smtClean="0"/>
-              <a:t>3/10/2025</a:t>
+              <a:t>3/13/2025</a:t>
             </a:fld>
             <a:endParaRPr lang="en-US"/>
           </a:p>
@@ -3539,7 +3554,7 @@
           <a:p>
             <a:fld id="{02AC24A9-CCB6-4F8D-B8DB-C2F3692CFA5A}" type="datetimeFigureOut">
               <a:rPr lang="en-US" smtClean="0"/>
-              <a:t>3/10/2025</a:t>
+              <a:t>3/13/2025</a:t>
             </a:fld>
             <a:endParaRPr lang="en-US"/>
           </a:p>
@@ -4034,7 +4049,7 @@
           <a:p>
             <a:fld id="{02AC24A9-CCB6-4F8D-B8DB-C2F3692CFA5A}" type="datetimeFigureOut">
               <a:rPr lang="en-US" smtClean="0"/>
-              <a:t>3/10/2025</a:t>
+              <a:t>3/13/2025</a:t>
             </a:fld>
             <a:endParaRPr lang="en-US" dirty="0"/>
           </a:p>
@@ -4511,7 +4526,7 @@
           <a:p>
             <a:fld id="{02AC24A9-CCB6-4F8D-B8DB-C2F3692CFA5A}" type="datetimeFigureOut">
               <a:rPr lang="en-US" smtClean="0"/>
-              <a:t>3/10/2025</a:t>
+              <a:t>3/13/2025</a:t>
             </a:fld>
             <a:endParaRPr lang="en-US"/>
           </a:p>
@@ -4754,7 +4769,7 @@
           <a:p>
             <a:fld id="{02AC24A9-CCB6-4F8D-B8DB-C2F3692CFA5A}" type="datetimeFigureOut">
               <a:rPr lang="en-US" smtClean="0"/>
-              <a:t>3/10/2025</a:t>
+              <a:t>3/13/2025</a:t>
             </a:fld>
             <a:endParaRPr lang="en-US"/>
           </a:p>
@@ -5235,7 +5250,7 @@
           <a:lstStyle/>
           <a:p>
             <a:pPr algn="ctr"/>
-            <a:endParaRPr lang="en-US"/>
+            <a:endParaRPr lang="en-US" dirty="0"/>
           </a:p>
         </p:txBody>
       </p:sp>
@@ -5499,7 +5514,7 @@
               <a:tabLst/>
               <a:defRPr/>
             </a:pPr>
-            <a:endParaRPr kumimoji="0" lang="en-US" sz="1800" b="0" i="0" u="none" strike="noStrike" kern="1200" cap="none" spc="0" normalizeH="0" baseline="0" noProof="0">
+            <a:endParaRPr kumimoji="0" lang="en-US" sz="1800" b="0" i="0" u="none" strike="noStrike" kern="1200" cap="none" spc="0" normalizeH="0" baseline="0" noProof="0" dirty="0">
               <a:ln>
                 <a:noFill/>
               </a:ln>
@@ -5581,6 +5596,1374 @@
         </p:style>
         <p:txBody>
           <a:bodyPr rtlCol="0" anchor="ctr"/>
+          <a:lstStyle/>
+          <a:p>
+            <a:pPr marL="0" marR="0" lvl="0" indent="0" algn="ctr" defTabSz="914400" rtl="0" eaLnBrk="1" fontAlgn="auto" latinLnBrk="0" hangingPunct="1">
+              <a:lnSpc>
+                <a:spcPct val="100000"/>
+              </a:lnSpc>
+              <a:spcBef>
+                <a:spcPts val="0"/>
+              </a:spcBef>
+              <a:spcAft>
+                <a:spcPts val="0"/>
+              </a:spcAft>
+              <a:buClrTx/>
+              <a:buSzTx/>
+              <a:buFontTx/>
+              <a:buNone/>
+              <a:tabLst/>
+              <a:defRPr/>
+            </a:pPr>
+            <a:endParaRPr kumimoji="0" lang="en-US" sz="1800" b="0" i="0" u="none" strike="noStrike" kern="1200" cap="none" spc="0" normalizeH="0" baseline="0" noProof="0" dirty="0">
+              <a:ln>
+                <a:noFill/>
+              </a:ln>
+              <a:solidFill>
+                <a:prstClr val="white"/>
+              </a:solidFill>
+              <a:effectLst/>
+              <a:uLnTx/>
+              <a:uFillTx/>
+              <a:latin typeface="Calibri" panose="020F0502020204030204"/>
+              <a:ea typeface="+mn-ea"/>
+              <a:cs typeface="+mn-cs"/>
+            </a:endParaRPr>
+          </a:p>
+        </p:txBody>
+      </p:sp>
+    </p:spTree>
+    <p:extLst>
+      <p:ext uri="{BB962C8B-B14F-4D97-AF65-F5344CB8AC3E}">
+        <p14:creationId xmlns:p14="http://schemas.microsoft.com/office/powerpoint/2010/main" val="3366734229"/>
+      </p:ext>
+    </p:extLst>
+  </p:cSld>
+  <p:clrMapOvr>
+    <a:masterClrMapping/>
+  </p:clrMapOvr>
+</p:sld>
+</file>
+
+<file path=ppt/slides/slide10.xml><?xml version="1.0" encoding="utf-8"?>
+<p:sld xmlns:a="http://schemas.openxmlformats.org/drawingml/2006/main" xmlns:r="http://schemas.openxmlformats.org/officeDocument/2006/relationships" xmlns:p="http://schemas.openxmlformats.org/presentationml/2006/main">
+  <p:cSld>
+    <p:spTree>
+      <p:nvGrpSpPr>
+        <p:cNvPr id="1" name=""/>
+        <p:cNvGrpSpPr/>
+        <p:nvPr/>
+      </p:nvGrpSpPr>
+      <p:grpSpPr>
+        <a:xfrm>
+          <a:off x="0" y="0"/>
+          <a:ext cx="0" cy="0"/>
+          <a:chOff x="0" y="0"/>
+          <a:chExt cx="0" cy="0"/>
+        </a:xfrm>
+      </p:grpSpPr>
+      <p:sp>
+        <p:nvSpPr>
+          <p:cNvPr id="2" name="Título 1">
+            <a:extLst>
+              <a:ext uri="{FF2B5EF4-FFF2-40B4-BE49-F238E27FC236}">
+                <a16:creationId xmlns:a16="http://schemas.microsoft.com/office/drawing/2014/main" id="{C6434DB0-8AF9-44F7-B55A-81E75E536FD0}"/>
+              </a:ext>
+            </a:extLst>
+          </p:cNvPr>
+          <p:cNvSpPr>
+            <a:spLocks noGrp="1"/>
+          </p:cNvSpPr>
+          <p:nvPr>
+            <p:ph type="title"/>
+          </p:nvPr>
+        </p:nvSpPr>
+        <p:spPr/>
+        <p:txBody>
+          <a:bodyPr/>
+          <a:lstStyle/>
+          <a:p>
+            <a:r>
+              <a:rPr lang="pt-BR" dirty="0"/>
+              <a:t>Idioma</a:t>
+            </a:r>
+          </a:p>
+        </p:txBody>
+      </p:sp>
+      <p:sp>
+        <p:nvSpPr>
+          <p:cNvPr id="3" name="Espaço Reservado para Conteúdo 2">
+            <a:extLst>
+              <a:ext uri="{FF2B5EF4-FFF2-40B4-BE49-F238E27FC236}">
+                <a16:creationId xmlns:a16="http://schemas.microsoft.com/office/drawing/2014/main" id="{21819CBC-5AFC-C44D-8E20-CCE879E5088A}"/>
+              </a:ext>
+            </a:extLst>
+          </p:cNvPr>
+          <p:cNvSpPr>
+            <a:spLocks noGrp="1"/>
+          </p:cNvSpPr>
+          <p:nvPr>
+            <p:ph idx="1"/>
+          </p:nvPr>
+        </p:nvSpPr>
+        <p:spPr/>
+        <p:txBody>
+          <a:bodyPr/>
+          <a:lstStyle/>
+          <a:p>
+            <a:r>
+              <a:rPr lang="pt-BR" dirty="0"/>
+              <a:t>Se você respondeu que seria um idioma universal ou um idioma mais fácil como o inglês ou o esperanto você está correto!</a:t>
+            </a:r>
+          </a:p>
+          <a:p>
+            <a:r>
+              <a:rPr lang="pt-BR" dirty="0"/>
+              <a:t>O “idioma” ao qual os computadores se comunicavam era o NCP. </a:t>
+            </a:r>
+          </a:p>
+        </p:txBody>
+      </p:sp>
+    </p:spTree>
+    <p:extLst>
+      <p:ext uri="{BB962C8B-B14F-4D97-AF65-F5344CB8AC3E}">
+        <p14:creationId xmlns:p14="http://schemas.microsoft.com/office/powerpoint/2010/main" val="3933331837"/>
+      </p:ext>
+    </p:extLst>
+  </p:cSld>
+  <p:clrMapOvr>
+    <a:masterClrMapping/>
+  </p:clrMapOvr>
+</p:sld>
+</file>
+
+<file path=ppt/slides/slide100.xml><?xml version="1.0" encoding="utf-8"?>
+<p:sld xmlns:a="http://schemas.openxmlformats.org/drawingml/2006/main" xmlns:r="http://schemas.openxmlformats.org/officeDocument/2006/relationships" xmlns:p="http://schemas.openxmlformats.org/presentationml/2006/main">
+  <p:cSld>
+    <p:spTree>
+      <p:nvGrpSpPr>
+        <p:cNvPr id="1" name=""/>
+        <p:cNvGrpSpPr/>
+        <p:nvPr/>
+      </p:nvGrpSpPr>
+      <p:grpSpPr>
+        <a:xfrm>
+          <a:off x="0" y="0"/>
+          <a:ext cx="0" cy="0"/>
+          <a:chOff x="0" y="0"/>
+          <a:chExt cx="0" cy="0"/>
+        </a:xfrm>
+      </p:grpSpPr>
+      <p:sp>
+        <p:nvSpPr>
+          <p:cNvPr id="2" name="Título 1">
+            <a:extLst>
+              <a:ext uri="{FF2B5EF4-FFF2-40B4-BE49-F238E27FC236}">
+                <a16:creationId xmlns:a16="http://schemas.microsoft.com/office/drawing/2014/main" id="{FFFDADEE-6501-2651-2F5F-E98014AFD63B}"/>
+              </a:ext>
+            </a:extLst>
+          </p:cNvPr>
+          <p:cNvSpPr>
+            <a:spLocks noGrp="1"/>
+          </p:cNvSpPr>
+          <p:nvPr>
+            <p:ph type="title"/>
+          </p:nvPr>
+        </p:nvSpPr>
+        <p:spPr/>
+        <p:txBody>
+          <a:bodyPr/>
+          <a:lstStyle/>
+          <a:p>
+            <a:r>
+              <a:rPr lang="pt-BR" dirty="0" err="1"/>
+              <a:t>Tag</a:t>
+            </a:r>
+            <a:r>
+              <a:rPr lang="pt-BR" dirty="0"/>
+              <a:t> </a:t>
+            </a:r>
+            <a:r>
+              <a:rPr lang="pt-BR" dirty="0" err="1"/>
+              <a:t>strong</a:t>
+            </a:r>
+            <a:endParaRPr lang="pt-BR" dirty="0"/>
+          </a:p>
+        </p:txBody>
+      </p:sp>
+      <p:sp>
+        <p:nvSpPr>
+          <p:cNvPr id="3" name="Espaço Reservado para Conteúdo 2">
+            <a:extLst>
+              <a:ext uri="{FF2B5EF4-FFF2-40B4-BE49-F238E27FC236}">
+                <a16:creationId xmlns:a16="http://schemas.microsoft.com/office/drawing/2014/main" id="{59B08E0B-B1B6-09A1-95C0-4DF455BCDFAE}"/>
+              </a:ext>
+            </a:extLst>
+          </p:cNvPr>
+          <p:cNvSpPr>
+            <a:spLocks noGrp="1"/>
+          </p:cNvSpPr>
+          <p:nvPr>
+            <p:ph idx="1"/>
+          </p:nvPr>
+        </p:nvSpPr>
+        <p:spPr/>
+        <p:txBody>
+          <a:bodyPr/>
+          <a:lstStyle/>
+          <a:p>
+            <a:r>
+              <a:rPr lang="pt-BR" dirty="0"/>
+              <a:t>Coloca os Textos em Negrito</a:t>
+            </a:r>
+          </a:p>
+        </p:txBody>
+      </p:sp>
+      <p:pic>
+        <p:nvPicPr>
+          <p:cNvPr id="5" name="Imagem 4">
+            <a:extLst>
+              <a:ext uri="{FF2B5EF4-FFF2-40B4-BE49-F238E27FC236}">
+                <a16:creationId xmlns:a16="http://schemas.microsoft.com/office/drawing/2014/main" id="{167DFB11-B30D-22CF-2AC5-0430A4AADC42}"/>
+              </a:ext>
+            </a:extLst>
+          </p:cNvPr>
+          <p:cNvPicPr>
+            <a:picLocks noChangeAspect="1"/>
+          </p:cNvPicPr>
+          <p:nvPr/>
+        </p:nvPicPr>
+        <p:blipFill>
+          <a:blip r:embed="rId2"/>
+          <a:stretch>
+            <a:fillRect/>
+          </a:stretch>
+        </p:blipFill>
+        <p:spPr>
+          <a:xfrm>
+            <a:off x="149922" y="3581782"/>
+            <a:ext cx="11892156" cy="929622"/>
+          </a:xfrm>
+          <a:prstGeom prst="rect">
+            <a:avLst/>
+          </a:prstGeom>
+        </p:spPr>
+      </p:pic>
+    </p:spTree>
+    <p:extLst>
+      <p:ext uri="{BB962C8B-B14F-4D97-AF65-F5344CB8AC3E}">
+        <p14:creationId xmlns:p14="http://schemas.microsoft.com/office/powerpoint/2010/main" val="1769184679"/>
+      </p:ext>
+    </p:extLst>
+  </p:cSld>
+  <p:clrMapOvr>
+    <a:masterClrMapping/>
+  </p:clrMapOvr>
+</p:sld>
+</file>
+
+<file path=ppt/slides/slide101.xml><?xml version="1.0" encoding="utf-8"?>
+<p:sld xmlns:a="http://schemas.openxmlformats.org/drawingml/2006/main" xmlns:r="http://schemas.openxmlformats.org/officeDocument/2006/relationships" xmlns:p="http://schemas.openxmlformats.org/presentationml/2006/main">
+  <p:cSld>
+    <p:spTree>
+      <p:nvGrpSpPr>
+        <p:cNvPr id="1" name=""/>
+        <p:cNvGrpSpPr/>
+        <p:nvPr/>
+      </p:nvGrpSpPr>
+      <p:grpSpPr>
+        <a:xfrm>
+          <a:off x="0" y="0"/>
+          <a:ext cx="0" cy="0"/>
+          <a:chOff x="0" y="0"/>
+          <a:chExt cx="0" cy="0"/>
+        </a:xfrm>
+      </p:grpSpPr>
+      <p:sp>
+        <p:nvSpPr>
+          <p:cNvPr id="2" name="Título 1">
+            <a:extLst>
+              <a:ext uri="{FF2B5EF4-FFF2-40B4-BE49-F238E27FC236}">
+                <a16:creationId xmlns:a16="http://schemas.microsoft.com/office/drawing/2014/main" id="{E38BA47C-6A8D-1BF0-9BFE-5C0D56469A6D}"/>
+              </a:ext>
+            </a:extLst>
+          </p:cNvPr>
+          <p:cNvSpPr>
+            <a:spLocks noGrp="1"/>
+          </p:cNvSpPr>
+          <p:nvPr>
+            <p:ph type="title"/>
+          </p:nvPr>
+        </p:nvSpPr>
+        <p:spPr/>
+        <p:txBody>
+          <a:bodyPr>
+            <a:normAutofit fontScale="90000"/>
+          </a:bodyPr>
+          <a:lstStyle/>
+          <a:p>
+            <a:r>
+              <a:rPr lang="pt-BR" dirty="0" err="1"/>
+              <a:t>Tag</a:t>
+            </a:r>
+            <a:r>
+              <a:rPr lang="pt-BR" dirty="0"/>
+              <a:t> em</a:t>
+            </a:r>
+            <a:br>
+              <a:rPr lang="pt-BR" dirty="0"/>
+            </a:br>
+            <a:endParaRPr lang="pt-BR" dirty="0"/>
+          </a:p>
+        </p:txBody>
+      </p:sp>
+      <p:sp>
+        <p:nvSpPr>
+          <p:cNvPr id="3" name="Espaço Reservado para Conteúdo 2">
+            <a:extLst>
+              <a:ext uri="{FF2B5EF4-FFF2-40B4-BE49-F238E27FC236}">
+                <a16:creationId xmlns:a16="http://schemas.microsoft.com/office/drawing/2014/main" id="{A40E534A-43A8-97DD-3BF7-8849F2B70E6C}"/>
+              </a:ext>
+            </a:extLst>
+          </p:cNvPr>
+          <p:cNvSpPr>
+            <a:spLocks noGrp="1"/>
+          </p:cNvSpPr>
+          <p:nvPr>
+            <p:ph idx="1"/>
+          </p:nvPr>
+        </p:nvSpPr>
+        <p:spPr/>
+        <p:txBody>
+          <a:bodyPr/>
+          <a:lstStyle/>
+          <a:p>
+            <a:r>
+              <a:rPr lang="pt-BR" dirty="0" err="1"/>
+              <a:t>Tag</a:t>
+            </a:r>
+            <a:r>
+              <a:rPr lang="pt-BR" dirty="0"/>
+              <a:t> dedicada a exibir um texto em itálico</a:t>
+            </a:r>
+          </a:p>
+        </p:txBody>
+      </p:sp>
+      <p:pic>
+        <p:nvPicPr>
+          <p:cNvPr id="5" name="Imagem 4">
+            <a:extLst>
+              <a:ext uri="{FF2B5EF4-FFF2-40B4-BE49-F238E27FC236}">
+                <a16:creationId xmlns:a16="http://schemas.microsoft.com/office/drawing/2014/main" id="{7BD53E17-C84E-7CDD-677A-1CB9F20FCD60}"/>
+              </a:ext>
+            </a:extLst>
+          </p:cNvPr>
+          <p:cNvPicPr>
+            <a:picLocks noChangeAspect="1"/>
+          </p:cNvPicPr>
+          <p:nvPr/>
+        </p:nvPicPr>
+        <p:blipFill>
+          <a:blip r:embed="rId2"/>
+          <a:stretch>
+            <a:fillRect/>
+          </a:stretch>
+        </p:blipFill>
+        <p:spPr>
+          <a:xfrm>
+            <a:off x="1939891" y="3785525"/>
+            <a:ext cx="8312217" cy="2386675"/>
+          </a:xfrm>
+          <a:prstGeom prst="rect">
+            <a:avLst/>
+          </a:prstGeom>
+        </p:spPr>
+      </p:pic>
+    </p:spTree>
+    <p:extLst>
+      <p:ext uri="{BB962C8B-B14F-4D97-AF65-F5344CB8AC3E}">
+        <p14:creationId xmlns:p14="http://schemas.microsoft.com/office/powerpoint/2010/main" val="4002955219"/>
+      </p:ext>
+    </p:extLst>
+  </p:cSld>
+  <p:clrMapOvr>
+    <a:masterClrMapping/>
+  </p:clrMapOvr>
+</p:sld>
+</file>
+
+<file path=ppt/slides/slide102.xml><?xml version="1.0" encoding="utf-8"?>
+<p:sld xmlns:a="http://schemas.openxmlformats.org/drawingml/2006/main" xmlns:r="http://schemas.openxmlformats.org/officeDocument/2006/relationships" xmlns:p="http://schemas.openxmlformats.org/presentationml/2006/main">
+  <p:cSld>
+    <p:spTree>
+      <p:nvGrpSpPr>
+        <p:cNvPr id="1" name=""/>
+        <p:cNvGrpSpPr/>
+        <p:nvPr/>
+      </p:nvGrpSpPr>
+      <p:grpSpPr>
+        <a:xfrm>
+          <a:off x="0" y="0"/>
+          <a:ext cx="0" cy="0"/>
+          <a:chOff x="0" y="0"/>
+          <a:chExt cx="0" cy="0"/>
+        </a:xfrm>
+      </p:grpSpPr>
+      <p:sp>
+        <p:nvSpPr>
+          <p:cNvPr id="2" name="Título 1">
+            <a:extLst>
+              <a:ext uri="{FF2B5EF4-FFF2-40B4-BE49-F238E27FC236}">
+                <a16:creationId xmlns:a16="http://schemas.microsoft.com/office/drawing/2014/main" id="{ABDE710B-4348-8C8A-5862-257AC73D230A}"/>
+              </a:ext>
+            </a:extLst>
+          </p:cNvPr>
+          <p:cNvSpPr>
+            <a:spLocks noGrp="1"/>
+          </p:cNvSpPr>
+          <p:nvPr>
+            <p:ph type="title"/>
+          </p:nvPr>
+        </p:nvSpPr>
+        <p:spPr/>
+        <p:txBody>
+          <a:bodyPr/>
+          <a:lstStyle/>
+          <a:p>
+            <a:r>
+              <a:rPr lang="pt-BR" dirty="0" err="1"/>
+              <a:t>Tag</a:t>
+            </a:r>
+            <a:r>
+              <a:rPr lang="pt-BR" dirty="0"/>
+              <a:t> </a:t>
+            </a:r>
+            <a:r>
+              <a:rPr lang="pt-BR" dirty="0" err="1"/>
+              <a:t>code</a:t>
+            </a:r>
+            <a:endParaRPr lang="pt-BR" dirty="0"/>
+          </a:p>
+        </p:txBody>
+      </p:sp>
+      <p:sp>
+        <p:nvSpPr>
+          <p:cNvPr id="3" name="Espaço Reservado para Conteúdo 2">
+            <a:extLst>
+              <a:ext uri="{FF2B5EF4-FFF2-40B4-BE49-F238E27FC236}">
+                <a16:creationId xmlns:a16="http://schemas.microsoft.com/office/drawing/2014/main" id="{2F04546F-CBC8-F240-B51E-A00C56106E7F}"/>
+              </a:ext>
+            </a:extLst>
+          </p:cNvPr>
+          <p:cNvSpPr>
+            <a:spLocks noGrp="1"/>
+          </p:cNvSpPr>
+          <p:nvPr>
+            <p:ph idx="1"/>
+          </p:nvPr>
+        </p:nvSpPr>
+        <p:spPr/>
+        <p:txBody>
+          <a:bodyPr/>
+          <a:lstStyle/>
+          <a:p>
+            <a:r>
+              <a:rPr lang="pt-BR" dirty="0"/>
+              <a:t>O nome já é bastante autoexplicativo, o objetivo é mostrar na Interface um trecho de código:</a:t>
+            </a:r>
+          </a:p>
+        </p:txBody>
+      </p:sp>
+      <p:pic>
+        <p:nvPicPr>
+          <p:cNvPr id="5" name="Imagem 4">
+            <a:extLst>
+              <a:ext uri="{FF2B5EF4-FFF2-40B4-BE49-F238E27FC236}">
+                <a16:creationId xmlns:a16="http://schemas.microsoft.com/office/drawing/2014/main" id="{F484A7DA-3F9E-DC96-CB1B-D8E7C76324F1}"/>
+              </a:ext>
+            </a:extLst>
+          </p:cNvPr>
+          <p:cNvPicPr>
+            <a:picLocks noChangeAspect="1"/>
+          </p:cNvPicPr>
+          <p:nvPr/>
+        </p:nvPicPr>
+        <p:blipFill>
+          <a:blip r:embed="rId2"/>
+          <a:stretch>
+            <a:fillRect/>
+          </a:stretch>
+        </p:blipFill>
+        <p:spPr>
+          <a:xfrm>
+            <a:off x="736847" y="3855063"/>
+            <a:ext cx="10718306" cy="1855624"/>
+          </a:xfrm>
+          <a:prstGeom prst="rect">
+            <a:avLst/>
+          </a:prstGeom>
+        </p:spPr>
+      </p:pic>
+    </p:spTree>
+    <p:extLst>
+      <p:ext uri="{BB962C8B-B14F-4D97-AF65-F5344CB8AC3E}">
+        <p14:creationId xmlns:p14="http://schemas.microsoft.com/office/powerpoint/2010/main" val="3072611932"/>
+      </p:ext>
+    </p:extLst>
+  </p:cSld>
+  <p:clrMapOvr>
+    <a:masterClrMapping/>
+  </p:clrMapOvr>
+</p:sld>
+</file>
+
+<file path=ppt/slides/slide103.xml><?xml version="1.0" encoding="utf-8"?>
+<p:sld xmlns:a="http://schemas.openxmlformats.org/drawingml/2006/main" xmlns:r="http://schemas.openxmlformats.org/officeDocument/2006/relationships" xmlns:p="http://schemas.openxmlformats.org/presentationml/2006/main">
+  <p:cSld>
+    <p:spTree>
+      <p:nvGrpSpPr>
+        <p:cNvPr id="1" name=""/>
+        <p:cNvGrpSpPr/>
+        <p:nvPr/>
+      </p:nvGrpSpPr>
+      <p:grpSpPr>
+        <a:xfrm>
+          <a:off x="0" y="0"/>
+          <a:ext cx="0" cy="0"/>
+          <a:chOff x="0" y="0"/>
+          <a:chExt cx="0" cy="0"/>
+        </a:xfrm>
+      </p:grpSpPr>
+      <p:sp>
+        <p:nvSpPr>
+          <p:cNvPr id="2" name="Título 1">
+            <a:extLst>
+              <a:ext uri="{FF2B5EF4-FFF2-40B4-BE49-F238E27FC236}">
+                <a16:creationId xmlns:a16="http://schemas.microsoft.com/office/drawing/2014/main" id="{DF23E368-6EC9-35C2-3B8E-083A5E73CFB4}"/>
+              </a:ext>
+            </a:extLst>
+          </p:cNvPr>
+          <p:cNvSpPr>
+            <a:spLocks noGrp="1"/>
+          </p:cNvSpPr>
+          <p:nvPr>
+            <p:ph type="title"/>
+          </p:nvPr>
+        </p:nvSpPr>
+        <p:spPr/>
+        <p:txBody>
+          <a:bodyPr/>
+          <a:lstStyle/>
+          <a:p>
+            <a:r>
+              <a:rPr lang="pt-BR" dirty="0" err="1"/>
+              <a:t>Tag</a:t>
+            </a:r>
+            <a:r>
+              <a:rPr lang="pt-BR" dirty="0"/>
+              <a:t> </a:t>
+            </a:r>
+            <a:r>
+              <a:rPr lang="pt-BR" dirty="0" err="1"/>
+              <a:t>small</a:t>
+            </a:r>
+            <a:endParaRPr lang="pt-BR" dirty="0"/>
+          </a:p>
+        </p:txBody>
+      </p:sp>
+      <p:sp>
+        <p:nvSpPr>
+          <p:cNvPr id="3" name="Espaço Reservado para Conteúdo 2">
+            <a:extLst>
+              <a:ext uri="{FF2B5EF4-FFF2-40B4-BE49-F238E27FC236}">
+                <a16:creationId xmlns:a16="http://schemas.microsoft.com/office/drawing/2014/main" id="{A9AB6C38-DBEC-786A-913F-7C2BB8D92344}"/>
+              </a:ext>
+            </a:extLst>
+          </p:cNvPr>
+          <p:cNvSpPr>
+            <a:spLocks noGrp="1"/>
+          </p:cNvSpPr>
+          <p:nvPr>
+            <p:ph idx="1"/>
+          </p:nvPr>
+        </p:nvSpPr>
+        <p:spPr/>
+        <p:txBody>
+          <a:bodyPr/>
+          <a:lstStyle/>
+          <a:p>
+            <a:r>
+              <a:rPr lang="pt-BR" dirty="0"/>
+              <a:t>A </a:t>
+            </a:r>
+            <a:r>
+              <a:rPr lang="pt-BR" dirty="0" err="1"/>
+              <a:t>tag</a:t>
+            </a:r>
+            <a:r>
+              <a:rPr lang="pt-BR" dirty="0"/>
+              <a:t> </a:t>
+            </a:r>
+            <a:r>
+              <a:rPr lang="pt-BR" dirty="0" err="1"/>
+              <a:t>small</a:t>
+            </a:r>
+            <a:r>
+              <a:rPr lang="pt-BR" dirty="0"/>
+              <a:t> possui por objetivo mostrar pequenos elementos dentro de uma interface. </a:t>
+            </a:r>
+          </a:p>
+        </p:txBody>
+      </p:sp>
+      <p:pic>
+        <p:nvPicPr>
+          <p:cNvPr id="5" name="Imagem 4">
+            <a:extLst>
+              <a:ext uri="{FF2B5EF4-FFF2-40B4-BE49-F238E27FC236}">
+                <a16:creationId xmlns:a16="http://schemas.microsoft.com/office/drawing/2014/main" id="{BAB26BA1-D857-3A8A-3440-5092BEE2B48B}"/>
+              </a:ext>
+            </a:extLst>
+          </p:cNvPr>
+          <p:cNvPicPr>
+            <a:picLocks noChangeAspect="1"/>
+          </p:cNvPicPr>
+          <p:nvPr/>
+        </p:nvPicPr>
+        <p:blipFill>
+          <a:blip r:embed="rId2"/>
+          <a:stretch>
+            <a:fillRect/>
+          </a:stretch>
+        </p:blipFill>
+        <p:spPr>
+          <a:xfrm>
+            <a:off x="217014" y="4030587"/>
+            <a:ext cx="11757971" cy="2035618"/>
+          </a:xfrm>
+          <a:prstGeom prst="rect">
+            <a:avLst/>
+          </a:prstGeom>
+        </p:spPr>
+      </p:pic>
+    </p:spTree>
+    <p:extLst>
+      <p:ext uri="{BB962C8B-B14F-4D97-AF65-F5344CB8AC3E}">
+        <p14:creationId xmlns:p14="http://schemas.microsoft.com/office/powerpoint/2010/main" val="1708926867"/>
+      </p:ext>
+    </p:extLst>
+  </p:cSld>
+  <p:clrMapOvr>
+    <a:masterClrMapping/>
+  </p:clrMapOvr>
+</p:sld>
+</file>
+
+<file path=ppt/slides/slide104.xml><?xml version="1.0" encoding="utf-8"?>
+<p:sld xmlns:a="http://schemas.openxmlformats.org/drawingml/2006/main" xmlns:r="http://schemas.openxmlformats.org/officeDocument/2006/relationships" xmlns:p="http://schemas.openxmlformats.org/presentationml/2006/main">
+  <p:cSld>
+    <p:spTree>
+      <p:nvGrpSpPr>
+        <p:cNvPr id="1" name=""/>
+        <p:cNvGrpSpPr/>
+        <p:nvPr/>
+      </p:nvGrpSpPr>
+      <p:grpSpPr>
+        <a:xfrm>
+          <a:off x="0" y="0"/>
+          <a:ext cx="0" cy="0"/>
+          <a:chOff x="0" y="0"/>
+          <a:chExt cx="0" cy="0"/>
+        </a:xfrm>
+      </p:grpSpPr>
+      <p:sp>
+        <p:nvSpPr>
+          <p:cNvPr id="2" name="Título 1">
+            <a:extLst>
+              <a:ext uri="{FF2B5EF4-FFF2-40B4-BE49-F238E27FC236}">
+                <a16:creationId xmlns:a16="http://schemas.microsoft.com/office/drawing/2014/main" id="{DAE760AE-67F8-C1F1-CB06-D718D4EF5D4B}"/>
+              </a:ext>
+            </a:extLst>
+          </p:cNvPr>
+          <p:cNvSpPr>
+            <a:spLocks noGrp="1"/>
+          </p:cNvSpPr>
+          <p:nvPr>
+            <p:ph type="title"/>
+          </p:nvPr>
+        </p:nvSpPr>
+        <p:spPr/>
+        <p:txBody>
+          <a:bodyPr/>
+          <a:lstStyle/>
+          <a:p>
+            <a:r>
+              <a:rPr lang="pt-BR" dirty="0" err="1"/>
+              <a:t>Tag</a:t>
+            </a:r>
+            <a:r>
+              <a:rPr lang="pt-BR" dirty="0"/>
+              <a:t> </a:t>
+            </a:r>
+            <a:r>
+              <a:rPr lang="pt-BR" dirty="0" err="1"/>
+              <a:t>abbr</a:t>
+            </a:r>
+            <a:endParaRPr lang="pt-BR" dirty="0"/>
+          </a:p>
+        </p:txBody>
+      </p:sp>
+      <p:sp>
+        <p:nvSpPr>
+          <p:cNvPr id="3" name="Espaço Reservado para Conteúdo 2">
+            <a:extLst>
+              <a:ext uri="{FF2B5EF4-FFF2-40B4-BE49-F238E27FC236}">
+                <a16:creationId xmlns:a16="http://schemas.microsoft.com/office/drawing/2014/main" id="{B3FFFE95-ABE4-325B-2C47-D4D448297B0A}"/>
+              </a:ext>
+            </a:extLst>
+          </p:cNvPr>
+          <p:cNvSpPr>
+            <a:spLocks noGrp="1"/>
+          </p:cNvSpPr>
+          <p:nvPr>
+            <p:ph idx="1"/>
+          </p:nvPr>
+        </p:nvSpPr>
+        <p:spPr/>
+        <p:txBody>
+          <a:bodyPr/>
+          <a:lstStyle/>
+          <a:p>
+            <a:r>
+              <a:rPr lang="pt-BR" dirty="0"/>
+              <a:t>Usada especialmente para abreviações no seu Texto</a:t>
+            </a:r>
+          </a:p>
+        </p:txBody>
+      </p:sp>
+      <p:pic>
+        <p:nvPicPr>
+          <p:cNvPr id="5" name="Imagem 4">
+            <a:extLst>
+              <a:ext uri="{FF2B5EF4-FFF2-40B4-BE49-F238E27FC236}">
+                <a16:creationId xmlns:a16="http://schemas.microsoft.com/office/drawing/2014/main" id="{5503D77C-1AF8-2736-CD20-534B19E2CB6C}"/>
+              </a:ext>
+            </a:extLst>
+          </p:cNvPr>
+          <p:cNvPicPr>
+            <a:picLocks noChangeAspect="1"/>
+          </p:cNvPicPr>
+          <p:nvPr/>
+        </p:nvPicPr>
+        <p:blipFill>
+          <a:blip r:embed="rId2"/>
+          <a:stretch>
+            <a:fillRect/>
+          </a:stretch>
+        </p:blipFill>
+        <p:spPr>
+          <a:xfrm>
+            <a:off x="2989158" y="3600165"/>
+            <a:ext cx="6213683" cy="1903488"/>
+          </a:xfrm>
+          <a:prstGeom prst="rect">
+            <a:avLst/>
+          </a:prstGeom>
+        </p:spPr>
+      </p:pic>
+    </p:spTree>
+    <p:extLst>
+      <p:ext uri="{BB962C8B-B14F-4D97-AF65-F5344CB8AC3E}">
+        <p14:creationId xmlns:p14="http://schemas.microsoft.com/office/powerpoint/2010/main" val="3255922775"/>
+      </p:ext>
+    </p:extLst>
+  </p:cSld>
+  <p:clrMapOvr>
+    <a:masterClrMapping/>
+  </p:clrMapOvr>
+</p:sld>
+</file>
+
+<file path=ppt/slides/slide105.xml><?xml version="1.0" encoding="utf-8"?>
+<p:sld xmlns:a="http://schemas.openxmlformats.org/drawingml/2006/main" xmlns:r="http://schemas.openxmlformats.org/officeDocument/2006/relationships" xmlns:p="http://schemas.openxmlformats.org/presentationml/2006/main">
+  <p:cSld>
+    <p:spTree>
+      <p:nvGrpSpPr>
+        <p:cNvPr id="1" name=""/>
+        <p:cNvGrpSpPr/>
+        <p:nvPr/>
+      </p:nvGrpSpPr>
+      <p:grpSpPr>
+        <a:xfrm>
+          <a:off x="0" y="0"/>
+          <a:ext cx="0" cy="0"/>
+          <a:chOff x="0" y="0"/>
+          <a:chExt cx="0" cy="0"/>
+        </a:xfrm>
+      </p:grpSpPr>
+      <p:sp>
+        <p:nvSpPr>
+          <p:cNvPr id="2" name="Título 1">
+            <a:extLst>
+              <a:ext uri="{FF2B5EF4-FFF2-40B4-BE49-F238E27FC236}">
+                <a16:creationId xmlns:a16="http://schemas.microsoft.com/office/drawing/2014/main" id="{C9DEF3A7-F8DB-55BD-ACFB-272DD8FEAB99}"/>
+              </a:ext>
+            </a:extLst>
+          </p:cNvPr>
+          <p:cNvSpPr>
+            <a:spLocks noGrp="1"/>
+          </p:cNvSpPr>
+          <p:nvPr>
+            <p:ph type="title"/>
+          </p:nvPr>
+        </p:nvSpPr>
+        <p:spPr/>
+        <p:txBody>
+          <a:bodyPr/>
+          <a:lstStyle/>
+          <a:p>
+            <a:r>
+              <a:rPr lang="pt-BR" dirty="0" err="1"/>
+              <a:t>Tag</a:t>
+            </a:r>
+            <a:r>
+              <a:rPr lang="pt-BR" dirty="0"/>
+              <a:t> </a:t>
+            </a:r>
+            <a:r>
+              <a:rPr lang="pt-BR" dirty="0" err="1"/>
+              <a:t>Address</a:t>
+            </a:r>
+            <a:endParaRPr lang="pt-BR" dirty="0"/>
+          </a:p>
+        </p:txBody>
+      </p:sp>
+      <p:sp>
+        <p:nvSpPr>
+          <p:cNvPr id="3" name="Espaço Reservado para Conteúdo 2">
+            <a:extLst>
+              <a:ext uri="{FF2B5EF4-FFF2-40B4-BE49-F238E27FC236}">
+                <a16:creationId xmlns:a16="http://schemas.microsoft.com/office/drawing/2014/main" id="{D11E18A6-B497-9594-A02C-D41E49D4B643}"/>
+              </a:ext>
+            </a:extLst>
+          </p:cNvPr>
+          <p:cNvSpPr>
+            <a:spLocks noGrp="1"/>
+          </p:cNvSpPr>
+          <p:nvPr>
+            <p:ph idx="1"/>
+          </p:nvPr>
+        </p:nvSpPr>
+        <p:spPr/>
+        <p:txBody>
+          <a:bodyPr/>
+          <a:lstStyle/>
+          <a:p>
+            <a:r>
+              <a:rPr lang="pt-BR" dirty="0"/>
+              <a:t>A </a:t>
+            </a:r>
+            <a:r>
+              <a:rPr lang="pt-BR" dirty="0" err="1"/>
+              <a:t>tag</a:t>
+            </a:r>
+            <a:r>
+              <a:rPr lang="pt-BR" dirty="0"/>
+              <a:t> </a:t>
+            </a:r>
+            <a:r>
+              <a:rPr lang="pt-BR" dirty="0" err="1"/>
+              <a:t>address</a:t>
+            </a:r>
+            <a:r>
+              <a:rPr lang="pt-BR" dirty="0"/>
+              <a:t> indica um endereço (em itálico) em sua página Web.</a:t>
+            </a:r>
+          </a:p>
+        </p:txBody>
+      </p:sp>
+      <p:pic>
+        <p:nvPicPr>
+          <p:cNvPr id="5" name="Imagem 4">
+            <a:extLst>
+              <a:ext uri="{FF2B5EF4-FFF2-40B4-BE49-F238E27FC236}">
+                <a16:creationId xmlns:a16="http://schemas.microsoft.com/office/drawing/2014/main" id="{90D294AE-B0D3-C00A-610A-6D44B5FF1DC1}"/>
+              </a:ext>
+            </a:extLst>
+          </p:cNvPr>
+          <p:cNvPicPr>
+            <a:picLocks noChangeAspect="1"/>
+          </p:cNvPicPr>
+          <p:nvPr/>
+        </p:nvPicPr>
+        <p:blipFill>
+          <a:blip r:embed="rId2"/>
+          <a:stretch>
+            <a:fillRect/>
+          </a:stretch>
+        </p:blipFill>
+        <p:spPr>
+          <a:xfrm>
+            <a:off x="2714542" y="3121829"/>
+            <a:ext cx="6762916" cy="2969801"/>
+          </a:xfrm>
+          <a:prstGeom prst="rect">
+            <a:avLst/>
+          </a:prstGeom>
+        </p:spPr>
+      </p:pic>
+    </p:spTree>
+    <p:extLst>
+      <p:ext uri="{BB962C8B-B14F-4D97-AF65-F5344CB8AC3E}">
+        <p14:creationId xmlns:p14="http://schemas.microsoft.com/office/powerpoint/2010/main" val="1630107844"/>
+      </p:ext>
+    </p:extLst>
+  </p:cSld>
+  <p:clrMapOvr>
+    <a:masterClrMapping/>
+  </p:clrMapOvr>
+</p:sld>
+</file>
+
+<file path=ppt/slides/slide106.xml><?xml version="1.0" encoding="utf-8"?>
+<p:sld xmlns:a="http://schemas.openxmlformats.org/drawingml/2006/main" xmlns:r="http://schemas.openxmlformats.org/officeDocument/2006/relationships" xmlns:p="http://schemas.openxmlformats.org/presentationml/2006/main">
+  <p:cSld>
+    <p:spTree>
+      <p:nvGrpSpPr>
+        <p:cNvPr id="1" name=""/>
+        <p:cNvGrpSpPr/>
+        <p:nvPr/>
+      </p:nvGrpSpPr>
+      <p:grpSpPr>
+        <a:xfrm>
+          <a:off x="0" y="0"/>
+          <a:ext cx="0" cy="0"/>
+          <a:chOff x="0" y="0"/>
+          <a:chExt cx="0" cy="0"/>
+        </a:xfrm>
+      </p:grpSpPr>
+      <p:sp>
+        <p:nvSpPr>
+          <p:cNvPr id="2" name="Título 1">
+            <a:extLst>
+              <a:ext uri="{FF2B5EF4-FFF2-40B4-BE49-F238E27FC236}">
+                <a16:creationId xmlns:a16="http://schemas.microsoft.com/office/drawing/2014/main" id="{E4B93C9B-EAFC-F139-182F-57A2826B3E23}"/>
+              </a:ext>
+            </a:extLst>
+          </p:cNvPr>
+          <p:cNvSpPr>
+            <a:spLocks noGrp="1"/>
+          </p:cNvSpPr>
+          <p:nvPr>
+            <p:ph type="title"/>
+          </p:nvPr>
+        </p:nvSpPr>
+        <p:spPr/>
+        <p:txBody>
+          <a:bodyPr/>
+          <a:lstStyle/>
+          <a:p>
+            <a:r>
+              <a:rPr lang="pt-BR" dirty="0"/>
+              <a:t>Listas</a:t>
+            </a:r>
+          </a:p>
+        </p:txBody>
+      </p:sp>
+      <p:sp>
+        <p:nvSpPr>
+          <p:cNvPr id="3" name="Espaço Reservado para Conteúdo 2">
+            <a:extLst>
+              <a:ext uri="{FF2B5EF4-FFF2-40B4-BE49-F238E27FC236}">
+                <a16:creationId xmlns:a16="http://schemas.microsoft.com/office/drawing/2014/main" id="{82F78F1B-D34E-4508-C3CE-9273C53E9358}"/>
+              </a:ext>
+            </a:extLst>
+          </p:cNvPr>
+          <p:cNvSpPr>
+            <a:spLocks noGrp="1"/>
+          </p:cNvSpPr>
+          <p:nvPr>
+            <p:ph idx="1"/>
+          </p:nvPr>
+        </p:nvSpPr>
+        <p:spPr/>
+        <p:txBody>
+          <a:bodyPr/>
+          <a:lstStyle/>
+          <a:p>
+            <a:r>
+              <a:rPr lang="pt-BR" dirty="0"/>
+              <a:t>Além dos textos propriamente ditos, nós também podemos utilizar Listas no HTML, elas podem ser ordenadas, não ordenadas e detalhadas</a:t>
+            </a:r>
+          </a:p>
+        </p:txBody>
+      </p:sp>
+    </p:spTree>
+    <p:extLst>
+      <p:ext uri="{BB962C8B-B14F-4D97-AF65-F5344CB8AC3E}">
+        <p14:creationId xmlns:p14="http://schemas.microsoft.com/office/powerpoint/2010/main" val="1527164085"/>
+      </p:ext>
+    </p:extLst>
+  </p:cSld>
+  <p:clrMapOvr>
+    <a:masterClrMapping/>
+  </p:clrMapOvr>
+</p:sld>
+</file>
+
+<file path=ppt/slides/slide107.xml><?xml version="1.0" encoding="utf-8"?>
+<p:sld xmlns:a="http://schemas.openxmlformats.org/drawingml/2006/main" xmlns:r="http://schemas.openxmlformats.org/officeDocument/2006/relationships" xmlns:p="http://schemas.openxmlformats.org/presentationml/2006/main">
+  <p:cSld>
+    <p:spTree>
+      <p:nvGrpSpPr>
+        <p:cNvPr id="1" name=""/>
+        <p:cNvGrpSpPr/>
+        <p:nvPr/>
+      </p:nvGrpSpPr>
+      <p:grpSpPr>
+        <a:xfrm>
+          <a:off x="0" y="0"/>
+          <a:ext cx="0" cy="0"/>
+          <a:chOff x="0" y="0"/>
+          <a:chExt cx="0" cy="0"/>
+        </a:xfrm>
+      </p:grpSpPr>
+      <p:sp>
+        <p:nvSpPr>
+          <p:cNvPr id="2" name="Título 1">
+            <a:extLst>
+              <a:ext uri="{FF2B5EF4-FFF2-40B4-BE49-F238E27FC236}">
+                <a16:creationId xmlns:a16="http://schemas.microsoft.com/office/drawing/2014/main" id="{EA9C5086-9189-8933-C821-03B44EBC92D2}"/>
+              </a:ext>
+            </a:extLst>
+          </p:cNvPr>
+          <p:cNvSpPr>
+            <a:spLocks noGrp="1"/>
+          </p:cNvSpPr>
+          <p:nvPr>
+            <p:ph type="title"/>
+          </p:nvPr>
+        </p:nvSpPr>
+        <p:spPr/>
+        <p:txBody>
+          <a:bodyPr/>
+          <a:lstStyle/>
+          <a:p>
+            <a:r>
+              <a:rPr lang="pt-BR" dirty="0"/>
+              <a:t>Listas Ordenadas</a:t>
+            </a:r>
+          </a:p>
+        </p:txBody>
+      </p:sp>
+      <p:sp>
+        <p:nvSpPr>
+          <p:cNvPr id="3" name="Espaço Reservado para Conteúdo 2">
+            <a:extLst>
+              <a:ext uri="{FF2B5EF4-FFF2-40B4-BE49-F238E27FC236}">
+                <a16:creationId xmlns:a16="http://schemas.microsoft.com/office/drawing/2014/main" id="{8904B8C1-F53F-332E-737C-64CF605BA1FC}"/>
+              </a:ext>
+            </a:extLst>
+          </p:cNvPr>
+          <p:cNvSpPr>
+            <a:spLocks noGrp="1"/>
+          </p:cNvSpPr>
+          <p:nvPr>
+            <p:ph idx="1"/>
+          </p:nvPr>
+        </p:nvSpPr>
+        <p:spPr/>
+        <p:txBody>
+          <a:bodyPr/>
+          <a:lstStyle/>
+          <a:p>
+            <a:pPr marL="457200" indent="-457200">
+              <a:buFont typeface="+mj-lt"/>
+              <a:buAutoNum type="arabicPeriod"/>
+            </a:pPr>
+            <a:r>
+              <a:rPr lang="pt-BR" dirty="0"/>
+              <a:t>Sabem esses números que ficam geralmente ao lado de um texto no meu slide? </a:t>
+            </a:r>
+          </a:p>
+          <a:p>
+            <a:pPr marL="457200" indent="-457200">
+              <a:buFont typeface="+mj-lt"/>
+              <a:buAutoNum type="arabicPeriod"/>
+            </a:pPr>
+            <a:r>
+              <a:rPr lang="pt-BR" dirty="0"/>
+              <a:t>Então, essa é uma representação visual das listas ordenadas no HTML.</a:t>
+            </a:r>
+          </a:p>
+        </p:txBody>
+      </p:sp>
+      <p:pic>
+        <p:nvPicPr>
+          <p:cNvPr id="5" name="Imagem 4">
+            <a:extLst>
+              <a:ext uri="{FF2B5EF4-FFF2-40B4-BE49-F238E27FC236}">
+                <a16:creationId xmlns:a16="http://schemas.microsoft.com/office/drawing/2014/main" id="{29898EDC-3A66-2972-EB2D-71BA2FBFC2CE}"/>
+              </a:ext>
+            </a:extLst>
+          </p:cNvPr>
+          <p:cNvPicPr>
+            <a:picLocks noChangeAspect="1"/>
+          </p:cNvPicPr>
+          <p:nvPr/>
+        </p:nvPicPr>
+        <p:blipFill>
+          <a:blip r:embed="rId2"/>
+          <a:stretch>
+            <a:fillRect/>
+          </a:stretch>
+        </p:blipFill>
+        <p:spPr>
+          <a:xfrm>
+            <a:off x="4895682" y="4537463"/>
+            <a:ext cx="2400635" cy="1771897"/>
+          </a:xfrm>
+          <a:prstGeom prst="rect">
+            <a:avLst/>
+          </a:prstGeom>
+        </p:spPr>
+      </p:pic>
+    </p:spTree>
+    <p:extLst>
+      <p:ext uri="{BB962C8B-B14F-4D97-AF65-F5344CB8AC3E}">
+        <p14:creationId xmlns:p14="http://schemas.microsoft.com/office/powerpoint/2010/main" val="2988216323"/>
+      </p:ext>
+    </p:extLst>
+  </p:cSld>
+  <p:clrMapOvr>
+    <a:masterClrMapping/>
+  </p:clrMapOvr>
+</p:sld>
+</file>
+
+<file path=ppt/slides/slide108.xml><?xml version="1.0" encoding="utf-8"?>
+<p:sld xmlns:a="http://schemas.openxmlformats.org/drawingml/2006/main" xmlns:r="http://schemas.openxmlformats.org/officeDocument/2006/relationships" xmlns:p="http://schemas.openxmlformats.org/presentationml/2006/main">
+  <p:cSld>
+    <p:bg>
+      <p:bgPr>
+        <a:solidFill>
+          <a:schemeClr val="bg1"/>
+        </a:solidFill>
+        <a:effectLst/>
+      </p:bgPr>
+    </p:bg>
+    <p:spTree>
+      <p:nvGrpSpPr>
+        <p:cNvPr id="1" name=""/>
+        <p:cNvGrpSpPr/>
+        <p:nvPr/>
+      </p:nvGrpSpPr>
+      <p:grpSpPr>
+        <a:xfrm>
+          <a:off x="0" y="0"/>
+          <a:ext cx="0" cy="0"/>
+          <a:chOff x="0" y="0"/>
+          <a:chExt cx="0" cy="0"/>
+        </a:xfrm>
+      </p:grpSpPr>
+      <p:sp useBgFill="1">
+        <p:nvSpPr>
+          <p:cNvPr id="10" name="Rectangle 9">
+            <a:extLst>
+              <a:ext uri="{FF2B5EF4-FFF2-40B4-BE49-F238E27FC236}">
+                <a16:creationId xmlns:a16="http://schemas.microsoft.com/office/drawing/2014/main" id="{0288C6B4-AFC3-407F-A595-EFFD38D4CCAF}"/>
+              </a:ext>
+              <a:ext uri="{C183D7F6-B498-43B3-948B-1728B52AA6E4}">
+                <adec:decorative xmlns:adec="http://schemas.microsoft.com/office/drawing/2017/decorative" val="1"/>
+              </a:ext>
+            </a:extLst>
+          </p:cNvPr>
+          <p:cNvSpPr>
+            <a:spLocks noGrp="1" noRot="1" noChangeAspect="1" noMove="1" noResize="1" noEditPoints="1" noAdjustHandles="1" noChangeArrowheads="1" noChangeShapeType="1" noTextEdit="1"/>
+          </p:cNvSpPr>
+          <p:nvPr>
+            <p:extLst>
+              <p:ext uri="{386F3935-93C4-4BCD-93E2-E3B085C9AB24}">
+                <p16:designElem xmlns:p16="http://schemas.microsoft.com/office/powerpoint/2015/main" val="1"/>
+              </p:ext>
+            </p:extLst>
+          </p:nvPr>
+        </p:nvSpPr>
+        <p:spPr>
+          <a:xfrm>
+            <a:off x="0" y="0"/>
+            <a:ext cx="12192000" cy="6858000"/>
+          </a:xfrm>
+          <a:prstGeom prst="rect">
+            <a:avLst/>
+          </a:prstGeom>
+          <a:ln>
+            <a:noFill/>
+          </a:ln>
+        </p:spPr>
+        <p:style>
+          <a:lnRef idx="2">
+            <a:schemeClr val="accent1">
+              <a:shade val="50000"/>
+            </a:schemeClr>
+          </a:lnRef>
+          <a:fillRef idx="1">
+            <a:schemeClr val="accent1"/>
+          </a:fillRef>
+          <a:effectRef idx="0">
+            <a:schemeClr val="accent1"/>
+          </a:effectRef>
+          <a:fontRef idx="minor">
+            <a:schemeClr val="lt1"/>
+          </a:fontRef>
+        </p:style>
+        <p:txBody>
+          <a:bodyPr rtlCol="0" anchor="ctr"/>
+          <a:lstStyle/>
+          <a:p>
+            <a:pPr algn="ctr"/>
+            <a:endParaRPr lang="en-US"/>
+          </a:p>
+        </p:txBody>
+      </p:sp>
+      <p:sp useBgFill="1">
+        <p:nvSpPr>
+          <p:cNvPr id="12" name="Freeform: Shape 11">
+            <a:extLst>
+              <a:ext uri="{FF2B5EF4-FFF2-40B4-BE49-F238E27FC236}">
+                <a16:creationId xmlns:a16="http://schemas.microsoft.com/office/drawing/2014/main" id="{CF236821-17FE-429B-8D2C-08E13A64EA40}"/>
+              </a:ext>
+              <a:ext uri="{C183D7F6-B498-43B3-948B-1728B52AA6E4}">
+                <adec:decorative xmlns:adec="http://schemas.microsoft.com/office/drawing/2017/decorative" val="1"/>
+              </a:ext>
+            </a:extLst>
+          </p:cNvPr>
+          <p:cNvSpPr>
+            <a:spLocks noGrp="1" noRot="1" noChangeAspect="1" noMove="1" noResize="1" noEditPoints="1" noAdjustHandles="1" noChangeArrowheads="1" noChangeShapeType="1" noTextEdit="1"/>
+          </p:cNvSpPr>
+          <p:nvPr>
+            <p:extLst>
+              <p:ext uri="{386F3935-93C4-4BCD-93E2-E3B085C9AB24}">
+                <p16:designElem xmlns:p16="http://schemas.microsoft.com/office/powerpoint/2015/main" val="1"/>
+              </p:ext>
+            </p:extLst>
+          </p:nvPr>
+        </p:nvSpPr>
+        <p:spPr>
+          <a:xfrm>
+            <a:off x="-1" y="0"/>
+            <a:ext cx="4455673" cy="6858000"/>
+          </a:xfrm>
+          <a:custGeom>
+            <a:avLst/>
+            <a:gdLst>
+              <a:gd name="connsiteX0" fmla="*/ 0 w 4455673"/>
+              <a:gd name="connsiteY0" fmla="*/ 0 h 6858000"/>
+              <a:gd name="connsiteX1" fmla="*/ 3242695 w 4455673"/>
+              <a:gd name="connsiteY1" fmla="*/ 0 h 6858000"/>
+              <a:gd name="connsiteX2" fmla="*/ 3305678 w 4455673"/>
+              <a:gd name="connsiteY2" fmla="*/ 69271 h 6858000"/>
+              <a:gd name="connsiteX3" fmla="*/ 4455673 w 4455673"/>
+              <a:gd name="connsiteY3" fmla="*/ 3429000 h 6858000"/>
+              <a:gd name="connsiteX4" fmla="*/ 3305678 w 4455673"/>
+              <a:gd name="connsiteY4" fmla="*/ 6788730 h 6858000"/>
+              <a:gd name="connsiteX5" fmla="*/ 3242695 w 4455673"/>
+              <a:gd name="connsiteY5" fmla="*/ 6858000 h 6858000"/>
+              <a:gd name="connsiteX6" fmla="*/ 0 w 4455673"/>
+              <a:gd name="connsiteY6" fmla="*/ 6858000 h 6858000"/>
+            </a:gdLst>
+            <a:ahLst/>
+            <a:cxnLst>
+              <a:cxn ang="0">
+                <a:pos x="connsiteX0" y="connsiteY0"/>
+              </a:cxn>
+              <a:cxn ang="0">
+                <a:pos x="connsiteX1" y="connsiteY1"/>
+              </a:cxn>
+              <a:cxn ang="0">
+                <a:pos x="connsiteX2" y="connsiteY2"/>
+              </a:cxn>
+              <a:cxn ang="0">
+                <a:pos x="connsiteX3" y="connsiteY3"/>
+              </a:cxn>
+              <a:cxn ang="0">
+                <a:pos x="connsiteX4" y="connsiteY4"/>
+              </a:cxn>
+              <a:cxn ang="0">
+                <a:pos x="connsiteX5" y="connsiteY5"/>
+              </a:cxn>
+              <a:cxn ang="0">
+                <a:pos x="connsiteX6" y="connsiteY6"/>
+              </a:cxn>
+            </a:cxnLst>
+            <a:rect l="l" t="t" r="r" b="b"/>
+            <a:pathLst>
+              <a:path w="4455673" h="6858000">
+                <a:moveTo>
+                  <a:pt x="0" y="0"/>
+                </a:moveTo>
+                <a:lnTo>
+                  <a:pt x="3242695" y="0"/>
+                </a:lnTo>
+                <a:lnTo>
+                  <a:pt x="3305678" y="69271"/>
+                </a:lnTo>
+                <a:cubicBezTo>
+                  <a:pt x="4016204" y="929100"/>
+                  <a:pt x="4455673" y="2116944"/>
+                  <a:pt x="4455673" y="3429000"/>
+                </a:cubicBezTo>
+                <a:cubicBezTo>
+                  <a:pt x="4455673" y="4741056"/>
+                  <a:pt x="4016204" y="5928900"/>
+                  <a:pt x="3305678" y="6788730"/>
+                </a:cubicBezTo>
+                <a:lnTo>
+                  <a:pt x="3242695" y="6858000"/>
+                </a:lnTo>
+                <a:lnTo>
+                  <a:pt x="0" y="6858000"/>
+                </a:lnTo>
+                <a:close/>
+              </a:path>
+            </a:pathLst>
+          </a:custGeom>
+          <a:ln w="9525">
+            <a:solidFill>
+              <a:schemeClr val="tx2">
+                <a:lumMod val="10000"/>
+                <a:lumOff val="90000"/>
+              </a:schemeClr>
+            </a:solidFill>
+          </a:ln>
+          <a:effectLst>
+            <a:outerShdw blurRad="50800" dist="38100" algn="l" rotWithShape="0">
+              <a:schemeClr val="bg1">
+                <a:lumMod val="85000"/>
+                <a:alpha val="30000"/>
+              </a:schemeClr>
+            </a:outerShdw>
+          </a:effectLst>
+        </p:spPr>
+        <p:style>
+          <a:lnRef idx="2">
+            <a:schemeClr val="accent1">
+              <a:shade val="50000"/>
+            </a:schemeClr>
+          </a:lnRef>
+          <a:fillRef idx="1">
+            <a:schemeClr val="accent1"/>
+          </a:fillRef>
+          <a:effectRef idx="0">
+            <a:schemeClr val="accent1"/>
+          </a:effectRef>
+          <a:fontRef idx="minor">
+            <a:schemeClr val="lt1"/>
+          </a:fontRef>
+        </p:style>
+        <p:txBody>
+          <a:bodyPr wrap="square" rtlCol="0" anchor="ctr">
+            <a:noAutofit/>
+          </a:bodyPr>
           <a:lstStyle/>
           <a:p>
             <a:pPr marL="0" marR="0" lvl="0" indent="0" algn="ctr" defTabSz="914400" rtl="0" eaLnBrk="1" fontAlgn="auto" latinLnBrk="0" hangingPunct="1">
@@ -5617,10 +7000,467 @@
           </a:p>
         </p:txBody>
       </p:sp>
+      <p:sp useBgFill="1">
+        <p:nvSpPr>
+          <p:cNvPr id="14" name="Freeform: Shape 13">
+            <a:extLst>
+              <a:ext uri="{FF2B5EF4-FFF2-40B4-BE49-F238E27FC236}">
+                <a16:creationId xmlns:a16="http://schemas.microsoft.com/office/drawing/2014/main" id="{C0BDBCD2-E081-43AB-9119-C55465E59757}"/>
+              </a:ext>
+              <a:ext uri="{C183D7F6-B498-43B3-948B-1728B52AA6E4}">
+                <adec:decorative xmlns:adec="http://schemas.microsoft.com/office/drawing/2017/decorative" val="1"/>
+              </a:ext>
+            </a:extLst>
+          </p:cNvPr>
+          <p:cNvSpPr>
+            <a:spLocks noGrp="1" noRot="1" noChangeAspect="1" noMove="1" noResize="1" noEditPoints="1" noAdjustHandles="1" noChangeArrowheads="1" noChangeShapeType="1" noTextEdit="1"/>
+          </p:cNvSpPr>
+          <p:nvPr>
+            <p:extLst>
+              <p:ext uri="{386F3935-93C4-4BCD-93E2-E3B085C9AB24}">
+                <p16:designElem xmlns:p16="http://schemas.microsoft.com/office/powerpoint/2015/main" val="1"/>
+              </p:ext>
+            </p:extLst>
+          </p:nvPr>
+        </p:nvSpPr>
+        <p:spPr>
+          <a:xfrm>
+            <a:off x="0" y="0"/>
+            <a:ext cx="4446529" cy="6858000"/>
+          </a:xfrm>
+          <a:custGeom>
+            <a:avLst/>
+            <a:gdLst>
+              <a:gd name="connsiteX0" fmla="*/ 0 w 4446529"/>
+              <a:gd name="connsiteY0" fmla="*/ 0 h 6858000"/>
+              <a:gd name="connsiteX1" fmla="*/ 3233551 w 4446529"/>
+              <a:gd name="connsiteY1" fmla="*/ 0 h 6858000"/>
+              <a:gd name="connsiteX2" fmla="*/ 3296534 w 4446529"/>
+              <a:gd name="connsiteY2" fmla="*/ 69271 h 6858000"/>
+              <a:gd name="connsiteX3" fmla="*/ 4446529 w 4446529"/>
+              <a:gd name="connsiteY3" fmla="*/ 3429000 h 6858000"/>
+              <a:gd name="connsiteX4" fmla="*/ 3296534 w 4446529"/>
+              <a:gd name="connsiteY4" fmla="*/ 6788730 h 6858000"/>
+              <a:gd name="connsiteX5" fmla="*/ 3233551 w 4446529"/>
+              <a:gd name="connsiteY5" fmla="*/ 6858000 h 6858000"/>
+              <a:gd name="connsiteX6" fmla="*/ 0 w 4446529"/>
+              <a:gd name="connsiteY6" fmla="*/ 6858000 h 6858000"/>
+            </a:gdLst>
+            <a:ahLst/>
+            <a:cxnLst>
+              <a:cxn ang="0">
+                <a:pos x="connsiteX0" y="connsiteY0"/>
+              </a:cxn>
+              <a:cxn ang="0">
+                <a:pos x="connsiteX1" y="connsiteY1"/>
+              </a:cxn>
+              <a:cxn ang="0">
+                <a:pos x="connsiteX2" y="connsiteY2"/>
+              </a:cxn>
+              <a:cxn ang="0">
+                <a:pos x="connsiteX3" y="connsiteY3"/>
+              </a:cxn>
+              <a:cxn ang="0">
+                <a:pos x="connsiteX4" y="connsiteY4"/>
+              </a:cxn>
+              <a:cxn ang="0">
+                <a:pos x="connsiteX5" y="connsiteY5"/>
+              </a:cxn>
+              <a:cxn ang="0">
+                <a:pos x="connsiteX6" y="connsiteY6"/>
+              </a:cxn>
+            </a:cxnLst>
+            <a:rect l="l" t="t" r="r" b="b"/>
+            <a:pathLst>
+              <a:path w="4446529" h="6858000">
+                <a:moveTo>
+                  <a:pt x="0" y="0"/>
+                </a:moveTo>
+                <a:lnTo>
+                  <a:pt x="3233551" y="0"/>
+                </a:lnTo>
+                <a:lnTo>
+                  <a:pt x="3296534" y="69271"/>
+                </a:lnTo>
+                <a:cubicBezTo>
+                  <a:pt x="4007060" y="929100"/>
+                  <a:pt x="4446529" y="2116944"/>
+                  <a:pt x="4446529" y="3429000"/>
+                </a:cubicBezTo>
+                <a:cubicBezTo>
+                  <a:pt x="4446529" y="4741056"/>
+                  <a:pt x="4007060" y="5928900"/>
+                  <a:pt x="3296534" y="6788730"/>
+                </a:cubicBezTo>
+                <a:lnTo>
+                  <a:pt x="3233551" y="6858000"/>
+                </a:lnTo>
+                <a:lnTo>
+                  <a:pt x="0" y="6858000"/>
+                </a:lnTo>
+                <a:close/>
+              </a:path>
+            </a:pathLst>
+          </a:custGeom>
+          <a:ln w="9525">
+            <a:noFill/>
+          </a:ln>
+          <a:effectLst/>
+        </p:spPr>
+        <p:style>
+          <a:lnRef idx="2">
+            <a:schemeClr val="accent1">
+              <a:shade val="50000"/>
+            </a:schemeClr>
+          </a:lnRef>
+          <a:fillRef idx="1">
+            <a:schemeClr val="accent1"/>
+          </a:fillRef>
+          <a:effectRef idx="0">
+            <a:schemeClr val="accent1"/>
+          </a:effectRef>
+          <a:fontRef idx="minor">
+            <a:schemeClr val="lt1"/>
+          </a:fontRef>
+        </p:style>
+        <p:txBody>
+          <a:bodyPr wrap="square" rtlCol="0" anchor="ctr">
+            <a:noAutofit/>
+          </a:bodyPr>
+          <a:lstStyle/>
+          <a:p>
+            <a:pPr marL="0" marR="0" lvl="0" indent="0" algn="ctr" defTabSz="914400" rtl="0" eaLnBrk="1" fontAlgn="auto" latinLnBrk="0" hangingPunct="1">
+              <a:lnSpc>
+                <a:spcPct val="100000"/>
+              </a:lnSpc>
+              <a:spcBef>
+                <a:spcPts val="0"/>
+              </a:spcBef>
+              <a:spcAft>
+                <a:spcPts val="0"/>
+              </a:spcAft>
+              <a:buClrTx/>
+              <a:buSzTx/>
+              <a:buFontTx/>
+              <a:buNone/>
+              <a:tabLst/>
+              <a:defRPr/>
+            </a:pPr>
+            <a:endParaRPr kumimoji="0" lang="en-US" sz="1800" b="0" i="0" u="none" strike="noStrike" kern="1200" cap="none" spc="0" normalizeH="0" baseline="0" noProof="0">
+              <a:ln>
+                <a:noFill/>
+              </a:ln>
+              <a:solidFill>
+                <a:prstClr val="white"/>
+              </a:solidFill>
+              <a:effectLst/>
+              <a:uLnTx/>
+              <a:uFillTx/>
+              <a:latin typeface="Calibri" panose="020F0502020204030204"/>
+              <a:ea typeface="+mn-ea"/>
+              <a:cs typeface="+mn-cs"/>
+            </a:endParaRPr>
+          </a:p>
+        </p:txBody>
+      </p:sp>
+      <p:sp>
+        <p:nvSpPr>
+          <p:cNvPr id="2" name="Título 1">
+            <a:extLst>
+              <a:ext uri="{FF2B5EF4-FFF2-40B4-BE49-F238E27FC236}">
+                <a16:creationId xmlns:a16="http://schemas.microsoft.com/office/drawing/2014/main" id="{1AEA4FFD-C92A-495A-60DD-677E1A216E93}"/>
+              </a:ext>
+            </a:extLst>
+          </p:cNvPr>
+          <p:cNvSpPr>
+            <a:spLocks noGrp="1"/>
+          </p:cNvSpPr>
+          <p:nvPr>
+            <p:ph type="title"/>
+          </p:nvPr>
+        </p:nvSpPr>
+        <p:spPr>
+          <a:xfrm>
+            <a:off x="371094" y="1161288"/>
+            <a:ext cx="3438144" cy="1239012"/>
+          </a:xfrm>
+        </p:spPr>
+        <p:txBody>
+          <a:bodyPr anchor="ctr">
+            <a:normAutofit/>
+          </a:bodyPr>
+          <a:lstStyle/>
+          <a:p>
+            <a:r>
+              <a:rPr lang="pt-BR" sz="2800"/>
+              <a:t>Listas Não Ordenadas</a:t>
+            </a:r>
+          </a:p>
+        </p:txBody>
+      </p:sp>
+      <p:sp>
+        <p:nvSpPr>
+          <p:cNvPr id="16" name="Rectangle 15">
+            <a:extLst>
+              <a:ext uri="{FF2B5EF4-FFF2-40B4-BE49-F238E27FC236}">
+                <a16:creationId xmlns:a16="http://schemas.microsoft.com/office/drawing/2014/main" id="{98E79BE4-34FE-485A-98A5-92CE8F7C4743}"/>
+              </a:ext>
+              <a:ext uri="{C183D7F6-B498-43B3-948B-1728B52AA6E4}">
+                <adec:decorative xmlns:adec="http://schemas.microsoft.com/office/drawing/2017/decorative" val="1"/>
+              </a:ext>
+            </a:extLst>
+          </p:cNvPr>
+          <p:cNvSpPr>
+            <a:spLocks noGrp="1" noRot="1" noChangeAspect="1" noMove="1" noResize="1" noEditPoints="1" noAdjustHandles="1" noChangeArrowheads="1" noChangeShapeType="1" noTextEdit="1"/>
+          </p:cNvSpPr>
+          <p:nvPr>
+            <p:extLst>
+              <p:ext uri="{386F3935-93C4-4BCD-93E2-E3B085C9AB24}">
+                <p16:designElem xmlns:p16="http://schemas.microsoft.com/office/powerpoint/2015/main" val="1"/>
+              </p:ext>
+            </p:extLst>
+          </p:nvPr>
+        </p:nvSpPr>
+        <p:spPr>
+          <a:xfrm>
+            <a:off x="0" y="1426546"/>
+            <a:ext cx="128016" cy="653903"/>
+          </a:xfrm>
+          <a:prstGeom prst="rect">
+            <a:avLst/>
+          </a:prstGeom>
+          <a:solidFill>
+            <a:schemeClr val="accent1"/>
+          </a:solidFill>
+          <a:ln>
+            <a:noFill/>
+          </a:ln>
+        </p:spPr>
+        <p:style>
+          <a:lnRef idx="2">
+            <a:schemeClr val="accent1">
+              <a:shade val="50000"/>
+            </a:schemeClr>
+          </a:lnRef>
+          <a:fillRef idx="1">
+            <a:schemeClr val="accent1"/>
+          </a:fillRef>
+          <a:effectRef idx="0">
+            <a:schemeClr val="accent1"/>
+          </a:effectRef>
+          <a:fontRef idx="minor">
+            <a:schemeClr val="lt1"/>
+          </a:fontRef>
+        </p:style>
+        <p:txBody>
+          <a:bodyPr rtlCol="0" anchor="ctr"/>
+          <a:lstStyle/>
+          <a:p>
+            <a:pPr marL="0" marR="0" lvl="0" indent="0" algn="ctr" defTabSz="914400" rtl="0" eaLnBrk="1" fontAlgn="auto" latinLnBrk="0" hangingPunct="1">
+              <a:lnSpc>
+                <a:spcPct val="100000"/>
+              </a:lnSpc>
+              <a:spcBef>
+                <a:spcPts val="0"/>
+              </a:spcBef>
+              <a:spcAft>
+                <a:spcPts val="0"/>
+              </a:spcAft>
+              <a:buClrTx/>
+              <a:buSzTx/>
+              <a:buFontTx/>
+              <a:buNone/>
+              <a:tabLst/>
+              <a:defRPr/>
+            </a:pPr>
+            <a:endParaRPr kumimoji="0" lang="en-US" sz="1800" b="0" i="0" u="none" strike="noStrike" kern="1200" cap="none" spc="0" normalizeH="0" baseline="0" noProof="0">
+              <a:ln>
+                <a:noFill/>
+              </a:ln>
+              <a:solidFill>
+                <a:prstClr val="white"/>
+              </a:solidFill>
+              <a:effectLst/>
+              <a:uLnTx/>
+              <a:uFillTx/>
+              <a:latin typeface="Calibri" panose="020F0502020204030204"/>
+              <a:ea typeface="+mn-ea"/>
+              <a:cs typeface="+mn-cs"/>
+            </a:endParaRPr>
+          </a:p>
+        </p:txBody>
+      </p:sp>
+      <p:sp>
+        <p:nvSpPr>
+          <p:cNvPr id="18" name="Rectangle 17">
+            <a:extLst>
+              <a:ext uri="{FF2B5EF4-FFF2-40B4-BE49-F238E27FC236}">
+                <a16:creationId xmlns:a16="http://schemas.microsoft.com/office/drawing/2014/main" id="{7A5F0580-5EE9-419F-96EE-B6529EF6E7D0}"/>
+              </a:ext>
+              <a:ext uri="{C183D7F6-B498-43B3-948B-1728B52AA6E4}">
+                <adec:decorative xmlns:adec="http://schemas.microsoft.com/office/drawing/2017/decorative" val="1"/>
+              </a:ext>
+            </a:extLst>
+          </p:cNvPr>
+          <p:cNvSpPr>
+            <a:spLocks noGrp="1" noRot="1" noChangeAspect="1" noMove="1" noResize="1" noEditPoints="1" noAdjustHandles="1" noChangeArrowheads="1" noChangeShapeType="1" noTextEdit="1"/>
+          </p:cNvSpPr>
+          <p:nvPr>
+            <p:extLst>
+              <p:ext uri="{386F3935-93C4-4BCD-93E2-E3B085C9AB24}">
+                <p16:designElem xmlns:p16="http://schemas.microsoft.com/office/powerpoint/2015/main" val="1"/>
+              </p:ext>
+            </p:extLst>
+          </p:nvPr>
+        </p:nvSpPr>
+        <p:spPr>
+          <a:xfrm>
+            <a:off x="395893" y="2443480"/>
+            <a:ext cx="3383280" cy="18288"/>
+          </a:xfrm>
+          <a:prstGeom prst="rect">
+            <a:avLst/>
+          </a:prstGeom>
+          <a:solidFill>
+            <a:schemeClr val="tx2">
+              <a:lumMod val="25000"/>
+              <a:lumOff val="75000"/>
+            </a:schemeClr>
+          </a:solidFill>
+          <a:ln w="3175">
+            <a:noFill/>
+          </a:ln>
+          <a:effectLst/>
+        </p:spPr>
+        <p:style>
+          <a:lnRef idx="2">
+            <a:schemeClr val="accent1">
+              <a:shade val="50000"/>
+            </a:schemeClr>
+          </a:lnRef>
+          <a:fillRef idx="1">
+            <a:schemeClr val="accent1"/>
+          </a:fillRef>
+          <a:effectRef idx="0">
+            <a:schemeClr val="accent1"/>
+          </a:effectRef>
+          <a:fontRef idx="minor">
+            <a:schemeClr val="lt1"/>
+          </a:fontRef>
+        </p:style>
+        <p:txBody>
+          <a:bodyPr rtlCol="0" anchor="ctr"/>
+          <a:lstStyle/>
+          <a:p>
+            <a:pPr marL="0" marR="0" lvl="0" indent="0" algn="ctr" defTabSz="914400" rtl="0" eaLnBrk="1" fontAlgn="auto" latinLnBrk="0" hangingPunct="1">
+              <a:lnSpc>
+                <a:spcPct val="100000"/>
+              </a:lnSpc>
+              <a:spcBef>
+                <a:spcPts val="0"/>
+              </a:spcBef>
+              <a:spcAft>
+                <a:spcPts val="0"/>
+              </a:spcAft>
+              <a:buClrTx/>
+              <a:buSzTx/>
+              <a:buFontTx/>
+              <a:buNone/>
+              <a:tabLst/>
+              <a:defRPr/>
+            </a:pPr>
+            <a:endParaRPr kumimoji="0" lang="en-US" sz="1800" b="0" i="0" u="none" strike="noStrike" kern="1200" cap="none" spc="0" normalizeH="0" baseline="0" noProof="0">
+              <a:ln>
+                <a:noFill/>
+              </a:ln>
+              <a:solidFill>
+                <a:prstClr val="white"/>
+              </a:solidFill>
+              <a:effectLst/>
+              <a:uLnTx/>
+              <a:uFillTx/>
+              <a:latin typeface="Calibri" panose="020F0502020204030204"/>
+              <a:ea typeface="+mn-ea"/>
+              <a:cs typeface="+mn-cs"/>
+            </a:endParaRPr>
+          </a:p>
+        </p:txBody>
+      </p:sp>
+      <p:sp>
+        <p:nvSpPr>
+          <p:cNvPr id="3" name="Espaço Reservado para Conteúdo 2">
+            <a:extLst>
+              <a:ext uri="{FF2B5EF4-FFF2-40B4-BE49-F238E27FC236}">
+                <a16:creationId xmlns:a16="http://schemas.microsoft.com/office/drawing/2014/main" id="{CD08F1AF-9584-F951-DE50-AD7F06A32D95}"/>
+              </a:ext>
+            </a:extLst>
+          </p:cNvPr>
+          <p:cNvSpPr>
+            <a:spLocks noGrp="1"/>
+          </p:cNvSpPr>
+          <p:nvPr>
+            <p:ph idx="1"/>
+          </p:nvPr>
+        </p:nvSpPr>
+        <p:spPr>
+          <a:xfrm>
+            <a:off x="371094" y="2718054"/>
+            <a:ext cx="3438906" cy="3207258"/>
+          </a:xfrm>
+        </p:spPr>
+        <p:txBody>
+          <a:bodyPr anchor="t">
+            <a:normAutofit/>
+          </a:bodyPr>
+          <a:lstStyle/>
+          <a:p>
+            <a:r>
+              <a:rPr lang="pt-BR" sz="1700" dirty="0"/>
+              <a:t>E quanto às listas não ordenadas?</a:t>
+            </a:r>
+          </a:p>
+          <a:p>
+            <a:r>
+              <a:rPr lang="pt-BR" sz="1700" dirty="0"/>
+              <a:t>Dê uma olhadinha no meu slide, percebeu algo diferente?</a:t>
+            </a:r>
+          </a:p>
+        </p:txBody>
+      </p:sp>
+      <p:pic>
+        <p:nvPicPr>
+          <p:cNvPr id="5" name="Imagem 4" descr="Texto&#10;&#10;O conteúdo gerado por IA pode estar incorreto.">
+            <a:extLst>
+              <a:ext uri="{FF2B5EF4-FFF2-40B4-BE49-F238E27FC236}">
+                <a16:creationId xmlns:a16="http://schemas.microsoft.com/office/drawing/2014/main" id="{1CAD522A-101C-2CD8-061F-FA5B1425061D}"/>
+              </a:ext>
+            </a:extLst>
+          </p:cNvPr>
+          <p:cNvPicPr>
+            <a:picLocks noChangeAspect="1"/>
+          </p:cNvPicPr>
+          <p:nvPr/>
+        </p:nvPicPr>
+        <p:blipFill>
+          <a:blip r:embed="rId2"/>
+          <a:stretch>
+            <a:fillRect/>
+          </a:stretch>
+        </p:blipFill>
+        <p:spPr>
+          <a:xfrm>
+            <a:off x="4901184" y="1059293"/>
+            <a:ext cx="6922008" cy="4839998"/>
+          </a:xfrm>
+          <a:prstGeom prst="rect">
+            <a:avLst/>
+          </a:prstGeom>
+        </p:spPr>
+      </p:pic>
     </p:spTree>
     <p:extLst>
       <p:ext uri="{BB962C8B-B14F-4D97-AF65-F5344CB8AC3E}">
-        <p14:creationId xmlns:p14="http://schemas.microsoft.com/office/powerpoint/2010/main" val="3366734229"/>
+        <p14:creationId xmlns:p14="http://schemas.microsoft.com/office/powerpoint/2010/main" val="996560986"/>
       </p:ext>
     </p:extLst>
   </p:cSld>
@@ -5630,7 +7470,7 @@
 </p:sld>
 </file>
 
-<file path=ppt/slides/slide10.xml><?xml version="1.0" encoding="utf-8"?>
+<file path=ppt/slides/slide109.xml><?xml version="1.0" encoding="utf-8"?>
 <p:sld xmlns:a="http://schemas.openxmlformats.org/drawingml/2006/main" xmlns:r="http://schemas.openxmlformats.org/officeDocument/2006/relationships" xmlns:p="http://schemas.openxmlformats.org/presentationml/2006/main">
   <p:cSld>
     <p:spTree>
@@ -5652,7 +7492,7 @@
           <p:cNvPr id="2" name="Título 1">
             <a:extLst>
               <a:ext uri="{FF2B5EF4-FFF2-40B4-BE49-F238E27FC236}">
-                <a16:creationId xmlns:a16="http://schemas.microsoft.com/office/drawing/2014/main" id="{C6434DB0-8AF9-44F7-B55A-81E75E536FD0}"/>
+                <a16:creationId xmlns:a16="http://schemas.microsoft.com/office/drawing/2014/main" id="{B7FA3351-FB95-9E29-C09C-AD5CF74D4AD6}"/>
               </a:ext>
             </a:extLst>
           </p:cNvPr>
@@ -5670,7 +7510,7 @@
           <a:p>
             <a:r>
               <a:rPr lang="pt-BR" dirty="0"/>
-              <a:t>Idioma</a:t>
+              <a:t>E quanto às Listas Detalhadas?</a:t>
             </a:r>
           </a:p>
         </p:txBody>
@@ -5680,7 +7520,7 @@
           <p:cNvPr id="3" name="Espaço Reservado para Conteúdo 2">
             <a:extLst>
               <a:ext uri="{FF2B5EF4-FFF2-40B4-BE49-F238E27FC236}">
-                <a16:creationId xmlns:a16="http://schemas.microsoft.com/office/drawing/2014/main" id="{21819CBC-5AFC-C44D-8E20-CCE879E5088A}"/>
+                <a16:creationId xmlns:a16="http://schemas.microsoft.com/office/drawing/2014/main" id="{3907E5BA-A28A-DF23-7306-211768F054FC}"/>
               </a:ext>
             </a:extLst>
           </p:cNvPr>
@@ -5696,15 +7536,39 @@
           <a:bodyPr/>
           <a:lstStyle/>
           <a:p>
+            <a:pPr marL="0" indent="0">
+              <a:buNone/>
+            </a:pPr>
+            <a:r>
+              <a:rPr lang="pt-BR" b="1" dirty="0"/>
+              <a:t>Empresa A</a:t>
+            </a:r>
+          </a:p>
+          <a:p>
+            <a:pPr marL="0" indent="0">
+              <a:buNone/>
+            </a:pPr>
             <a:r>
               <a:rPr lang="pt-BR" dirty="0"/>
-              <a:t>Se você respondeu que seria um idioma universal ou um idioma mais fácil como o inglês ou o esperanto você está correto!</a:t>
-            </a:r>
-          </a:p>
-          <a:p>
+              <a:t>Eu trabalhei durante ... Anos como desenvolvedor na Empresa A.</a:t>
+            </a:r>
+          </a:p>
+          <a:p>
+            <a:pPr marL="0" indent="0">
+              <a:buNone/>
+            </a:pPr>
+            <a:r>
+              <a:rPr lang="pt-BR" b="1" dirty="0"/>
+              <a:t>Empresa B</a:t>
+            </a:r>
+          </a:p>
+          <a:p>
+            <a:pPr marL="0" indent="0">
+              <a:buNone/>
+            </a:pPr>
             <a:r>
               <a:rPr lang="pt-BR" dirty="0"/>
-              <a:t>O “idioma” ao qual os computadores se comunicavam era o NCP. </a:t>
+              <a:t>Trabalhei durante ... Meses na Empresa B</a:t>
             </a:r>
           </a:p>
         </p:txBody>
@@ -5712,7 +7576,7 @@
     </p:spTree>
     <p:extLst>
       <p:ext uri="{BB962C8B-B14F-4D97-AF65-F5344CB8AC3E}">
-        <p14:creationId xmlns:p14="http://schemas.microsoft.com/office/powerpoint/2010/main" val="3933331837"/>
+        <p14:creationId xmlns:p14="http://schemas.microsoft.com/office/powerpoint/2010/main" val="1063595738"/>
       </p:ext>
     </p:extLst>
   </p:cSld>
@@ -5799,6 +7663,199 @@
     <p:extLst>
       <p:ext uri="{BB962C8B-B14F-4D97-AF65-F5344CB8AC3E}">
         <p14:creationId xmlns:p14="http://schemas.microsoft.com/office/powerpoint/2010/main" val="2680328951"/>
+      </p:ext>
+    </p:extLst>
+  </p:cSld>
+  <p:clrMapOvr>
+    <a:masterClrMapping/>
+  </p:clrMapOvr>
+</p:sld>
+</file>
+
+<file path=ppt/slides/slide110.xml><?xml version="1.0" encoding="utf-8"?>
+<p:sld xmlns:a="http://schemas.openxmlformats.org/drawingml/2006/main" xmlns:r="http://schemas.openxmlformats.org/officeDocument/2006/relationships" xmlns:p="http://schemas.openxmlformats.org/presentationml/2006/main">
+  <p:cSld>
+    <p:spTree>
+      <p:nvGrpSpPr>
+        <p:cNvPr id="1" name=""/>
+        <p:cNvGrpSpPr/>
+        <p:nvPr/>
+      </p:nvGrpSpPr>
+      <p:grpSpPr>
+        <a:xfrm>
+          <a:off x="0" y="0"/>
+          <a:ext cx="0" cy="0"/>
+          <a:chOff x="0" y="0"/>
+          <a:chExt cx="0" cy="0"/>
+        </a:xfrm>
+      </p:grpSpPr>
+      <p:sp>
+        <p:nvSpPr>
+          <p:cNvPr id="2" name="Título 1">
+            <a:extLst>
+              <a:ext uri="{FF2B5EF4-FFF2-40B4-BE49-F238E27FC236}">
+                <a16:creationId xmlns:a16="http://schemas.microsoft.com/office/drawing/2014/main" id="{380A5DE0-A935-3AE4-8318-916E1F0D3B25}"/>
+              </a:ext>
+            </a:extLst>
+          </p:cNvPr>
+          <p:cNvSpPr>
+            <a:spLocks noGrp="1"/>
+          </p:cNvSpPr>
+          <p:nvPr>
+            <p:ph type="title"/>
+          </p:nvPr>
+        </p:nvSpPr>
+        <p:spPr/>
+        <p:txBody>
+          <a:bodyPr/>
+          <a:lstStyle/>
+          <a:p>
+            <a:r>
+              <a:rPr lang="pt-BR" dirty="0"/>
+              <a:t>Representação Visual</a:t>
+            </a:r>
+          </a:p>
+        </p:txBody>
+      </p:sp>
+      <p:pic>
+        <p:nvPicPr>
+          <p:cNvPr id="5" name="Espaço Reservado para Conteúdo 4">
+            <a:extLst>
+              <a:ext uri="{FF2B5EF4-FFF2-40B4-BE49-F238E27FC236}">
+                <a16:creationId xmlns:a16="http://schemas.microsoft.com/office/drawing/2014/main" id="{D44D3726-C177-FD9F-BCEF-5440BB001DD2}"/>
+              </a:ext>
+            </a:extLst>
+          </p:cNvPr>
+          <p:cNvPicPr>
+            <a:picLocks noGrp="1" noChangeAspect="1"/>
+          </p:cNvPicPr>
+          <p:nvPr>
+            <p:ph idx="1"/>
+          </p:nvPr>
+        </p:nvPicPr>
+        <p:blipFill>
+          <a:blip r:embed="rId2"/>
+          <a:stretch>
+            <a:fillRect/>
+          </a:stretch>
+        </p:blipFill>
+        <p:spPr>
+          <a:xfrm>
+            <a:off x="1941712" y="3377274"/>
+            <a:ext cx="8516539" cy="1895740"/>
+          </a:xfrm>
+        </p:spPr>
+      </p:pic>
+    </p:spTree>
+    <p:extLst>
+      <p:ext uri="{BB962C8B-B14F-4D97-AF65-F5344CB8AC3E}">
+        <p14:creationId xmlns:p14="http://schemas.microsoft.com/office/powerpoint/2010/main" val="1331622321"/>
+      </p:ext>
+    </p:extLst>
+  </p:cSld>
+  <p:clrMapOvr>
+    <a:masterClrMapping/>
+  </p:clrMapOvr>
+</p:sld>
+</file>
+
+<file path=ppt/slides/slide111.xml><?xml version="1.0" encoding="utf-8"?>
+<p:sld xmlns:a="http://schemas.openxmlformats.org/drawingml/2006/main" xmlns:r="http://schemas.openxmlformats.org/officeDocument/2006/relationships" xmlns:p="http://schemas.openxmlformats.org/presentationml/2006/main">
+  <p:cSld>
+    <p:spTree>
+      <p:nvGrpSpPr>
+        <p:cNvPr id="1" name=""/>
+        <p:cNvGrpSpPr/>
+        <p:nvPr/>
+      </p:nvGrpSpPr>
+      <p:grpSpPr>
+        <a:xfrm>
+          <a:off x="0" y="0"/>
+          <a:ext cx="0" cy="0"/>
+          <a:chOff x="0" y="0"/>
+          <a:chExt cx="0" cy="0"/>
+        </a:xfrm>
+      </p:grpSpPr>
+      <p:sp>
+        <p:nvSpPr>
+          <p:cNvPr id="2" name="Título 1">
+            <a:extLst>
+              <a:ext uri="{FF2B5EF4-FFF2-40B4-BE49-F238E27FC236}">
+                <a16:creationId xmlns:a16="http://schemas.microsoft.com/office/drawing/2014/main" id="{4477F1E8-2D05-8EEE-E483-9F64D71E6317}"/>
+              </a:ext>
+            </a:extLst>
+          </p:cNvPr>
+          <p:cNvSpPr>
+            <a:spLocks noGrp="1"/>
+          </p:cNvSpPr>
+          <p:nvPr>
+            <p:ph type="title"/>
+          </p:nvPr>
+        </p:nvSpPr>
+        <p:spPr/>
+        <p:txBody>
+          <a:bodyPr/>
+          <a:lstStyle/>
+          <a:p>
+            <a:r>
+              <a:rPr lang="pt-BR" dirty="0"/>
+              <a:t>Para Casa</a:t>
+            </a:r>
+          </a:p>
+        </p:txBody>
+      </p:sp>
+      <p:sp>
+        <p:nvSpPr>
+          <p:cNvPr id="3" name="Espaço Reservado para Conteúdo 2">
+            <a:extLst>
+              <a:ext uri="{FF2B5EF4-FFF2-40B4-BE49-F238E27FC236}">
+                <a16:creationId xmlns:a16="http://schemas.microsoft.com/office/drawing/2014/main" id="{BCAF392E-5C55-54E3-39B9-D4D1CF6255AC}"/>
+              </a:ext>
+            </a:extLst>
+          </p:cNvPr>
+          <p:cNvSpPr>
+            <a:spLocks noGrp="1"/>
+          </p:cNvSpPr>
+          <p:nvPr>
+            <p:ph idx="1"/>
+          </p:nvPr>
+        </p:nvSpPr>
+        <p:spPr/>
+        <p:txBody>
+          <a:bodyPr/>
+          <a:lstStyle/>
+          <a:p>
+            <a:pPr marL="457200" indent="-457200">
+              <a:buFont typeface="+mj-lt"/>
+              <a:buAutoNum type="arabicPeriod"/>
+            </a:pPr>
+            <a:r>
+              <a:rPr lang="pt-BR" dirty="0"/>
+              <a:t>Tente recriar o currículo utilizando as </a:t>
+            </a:r>
+            <a:r>
+              <a:rPr lang="pt-BR" dirty="0" err="1"/>
+              <a:t>tags</a:t>
+            </a:r>
+            <a:r>
+              <a:rPr lang="pt-BR" dirty="0"/>
+              <a:t> informadas a ti por mim nessa aula. Volte o vídeo e veja os capítulos e encontre a </a:t>
+            </a:r>
+            <a:r>
+              <a:rPr lang="pt-BR" dirty="0" err="1"/>
+              <a:t>tag</a:t>
+            </a:r>
+            <a:r>
+              <a:rPr lang="pt-BR" dirty="0"/>
+              <a:t> correta para cada elemento da tela. </a:t>
+            </a:r>
+          </a:p>
+        </p:txBody>
+      </p:sp>
+    </p:spTree>
+    <p:extLst>
+      <p:ext uri="{BB962C8B-B14F-4D97-AF65-F5344CB8AC3E}">
+        <p14:creationId xmlns:p14="http://schemas.microsoft.com/office/powerpoint/2010/main" val="3605066997"/>
       </p:ext>
     </p:extLst>
   </p:cSld>
@@ -7260,7 +9317,7 @@
               <a:tabLst/>
               <a:defRPr/>
             </a:pPr>
-            <a:endParaRPr kumimoji="0" lang="en-US" sz="1800" b="0" i="0" u="none" strike="noStrike" kern="1200" cap="none" spc="0" normalizeH="0" baseline="0" noProof="0">
+            <a:endParaRPr kumimoji="0" lang="en-US" sz="1800" b="0" i="0" u="none" strike="noStrike" kern="1200" cap="none" spc="0" normalizeH="0" baseline="0" noProof="0" dirty="0">
               <a:ln>
                 <a:noFill/>
               </a:ln>
@@ -7356,7 +9413,7 @@
               <a:tabLst/>
               <a:defRPr/>
             </a:pPr>
-            <a:endParaRPr kumimoji="0" lang="en-US" sz="1800" b="0" i="0" u="none" strike="noStrike" kern="1200" cap="none" spc="0" normalizeH="0" baseline="0" noProof="0">
+            <a:endParaRPr kumimoji="0" lang="en-US" sz="1800" b="0" i="0" u="none" strike="noStrike" kern="1200" cap="none" spc="0" normalizeH="0" baseline="0" noProof="0" dirty="0">
               <a:ln>
                 <a:noFill/>
               </a:ln>
@@ -7429,7 +9486,7 @@
           <a:lstStyle/>
           <a:p>
             <a:pPr algn="ctr"/>
-            <a:endParaRPr lang="en-US"/>
+            <a:endParaRPr lang="en-US" dirty="0"/>
           </a:p>
         </p:txBody>
       </p:sp>
@@ -27613,6 +29670,965 @@
 </p:sld>
 </file>
 
+<file path=ppt/slides/slide97.xml><?xml version="1.0" encoding="utf-8"?>
+<p:sld xmlns:a="http://schemas.openxmlformats.org/drawingml/2006/main" xmlns:r="http://schemas.openxmlformats.org/officeDocument/2006/relationships" xmlns:p="http://schemas.openxmlformats.org/presentationml/2006/main">
+  <p:cSld>
+    <p:bg>
+      <p:bgPr>
+        <a:solidFill>
+          <a:schemeClr val="bg1"/>
+        </a:solidFill>
+        <a:effectLst/>
+      </p:bgPr>
+    </p:bg>
+    <p:spTree>
+      <p:nvGrpSpPr>
+        <p:cNvPr id="1" name=""/>
+        <p:cNvGrpSpPr/>
+        <p:nvPr/>
+      </p:nvGrpSpPr>
+      <p:grpSpPr>
+        <a:xfrm>
+          <a:off x="0" y="0"/>
+          <a:ext cx="0" cy="0"/>
+          <a:chOff x="0" y="0"/>
+          <a:chExt cx="0" cy="0"/>
+        </a:xfrm>
+      </p:grpSpPr>
+      <p:sp>
+        <p:nvSpPr>
+          <p:cNvPr id="10" name="Rectangle 9">
+            <a:extLst>
+              <a:ext uri="{FF2B5EF4-FFF2-40B4-BE49-F238E27FC236}">
+                <a16:creationId xmlns:a16="http://schemas.microsoft.com/office/drawing/2014/main" id="{8D06CE56-3881-4ADA-8CEF-D18B02C242A3}"/>
+              </a:ext>
+              <a:ext uri="{C183D7F6-B498-43B3-948B-1728B52AA6E4}">
+                <adec:decorative xmlns:adec="http://schemas.microsoft.com/office/drawing/2017/decorative" val="1"/>
+              </a:ext>
+            </a:extLst>
+          </p:cNvPr>
+          <p:cNvSpPr>
+            <a:spLocks noGrp="1" noRot="1" noChangeAspect="1" noMove="1" noResize="1" noEditPoints="1" noAdjustHandles="1" noChangeArrowheads="1" noChangeShapeType="1" noTextEdit="1"/>
+          </p:cNvSpPr>
+          <p:nvPr>
+            <p:extLst>
+              <p:ext uri="{386F3935-93C4-4BCD-93E2-E3B085C9AB24}">
+                <p16:designElem xmlns:p16="http://schemas.microsoft.com/office/powerpoint/2015/main" val="1"/>
+              </p:ext>
+            </p:extLst>
+          </p:nvPr>
+        </p:nvSpPr>
+        <p:spPr>
+          <a:xfrm rot="5400000">
+            <a:off x="857544" y="346791"/>
+            <a:ext cx="146304" cy="704088"/>
+          </a:xfrm>
+          <a:prstGeom prst="rect">
+            <a:avLst/>
+          </a:prstGeom>
+          <a:solidFill>
+            <a:schemeClr val="accent1"/>
+          </a:solidFill>
+          <a:ln>
+            <a:noFill/>
+          </a:ln>
+        </p:spPr>
+        <p:style>
+          <a:lnRef idx="2">
+            <a:schemeClr val="accent1">
+              <a:shade val="50000"/>
+            </a:schemeClr>
+          </a:lnRef>
+          <a:fillRef idx="1">
+            <a:schemeClr val="accent1"/>
+          </a:fillRef>
+          <a:effectRef idx="0">
+            <a:schemeClr val="accent1"/>
+          </a:effectRef>
+          <a:fontRef idx="minor">
+            <a:schemeClr val="lt1"/>
+          </a:fontRef>
+        </p:style>
+        <p:txBody>
+          <a:bodyPr rtlCol="0" anchor="ctr"/>
+          <a:lstStyle/>
+          <a:p>
+            <a:pPr marL="0" marR="0" lvl="0" indent="0" algn="ctr" defTabSz="914400" rtl="0" eaLnBrk="1" fontAlgn="auto" latinLnBrk="0" hangingPunct="1">
+              <a:lnSpc>
+                <a:spcPct val="100000"/>
+              </a:lnSpc>
+              <a:spcBef>
+                <a:spcPts val="0"/>
+              </a:spcBef>
+              <a:spcAft>
+                <a:spcPts val="0"/>
+              </a:spcAft>
+              <a:buClrTx/>
+              <a:buSzTx/>
+              <a:buFontTx/>
+              <a:buNone/>
+              <a:tabLst/>
+              <a:defRPr/>
+            </a:pPr>
+            <a:endParaRPr kumimoji="0" lang="en-US" sz="1800" b="0" i="0" u="none" strike="noStrike" kern="1200" cap="none" spc="0" normalizeH="0" baseline="0" noProof="0">
+              <a:ln>
+                <a:noFill/>
+              </a:ln>
+              <a:solidFill>
+                <a:prstClr val="white"/>
+              </a:solidFill>
+              <a:effectLst/>
+              <a:uLnTx/>
+              <a:uFillTx/>
+              <a:latin typeface="Calibri" panose="020F0502020204030204"/>
+              <a:ea typeface="+mn-ea"/>
+              <a:cs typeface="+mn-cs"/>
+            </a:endParaRPr>
+          </a:p>
+        </p:txBody>
+      </p:sp>
+      <p:sp>
+        <p:nvSpPr>
+          <p:cNvPr id="12" name="Rectangle 11">
+            <a:extLst>
+              <a:ext uri="{FF2B5EF4-FFF2-40B4-BE49-F238E27FC236}">
+                <a16:creationId xmlns:a16="http://schemas.microsoft.com/office/drawing/2014/main" id="{79F3C543-62EC-4433-9C93-A2CD8764E9B4}"/>
+              </a:ext>
+              <a:ext uri="{C183D7F6-B498-43B3-948B-1728B52AA6E4}">
+                <adec:decorative xmlns:adec="http://schemas.microsoft.com/office/drawing/2017/decorative" val="1"/>
+              </a:ext>
+            </a:extLst>
+          </p:cNvPr>
+          <p:cNvSpPr>
+            <a:spLocks noGrp="1" noRot="1" noChangeAspect="1" noMove="1" noResize="1" noEditPoints="1" noAdjustHandles="1" noChangeArrowheads="1" noChangeShapeType="1" noTextEdit="1"/>
+          </p:cNvSpPr>
+          <p:nvPr>
+            <p:extLst>
+              <p:ext uri="{386F3935-93C4-4BCD-93E2-E3B085C9AB24}">
+                <p16:designElem xmlns:p16="http://schemas.microsoft.com/office/powerpoint/2015/main" val="1"/>
+              </p:ext>
+            </p:extLst>
+          </p:nvPr>
+        </p:nvSpPr>
+        <p:spPr>
+          <a:xfrm flipV="1">
+            <a:off x="578652" y="4501201"/>
+            <a:ext cx="11034696" cy="18288"/>
+          </a:xfrm>
+          <a:prstGeom prst="rect">
+            <a:avLst/>
+          </a:prstGeom>
+          <a:solidFill>
+            <a:schemeClr val="tx2">
+              <a:lumMod val="25000"/>
+              <a:lumOff val="75000"/>
+            </a:schemeClr>
+          </a:solidFill>
+          <a:ln w="3175">
+            <a:noFill/>
+          </a:ln>
+          <a:effectLst/>
+        </p:spPr>
+        <p:style>
+          <a:lnRef idx="2">
+            <a:schemeClr val="accent1">
+              <a:shade val="50000"/>
+            </a:schemeClr>
+          </a:lnRef>
+          <a:fillRef idx="1">
+            <a:schemeClr val="accent1"/>
+          </a:fillRef>
+          <a:effectRef idx="0">
+            <a:schemeClr val="accent1"/>
+          </a:effectRef>
+          <a:fontRef idx="minor">
+            <a:schemeClr val="lt1"/>
+          </a:fontRef>
+        </p:style>
+        <p:txBody>
+          <a:bodyPr rtlCol="0" anchor="ctr"/>
+          <a:lstStyle/>
+          <a:p>
+            <a:pPr marL="0" marR="0" lvl="0" indent="0" algn="ctr" defTabSz="914400" rtl="0" eaLnBrk="1" fontAlgn="auto" latinLnBrk="0" hangingPunct="1">
+              <a:lnSpc>
+                <a:spcPct val="100000"/>
+              </a:lnSpc>
+              <a:spcBef>
+                <a:spcPts val="0"/>
+              </a:spcBef>
+              <a:spcAft>
+                <a:spcPts val="0"/>
+              </a:spcAft>
+              <a:buClrTx/>
+              <a:buSzTx/>
+              <a:buFontTx/>
+              <a:buNone/>
+              <a:tabLst/>
+              <a:defRPr/>
+            </a:pPr>
+            <a:endParaRPr kumimoji="0" lang="en-US" sz="1800" b="0" i="0" u="none" strike="noStrike" kern="1200" cap="none" spc="0" normalizeH="0" baseline="0" noProof="0">
+              <a:ln>
+                <a:noFill/>
+              </a:ln>
+              <a:solidFill>
+                <a:prstClr val="white"/>
+              </a:solidFill>
+              <a:effectLst/>
+              <a:uLnTx/>
+              <a:uFillTx/>
+              <a:latin typeface="Calibri" panose="020F0502020204030204"/>
+              <a:ea typeface="+mn-ea"/>
+              <a:cs typeface="+mn-cs"/>
+            </a:endParaRPr>
+          </a:p>
+        </p:txBody>
+      </p:sp>
+      <p:sp useBgFill="1">
+        <p:nvSpPr>
+          <p:cNvPr id="14" name="Rectangle 13">
+            <a:extLst>
+              <a:ext uri="{FF2B5EF4-FFF2-40B4-BE49-F238E27FC236}">
+                <a16:creationId xmlns:a16="http://schemas.microsoft.com/office/drawing/2014/main" id="{E91DC736-0EF8-4F87-9146-EBF1D2EE4D3D}"/>
+              </a:ext>
+              <a:ext uri="{C183D7F6-B498-43B3-948B-1728B52AA6E4}">
+                <adec:decorative xmlns:adec="http://schemas.microsoft.com/office/drawing/2017/decorative" val="1"/>
+              </a:ext>
+            </a:extLst>
+          </p:cNvPr>
+          <p:cNvSpPr>
+            <a:spLocks noGrp="1" noRot="1" noChangeAspect="1" noMove="1" noResize="1" noEditPoints="1" noAdjustHandles="1" noChangeArrowheads="1" noChangeShapeType="1" noTextEdit="1"/>
+          </p:cNvSpPr>
+          <p:nvPr>
+            <p:extLst>
+              <p:ext uri="{386F3935-93C4-4BCD-93E2-E3B085C9AB24}">
+                <p16:designElem xmlns:p16="http://schemas.microsoft.com/office/powerpoint/2015/main" val="1"/>
+              </p:ext>
+            </p:extLst>
+          </p:nvPr>
+        </p:nvSpPr>
+        <p:spPr>
+          <a:xfrm>
+            <a:off x="0" y="0"/>
+            <a:ext cx="12192000" cy="6858000"/>
+          </a:xfrm>
+          <a:prstGeom prst="rect">
+            <a:avLst/>
+          </a:prstGeom>
+          <a:ln>
+            <a:noFill/>
+          </a:ln>
+        </p:spPr>
+        <p:style>
+          <a:lnRef idx="2">
+            <a:schemeClr val="accent1">
+              <a:shade val="50000"/>
+            </a:schemeClr>
+          </a:lnRef>
+          <a:fillRef idx="1">
+            <a:schemeClr val="accent1"/>
+          </a:fillRef>
+          <a:effectRef idx="0">
+            <a:schemeClr val="accent1"/>
+          </a:effectRef>
+          <a:fontRef idx="minor">
+            <a:schemeClr val="lt1"/>
+          </a:fontRef>
+        </p:style>
+        <p:txBody>
+          <a:bodyPr rtlCol="0" anchor="ctr"/>
+          <a:lstStyle/>
+          <a:p>
+            <a:pPr algn="ctr"/>
+            <a:endParaRPr lang="en-US"/>
+          </a:p>
+        </p:txBody>
+      </p:sp>
+      <p:pic>
+        <p:nvPicPr>
+          <p:cNvPr id="4" name="Content Placeholder 3" descr="Fundo do vetor de cores vibrantes salpicando">
+            <a:extLst>
+              <a:ext uri="{FF2B5EF4-FFF2-40B4-BE49-F238E27FC236}">
+                <a16:creationId xmlns:a16="http://schemas.microsoft.com/office/drawing/2014/main" id="{8DA498E9-F316-3B91-0898-41E8CEAC46F0}"/>
+              </a:ext>
+            </a:extLst>
+          </p:cNvPr>
+          <p:cNvPicPr>
+            <a:picLocks noChangeAspect="1"/>
+          </p:cNvPicPr>
+          <p:nvPr/>
+        </p:nvPicPr>
+        <p:blipFill rotWithShape="1">
+          <a:blip r:embed="rId2"/>
+          <a:srcRect l="10975" r="3072" b="-1"/>
+          <a:stretch/>
+        </p:blipFill>
+        <p:spPr>
+          <a:xfrm>
+            <a:off x="3523488" y="10"/>
+            <a:ext cx="8668512" cy="6857990"/>
+          </a:xfrm>
+          <a:prstGeom prst="rect">
+            <a:avLst/>
+          </a:prstGeom>
+        </p:spPr>
+      </p:pic>
+      <p:sp>
+        <p:nvSpPr>
+          <p:cNvPr id="16" name="Rectangle 15">
+            <a:extLst>
+              <a:ext uri="{FF2B5EF4-FFF2-40B4-BE49-F238E27FC236}">
+                <a16:creationId xmlns:a16="http://schemas.microsoft.com/office/drawing/2014/main" id="{097CD68E-23E3-4007-8847-CD0944C4F7BE}"/>
+              </a:ext>
+              <a:ext uri="{C183D7F6-B498-43B3-948B-1728B52AA6E4}">
+                <adec:decorative xmlns:adec="http://schemas.microsoft.com/office/drawing/2017/decorative" val="1"/>
+              </a:ext>
+            </a:extLst>
+          </p:cNvPr>
+          <p:cNvSpPr>
+            <a:spLocks noGrp="1" noRot="1" noChangeAspect="1" noMove="1" noResize="1" noEditPoints="1" noAdjustHandles="1" noChangeArrowheads="1" noChangeShapeType="1" noTextEdit="1"/>
+          </p:cNvSpPr>
+          <p:nvPr>
+            <p:extLst>
+              <p:ext uri="{386F3935-93C4-4BCD-93E2-E3B085C9AB24}">
+                <p16:designElem xmlns:p16="http://schemas.microsoft.com/office/powerpoint/2015/main" val="1"/>
+              </p:ext>
+            </p:extLst>
+          </p:nvPr>
+        </p:nvSpPr>
+        <p:spPr>
+          <a:xfrm>
+            <a:off x="0" y="0"/>
+            <a:ext cx="9756601" cy="6858000"/>
+          </a:xfrm>
+          <a:prstGeom prst="rect">
+            <a:avLst/>
+          </a:prstGeom>
+          <a:gradFill>
+            <a:gsLst>
+              <a:gs pos="58000">
+                <a:schemeClr val="bg1"/>
+              </a:gs>
+              <a:gs pos="35000">
+                <a:schemeClr val="bg1">
+                  <a:alpha val="79000"/>
+                </a:schemeClr>
+              </a:gs>
+              <a:gs pos="19000">
+                <a:schemeClr val="bg1">
+                  <a:alpha val="38000"/>
+                </a:schemeClr>
+              </a:gs>
+              <a:gs pos="0">
+                <a:schemeClr val="bg1">
+                  <a:alpha val="0"/>
+                </a:schemeClr>
+              </a:gs>
+              <a:gs pos="100000">
+                <a:schemeClr val="bg1"/>
+              </a:gs>
+            </a:gsLst>
+            <a:lin ang="10800000" scaled="0"/>
+          </a:gradFill>
+          <a:ln>
+            <a:noFill/>
+          </a:ln>
+        </p:spPr>
+        <p:style>
+          <a:lnRef idx="2">
+            <a:schemeClr val="accent1">
+              <a:shade val="50000"/>
+            </a:schemeClr>
+          </a:lnRef>
+          <a:fillRef idx="1">
+            <a:schemeClr val="accent1"/>
+          </a:fillRef>
+          <a:effectRef idx="0">
+            <a:schemeClr val="accent1"/>
+          </a:effectRef>
+          <a:fontRef idx="minor">
+            <a:schemeClr val="lt1"/>
+          </a:fontRef>
+        </p:style>
+        <p:txBody>
+          <a:bodyPr rtlCol="0" anchor="ctr"/>
+          <a:lstStyle/>
+          <a:p>
+            <a:pPr algn="ctr"/>
+            <a:endParaRPr lang="en-US" dirty="0"/>
+          </a:p>
+        </p:txBody>
+      </p:sp>
+      <p:sp>
+        <p:nvSpPr>
+          <p:cNvPr id="5" name="Título 1">
+            <a:extLst>
+              <a:ext uri="{FF2B5EF4-FFF2-40B4-BE49-F238E27FC236}">
+                <a16:creationId xmlns:a16="http://schemas.microsoft.com/office/drawing/2014/main" id="{213460A5-00D9-1E6B-BB32-922FA0C6F2D0}"/>
+              </a:ext>
+            </a:extLst>
+          </p:cNvPr>
+          <p:cNvSpPr>
+            <a:spLocks noGrp="1"/>
+          </p:cNvSpPr>
+          <p:nvPr>
+            <p:ph type="title"/>
+          </p:nvPr>
+        </p:nvSpPr>
+        <p:spPr>
+          <a:xfrm>
+            <a:off x="477981" y="1122363"/>
+            <a:ext cx="4023360" cy="3204134"/>
+          </a:xfrm>
+        </p:spPr>
+        <p:txBody>
+          <a:bodyPr vert="horz" lIns="91440" tIns="45720" rIns="91440" bIns="45720" rtlCol="0" anchor="b">
+            <a:normAutofit/>
+          </a:bodyPr>
+          <a:lstStyle/>
+          <a:p>
+            <a:r>
+              <a:rPr lang="en-US" sz="4800" dirty="0"/>
+              <a:t>Aula 7 – </a:t>
+            </a:r>
+            <a:r>
+              <a:rPr lang="en-US" sz="4800" dirty="0" err="1"/>
+              <a:t>Textos</a:t>
+            </a:r>
+            <a:r>
+              <a:rPr lang="en-US" sz="4800" dirty="0"/>
+              <a:t> e </a:t>
+            </a:r>
+            <a:r>
+              <a:rPr lang="en-US" sz="4800" dirty="0" err="1"/>
+              <a:t>Listas</a:t>
+            </a:r>
+            <a:r>
+              <a:rPr lang="en-US" sz="4800" dirty="0"/>
+              <a:t> no HTML</a:t>
+            </a:r>
+          </a:p>
+        </p:txBody>
+      </p:sp>
+      <p:sp>
+        <p:nvSpPr>
+          <p:cNvPr id="18" name="Rectangle 17">
+            <a:extLst>
+              <a:ext uri="{FF2B5EF4-FFF2-40B4-BE49-F238E27FC236}">
+                <a16:creationId xmlns:a16="http://schemas.microsoft.com/office/drawing/2014/main" id="{AF2F604E-43BE-4DC3-B983-E071523364F8}"/>
+              </a:ext>
+              <a:ext uri="{C183D7F6-B498-43B3-948B-1728B52AA6E4}">
+                <adec:decorative xmlns:adec="http://schemas.microsoft.com/office/drawing/2017/decorative" val="1"/>
+              </a:ext>
+            </a:extLst>
+          </p:cNvPr>
+          <p:cNvSpPr>
+            <a:spLocks noGrp="1" noRot="1" noChangeAspect="1" noMove="1" noResize="1" noEditPoints="1" noAdjustHandles="1" noChangeArrowheads="1" noChangeShapeType="1" noTextEdit="1"/>
+          </p:cNvSpPr>
+          <p:nvPr>
+            <p:extLst>
+              <p:ext uri="{386F3935-93C4-4BCD-93E2-E3B085C9AB24}">
+                <p16:designElem xmlns:p16="http://schemas.microsoft.com/office/powerpoint/2015/main" val="1"/>
+              </p:ext>
+            </p:extLst>
+          </p:nvPr>
+        </p:nvSpPr>
+        <p:spPr>
+          <a:xfrm rot="5400000">
+            <a:off x="759921" y="346791"/>
+            <a:ext cx="146304" cy="704088"/>
+          </a:xfrm>
+          <a:prstGeom prst="rect">
+            <a:avLst/>
+          </a:prstGeom>
+          <a:solidFill>
+            <a:schemeClr val="accent1"/>
+          </a:solidFill>
+          <a:ln>
+            <a:noFill/>
+          </a:ln>
+        </p:spPr>
+        <p:style>
+          <a:lnRef idx="2">
+            <a:schemeClr val="accent1">
+              <a:shade val="50000"/>
+            </a:schemeClr>
+          </a:lnRef>
+          <a:fillRef idx="1">
+            <a:schemeClr val="accent1"/>
+          </a:fillRef>
+          <a:effectRef idx="0">
+            <a:schemeClr val="accent1"/>
+          </a:effectRef>
+          <a:fontRef idx="minor">
+            <a:schemeClr val="lt1"/>
+          </a:fontRef>
+        </p:style>
+        <p:txBody>
+          <a:bodyPr rtlCol="0" anchor="ctr"/>
+          <a:lstStyle/>
+          <a:p>
+            <a:pPr marL="0" marR="0" lvl="0" indent="0" algn="ctr" defTabSz="914400" rtl="0" eaLnBrk="1" fontAlgn="auto" latinLnBrk="0" hangingPunct="1">
+              <a:lnSpc>
+                <a:spcPct val="100000"/>
+              </a:lnSpc>
+              <a:spcBef>
+                <a:spcPts val="0"/>
+              </a:spcBef>
+              <a:spcAft>
+                <a:spcPts val="0"/>
+              </a:spcAft>
+              <a:buClrTx/>
+              <a:buSzTx/>
+              <a:buFontTx/>
+              <a:buNone/>
+              <a:tabLst/>
+              <a:defRPr/>
+            </a:pPr>
+            <a:endParaRPr kumimoji="0" lang="en-US" sz="1800" b="0" i="0" u="none" strike="noStrike" kern="1200" cap="none" spc="0" normalizeH="0" baseline="0" noProof="0">
+              <a:ln>
+                <a:noFill/>
+              </a:ln>
+              <a:solidFill>
+                <a:prstClr val="white"/>
+              </a:solidFill>
+              <a:effectLst/>
+              <a:uLnTx/>
+              <a:uFillTx/>
+              <a:latin typeface="Calibri" panose="020F0502020204030204"/>
+              <a:ea typeface="+mn-ea"/>
+              <a:cs typeface="+mn-cs"/>
+            </a:endParaRPr>
+          </a:p>
+        </p:txBody>
+      </p:sp>
+      <p:sp>
+        <p:nvSpPr>
+          <p:cNvPr id="20" name="Rectangle 19">
+            <a:extLst>
+              <a:ext uri="{FF2B5EF4-FFF2-40B4-BE49-F238E27FC236}">
+                <a16:creationId xmlns:a16="http://schemas.microsoft.com/office/drawing/2014/main" id="{08C9B587-E65E-4B52-B37C-ABEBB6E87928}"/>
+              </a:ext>
+              <a:ext uri="{C183D7F6-B498-43B3-948B-1728B52AA6E4}">
+                <adec:decorative xmlns:adec="http://schemas.microsoft.com/office/drawing/2017/decorative" val="1"/>
+              </a:ext>
+            </a:extLst>
+          </p:cNvPr>
+          <p:cNvSpPr>
+            <a:spLocks noGrp="1" noRot="1" noChangeAspect="1" noMove="1" noResize="1" noEditPoints="1" noAdjustHandles="1" noChangeArrowheads="1" noChangeShapeType="1" noTextEdit="1"/>
+          </p:cNvSpPr>
+          <p:nvPr>
+            <p:extLst>
+              <p:ext uri="{386F3935-93C4-4BCD-93E2-E3B085C9AB24}">
+                <p16:designElem xmlns:p16="http://schemas.microsoft.com/office/powerpoint/2015/main" val="1"/>
+              </p:ext>
+            </p:extLst>
+          </p:nvPr>
+        </p:nvSpPr>
+        <p:spPr>
+          <a:xfrm>
+            <a:off x="481029" y="4546920"/>
+            <a:ext cx="3977640" cy="18288"/>
+          </a:xfrm>
+          <a:prstGeom prst="rect">
+            <a:avLst/>
+          </a:prstGeom>
+          <a:solidFill>
+            <a:schemeClr val="tx2">
+              <a:lumMod val="25000"/>
+              <a:lumOff val="75000"/>
+            </a:schemeClr>
+          </a:solidFill>
+          <a:ln w="3175">
+            <a:solidFill>
+              <a:schemeClr val="tx2">
+                <a:lumMod val="25000"/>
+                <a:lumOff val="75000"/>
+              </a:schemeClr>
+            </a:solidFill>
+          </a:ln>
+          <a:effectLst/>
+        </p:spPr>
+        <p:style>
+          <a:lnRef idx="2">
+            <a:schemeClr val="accent1">
+              <a:shade val="50000"/>
+            </a:schemeClr>
+          </a:lnRef>
+          <a:fillRef idx="1">
+            <a:schemeClr val="accent1"/>
+          </a:fillRef>
+          <a:effectRef idx="0">
+            <a:schemeClr val="accent1"/>
+          </a:effectRef>
+          <a:fontRef idx="minor">
+            <a:schemeClr val="lt1"/>
+          </a:fontRef>
+        </p:style>
+        <p:txBody>
+          <a:bodyPr rtlCol="0" anchor="ctr"/>
+          <a:lstStyle/>
+          <a:p>
+            <a:pPr marL="0" marR="0" lvl="0" indent="0" algn="ctr" defTabSz="914400" rtl="0" eaLnBrk="1" fontAlgn="auto" latinLnBrk="0" hangingPunct="1">
+              <a:lnSpc>
+                <a:spcPct val="100000"/>
+              </a:lnSpc>
+              <a:spcBef>
+                <a:spcPts val="0"/>
+              </a:spcBef>
+              <a:spcAft>
+                <a:spcPts val="0"/>
+              </a:spcAft>
+              <a:buClrTx/>
+              <a:buSzTx/>
+              <a:buFontTx/>
+              <a:buNone/>
+              <a:tabLst/>
+              <a:defRPr/>
+            </a:pPr>
+            <a:endParaRPr kumimoji="0" lang="en-US" sz="1800" b="0" i="0" u="none" strike="noStrike" kern="1200" cap="none" spc="0" normalizeH="0" baseline="0" noProof="0">
+              <a:ln>
+                <a:noFill/>
+              </a:ln>
+              <a:solidFill>
+                <a:prstClr val="white"/>
+              </a:solidFill>
+              <a:effectLst/>
+              <a:uLnTx/>
+              <a:uFillTx/>
+              <a:latin typeface="Calibri" panose="020F0502020204030204"/>
+              <a:ea typeface="+mn-ea"/>
+              <a:cs typeface="+mn-cs"/>
+            </a:endParaRPr>
+          </a:p>
+        </p:txBody>
+      </p:sp>
+    </p:spTree>
+    <p:extLst>
+      <p:ext uri="{BB962C8B-B14F-4D97-AF65-F5344CB8AC3E}">
+        <p14:creationId xmlns:p14="http://schemas.microsoft.com/office/powerpoint/2010/main" val="3492107673"/>
+      </p:ext>
+    </p:extLst>
+  </p:cSld>
+  <p:clrMapOvr>
+    <a:masterClrMapping/>
+  </p:clrMapOvr>
+  <p:timing>
+    <p:tnLst>
+      <p:par>
+        <p:cTn id="1" dur="indefinite" restart="never" nodeType="tmRoot">
+          <p:childTnLst>
+            <p:seq concurrent="1" nextAc="seek">
+              <p:cTn id="2" dur="indefinite" nodeType="mainSeq">
+                <p:childTnLst>
+                  <p:par>
+                    <p:cTn id="3" fill="hold">
+                      <p:stCondLst>
+                        <p:cond delay="indefinite"/>
+                        <p:cond evt="onBegin" delay="0">
+                          <p:tn val="2"/>
+                        </p:cond>
+                      </p:stCondLst>
+                      <p:childTnLst>
+                        <p:par>
+                          <p:cTn id="4" fill="hold">
+                            <p:stCondLst>
+                              <p:cond delay="0"/>
+                            </p:stCondLst>
+                            <p:childTnLst>
+                              <p:par>
+                                <p:cTn id="5" presetID="10" presetClass="entr" presetSubtype="0" fill="hold" grpId="0" nodeType="withEffect">
+                                  <p:stCondLst>
+                                    <p:cond delay="1000"/>
+                                  </p:stCondLst>
+                                  <p:iterate type="lt">
+                                    <p:tmPct val="10000"/>
+                                  </p:iterate>
+                                  <p:childTnLst>
+                                    <p:set>
+                                      <p:cBhvr>
+                                        <p:cTn id="6" dur="1" fill="hold">
+                                          <p:stCondLst>
+                                            <p:cond delay="0"/>
+                                          </p:stCondLst>
+                                        </p:cTn>
+                                        <p:tgtEl>
+                                          <p:spTgt spid="5"/>
+                                        </p:tgtEl>
+                                        <p:attrNameLst>
+                                          <p:attrName>style.visibility</p:attrName>
+                                        </p:attrNameLst>
+                                      </p:cBhvr>
+                                      <p:to>
+                                        <p:strVal val="visible"/>
+                                      </p:to>
+                                    </p:set>
+                                    <p:animEffect transition="in" filter="fade">
+                                      <p:cBhvr>
+                                        <p:cTn id="7" dur="400"/>
+                                        <p:tgtEl>
+                                          <p:spTgt spid="5"/>
+                                        </p:tgtEl>
+                                      </p:cBhvr>
+                                    </p:animEffect>
+                                  </p:childTnLst>
+                                </p:cTn>
+                              </p:par>
+                            </p:childTnLst>
+                          </p:cTn>
+                        </p:par>
+                      </p:childTnLst>
+                    </p:cTn>
+                  </p:par>
+                </p:childTnLst>
+              </p:cTn>
+              <p:prevCondLst>
+                <p:cond evt="onPrev" delay="0">
+                  <p:tgtEl>
+                    <p:sldTgt/>
+                  </p:tgtEl>
+                </p:cond>
+              </p:prevCondLst>
+              <p:nextCondLst>
+                <p:cond evt="onNext" delay="0">
+                  <p:tgtEl>
+                    <p:sldTgt/>
+                  </p:tgtEl>
+                </p:cond>
+              </p:nextCondLst>
+            </p:seq>
+          </p:childTnLst>
+        </p:cTn>
+      </p:par>
+    </p:tnLst>
+    <p:bldLst>
+      <p:bldP spid="5" grpId="0"/>
+    </p:bldLst>
+  </p:timing>
+</p:sld>
+</file>
+
+<file path=ppt/slides/slide98.xml><?xml version="1.0" encoding="utf-8"?>
+<p:sld xmlns:a="http://schemas.openxmlformats.org/drawingml/2006/main" xmlns:r="http://schemas.openxmlformats.org/officeDocument/2006/relationships" xmlns:p="http://schemas.openxmlformats.org/presentationml/2006/main">
+  <p:cSld>
+    <p:spTree>
+      <p:nvGrpSpPr>
+        <p:cNvPr id="1" name=""/>
+        <p:cNvGrpSpPr/>
+        <p:nvPr/>
+      </p:nvGrpSpPr>
+      <p:grpSpPr>
+        <a:xfrm>
+          <a:off x="0" y="0"/>
+          <a:ext cx="0" cy="0"/>
+          <a:chOff x="0" y="0"/>
+          <a:chExt cx="0" cy="0"/>
+        </a:xfrm>
+      </p:grpSpPr>
+      <p:sp>
+        <p:nvSpPr>
+          <p:cNvPr id="2" name="Título 1">
+            <a:extLst>
+              <a:ext uri="{FF2B5EF4-FFF2-40B4-BE49-F238E27FC236}">
+                <a16:creationId xmlns:a16="http://schemas.microsoft.com/office/drawing/2014/main" id="{7E178860-82E6-4936-CF96-E9C41E54E400}"/>
+              </a:ext>
+            </a:extLst>
+          </p:cNvPr>
+          <p:cNvSpPr>
+            <a:spLocks noGrp="1"/>
+          </p:cNvSpPr>
+          <p:nvPr>
+            <p:ph type="title"/>
+          </p:nvPr>
+        </p:nvSpPr>
+        <p:spPr/>
+        <p:txBody>
+          <a:bodyPr/>
+          <a:lstStyle/>
+          <a:p>
+            <a:r>
+              <a:rPr lang="pt-BR" dirty="0"/>
+              <a:t>Textos no HTML</a:t>
+            </a:r>
+          </a:p>
+        </p:txBody>
+      </p:sp>
+      <p:sp>
+        <p:nvSpPr>
+          <p:cNvPr id="3" name="Espaço Reservado para Conteúdo 2">
+            <a:extLst>
+              <a:ext uri="{FF2B5EF4-FFF2-40B4-BE49-F238E27FC236}">
+                <a16:creationId xmlns:a16="http://schemas.microsoft.com/office/drawing/2014/main" id="{7061C83C-C8F3-1B19-5B87-79E953643745}"/>
+              </a:ext>
+            </a:extLst>
+          </p:cNvPr>
+          <p:cNvSpPr>
+            <a:spLocks noGrp="1"/>
+          </p:cNvSpPr>
+          <p:nvPr>
+            <p:ph idx="1"/>
+          </p:nvPr>
+        </p:nvSpPr>
+        <p:spPr/>
+        <p:txBody>
+          <a:bodyPr/>
+          <a:lstStyle/>
+          <a:p>
+            <a:r>
+              <a:rPr lang="pt-BR" dirty="0"/>
+              <a:t>Existem diversas </a:t>
+            </a:r>
+            <a:r>
+              <a:rPr lang="pt-BR" dirty="0" err="1"/>
+              <a:t>tags</a:t>
+            </a:r>
+            <a:r>
+              <a:rPr lang="pt-BR" dirty="0"/>
+              <a:t> de texto no HTML, p, h1, </a:t>
+            </a:r>
+            <a:r>
+              <a:rPr lang="pt-BR" dirty="0" err="1"/>
+              <a:t>code</a:t>
+            </a:r>
+            <a:r>
+              <a:rPr lang="pt-BR" dirty="0"/>
+              <a:t>, Strong, em e vou mostrar cada uma delas aqui abaixo</a:t>
+            </a:r>
+          </a:p>
+        </p:txBody>
+      </p:sp>
+    </p:spTree>
+    <p:extLst>
+      <p:ext uri="{BB962C8B-B14F-4D97-AF65-F5344CB8AC3E}">
+        <p14:creationId xmlns:p14="http://schemas.microsoft.com/office/powerpoint/2010/main" val="1971970878"/>
+      </p:ext>
+    </p:extLst>
+  </p:cSld>
+  <p:clrMapOvr>
+    <a:masterClrMapping/>
+  </p:clrMapOvr>
+</p:sld>
+</file>
+
+<file path=ppt/slides/slide99.xml><?xml version="1.0" encoding="utf-8"?>
+<p:sld xmlns:a="http://schemas.openxmlformats.org/drawingml/2006/main" xmlns:r="http://schemas.openxmlformats.org/officeDocument/2006/relationships" xmlns:p="http://schemas.openxmlformats.org/presentationml/2006/main">
+  <p:cSld>
+    <p:spTree>
+      <p:nvGrpSpPr>
+        <p:cNvPr id="1" name=""/>
+        <p:cNvGrpSpPr/>
+        <p:nvPr/>
+      </p:nvGrpSpPr>
+      <p:grpSpPr>
+        <a:xfrm>
+          <a:off x="0" y="0"/>
+          <a:ext cx="0" cy="0"/>
+          <a:chOff x="0" y="0"/>
+          <a:chExt cx="0" cy="0"/>
+        </a:xfrm>
+      </p:grpSpPr>
+      <p:sp>
+        <p:nvSpPr>
+          <p:cNvPr id="2" name="Título 1">
+            <a:extLst>
+              <a:ext uri="{FF2B5EF4-FFF2-40B4-BE49-F238E27FC236}">
+                <a16:creationId xmlns:a16="http://schemas.microsoft.com/office/drawing/2014/main" id="{05F4669E-5949-AACF-6456-A98748339E54}"/>
+              </a:ext>
+            </a:extLst>
+          </p:cNvPr>
+          <p:cNvSpPr>
+            <a:spLocks noGrp="1"/>
+          </p:cNvSpPr>
+          <p:nvPr>
+            <p:ph type="title"/>
+          </p:nvPr>
+        </p:nvSpPr>
+        <p:spPr/>
+        <p:txBody>
+          <a:bodyPr/>
+          <a:lstStyle/>
+          <a:p>
+            <a:r>
+              <a:rPr lang="pt-BR" dirty="0" err="1"/>
+              <a:t>Tag</a:t>
+            </a:r>
+            <a:r>
+              <a:rPr lang="pt-BR" dirty="0"/>
+              <a:t> p</a:t>
+            </a:r>
+          </a:p>
+        </p:txBody>
+      </p:sp>
+      <p:sp>
+        <p:nvSpPr>
+          <p:cNvPr id="3" name="Espaço Reservado para Conteúdo 2">
+            <a:extLst>
+              <a:ext uri="{FF2B5EF4-FFF2-40B4-BE49-F238E27FC236}">
+                <a16:creationId xmlns:a16="http://schemas.microsoft.com/office/drawing/2014/main" id="{A22D4812-2249-6C12-100C-A4F124EC7846}"/>
+              </a:ext>
+            </a:extLst>
+          </p:cNvPr>
+          <p:cNvSpPr>
+            <a:spLocks noGrp="1"/>
+          </p:cNvSpPr>
+          <p:nvPr>
+            <p:ph idx="1"/>
+          </p:nvPr>
+        </p:nvSpPr>
+        <p:spPr/>
+        <p:txBody>
+          <a:bodyPr/>
+          <a:lstStyle/>
+          <a:p>
+            <a:r>
+              <a:rPr lang="pt-BR" dirty="0"/>
+              <a:t>Pensada especialmente em textos longos, como textos jornalísticos e qualquer tipo de texto que não cabe em uma linha. Ideal para que você coloque o parágrafo de cada frase que você está desenvolvendo.</a:t>
+            </a:r>
+          </a:p>
+        </p:txBody>
+      </p:sp>
+      <p:pic>
+        <p:nvPicPr>
+          <p:cNvPr id="7" name="Imagem 6">
+            <a:extLst>
+              <a:ext uri="{FF2B5EF4-FFF2-40B4-BE49-F238E27FC236}">
+                <a16:creationId xmlns:a16="http://schemas.microsoft.com/office/drawing/2014/main" id="{28B1DE71-5B3A-082C-615B-0472E6FF85F9}"/>
+              </a:ext>
+            </a:extLst>
+          </p:cNvPr>
+          <p:cNvPicPr>
+            <a:picLocks noChangeAspect="1"/>
+          </p:cNvPicPr>
+          <p:nvPr/>
+        </p:nvPicPr>
+        <p:blipFill>
+          <a:blip r:embed="rId2"/>
+          <a:stretch>
+            <a:fillRect/>
+          </a:stretch>
+        </p:blipFill>
+        <p:spPr>
+          <a:xfrm>
+            <a:off x="1045706" y="4797451"/>
+            <a:ext cx="10100588" cy="664668"/>
+          </a:xfrm>
+          <a:prstGeom prst="rect">
+            <a:avLst/>
+          </a:prstGeom>
+        </p:spPr>
+      </p:pic>
+    </p:spTree>
+    <p:extLst>
+      <p:ext uri="{BB962C8B-B14F-4D97-AF65-F5344CB8AC3E}">
+        <p14:creationId xmlns:p14="http://schemas.microsoft.com/office/powerpoint/2010/main" val="3715368711"/>
+      </p:ext>
+    </p:extLst>
+  </p:cSld>
+  <p:clrMapOvr>
+    <a:masterClrMapping/>
+  </p:clrMapOvr>
+</p:sld>
+</file>
+
 <file path=ppt/theme/theme1.xml><?xml version="1.0" encoding="utf-8"?>
 <a:theme xmlns:a="http://schemas.openxmlformats.org/drawingml/2006/main" name="AccentBoxVTI">
   <a:themeElements>

</xml_diff>

<commit_message>
Preparada a aula sobre Parâmetros no HTML.
</commit_message>
<xml_diff>
--- a/Power Point/Curso de HTML e CSS.pptx
+++ b/Power Point/Curso de HTML e CSS.pptx
@@ -116,6 +116,13 @@
     <p:sldId id="365" r:id="rId110"/>
     <p:sldId id="366" r:id="rId111"/>
     <p:sldId id="367" r:id="rId112"/>
+    <p:sldId id="368" r:id="rId113"/>
+    <p:sldId id="369" r:id="rId114"/>
+    <p:sldId id="370" r:id="rId115"/>
+    <p:sldId id="371" r:id="rId116"/>
+    <p:sldId id="372" r:id="rId117"/>
+    <p:sldId id="373" r:id="rId118"/>
+    <p:sldId id="374" r:id="rId119"/>
   </p:sldIdLst>
   <p:sldSz cx="12192000" cy="6858000"/>
   <p:notesSz cx="6858000" cy="9144000"/>
@@ -378,7 +385,7 @@
           <a:p>
             <a:fld id="{02AC24A9-CCB6-4F8D-B8DB-C2F3692CFA5A}" type="datetimeFigureOut">
               <a:rPr lang="en-US" smtClean="0"/>
-              <a:t>3/13/2025</a:t>
+              <a:t>3/14/2025</a:t>
             </a:fld>
             <a:endParaRPr lang="en-US" dirty="0"/>
           </a:p>
@@ -748,7 +755,7 @@
           <a:p>
             <a:fld id="{02AC24A9-CCB6-4F8D-B8DB-C2F3692CFA5A}" type="datetimeFigureOut">
               <a:rPr lang="en-US" smtClean="0"/>
-              <a:t>3/13/2025</a:t>
+              <a:t>3/14/2025</a:t>
             </a:fld>
             <a:endParaRPr lang="en-US"/>
           </a:p>
@@ -957,7 +964,7 @@
           <a:p>
             <a:fld id="{02AC24A9-CCB6-4F8D-B8DB-C2F3692CFA5A}" type="datetimeFigureOut">
               <a:rPr lang="en-US" smtClean="0"/>
-              <a:t>3/13/2025</a:t>
+              <a:t>3/14/2025</a:t>
             </a:fld>
             <a:endParaRPr lang="en-US"/>
           </a:p>
@@ -1427,7 +1434,7 @@
           <a:p>
             <a:fld id="{02AC24A9-CCB6-4F8D-B8DB-C2F3692CFA5A}" type="datetimeFigureOut">
               <a:rPr lang="en-US" smtClean="0"/>
-              <a:t>3/13/2025</a:t>
+              <a:t>3/14/2025</a:t>
             </a:fld>
             <a:endParaRPr lang="en-US"/>
           </a:p>
@@ -1881,7 +1888,7 @@
           <a:p>
             <a:fld id="{02AC24A9-CCB6-4F8D-B8DB-C2F3692CFA5A}" type="datetimeFigureOut">
               <a:rPr lang="en-US" smtClean="0"/>
-              <a:t>3/13/2025</a:t>
+              <a:t>3/14/2025</a:t>
             </a:fld>
             <a:endParaRPr lang="en-US"/>
           </a:p>
@@ -2413,7 +2420,7 @@
           <a:p>
             <a:fld id="{02AC24A9-CCB6-4F8D-B8DB-C2F3692CFA5A}" type="datetimeFigureOut">
               <a:rPr lang="en-US" smtClean="0"/>
-              <a:t>3/13/2025</a:t>
+              <a:t>3/14/2025</a:t>
             </a:fld>
             <a:endParaRPr lang="en-US"/>
           </a:p>
@@ -3112,7 +3119,7 @@
           <a:p>
             <a:fld id="{02AC24A9-CCB6-4F8D-B8DB-C2F3692CFA5A}" type="datetimeFigureOut">
               <a:rPr lang="en-US" smtClean="0"/>
-              <a:t>3/13/2025</a:t>
+              <a:t>3/14/2025</a:t>
             </a:fld>
             <a:endParaRPr lang="en-US"/>
           </a:p>
@@ -3441,7 +3448,7 @@
           <a:p>
             <a:fld id="{02AC24A9-CCB6-4F8D-B8DB-C2F3692CFA5A}" type="datetimeFigureOut">
               <a:rPr lang="en-US" smtClean="0"/>
-              <a:t>3/13/2025</a:t>
+              <a:t>3/14/2025</a:t>
             </a:fld>
             <a:endParaRPr lang="en-US"/>
           </a:p>
@@ -3554,7 +3561,7 @@
           <a:p>
             <a:fld id="{02AC24A9-CCB6-4F8D-B8DB-C2F3692CFA5A}" type="datetimeFigureOut">
               <a:rPr lang="en-US" smtClean="0"/>
-              <a:t>3/13/2025</a:t>
+              <a:t>3/14/2025</a:t>
             </a:fld>
             <a:endParaRPr lang="en-US"/>
           </a:p>
@@ -4049,7 +4056,7 @@
           <a:p>
             <a:fld id="{02AC24A9-CCB6-4F8D-B8DB-C2F3692CFA5A}" type="datetimeFigureOut">
               <a:rPr lang="en-US" smtClean="0"/>
-              <a:t>3/13/2025</a:t>
+              <a:t>3/14/2025</a:t>
             </a:fld>
             <a:endParaRPr lang="en-US" dirty="0"/>
           </a:p>
@@ -4526,7 +4533,7 @@
           <a:p>
             <a:fld id="{02AC24A9-CCB6-4F8D-B8DB-C2F3692CFA5A}" type="datetimeFigureOut">
               <a:rPr lang="en-US" smtClean="0"/>
-              <a:t>3/13/2025</a:t>
+              <a:t>3/14/2025</a:t>
             </a:fld>
             <a:endParaRPr lang="en-US"/>
           </a:p>
@@ -4769,7 +4776,7 @@
           <a:p>
             <a:fld id="{02AC24A9-CCB6-4F8D-B8DB-C2F3692CFA5A}" type="datetimeFigureOut">
               <a:rPr lang="en-US" smtClean="0"/>
-              <a:t>3/13/2025</a:t>
+              <a:t>3/14/2025</a:t>
             </a:fld>
             <a:endParaRPr lang="en-US"/>
           </a:p>
@@ -7865,6 +7872,1391 @@
 </p:sld>
 </file>
 
+<file path=ppt/slides/slide112.xml><?xml version="1.0" encoding="utf-8"?>
+<p:sld xmlns:a="http://schemas.openxmlformats.org/drawingml/2006/main" xmlns:r="http://schemas.openxmlformats.org/officeDocument/2006/relationships" xmlns:p="http://schemas.openxmlformats.org/presentationml/2006/main">
+  <p:cSld>
+    <p:bg>
+      <p:bgPr>
+        <a:solidFill>
+          <a:schemeClr val="bg1"/>
+        </a:solidFill>
+        <a:effectLst/>
+      </p:bgPr>
+    </p:bg>
+    <p:spTree>
+      <p:nvGrpSpPr>
+        <p:cNvPr id="1" name=""/>
+        <p:cNvGrpSpPr/>
+        <p:nvPr/>
+      </p:nvGrpSpPr>
+      <p:grpSpPr>
+        <a:xfrm>
+          <a:off x="0" y="0"/>
+          <a:ext cx="0" cy="0"/>
+          <a:chOff x="0" y="0"/>
+          <a:chExt cx="0" cy="0"/>
+        </a:xfrm>
+      </p:grpSpPr>
+      <p:sp>
+        <p:nvSpPr>
+          <p:cNvPr id="10" name="Rectangle 9">
+            <a:extLst>
+              <a:ext uri="{FF2B5EF4-FFF2-40B4-BE49-F238E27FC236}">
+                <a16:creationId xmlns:a16="http://schemas.microsoft.com/office/drawing/2014/main" id="{8D06CE56-3881-4ADA-8CEF-D18B02C242A3}"/>
+              </a:ext>
+              <a:ext uri="{C183D7F6-B498-43B3-948B-1728B52AA6E4}">
+                <adec:decorative xmlns:adec="http://schemas.microsoft.com/office/drawing/2017/decorative" val="1"/>
+              </a:ext>
+            </a:extLst>
+          </p:cNvPr>
+          <p:cNvSpPr>
+            <a:spLocks noGrp="1" noRot="1" noChangeAspect="1" noMove="1" noResize="1" noEditPoints="1" noAdjustHandles="1" noChangeArrowheads="1" noChangeShapeType="1" noTextEdit="1"/>
+          </p:cNvSpPr>
+          <p:nvPr>
+            <p:extLst>
+              <p:ext uri="{386F3935-93C4-4BCD-93E2-E3B085C9AB24}">
+                <p16:designElem xmlns:p16="http://schemas.microsoft.com/office/powerpoint/2015/main" val="1"/>
+              </p:ext>
+            </p:extLst>
+          </p:nvPr>
+        </p:nvSpPr>
+        <p:spPr>
+          <a:xfrm rot="5400000">
+            <a:off x="857544" y="346791"/>
+            <a:ext cx="146304" cy="704088"/>
+          </a:xfrm>
+          <a:prstGeom prst="rect">
+            <a:avLst/>
+          </a:prstGeom>
+          <a:solidFill>
+            <a:schemeClr val="accent1"/>
+          </a:solidFill>
+          <a:ln>
+            <a:noFill/>
+          </a:ln>
+        </p:spPr>
+        <p:style>
+          <a:lnRef idx="2">
+            <a:schemeClr val="accent1">
+              <a:shade val="50000"/>
+            </a:schemeClr>
+          </a:lnRef>
+          <a:fillRef idx="1">
+            <a:schemeClr val="accent1"/>
+          </a:fillRef>
+          <a:effectRef idx="0">
+            <a:schemeClr val="accent1"/>
+          </a:effectRef>
+          <a:fontRef idx="minor">
+            <a:schemeClr val="lt1"/>
+          </a:fontRef>
+        </p:style>
+        <p:txBody>
+          <a:bodyPr rtlCol="0" anchor="ctr"/>
+          <a:lstStyle/>
+          <a:p>
+            <a:pPr marL="0" marR="0" lvl="0" indent="0" algn="ctr" defTabSz="914400" rtl="0" eaLnBrk="1" fontAlgn="auto" latinLnBrk="0" hangingPunct="1">
+              <a:lnSpc>
+                <a:spcPct val="100000"/>
+              </a:lnSpc>
+              <a:spcBef>
+                <a:spcPts val="0"/>
+              </a:spcBef>
+              <a:spcAft>
+                <a:spcPts val="0"/>
+              </a:spcAft>
+              <a:buClrTx/>
+              <a:buSzTx/>
+              <a:buFontTx/>
+              <a:buNone/>
+              <a:tabLst/>
+              <a:defRPr/>
+            </a:pPr>
+            <a:endParaRPr kumimoji="0" lang="en-US" sz="1800" b="0" i="0" u="none" strike="noStrike" kern="1200" cap="none" spc="0" normalizeH="0" baseline="0" noProof="0">
+              <a:ln>
+                <a:noFill/>
+              </a:ln>
+              <a:solidFill>
+                <a:prstClr val="white"/>
+              </a:solidFill>
+              <a:effectLst/>
+              <a:uLnTx/>
+              <a:uFillTx/>
+              <a:latin typeface="Calibri" panose="020F0502020204030204"/>
+              <a:ea typeface="+mn-ea"/>
+              <a:cs typeface="+mn-cs"/>
+            </a:endParaRPr>
+          </a:p>
+        </p:txBody>
+      </p:sp>
+      <p:sp>
+        <p:nvSpPr>
+          <p:cNvPr id="12" name="Rectangle 11">
+            <a:extLst>
+              <a:ext uri="{FF2B5EF4-FFF2-40B4-BE49-F238E27FC236}">
+                <a16:creationId xmlns:a16="http://schemas.microsoft.com/office/drawing/2014/main" id="{79F3C543-62EC-4433-9C93-A2CD8764E9B4}"/>
+              </a:ext>
+              <a:ext uri="{C183D7F6-B498-43B3-948B-1728B52AA6E4}">
+                <adec:decorative xmlns:adec="http://schemas.microsoft.com/office/drawing/2017/decorative" val="1"/>
+              </a:ext>
+            </a:extLst>
+          </p:cNvPr>
+          <p:cNvSpPr>
+            <a:spLocks noGrp="1" noRot="1" noChangeAspect="1" noMove="1" noResize="1" noEditPoints="1" noAdjustHandles="1" noChangeArrowheads="1" noChangeShapeType="1" noTextEdit="1"/>
+          </p:cNvSpPr>
+          <p:nvPr>
+            <p:extLst>
+              <p:ext uri="{386F3935-93C4-4BCD-93E2-E3B085C9AB24}">
+                <p16:designElem xmlns:p16="http://schemas.microsoft.com/office/powerpoint/2015/main" val="1"/>
+              </p:ext>
+            </p:extLst>
+          </p:nvPr>
+        </p:nvSpPr>
+        <p:spPr>
+          <a:xfrm flipV="1">
+            <a:off x="578652" y="4501201"/>
+            <a:ext cx="11034696" cy="18288"/>
+          </a:xfrm>
+          <a:prstGeom prst="rect">
+            <a:avLst/>
+          </a:prstGeom>
+          <a:solidFill>
+            <a:schemeClr val="tx2">
+              <a:lumMod val="25000"/>
+              <a:lumOff val="75000"/>
+            </a:schemeClr>
+          </a:solidFill>
+          <a:ln w="3175">
+            <a:noFill/>
+          </a:ln>
+          <a:effectLst/>
+        </p:spPr>
+        <p:style>
+          <a:lnRef idx="2">
+            <a:schemeClr val="accent1">
+              <a:shade val="50000"/>
+            </a:schemeClr>
+          </a:lnRef>
+          <a:fillRef idx="1">
+            <a:schemeClr val="accent1"/>
+          </a:fillRef>
+          <a:effectRef idx="0">
+            <a:schemeClr val="accent1"/>
+          </a:effectRef>
+          <a:fontRef idx="minor">
+            <a:schemeClr val="lt1"/>
+          </a:fontRef>
+        </p:style>
+        <p:txBody>
+          <a:bodyPr rtlCol="0" anchor="ctr"/>
+          <a:lstStyle/>
+          <a:p>
+            <a:pPr marL="0" marR="0" lvl="0" indent="0" algn="ctr" defTabSz="914400" rtl="0" eaLnBrk="1" fontAlgn="auto" latinLnBrk="0" hangingPunct="1">
+              <a:lnSpc>
+                <a:spcPct val="100000"/>
+              </a:lnSpc>
+              <a:spcBef>
+                <a:spcPts val="0"/>
+              </a:spcBef>
+              <a:spcAft>
+                <a:spcPts val="0"/>
+              </a:spcAft>
+              <a:buClrTx/>
+              <a:buSzTx/>
+              <a:buFontTx/>
+              <a:buNone/>
+              <a:tabLst/>
+              <a:defRPr/>
+            </a:pPr>
+            <a:endParaRPr kumimoji="0" lang="en-US" sz="1800" b="0" i="0" u="none" strike="noStrike" kern="1200" cap="none" spc="0" normalizeH="0" baseline="0" noProof="0">
+              <a:ln>
+                <a:noFill/>
+              </a:ln>
+              <a:solidFill>
+                <a:prstClr val="white"/>
+              </a:solidFill>
+              <a:effectLst/>
+              <a:uLnTx/>
+              <a:uFillTx/>
+              <a:latin typeface="Calibri" panose="020F0502020204030204"/>
+              <a:ea typeface="+mn-ea"/>
+              <a:cs typeface="+mn-cs"/>
+            </a:endParaRPr>
+          </a:p>
+        </p:txBody>
+      </p:sp>
+      <p:sp useBgFill="1">
+        <p:nvSpPr>
+          <p:cNvPr id="14" name="Rectangle 13">
+            <a:extLst>
+              <a:ext uri="{FF2B5EF4-FFF2-40B4-BE49-F238E27FC236}">
+                <a16:creationId xmlns:a16="http://schemas.microsoft.com/office/drawing/2014/main" id="{E91DC736-0EF8-4F87-9146-EBF1D2EE4D3D}"/>
+              </a:ext>
+              <a:ext uri="{C183D7F6-B498-43B3-948B-1728B52AA6E4}">
+                <adec:decorative xmlns:adec="http://schemas.microsoft.com/office/drawing/2017/decorative" val="1"/>
+              </a:ext>
+            </a:extLst>
+          </p:cNvPr>
+          <p:cNvSpPr>
+            <a:spLocks noGrp="1" noRot="1" noChangeAspect="1" noMove="1" noResize="1" noEditPoints="1" noAdjustHandles="1" noChangeArrowheads="1" noChangeShapeType="1" noTextEdit="1"/>
+          </p:cNvSpPr>
+          <p:nvPr>
+            <p:extLst>
+              <p:ext uri="{386F3935-93C4-4BCD-93E2-E3B085C9AB24}">
+                <p16:designElem xmlns:p16="http://schemas.microsoft.com/office/powerpoint/2015/main" val="1"/>
+              </p:ext>
+            </p:extLst>
+          </p:nvPr>
+        </p:nvSpPr>
+        <p:spPr>
+          <a:xfrm>
+            <a:off x="0" y="0"/>
+            <a:ext cx="12192000" cy="6858000"/>
+          </a:xfrm>
+          <a:prstGeom prst="rect">
+            <a:avLst/>
+          </a:prstGeom>
+          <a:ln>
+            <a:noFill/>
+          </a:ln>
+        </p:spPr>
+        <p:style>
+          <a:lnRef idx="2">
+            <a:schemeClr val="accent1">
+              <a:shade val="50000"/>
+            </a:schemeClr>
+          </a:lnRef>
+          <a:fillRef idx="1">
+            <a:schemeClr val="accent1"/>
+          </a:fillRef>
+          <a:effectRef idx="0">
+            <a:schemeClr val="accent1"/>
+          </a:effectRef>
+          <a:fontRef idx="minor">
+            <a:schemeClr val="lt1"/>
+          </a:fontRef>
+        </p:style>
+        <p:txBody>
+          <a:bodyPr rtlCol="0" anchor="ctr"/>
+          <a:lstStyle/>
+          <a:p>
+            <a:pPr algn="ctr"/>
+            <a:endParaRPr lang="en-US"/>
+          </a:p>
+        </p:txBody>
+      </p:sp>
+      <p:pic>
+        <p:nvPicPr>
+          <p:cNvPr id="4" name="Content Placeholder 3" descr="Fundo do vetor de cores vibrantes salpicando">
+            <a:extLst>
+              <a:ext uri="{FF2B5EF4-FFF2-40B4-BE49-F238E27FC236}">
+                <a16:creationId xmlns:a16="http://schemas.microsoft.com/office/drawing/2014/main" id="{732D2651-2063-E849-A852-33096C67BA0F}"/>
+              </a:ext>
+            </a:extLst>
+          </p:cNvPr>
+          <p:cNvPicPr>
+            <a:picLocks noChangeAspect="1"/>
+          </p:cNvPicPr>
+          <p:nvPr/>
+        </p:nvPicPr>
+        <p:blipFill rotWithShape="1">
+          <a:blip r:embed="rId2"/>
+          <a:srcRect l="10975" r="3072" b="-1"/>
+          <a:stretch/>
+        </p:blipFill>
+        <p:spPr>
+          <a:xfrm>
+            <a:off x="3523488" y="10"/>
+            <a:ext cx="8668512" cy="6857990"/>
+          </a:xfrm>
+          <a:prstGeom prst="rect">
+            <a:avLst/>
+          </a:prstGeom>
+        </p:spPr>
+      </p:pic>
+      <p:sp>
+        <p:nvSpPr>
+          <p:cNvPr id="16" name="Rectangle 15">
+            <a:extLst>
+              <a:ext uri="{FF2B5EF4-FFF2-40B4-BE49-F238E27FC236}">
+                <a16:creationId xmlns:a16="http://schemas.microsoft.com/office/drawing/2014/main" id="{097CD68E-23E3-4007-8847-CD0944C4F7BE}"/>
+              </a:ext>
+              <a:ext uri="{C183D7F6-B498-43B3-948B-1728B52AA6E4}">
+                <adec:decorative xmlns:adec="http://schemas.microsoft.com/office/drawing/2017/decorative" val="1"/>
+              </a:ext>
+            </a:extLst>
+          </p:cNvPr>
+          <p:cNvSpPr>
+            <a:spLocks noGrp="1" noRot="1" noChangeAspect="1" noMove="1" noResize="1" noEditPoints="1" noAdjustHandles="1" noChangeArrowheads="1" noChangeShapeType="1" noTextEdit="1"/>
+          </p:cNvSpPr>
+          <p:nvPr>
+            <p:extLst>
+              <p:ext uri="{386F3935-93C4-4BCD-93E2-E3B085C9AB24}">
+                <p16:designElem xmlns:p16="http://schemas.microsoft.com/office/powerpoint/2015/main" val="1"/>
+              </p:ext>
+            </p:extLst>
+          </p:nvPr>
+        </p:nvSpPr>
+        <p:spPr>
+          <a:xfrm>
+            <a:off x="0" y="0"/>
+            <a:ext cx="9756601" cy="6858000"/>
+          </a:xfrm>
+          <a:prstGeom prst="rect">
+            <a:avLst/>
+          </a:prstGeom>
+          <a:gradFill>
+            <a:gsLst>
+              <a:gs pos="58000">
+                <a:schemeClr val="bg1"/>
+              </a:gs>
+              <a:gs pos="35000">
+                <a:schemeClr val="bg1">
+                  <a:alpha val="79000"/>
+                </a:schemeClr>
+              </a:gs>
+              <a:gs pos="19000">
+                <a:schemeClr val="bg1">
+                  <a:alpha val="38000"/>
+                </a:schemeClr>
+              </a:gs>
+              <a:gs pos="0">
+                <a:schemeClr val="bg1">
+                  <a:alpha val="0"/>
+                </a:schemeClr>
+              </a:gs>
+              <a:gs pos="100000">
+                <a:schemeClr val="bg1"/>
+              </a:gs>
+            </a:gsLst>
+            <a:lin ang="10800000" scaled="0"/>
+          </a:gradFill>
+          <a:ln>
+            <a:noFill/>
+          </a:ln>
+        </p:spPr>
+        <p:style>
+          <a:lnRef idx="2">
+            <a:schemeClr val="accent1">
+              <a:shade val="50000"/>
+            </a:schemeClr>
+          </a:lnRef>
+          <a:fillRef idx="1">
+            <a:schemeClr val="accent1"/>
+          </a:fillRef>
+          <a:effectRef idx="0">
+            <a:schemeClr val="accent1"/>
+          </a:effectRef>
+          <a:fontRef idx="minor">
+            <a:schemeClr val="lt1"/>
+          </a:fontRef>
+        </p:style>
+        <p:txBody>
+          <a:bodyPr rtlCol="0" anchor="ctr"/>
+          <a:lstStyle/>
+          <a:p>
+            <a:pPr algn="ctr"/>
+            <a:endParaRPr lang="en-US" dirty="0"/>
+          </a:p>
+        </p:txBody>
+      </p:sp>
+      <p:sp>
+        <p:nvSpPr>
+          <p:cNvPr id="5" name="Título 1">
+            <a:extLst>
+              <a:ext uri="{FF2B5EF4-FFF2-40B4-BE49-F238E27FC236}">
+                <a16:creationId xmlns:a16="http://schemas.microsoft.com/office/drawing/2014/main" id="{C3A2EB15-8DFE-16BC-CAF2-9AFFC71E00F2}"/>
+              </a:ext>
+            </a:extLst>
+          </p:cNvPr>
+          <p:cNvSpPr>
+            <a:spLocks noGrp="1"/>
+          </p:cNvSpPr>
+          <p:nvPr>
+            <p:ph type="title"/>
+          </p:nvPr>
+        </p:nvSpPr>
+        <p:spPr>
+          <a:xfrm>
+            <a:off x="477981" y="1122363"/>
+            <a:ext cx="4023360" cy="3204134"/>
+          </a:xfrm>
+        </p:spPr>
+        <p:txBody>
+          <a:bodyPr vert="horz" lIns="91440" tIns="45720" rIns="91440" bIns="45720" rtlCol="0" anchor="b">
+            <a:normAutofit/>
+          </a:bodyPr>
+          <a:lstStyle/>
+          <a:p>
+            <a:r>
+              <a:rPr lang="en-US" sz="4800" dirty="0"/>
+              <a:t>Aula 8 – </a:t>
+            </a:r>
+            <a:r>
+              <a:rPr lang="en-US" sz="4800" dirty="0" err="1"/>
+              <a:t>Parâmetros</a:t>
+            </a:r>
+            <a:r>
+              <a:rPr lang="en-US" sz="4800" dirty="0"/>
+              <a:t> no HTML</a:t>
+            </a:r>
+          </a:p>
+        </p:txBody>
+      </p:sp>
+      <p:sp>
+        <p:nvSpPr>
+          <p:cNvPr id="18" name="Rectangle 17">
+            <a:extLst>
+              <a:ext uri="{FF2B5EF4-FFF2-40B4-BE49-F238E27FC236}">
+                <a16:creationId xmlns:a16="http://schemas.microsoft.com/office/drawing/2014/main" id="{AF2F604E-43BE-4DC3-B983-E071523364F8}"/>
+              </a:ext>
+              <a:ext uri="{C183D7F6-B498-43B3-948B-1728B52AA6E4}">
+                <adec:decorative xmlns:adec="http://schemas.microsoft.com/office/drawing/2017/decorative" val="1"/>
+              </a:ext>
+            </a:extLst>
+          </p:cNvPr>
+          <p:cNvSpPr>
+            <a:spLocks noGrp="1" noRot="1" noChangeAspect="1" noMove="1" noResize="1" noEditPoints="1" noAdjustHandles="1" noChangeArrowheads="1" noChangeShapeType="1" noTextEdit="1"/>
+          </p:cNvSpPr>
+          <p:nvPr>
+            <p:extLst>
+              <p:ext uri="{386F3935-93C4-4BCD-93E2-E3B085C9AB24}">
+                <p16:designElem xmlns:p16="http://schemas.microsoft.com/office/powerpoint/2015/main" val="1"/>
+              </p:ext>
+            </p:extLst>
+          </p:nvPr>
+        </p:nvSpPr>
+        <p:spPr>
+          <a:xfrm rot="5400000">
+            <a:off x="759921" y="346791"/>
+            <a:ext cx="146304" cy="704088"/>
+          </a:xfrm>
+          <a:prstGeom prst="rect">
+            <a:avLst/>
+          </a:prstGeom>
+          <a:solidFill>
+            <a:schemeClr val="accent1"/>
+          </a:solidFill>
+          <a:ln>
+            <a:noFill/>
+          </a:ln>
+        </p:spPr>
+        <p:style>
+          <a:lnRef idx="2">
+            <a:schemeClr val="accent1">
+              <a:shade val="50000"/>
+            </a:schemeClr>
+          </a:lnRef>
+          <a:fillRef idx="1">
+            <a:schemeClr val="accent1"/>
+          </a:fillRef>
+          <a:effectRef idx="0">
+            <a:schemeClr val="accent1"/>
+          </a:effectRef>
+          <a:fontRef idx="minor">
+            <a:schemeClr val="lt1"/>
+          </a:fontRef>
+        </p:style>
+        <p:txBody>
+          <a:bodyPr rtlCol="0" anchor="ctr"/>
+          <a:lstStyle/>
+          <a:p>
+            <a:pPr marL="0" marR="0" lvl="0" indent="0" algn="ctr" defTabSz="914400" rtl="0" eaLnBrk="1" fontAlgn="auto" latinLnBrk="0" hangingPunct="1">
+              <a:lnSpc>
+                <a:spcPct val="100000"/>
+              </a:lnSpc>
+              <a:spcBef>
+                <a:spcPts val="0"/>
+              </a:spcBef>
+              <a:spcAft>
+                <a:spcPts val="0"/>
+              </a:spcAft>
+              <a:buClrTx/>
+              <a:buSzTx/>
+              <a:buFontTx/>
+              <a:buNone/>
+              <a:tabLst/>
+              <a:defRPr/>
+            </a:pPr>
+            <a:endParaRPr kumimoji="0" lang="en-US" sz="1800" b="0" i="0" u="none" strike="noStrike" kern="1200" cap="none" spc="0" normalizeH="0" baseline="0" noProof="0">
+              <a:ln>
+                <a:noFill/>
+              </a:ln>
+              <a:solidFill>
+                <a:prstClr val="white"/>
+              </a:solidFill>
+              <a:effectLst/>
+              <a:uLnTx/>
+              <a:uFillTx/>
+              <a:latin typeface="Calibri" panose="020F0502020204030204"/>
+              <a:ea typeface="+mn-ea"/>
+              <a:cs typeface="+mn-cs"/>
+            </a:endParaRPr>
+          </a:p>
+        </p:txBody>
+      </p:sp>
+      <p:sp>
+        <p:nvSpPr>
+          <p:cNvPr id="20" name="Rectangle 19">
+            <a:extLst>
+              <a:ext uri="{FF2B5EF4-FFF2-40B4-BE49-F238E27FC236}">
+                <a16:creationId xmlns:a16="http://schemas.microsoft.com/office/drawing/2014/main" id="{08C9B587-E65E-4B52-B37C-ABEBB6E87928}"/>
+              </a:ext>
+              <a:ext uri="{C183D7F6-B498-43B3-948B-1728B52AA6E4}">
+                <adec:decorative xmlns:adec="http://schemas.microsoft.com/office/drawing/2017/decorative" val="1"/>
+              </a:ext>
+            </a:extLst>
+          </p:cNvPr>
+          <p:cNvSpPr>
+            <a:spLocks noGrp="1" noRot="1" noChangeAspect="1" noMove="1" noResize="1" noEditPoints="1" noAdjustHandles="1" noChangeArrowheads="1" noChangeShapeType="1" noTextEdit="1"/>
+          </p:cNvSpPr>
+          <p:nvPr>
+            <p:extLst>
+              <p:ext uri="{386F3935-93C4-4BCD-93E2-E3B085C9AB24}">
+                <p16:designElem xmlns:p16="http://schemas.microsoft.com/office/powerpoint/2015/main" val="1"/>
+              </p:ext>
+            </p:extLst>
+          </p:nvPr>
+        </p:nvSpPr>
+        <p:spPr>
+          <a:xfrm>
+            <a:off x="481029" y="4546920"/>
+            <a:ext cx="3977640" cy="18288"/>
+          </a:xfrm>
+          <a:prstGeom prst="rect">
+            <a:avLst/>
+          </a:prstGeom>
+          <a:solidFill>
+            <a:schemeClr val="tx2">
+              <a:lumMod val="25000"/>
+              <a:lumOff val="75000"/>
+            </a:schemeClr>
+          </a:solidFill>
+          <a:ln w="3175">
+            <a:solidFill>
+              <a:schemeClr val="tx2">
+                <a:lumMod val="25000"/>
+                <a:lumOff val="75000"/>
+              </a:schemeClr>
+            </a:solidFill>
+          </a:ln>
+          <a:effectLst/>
+        </p:spPr>
+        <p:style>
+          <a:lnRef idx="2">
+            <a:schemeClr val="accent1">
+              <a:shade val="50000"/>
+            </a:schemeClr>
+          </a:lnRef>
+          <a:fillRef idx="1">
+            <a:schemeClr val="accent1"/>
+          </a:fillRef>
+          <a:effectRef idx="0">
+            <a:schemeClr val="accent1"/>
+          </a:effectRef>
+          <a:fontRef idx="minor">
+            <a:schemeClr val="lt1"/>
+          </a:fontRef>
+        </p:style>
+        <p:txBody>
+          <a:bodyPr rtlCol="0" anchor="ctr"/>
+          <a:lstStyle/>
+          <a:p>
+            <a:pPr marL="0" marR="0" lvl="0" indent="0" algn="ctr" defTabSz="914400" rtl="0" eaLnBrk="1" fontAlgn="auto" latinLnBrk="0" hangingPunct="1">
+              <a:lnSpc>
+                <a:spcPct val="100000"/>
+              </a:lnSpc>
+              <a:spcBef>
+                <a:spcPts val="0"/>
+              </a:spcBef>
+              <a:spcAft>
+                <a:spcPts val="0"/>
+              </a:spcAft>
+              <a:buClrTx/>
+              <a:buSzTx/>
+              <a:buFontTx/>
+              <a:buNone/>
+              <a:tabLst/>
+              <a:defRPr/>
+            </a:pPr>
+            <a:endParaRPr kumimoji="0" lang="en-US" sz="1800" b="0" i="0" u="none" strike="noStrike" kern="1200" cap="none" spc="0" normalizeH="0" baseline="0" noProof="0">
+              <a:ln>
+                <a:noFill/>
+              </a:ln>
+              <a:solidFill>
+                <a:prstClr val="white"/>
+              </a:solidFill>
+              <a:effectLst/>
+              <a:uLnTx/>
+              <a:uFillTx/>
+              <a:latin typeface="Calibri" panose="020F0502020204030204"/>
+              <a:ea typeface="+mn-ea"/>
+              <a:cs typeface="+mn-cs"/>
+            </a:endParaRPr>
+          </a:p>
+        </p:txBody>
+      </p:sp>
+    </p:spTree>
+    <p:extLst>
+      <p:ext uri="{BB962C8B-B14F-4D97-AF65-F5344CB8AC3E}">
+        <p14:creationId xmlns:p14="http://schemas.microsoft.com/office/powerpoint/2010/main" val="1526990506"/>
+      </p:ext>
+    </p:extLst>
+  </p:cSld>
+  <p:clrMapOvr>
+    <a:masterClrMapping/>
+  </p:clrMapOvr>
+  <p:timing>
+    <p:tnLst>
+      <p:par>
+        <p:cTn id="1" dur="indefinite" restart="never" nodeType="tmRoot">
+          <p:childTnLst>
+            <p:seq concurrent="1" nextAc="seek">
+              <p:cTn id="2" dur="indefinite" nodeType="mainSeq">
+                <p:childTnLst>
+                  <p:par>
+                    <p:cTn id="3" fill="hold">
+                      <p:stCondLst>
+                        <p:cond delay="indefinite"/>
+                        <p:cond evt="onBegin" delay="0">
+                          <p:tn val="2"/>
+                        </p:cond>
+                      </p:stCondLst>
+                      <p:childTnLst>
+                        <p:par>
+                          <p:cTn id="4" fill="hold">
+                            <p:stCondLst>
+                              <p:cond delay="0"/>
+                            </p:stCondLst>
+                            <p:childTnLst>
+                              <p:par>
+                                <p:cTn id="5" presetID="10" presetClass="entr" presetSubtype="0" fill="hold" grpId="0" nodeType="withEffect">
+                                  <p:stCondLst>
+                                    <p:cond delay="1000"/>
+                                  </p:stCondLst>
+                                  <p:iterate type="lt">
+                                    <p:tmPct val="10000"/>
+                                  </p:iterate>
+                                  <p:childTnLst>
+                                    <p:set>
+                                      <p:cBhvr>
+                                        <p:cTn id="6" dur="1" fill="hold">
+                                          <p:stCondLst>
+                                            <p:cond delay="0"/>
+                                          </p:stCondLst>
+                                        </p:cTn>
+                                        <p:tgtEl>
+                                          <p:spTgt spid="5"/>
+                                        </p:tgtEl>
+                                        <p:attrNameLst>
+                                          <p:attrName>style.visibility</p:attrName>
+                                        </p:attrNameLst>
+                                      </p:cBhvr>
+                                      <p:to>
+                                        <p:strVal val="visible"/>
+                                      </p:to>
+                                    </p:set>
+                                    <p:animEffect transition="in" filter="fade">
+                                      <p:cBhvr>
+                                        <p:cTn id="7" dur="400"/>
+                                        <p:tgtEl>
+                                          <p:spTgt spid="5"/>
+                                        </p:tgtEl>
+                                      </p:cBhvr>
+                                    </p:animEffect>
+                                  </p:childTnLst>
+                                </p:cTn>
+                              </p:par>
+                            </p:childTnLst>
+                          </p:cTn>
+                        </p:par>
+                      </p:childTnLst>
+                    </p:cTn>
+                  </p:par>
+                </p:childTnLst>
+              </p:cTn>
+              <p:prevCondLst>
+                <p:cond evt="onPrev" delay="0">
+                  <p:tgtEl>
+                    <p:sldTgt/>
+                  </p:tgtEl>
+                </p:cond>
+              </p:prevCondLst>
+              <p:nextCondLst>
+                <p:cond evt="onNext" delay="0">
+                  <p:tgtEl>
+                    <p:sldTgt/>
+                  </p:tgtEl>
+                </p:cond>
+              </p:nextCondLst>
+            </p:seq>
+          </p:childTnLst>
+        </p:cTn>
+      </p:par>
+    </p:tnLst>
+    <p:bldLst>
+      <p:bldP spid="5" grpId="0"/>
+    </p:bldLst>
+  </p:timing>
+</p:sld>
+</file>
+
+<file path=ppt/slides/slide113.xml><?xml version="1.0" encoding="utf-8"?>
+<p:sld xmlns:a="http://schemas.openxmlformats.org/drawingml/2006/main" xmlns:r="http://schemas.openxmlformats.org/officeDocument/2006/relationships" xmlns:p="http://schemas.openxmlformats.org/presentationml/2006/main">
+  <p:cSld>
+    <p:spTree>
+      <p:nvGrpSpPr>
+        <p:cNvPr id="1" name=""/>
+        <p:cNvGrpSpPr/>
+        <p:nvPr/>
+      </p:nvGrpSpPr>
+      <p:grpSpPr>
+        <a:xfrm>
+          <a:off x="0" y="0"/>
+          <a:ext cx="0" cy="0"/>
+          <a:chOff x="0" y="0"/>
+          <a:chExt cx="0" cy="0"/>
+        </a:xfrm>
+      </p:grpSpPr>
+      <p:sp>
+        <p:nvSpPr>
+          <p:cNvPr id="2" name="Título 1">
+            <a:extLst>
+              <a:ext uri="{FF2B5EF4-FFF2-40B4-BE49-F238E27FC236}">
+                <a16:creationId xmlns:a16="http://schemas.microsoft.com/office/drawing/2014/main" id="{6EBA68B2-AF95-E223-6453-A640267FF8E8}"/>
+              </a:ext>
+            </a:extLst>
+          </p:cNvPr>
+          <p:cNvSpPr>
+            <a:spLocks noGrp="1"/>
+          </p:cNvSpPr>
+          <p:nvPr>
+            <p:ph type="title"/>
+          </p:nvPr>
+        </p:nvSpPr>
+        <p:spPr/>
+        <p:txBody>
+          <a:bodyPr/>
+          <a:lstStyle/>
+          <a:p>
+            <a:r>
+              <a:rPr lang="pt-BR" dirty="0"/>
+              <a:t>Parâmetros no HTML</a:t>
+            </a:r>
+          </a:p>
+        </p:txBody>
+      </p:sp>
+      <p:sp>
+        <p:nvSpPr>
+          <p:cNvPr id="3" name="Espaço Reservado para Conteúdo 2">
+            <a:extLst>
+              <a:ext uri="{FF2B5EF4-FFF2-40B4-BE49-F238E27FC236}">
+                <a16:creationId xmlns:a16="http://schemas.microsoft.com/office/drawing/2014/main" id="{04086A11-67D3-F683-BE36-9D6AB167E061}"/>
+              </a:ext>
+            </a:extLst>
+          </p:cNvPr>
+          <p:cNvSpPr>
+            <a:spLocks noGrp="1"/>
+          </p:cNvSpPr>
+          <p:nvPr>
+            <p:ph idx="1"/>
+          </p:nvPr>
+        </p:nvSpPr>
+        <p:spPr/>
+        <p:txBody>
+          <a:bodyPr/>
+          <a:lstStyle/>
+          <a:p>
+            <a:r>
+              <a:rPr lang="pt-BR" dirty="0"/>
+              <a:t>Parâmetro </a:t>
+            </a:r>
+            <a:r>
+              <a:rPr lang="pt-BR" dirty="0">
+                <a:sym typeface="Wingdings" panose="05000000000000000000" pitchFamily="2" charset="2"/>
+              </a:rPr>
+              <a:t></a:t>
+            </a:r>
+            <a:r>
+              <a:rPr lang="pt-BR" dirty="0"/>
+              <a:t> Característica</a:t>
+            </a:r>
+          </a:p>
+          <a:p>
+            <a:r>
+              <a:rPr lang="pt-BR" dirty="0"/>
+              <a:t>Centro </a:t>
+            </a:r>
+            <a:r>
+              <a:rPr lang="pt-BR" dirty="0">
+                <a:sym typeface="Wingdings" panose="05000000000000000000" pitchFamily="2" charset="2"/>
+              </a:rPr>
+              <a:t> Conteúdo</a:t>
+            </a:r>
+          </a:p>
+          <a:p>
+            <a:r>
+              <a:rPr lang="pt-BR" dirty="0">
+                <a:sym typeface="Wingdings" panose="05000000000000000000" pitchFamily="2" charset="2"/>
+              </a:rPr>
+              <a:t>Exemplo: </a:t>
+            </a:r>
+            <a:r>
+              <a:rPr lang="pt-BR" dirty="0" err="1">
+                <a:sym typeface="Wingdings" panose="05000000000000000000" pitchFamily="2" charset="2"/>
+              </a:rPr>
+              <a:t>Tag</a:t>
+            </a:r>
+            <a:r>
+              <a:rPr lang="pt-BR" dirty="0">
+                <a:sym typeface="Wingdings" panose="05000000000000000000" pitchFamily="2" charset="2"/>
+              </a:rPr>
+              <a:t> </a:t>
+            </a:r>
+            <a:r>
+              <a:rPr lang="pt-BR" dirty="0" err="1">
+                <a:sym typeface="Wingdings" panose="05000000000000000000" pitchFamily="2" charset="2"/>
+              </a:rPr>
+              <a:t>abbr</a:t>
+            </a:r>
+            <a:r>
+              <a:rPr lang="pt-BR" dirty="0">
+                <a:sym typeface="Wingdings" panose="05000000000000000000" pitchFamily="2" charset="2"/>
+              </a:rPr>
+              <a:t>:</a:t>
+            </a:r>
+          </a:p>
+        </p:txBody>
+      </p:sp>
+      <p:pic>
+        <p:nvPicPr>
+          <p:cNvPr id="5" name="Imagem 4">
+            <a:extLst>
+              <a:ext uri="{FF2B5EF4-FFF2-40B4-BE49-F238E27FC236}">
+                <a16:creationId xmlns:a16="http://schemas.microsoft.com/office/drawing/2014/main" id="{494A6DCB-5131-A437-B6BE-43006515D70B}"/>
+              </a:ext>
+            </a:extLst>
+          </p:cNvPr>
+          <p:cNvPicPr>
+            <a:picLocks noChangeAspect="1"/>
+          </p:cNvPicPr>
+          <p:nvPr/>
+        </p:nvPicPr>
+        <p:blipFill>
+          <a:blip r:embed="rId2"/>
+          <a:stretch>
+            <a:fillRect/>
+          </a:stretch>
+        </p:blipFill>
+        <p:spPr>
+          <a:xfrm>
+            <a:off x="2033430" y="4325112"/>
+            <a:ext cx="8125140" cy="993073"/>
+          </a:xfrm>
+          <a:prstGeom prst="rect">
+            <a:avLst/>
+          </a:prstGeom>
+        </p:spPr>
+      </p:pic>
+    </p:spTree>
+    <p:extLst>
+      <p:ext uri="{BB962C8B-B14F-4D97-AF65-F5344CB8AC3E}">
+        <p14:creationId xmlns:p14="http://schemas.microsoft.com/office/powerpoint/2010/main" val="2337324791"/>
+      </p:ext>
+    </p:extLst>
+  </p:cSld>
+  <p:clrMapOvr>
+    <a:masterClrMapping/>
+  </p:clrMapOvr>
+</p:sld>
+</file>
+
+<file path=ppt/slides/slide114.xml><?xml version="1.0" encoding="utf-8"?>
+<p:sld xmlns:a="http://schemas.openxmlformats.org/drawingml/2006/main" xmlns:r="http://schemas.openxmlformats.org/officeDocument/2006/relationships" xmlns:p="http://schemas.openxmlformats.org/presentationml/2006/main">
+  <p:cSld>
+    <p:spTree>
+      <p:nvGrpSpPr>
+        <p:cNvPr id="1" name=""/>
+        <p:cNvGrpSpPr/>
+        <p:nvPr/>
+      </p:nvGrpSpPr>
+      <p:grpSpPr>
+        <a:xfrm>
+          <a:off x="0" y="0"/>
+          <a:ext cx="0" cy="0"/>
+          <a:chOff x="0" y="0"/>
+          <a:chExt cx="0" cy="0"/>
+        </a:xfrm>
+      </p:grpSpPr>
+      <p:sp>
+        <p:nvSpPr>
+          <p:cNvPr id="2" name="Título 1">
+            <a:extLst>
+              <a:ext uri="{FF2B5EF4-FFF2-40B4-BE49-F238E27FC236}">
+                <a16:creationId xmlns:a16="http://schemas.microsoft.com/office/drawing/2014/main" id="{EA8D2A3B-4A20-E5C7-3055-0BC4B830D4D5}"/>
+              </a:ext>
+            </a:extLst>
+          </p:cNvPr>
+          <p:cNvSpPr>
+            <a:spLocks noGrp="1"/>
+          </p:cNvSpPr>
+          <p:nvPr>
+            <p:ph type="title"/>
+          </p:nvPr>
+        </p:nvSpPr>
+        <p:spPr/>
+        <p:txBody>
+          <a:bodyPr/>
+          <a:lstStyle/>
+          <a:p>
+            <a:r>
+              <a:rPr lang="pt-BR" dirty="0"/>
+              <a:t>Imagine Uma </a:t>
+            </a:r>
+            <a:r>
+              <a:rPr lang="pt-BR" dirty="0" err="1"/>
+              <a:t>Tag</a:t>
+            </a:r>
+            <a:r>
+              <a:rPr lang="pt-BR" dirty="0"/>
+              <a:t> Assim:</a:t>
+            </a:r>
+          </a:p>
+        </p:txBody>
+      </p:sp>
+      <p:pic>
+        <p:nvPicPr>
+          <p:cNvPr id="5" name="Espaço Reservado para Conteúdo 4">
+            <a:extLst>
+              <a:ext uri="{FF2B5EF4-FFF2-40B4-BE49-F238E27FC236}">
+                <a16:creationId xmlns:a16="http://schemas.microsoft.com/office/drawing/2014/main" id="{9AA29364-05BD-7867-1BFF-2D051B5DA4E3}"/>
+              </a:ext>
+            </a:extLst>
+          </p:cNvPr>
+          <p:cNvPicPr>
+            <a:picLocks noGrp="1" noChangeAspect="1"/>
+          </p:cNvPicPr>
+          <p:nvPr>
+            <p:ph idx="1"/>
+          </p:nvPr>
+        </p:nvPicPr>
+        <p:blipFill>
+          <a:blip r:embed="rId2"/>
+          <a:stretch>
+            <a:fillRect/>
+          </a:stretch>
+        </p:blipFill>
+        <p:spPr>
+          <a:xfrm>
+            <a:off x="145694" y="2553419"/>
+            <a:ext cx="11900612" cy="3347049"/>
+          </a:xfrm>
+        </p:spPr>
+      </p:pic>
+    </p:spTree>
+    <p:extLst>
+      <p:ext uri="{BB962C8B-B14F-4D97-AF65-F5344CB8AC3E}">
+        <p14:creationId xmlns:p14="http://schemas.microsoft.com/office/powerpoint/2010/main" val="2905356730"/>
+      </p:ext>
+    </p:extLst>
+  </p:cSld>
+  <p:clrMapOvr>
+    <a:masterClrMapping/>
+  </p:clrMapOvr>
+</p:sld>
+</file>
+
+<file path=ppt/slides/slide115.xml><?xml version="1.0" encoding="utf-8"?>
+<p:sld xmlns:a="http://schemas.openxmlformats.org/drawingml/2006/main" xmlns:r="http://schemas.openxmlformats.org/officeDocument/2006/relationships" xmlns:p="http://schemas.openxmlformats.org/presentationml/2006/main">
+  <p:cSld>
+    <p:spTree>
+      <p:nvGrpSpPr>
+        <p:cNvPr id="1" name=""/>
+        <p:cNvGrpSpPr/>
+        <p:nvPr/>
+      </p:nvGrpSpPr>
+      <p:grpSpPr>
+        <a:xfrm>
+          <a:off x="0" y="0"/>
+          <a:ext cx="0" cy="0"/>
+          <a:chOff x="0" y="0"/>
+          <a:chExt cx="0" cy="0"/>
+        </a:xfrm>
+      </p:grpSpPr>
+      <p:sp>
+        <p:nvSpPr>
+          <p:cNvPr id="2" name="Título 1">
+            <a:extLst>
+              <a:ext uri="{FF2B5EF4-FFF2-40B4-BE49-F238E27FC236}">
+                <a16:creationId xmlns:a16="http://schemas.microsoft.com/office/drawing/2014/main" id="{B906A0C3-83E9-62CD-B587-B46E9AB00123}"/>
+              </a:ext>
+            </a:extLst>
+          </p:cNvPr>
+          <p:cNvSpPr>
+            <a:spLocks noGrp="1"/>
+          </p:cNvSpPr>
+          <p:nvPr>
+            <p:ph type="title"/>
+          </p:nvPr>
+        </p:nvSpPr>
+        <p:spPr/>
+        <p:txBody>
+          <a:bodyPr/>
+          <a:lstStyle/>
+          <a:p>
+            <a:r>
+              <a:rPr lang="pt-BR" dirty="0"/>
+              <a:t>Ou Assim:</a:t>
+            </a:r>
+          </a:p>
+        </p:txBody>
+      </p:sp>
+      <p:pic>
+        <p:nvPicPr>
+          <p:cNvPr id="5" name="Espaço Reservado para Conteúdo 4">
+            <a:extLst>
+              <a:ext uri="{FF2B5EF4-FFF2-40B4-BE49-F238E27FC236}">
+                <a16:creationId xmlns:a16="http://schemas.microsoft.com/office/drawing/2014/main" id="{BD2A8B03-66AE-31D0-B13A-86FE066267C8}"/>
+              </a:ext>
+            </a:extLst>
+          </p:cNvPr>
+          <p:cNvPicPr>
+            <a:picLocks noGrp="1" noChangeAspect="1"/>
+          </p:cNvPicPr>
+          <p:nvPr>
+            <p:ph idx="1"/>
+          </p:nvPr>
+        </p:nvPicPr>
+        <p:blipFill>
+          <a:blip r:embed="rId2"/>
+          <a:stretch>
+            <a:fillRect/>
+          </a:stretch>
+        </p:blipFill>
+        <p:spPr>
+          <a:xfrm>
+            <a:off x="219119" y="2708694"/>
+            <a:ext cx="11745727" cy="3174521"/>
+          </a:xfrm>
+        </p:spPr>
+      </p:pic>
+    </p:spTree>
+    <p:extLst>
+      <p:ext uri="{BB962C8B-B14F-4D97-AF65-F5344CB8AC3E}">
+        <p14:creationId xmlns:p14="http://schemas.microsoft.com/office/powerpoint/2010/main" val="3624686043"/>
+      </p:ext>
+    </p:extLst>
+  </p:cSld>
+  <p:clrMapOvr>
+    <a:masterClrMapping/>
+  </p:clrMapOvr>
+</p:sld>
+</file>
+
+<file path=ppt/slides/slide116.xml><?xml version="1.0" encoding="utf-8"?>
+<p:sld xmlns:a="http://schemas.openxmlformats.org/drawingml/2006/main" xmlns:r="http://schemas.openxmlformats.org/officeDocument/2006/relationships" xmlns:p="http://schemas.openxmlformats.org/presentationml/2006/main">
+  <p:cSld>
+    <p:spTree>
+      <p:nvGrpSpPr>
+        <p:cNvPr id="1" name=""/>
+        <p:cNvGrpSpPr/>
+        <p:nvPr/>
+      </p:nvGrpSpPr>
+      <p:grpSpPr>
+        <a:xfrm>
+          <a:off x="0" y="0"/>
+          <a:ext cx="0" cy="0"/>
+          <a:chOff x="0" y="0"/>
+          <a:chExt cx="0" cy="0"/>
+        </a:xfrm>
+      </p:grpSpPr>
+      <p:sp>
+        <p:nvSpPr>
+          <p:cNvPr id="2" name="Título 1">
+            <a:extLst>
+              <a:ext uri="{FF2B5EF4-FFF2-40B4-BE49-F238E27FC236}">
+                <a16:creationId xmlns:a16="http://schemas.microsoft.com/office/drawing/2014/main" id="{A2BBFD08-2C42-D87B-55E6-77C0ACD9EB54}"/>
+              </a:ext>
+            </a:extLst>
+          </p:cNvPr>
+          <p:cNvSpPr>
+            <a:spLocks noGrp="1"/>
+          </p:cNvSpPr>
+          <p:nvPr>
+            <p:ph type="title"/>
+          </p:nvPr>
+        </p:nvSpPr>
+        <p:spPr/>
+        <p:txBody>
+          <a:bodyPr/>
+          <a:lstStyle/>
+          <a:p>
+            <a:r>
+              <a:rPr lang="pt-BR" dirty="0"/>
+              <a:t>História dos Parâmetros</a:t>
+            </a:r>
+          </a:p>
+        </p:txBody>
+      </p:sp>
+      <p:sp>
+        <p:nvSpPr>
+          <p:cNvPr id="3" name="Espaço Reservado para Conteúdo 2">
+            <a:extLst>
+              <a:ext uri="{FF2B5EF4-FFF2-40B4-BE49-F238E27FC236}">
+                <a16:creationId xmlns:a16="http://schemas.microsoft.com/office/drawing/2014/main" id="{6CC76603-FE81-23F9-9DDB-093B23A9A2F7}"/>
+              </a:ext>
+            </a:extLst>
+          </p:cNvPr>
+          <p:cNvSpPr>
+            <a:spLocks noGrp="1"/>
+          </p:cNvSpPr>
+          <p:nvPr>
+            <p:ph idx="1"/>
+          </p:nvPr>
+        </p:nvSpPr>
+        <p:spPr/>
+        <p:txBody>
+          <a:bodyPr/>
+          <a:lstStyle/>
+          <a:p>
+            <a:r>
+              <a:rPr lang="pt-BR" dirty="0"/>
+              <a:t>Cada Caractere possui diversos parâmetros, dentre eles:</a:t>
+            </a:r>
+          </a:p>
+          <a:p>
+            <a:pPr marL="457200" indent="-457200">
+              <a:buFont typeface="+mj-lt"/>
+              <a:buAutoNum type="arabicPeriod"/>
+            </a:pPr>
+            <a:r>
+              <a:rPr lang="pt-BR" dirty="0"/>
+              <a:t>Tamanho da Fonte;</a:t>
+            </a:r>
+          </a:p>
+          <a:p>
+            <a:pPr marL="457200" indent="-457200">
+              <a:buFont typeface="+mj-lt"/>
+              <a:buAutoNum type="arabicPeriod"/>
+            </a:pPr>
+            <a:r>
+              <a:rPr lang="pt-BR" dirty="0"/>
+              <a:t>Está em Negrito ou Não;</a:t>
+            </a:r>
+          </a:p>
+          <a:p>
+            <a:pPr marL="457200" indent="-457200">
+              <a:buFont typeface="+mj-lt"/>
+              <a:buAutoNum type="arabicPeriod"/>
+            </a:pPr>
+            <a:r>
+              <a:rPr lang="pt-BR" dirty="0"/>
+              <a:t>Cor da Fonte</a:t>
+            </a:r>
+          </a:p>
+        </p:txBody>
+      </p:sp>
+    </p:spTree>
+    <p:extLst>
+      <p:ext uri="{BB962C8B-B14F-4D97-AF65-F5344CB8AC3E}">
+        <p14:creationId xmlns:p14="http://schemas.microsoft.com/office/powerpoint/2010/main" val="2881746051"/>
+      </p:ext>
+    </p:extLst>
+  </p:cSld>
+  <p:clrMapOvr>
+    <a:masterClrMapping/>
+  </p:clrMapOvr>
+</p:sld>
+</file>
+
+<file path=ppt/slides/slide117.xml><?xml version="1.0" encoding="utf-8"?>
+<p:sld xmlns:a="http://schemas.openxmlformats.org/drawingml/2006/main" xmlns:r="http://schemas.openxmlformats.org/officeDocument/2006/relationships" xmlns:p="http://schemas.openxmlformats.org/presentationml/2006/main">
+  <p:cSld>
+    <p:spTree>
+      <p:nvGrpSpPr>
+        <p:cNvPr id="1" name=""/>
+        <p:cNvGrpSpPr/>
+        <p:nvPr/>
+      </p:nvGrpSpPr>
+      <p:grpSpPr>
+        <a:xfrm>
+          <a:off x="0" y="0"/>
+          <a:ext cx="0" cy="0"/>
+          <a:chOff x="0" y="0"/>
+          <a:chExt cx="0" cy="0"/>
+        </a:xfrm>
+      </p:grpSpPr>
+      <p:sp>
+        <p:nvSpPr>
+          <p:cNvPr id="2" name="Título 1">
+            <a:extLst>
+              <a:ext uri="{FF2B5EF4-FFF2-40B4-BE49-F238E27FC236}">
+                <a16:creationId xmlns:a16="http://schemas.microsoft.com/office/drawing/2014/main" id="{23A4D269-D3D9-DA4B-F739-50ED474D5496}"/>
+              </a:ext>
+            </a:extLst>
+          </p:cNvPr>
+          <p:cNvSpPr>
+            <a:spLocks noGrp="1"/>
+          </p:cNvSpPr>
+          <p:nvPr>
+            <p:ph type="title"/>
+          </p:nvPr>
+        </p:nvSpPr>
+        <p:spPr/>
+        <p:txBody>
+          <a:bodyPr>
+            <a:normAutofit fontScale="90000"/>
+          </a:bodyPr>
+          <a:lstStyle/>
+          <a:p>
+            <a:r>
+              <a:rPr lang="pt-BR" dirty="0"/>
+              <a:t>Parâmetros nas Linguagens de Marcação</a:t>
+            </a:r>
+          </a:p>
+        </p:txBody>
+      </p:sp>
+      <p:sp>
+        <p:nvSpPr>
+          <p:cNvPr id="3" name="Espaço Reservado para Conteúdo 2">
+            <a:extLst>
+              <a:ext uri="{FF2B5EF4-FFF2-40B4-BE49-F238E27FC236}">
+                <a16:creationId xmlns:a16="http://schemas.microsoft.com/office/drawing/2014/main" id="{C7D29C79-1813-8C88-97DF-947A7397BDE8}"/>
+              </a:ext>
+            </a:extLst>
+          </p:cNvPr>
+          <p:cNvSpPr>
+            <a:spLocks noGrp="1"/>
+          </p:cNvSpPr>
+          <p:nvPr>
+            <p:ph idx="1"/>
+          </p:nvPr>
+        </p:nvSpPr>
+        <p:spPr/>
+        <p:txBody>
+          <a:bodyPr/>
+          <a:lstStyle/>
+          <a:p>
+            <a:r>
+              <a:rPr lang="pt-BR" dirty="0"/>
+              <a:t>Os parâmetros vieram como uma forma de demonstrar as características do texto. </a:t>
+            </a:r>
+          </a:p>
+        </p:txBody>
+      </p:sp>
+    </p:spTree>
+    <p:extLst>
+      <p:ext uri="{BB962C8B-B14F-4D97-AF65-F5344CB8AC3E}">
+        <p14:creationId xmlns:p14="http://schemas.microsoft.com/office/powerpoint/2010/main" val="979876754"/>
+      </p:ext>
+    </p:extLst>
+  </p:cSld>
+  <p:clrMapOvr>
+    <a:masterClrMapping/>
+  </p:clrMapOvr>
+</p:sld>
+</file>
+
+<file path=ppt/slides/slide118.xml><?xml version="1.0" encoding="utf-8"?>
+<p:sld xmlns:a="http://schemas.openxmlformats.org/drawingml/2006/main" xmlns:r="http://schemas.openxmlformats.org/officeDocument/2006/relationships" xmlns:p="http://schemas.openxmlformats.org/presentationml/2006/main">
+  <p:cSld>
+    <p:spTree>
+      <p:nvGrpSpPr>
+        <p:cNvPr id="1" name=""/>
+        <p:cNvGrpSpPr/>
+        <p:nvPr/>
+      </p:nvGrpSpPr>
+      <p:grpSpPr>
+        <a:xfrm>
+          <a:off x="0" y="0"/>
+          <a:ext cx="0" cy="0"/>
+          <a:chOff x="0" y="0"/>
+          <a:chExt cx="0" cy="0"/>
+        </a:xfrm>
+      </p:grpSpPr>
+      <p:sp>
+        <p:nvSpPr>
+          <p:cNvPr id="2" name="Título 1">
+            <a:extLst>
+              <a:ext uri="{FF2B5EF4-FFF2-40B4-BE49-F238E27FC236}">
+                <a16:creationId xmlns:a16="http://schemas.microsoft.com/office/drawing/2014/main" id="{26B5640C-46A5-1339-03CE-E2ED5CB9F771}"/>
+              </a:ext>
+            </a:extLst>
+          </p:cNvPr>
+          <p:cNvSpPr>
+            <a:spLocks noGrp="1"/>
+          </p:cNvSpPr>
+          <p:nvPr>
+            <p:ph type="title"/>
+          </p:nvPr>
+        </p:nvSpPr>
+        <p:spPr/>
+        <p:txBody>
+          <a:bodyPr/>
+          <a:lstStyle/>
+          <a:p>
+            <a:r>
+              <a:rPr lang="pt-BR" dirty="0"/>
+              <a:t>Lição de Casa</a:t>
+            </a:r>
+          </a:p>
+        </p:txBody>
+      </p:sp>
+      <p:sp>
+        <p:nvSpPr>
+          <p:cNvPr id="3" name="Espaço Reservado para Conteúdo 2">
+            <a:extLst>
+              <a:ext uri="{FF2B5EF4-FFF2-40B4-BE49-F238E27FC236}">
+                <a16:creationId xmlns:a16="http://schemas.microsoft.com/office/drawing/2014/main" id="{D3F56F73-2267-76C9-C4FB-DBC27373F5CD}"/>
+              </a:ext>
+            </a:extLst>
+          </p:cNvPr>
+          <p:cNvSpPr>
+            <a:spLocks noGrp="1"/>
+          </p:cNvSpPr>
+          <p:nvPr>
+            <p:ph idx="1"/>
+          </p:nvPr>
+        </p:nvSpPr>
+        <p:spPr/>
+        <p:txBody>
+          <a:bodyPr/>
+          <a:lstStyle/>
+          <a:p>
+            <a:r>
+              <a:rPr lang="pt-BR" dirty="0"/>
+              <a:t>Pesquise sobre como parâmetros eram representados em linguagens antigas, como </a:t>
+            </a:r>
+            <a:r>
+              <a:rPr lang="pt-BR" dirty="0" err="1"/>
+              <a:t>Runoff</a:t>
+            </a:r>
+            <a:r>
+              <a:rPr lang="pt-BR" dirty="0"/>
+              <a:t>, GML e SGML. </a:t>
+            </a:r>
+          </a:p>
+          <a:p>
+            <a:r>
+              <a:rPr lang="pt-BR" dirty="0"/>
+              <a:t>Peça ao ChatGPT que ele te ajude com boas fontes de pesquisa.</a:t>
+            </a:r>
+          </a:p>
+        </p:txBody>
+      </p:sp>
+    </p:spTree>
+    <p:extLst>
+      <p:ext uri="{BB962C8B-B14F-4D97-AF65-F5344CB8AC3E}">
+        <p14:creationId xmlns:p14="http://schemas.microsoft.com/office/powerpoint/2010/main" val="4235648682"/>
+      </p:ext>
+    </p:extLst>
+  </p:cSld>
+  <p:clrMapOvr>
+    <a:masterClrMapping/>
+  </p:clrMapOvr>
+</p:sld>
+</file>
+
 <file path=ppt/slides/slide12.xml><?xml version="1.0" encoding="utf-8"?>
 <p:sld xmlns:a="http://schemas.openxmlformats.org/drawingml/2006/main" xmlns:r="http://schemas.openxmlformats.org/officeDocument/2006/relationships" xmlns:p="http://schemas.openxmlformats.org/presentationml/2006/main">
   <p:cSld>

</xml_diff>

<commit_message>
Aula Sobre Tabelas no HTML
</commit_message>
<xml_diff>
--- a/Power Point/Curso de HTML e CSS.pptx
+++ b/Power Point/Curso de HTML e CSS.pptx
@@ -158,6 +158,15 @@
     <p:sldId id="407" r:id="rId152"/>
     <p:sldId id="408" r:id="rId153"/>
     <p:sldId id="409" r:id="rId154"/>
+    <p:sldId id="410" r:id="rId155"/>
+    <p:sldId id="411" r:id="rId156"/>
+    <p:sldId id="412" r:id="rId157"/>
+    <p:sldId id="413" r:id="rId158"/>
+    <p:sldId id="414" r:id="rId159"/>
+    <p:sldId id="418" r:id="rId160"/>
+    <p:sldId id="415" r:id="rId161"/>
+    <p:sldId id="416" r:id="rId162"/>
+    <p:sldId id="417" r:id="rId163"/>
   </p:sldIdLst>
   <p:sldSz cx="12192000" cy="6858000"/>
   <p:notesSz cx="6858000" cy="9144000"/>
@@ -420,7 +429,7 @@
           <a:p>
             <a:fld id="{02AC24A9-CCB6-4F8D-B8DB-C2F3692CFA5A}" type="datetimeFigureOut">
               <a:rPr lang="en-US" smtClean="0"/>
-              <a:t>6/17/2025</a:t>
+              <a:t>6/24/2025</a:t>
             </a:fld>
             <a:endParaRPr lang="en-US" dirty="0"/>
           </a:p>
@@ -790,7 +799,7 @@
           <a:p>
             <a:fld id="{02AC24A9-CCB6-4F8D-B8DB-C2F3692CFA5A}" type="datetimeFigureOut">
               <a:rPr lang="en-US" smtClean="0"/>
-              <a:t>6/17/2025</a:t>
+              <a:t>6/24/2025</a:t>
             </a:fld>
             <a:endParaRPr lang="en-US"/>
           </a:p>
@@ -999,7 +1008,7 @@
           <a:p>
             <a:fld id="{02AC24A9-CCB6-4F8D-B8DB-C2F3692CFA5A}" type="datetimeFigureOut">
               <a:rPr lang="en-US" smtClean="0"/>
-              <a:t>6/17/2025</a:t>
+              <a:t>6/24/2025</a:t>
             </a:fld>
             <a:endParaRPr lang="en-US"/>
           </a:p>
@@ -1469,7 +1478,7 @@
           <a:p>
             <a:fld id="{02AC24A9-CCB6-4F8D-B8DB-C2F3692CFA5A}" type="datetimeFigureOut">
               <a:rPr lang="en-US" smtClean="0"/>
-              <a:t>6/17/2025</a:t>
+              <a:t>6/24/2025</a:t>
             </a:fld>
             <a:endParaRPr lang="en-US"/>
           </a:p>
@@ -1923,7 +1932,7 @@
           <a:p>
             <a:fld id="{02AC24A9-CCB6-4F8D-B8DB-C2F3692CFA5A}" type="datetimeFigureOut">
               <a:rPr lang="en-US" smtClean="0"/>
-              <a:t>6/17/2025</a:t>
+              <a:t>6/24/2025</a:t>
             </a:fld>
             <a:endParaRPr lang="en-US"/>
           </a:p>
@@ -2455,7 +2464,7 @@
           <a:p>
             <a:fld id="{02AC24A9-CCB6-4F8D-B8DB-C2F3692CFA5A}" type="datetimeFigureOut">
               <a:rPr lang="en-US" smtClean="0"/>
-              <a:t>6/17/2025</a:t>
+              <a:t>6/24/2025</a:t>
             </a:fld>
             <a:endParaRPr lang="en-US"/>
           </a:p>
@@ -3154,7 +3163,7 @@
           <a:p>
             <a:fld id="{02AC24A9-CCB6-4F8D-B8DB-C2F3692CFA5A}" type="datetimeFigureOut">
               <a:rPr lang="en-US" smtClean="0"/>
-              <a:t>6/17/2025</a:t>
+              <a:t>6/24/2025</a:t>
             </a:fld>
             <a:endParaRPr lang="en-US"/>
           </a:p>
@@ -3483,7 +3492,7 @@
           <a:p>
             <a:fld id="{02AC24A9-CCB6-4F8D-B8DB-C2F3692CFA5A}" type="datetimeFigureOut">
               <a:rPr lang="en-US" smtClean="0"/>
-              <a:t>6/17/2025</a:t>
+              <a:t>6/24/2025</a:t>
             </a:fld>
             <a:endParaRPr lang="en-US"/>
           </a:p>
@@ -3596,7 +3605,7 @@
           <a:p>
             <a:fld id="{02AC24A9-CCB6-4F8D-B8DB-C2F3692CFA5A}" type="datetimeFigureOut">
               <a:rPr lang="en-US" smtClean="0"/>
-              <a:t>6/17/2025</a:t>
+              <a:t>6/24/2025</a:t>
             </a:fld>
             <a:endParaRPr lang="en-US"/>
           </a:p>
@@ -4091,7 +4100,7 @@
           <a:p>
             <a:fld id="{02AC24A9-CCB6-4F8D-B8DB-C2F3692CFA5A}" type="datetimeFigureOut">
               <a:rPr lang="en-US" smtClean="0"/>
-              <a:t>6/17/2025</a:t>
+              <a:t>6/24/2025</a:t>
             </a:fld>
             <a:endParaRPr lang="en-US" dirty="0"/>
           </a:p>
@@ -4568,7 +4577,7 @@
           <a:p>
             <a:fld id="{02AC24A9-CCB6-4F8D-B8DB-C2F3692CFA5A}" type="datetimeFigureOut">
               <a:rPr lang="en-US" smtClean="0"/>
-              <a:t>6/17/2025</a:t>
+              <a:t>6/24/2025</a:t>
             </a:fld>
             <a:endParaRPr lang="en-US"/>
           </a:p>
@@ -4811,7 +4820,7 @@
           <a:p>
             <a:fld id="{02AC24A9-CCB6-4F8D-B8DB-C2F3692CFA5A}" type="datetimeFigureOut">
               <a:rPr lang="en-US" smtClean="0"/>
-              <a:t>6/17/2025</a:t>
+              <a:t>6/24/2025</a:t>
             </a:fld>
             <a:endParaRPr lang="en-US"/>
           </a:p>
@@ -18998,6 +19007,2993 @@
 </p:sld>
 </file>
 
+<file path=ppt/slides/slide154.xml><?xml version="1.0" encoding="utf-8"?>
+<p:sld xmlns:a="http://schemas.openxmlformats.org/drawingml/2006/main" xmlns:r="http://schemas.openxmlformats.org/officeDocument/2006/relationships" xmlns:p="http://schemas.openxmlformats.org/presentationml/2006/main">
+  <p:cSld>
+    <p:spTree>
+      <p:nvGrpSpPr>
+        <p:cNvPr id="1" name=""/>
+        <p:cNvGrpSpPr/>
+        <p:nvPr/>
+      </p:nvGrpSpPr>
+      <p:grpSpPr>
+        <a:xfrm>
+          <a:off x="0" y="0"/>
+          <a:ext cx="0" cy="0"/>
+          <a:chOff x="0" y="0"/>
+          <a:chExt cx="0" cy="0"/>
+        </a:xfrm>
+      </p:grpSpPr>
+      <p:sp>
+        <p:nvSpPr>
+          <p:cNvPr id="2" name="Título 1">
+            <a:extLst>
+              <a:ext uri="{FF2B5EF4-FFF2-40B4-BE49-F238E27FC236}">
+                <a16:creationId xmlns:a16="http://schemas.microsoft.com/office/drawing/2014/main" id="{38F57FAC-6BE1-8F78-D37E-15E7975B9B19}"/>
+              </a:ext>
+            </a:extLst>
+          </p:cNvPr>
+          <p:cNvSpPr>
+            <a:spLocks noGrp="1"/>
+          </p:cNvSpPr>
+          <p:nvPr>
+            <p:ph type="title"/>
+          </p:nvPr>
+        </p:nvSpPr>
+        <p:spPr/>
+        <p:txBody>
+          <a:bodyPr/>
+          <a:lstStyle/>
+          <a:p>
+            <a:r>
+              <a:rPr lang="pt-BR" dirty="0"/>
+              <a:t>Lição de Casa</a:t>
+            </a:r>
+          </a:p>
+        </p:txBody>
+      </p:sp>
+      <p:sp>
+        <p:nvSpPr>
+          <p:cNvPr id="3" name="Espaço Reservado para Conteúdo 2">
+            <a:extLst>
+              <a:ext uri="{FF2B5EF4-FFF2-40B4-BE49-F238E27FC236}">
+                <a16:creationId xmlns:a16="http://schemas.microsoft.com/office/drawing/2014/main" id="{5BC8FCDB-D1DB-FA77-158D-4E13EA74EB74}"/>
+              </a:ext>
+            </a:extLst>
+          </p:cNvPr>
+          <p:cNvSpPr>
+            <a:spLocks noGrp="1"/>
+          </p:cNvSpPr>
+          <p:nvPr>
+            <p:ph idx="1"/>
+          </p:nvPr>
+        </p:nvSpPr>
+        <p:spPr/>
+        <p:txBody>
+          <a:bodyPr/>
+          <a:lstStyle/>
+          <a:p>
+            <a:r>
+              <a:rPr lang="pt-BR" dirty="0"/>
+              <a:t>Pesquise sobre métodos HTTP e sobre formas de você lidar com esses formulários no HTML. </a:t>
+            </a:r>
+          </a:p>
+        </p:txBody>
+      </p:sp>
+    </p:spTree>
+    <p:extLst>
+      <p:ext uri="{BB962C8B-B14F-4D97-AF65-F5344CB8AC3E}">
+        <p14:creationId xmlns:p14="http://schemas.microsoft.com/office/powerpoint/2010/main" val="2650802017"/>
+      </p:ext>
+    </p:extLst>
+  </p:cSld>
+  <p:clrMapOvr>
+    <a:masterClrMapping/>
+  </p:clrMapOvr>
+</p:sld>
+</file>
+
+<file path=ppt/slides/slide155.xml><?xml version="1.0" encoding="utf-8"?>
+<p:sld xmlns:a="http://schemas.openxmlformats.org/drawingml/2006/main" xmlns:r="http://schemas.openxmlformats.org/officeDocument/2006/relationships" xmlns:p="http://schemas.openxmlformats.org/presentationml/2006/main">
+  <p:cSld>
+    <p:bg>
+      <p:bgPr>
+        <a:solidFill>
+          <a:schemeClr val="bg1"/>
+        </a:solidFill>
+        <a:effectLst/>
+      </p:bgPr>
+    </p:bg>
+    <p:spTree>
+      <p:nvGrpSpPr>
+        <p:cNvPr id="1" name=""/>
+        <p:cNvGrpSpPr/>
+        <p:nvPr/>
+      </p:nvGrpSpPr>
+      <p:grpSpPr>
+        <a:xfrm>
+          <a:off x="0" y="0"/>
+          <a:ext cx="0" cy="0"/>
+          <a:chOff x="0" y="0"/>
+          <a:chExt cx="0" cy="0"/>
+        </a:xfrm>
+      </p:grpSpPr>
+      <p:sp>
+        <p:nvSpPr>
+          <p:cNvPr id="10" name="Rectangle 9">
+            <a:extLst>
+              <a:ext uri="{FF2B5EF4-FFF2-40B4-BE49-F238E27FC236}">
+                <a16:creationId xmlns:a16="http://schemas.microsoft.com/office/drawing/2014/main" id="{8D06CE56-3881-4ADA-8CEF-D18B02C242A3}"/>
+              </a:ext>
+              <a:ext uri="{C183D7F6-B498-43B3-948B-1728B52AA6E4}">
+                <adec:decorative xmlns:adec="http://schemas.microsoft.com/office/drawing/2017/decorative" val="1"/>
+              </a:ext>
+            </a:extLst>
+          </p:cNvPr>
+          <p:cNvSpPr>
+            <a:spLocks noGrp="1" noRot="1" noChangeAspect="1" noMove="1" noResize="1" noEditPoints="1" noAdjustHandles="1" noChangeArrowheads="1" noChangeShapeType="1" noTextEdit="1"/>
+          </p:cNvSpPr>
+          <p:nvPr>
+            <p:extLst>
+              <p:ext uri="{386F3935-93C4-4BCD-93E2-E3B085C9AB24}">
+                <p16:designElem xmlns:p16="http://schemas.microsoft.com/office/powerpoint/2015/main" val="1"/>
+              </p:ext>
+            </p:extLst>
+          </p:nvPr>
+        </p:nvSpPr>
+        <p:spPr>
+          <a:xfrm rot="5400000">
+            <a:off x="857544" y="346791"/>
+            <a:ext cx="146304" cy="704088"/>
+          </a:xfrm>
+          <a:prstGeom prst="rect">
+            <a:avLst/>
+          </a:prstGeom>
+          <a:solidFill>
+            <a:schemeClr val="accent1"/>
+          </a:solidFill>
+          <a:ln>
+            <a:noFill/>
+          </a:ln>
+        </p:spPr>
+        <p:style>
+          <a:lnRef idx="2">
+            <a:schemeClr val="accent1">
+              <a:shade val="50000"/>
+            </a:schemeClr>
+          </a:lnRef>
+          <a:fillRef idx="1">
+            <a:schemeClr val="accent1"/>
+          </a:fillRef>
+          <a:effectRef idx="0">
+            <a:schemeClr val="accent1"/>
+          </a:effectRef>
+          <a:fontRef idx="minor">
+            <a:schemeClr val="lt1"/>
+          </a:fontRef>
+        </p:style>
+        <p:txBody>
+          <a:bodyPr rtlCol="0" anchor="ctr"/>
+          <a:lstStyle/>
+          <a:p>
+            <a:pPr marL="0" marR="0" lvl="0" indent="0" algn="ctr" defTabSz="914400" rtl="0" eaLnBrk="1" fontAlgn="auto" latinLnBrk="0" hangingPunct="1">
+              <a:lnSpc>
+                <a:spcPct val="100000"/>
+              </a:lnSpc>
+              <a:spcBef>
+                <a:spcPts val="0"/>
+              </a:spcBef>
+              <a:spcAft>
+                <a:spcPts val="0"/>
+              </a:spcAft>
+              <a:buClrTx/>
+              <a:buSzTx/>
+              <a:buFontTx/>
+              <a:buNone/>
+              <a:tabLst/>
+              <a:defRPr/>
+            </a:pPr>
+            <a:endParaRPr kumimoji="0" lang="en-US" sz="1800" b="0" i="0" u="none" strike="noStrike" kern="1200" cap="none" spc="0" normalizeH="0" baseline="0" noProof="0">
+              <a:ln>
+                <a:noFill/>
+              </a:ln>
+              <a:solidFill>
+                <a:prstClr val="white"/>
+              </a:solidFill>
+              <a:effectLst/>
+              <a:uLnTx/>
+              <a:uFillTx/>
+              <a:latin typeface="Calibri" panose="020F0502020204030204"/>
+              <a:ea typeface="+mn-ea"/>
+              <a:cs typeface="+mn-cs"/>
+            </a:endParaRPr>
+          </a:p>
+        </p:txBody>
+      </p:sp>
+      <p:sp>
+        <p:nvSpPr>
+          <p:cNvPr id="12" name="Rectangle 11">
+            <a:extLst>
+              <a:ext uri="{FF2B5EF4-FFF2-40B4-BE49-F238E27FC236}">
+                <a16:creationId xmlns:a16="http://schemas.microsoft.com/office/drawing/2014/main" id="{79F3C543-62EC-4433-9C93-A2CD8764E9B4}"/>
+              </a:ext>
+              <a:ext uri="{C183D7F6-B498-43B3-948B-1728B52AA6E4}">
+                <adec:decorative xmlns:adec="http://schemas.microsoft.com/office/drawing/2017/decorative" val="1"/>
+              </a:ext>
+            </a:extLst>
+          </p:cNvPr>
+          <p:cNvSpPr>
+            <a:spLocks noGrp="1" noRot="1" noChangeAspect="1" noMove="1" noResize="1" noEditPoints="1" noAdjustHandles="1" noChangeArrowheads="1" noChangeShapeType="1" noTextEdit="1"/>
+          </p:cNvSpPr>
+          <p:nvPr>
+            <p:extLst>
+              <p:ext uri="{386F3935-93C4-4BCD-93E2-E3B085C9AB24}">
+                <p16:designElem xmlns:p16="http://schemas.microsoft.com/office/powerpoint/2015/main" val="1"/>
+              </p:ext>
+            </p:extLst>
+          </p:nvPr>
+        </p:nvSpPr>
+        <p:spPr>
+          <a:xfrm flipV="1">
+            <a:off x="578652" y="4501201"/>
+            <a:ext cx="11034696" cy="18288"/>
+          </a:xfrm>
+          <a:prstGeom prst="rect">
+            <a:avLst/>
+          </a:prstGeom>
+          <a:solidFill>
+            <a:schemeClr val="tx2">
+              <a:lumMod val="25000"/>
+              <a:lumOff val="75000"/>
+            </a:schemeClr>
+          </a:solidFill>
+          <a:ln w="3175">
+            <a:noFill/>
+          </a:ln>
+          <a:effectLst/>
+        </p:spPr>
+        <p:style>
+          <a:lnRef idx="2">
+            <a:schemeClr val="accent1">
+              <a:shade val="50000"/>
+            </a:schemeClr>
+          </a:lnRef>
+          <a:fillRef idx="1">
+            <a:schemeClr val="accent1"/>
+          </a:fillRef>
+          <a:effectRef idx="0">
+            <a:schemeClr val="accent1"/>
+          </a:effectRef>
+          <a:fontRef idx="minor">
+            <a:schemeClr val="lt1"/>
+          </a:fontRef>
+        </p:style>
+        <p:txBody>
+          <a:bodyPr rtlCol="0" anchor="ctr"/>
+          <a:lstStyle/>
+          <a:p>
+            <a:pPr marL="0" marR="0" lvl="0" indent="0" algn="ctr" defTabSz="914400" rtl="0" eaLnBrk="1" fontAlgn="auto" latinLnBrk="0" hangingPunct="1">
+              <a:lnSpc>
+                <a:spcPct val="100000"/>
+              </a:lnSpc>
+              <a:spcBef>
+                <a:spcPts val="0"/>
+              </a:spcBef>
+              <a:spcAft>
+                <a:spcPts val="0"/>
+              </a:spcAft>
+              <a:buClrTx/>
+              <a:buSzTx/>
+              <a:buFontTx/>
+              <a:buNone/>
+              <a:tabLst/>
+              <a:defRPr/>
+            </a:pPr>
+            <a:endParaRPr kumimoji="0" lang="en-US" sz="1800" b="0" i="0" u="none" strike="noStrike" kern="1200" cap="none" spc="0" normalizeH="0" baseline="0" noProof="0">
+              <a:ln>
+                <a:noFill/>
+              </a:ln>
+              <a:solidFill>
+                <a:prstClr val="white"/>
+              </a:solidFill>
+              <a:effectLst/>
+              <a:uLnTx/>
+              <a:uFillTx/>
+              <a:latin typeface="Calibri" panose="020F0502020204030204"/>
+              <a:ea typeface="+mn-ea"/>
+              <a:cs typeface="+mn-cs"/>
+            </a:endParaRPr>
+          </a:p>
+        </p:txBody>
+      </p:sp>
+      <p:sp useBgFill="1">
+        <p:nvSpPr>
+          <p:cNvPr id="14" name="Rectangle 13">
+            <a:extLst>
+              <a:ext uri="{FF2B5EF4-FFF2-40B4-BE49-F238E27FC236}">
+                <a16:creationId xmlns:a16="http://schemas.microsoft.com/office/drawing/2014/main" id="{E91DC736-0EF8-4F87-9146-EBF1D2EE4D3D}"/>
+              </a:ext>
+              <a:ext uri="{C183D7F6-B498-43B3-948B-1728B52AA6E4}">
+                <adec:decorative xmlns:adec="http://schemas.microsoft.com/office/drawing/2017/decorative" val="1"/>
+              </a:ext>
+            </a:extLst>
+          </p:cNvPr>
+          <p:cNvSpPr>
+            <a:spLocks noGrp="1" noRot="1" noChangeAspect="1" noMove="1" noResize="1" noEditPoints="1" noAdjustHandles="1" noChangeArrowheads="1" noChangeShapeType="1" noTextEdit="1"/>
+          </p:cNvSpPr>
+          <p:nvPr>
+            <p:extLst>
+              <p:ext uri="{386F3935-93C4-4BCD-93E2-E3B085C9AB24}">
+                <p16:designElem xmlns:p16="http://schemas.microsoft.com/office/powerpoint/2015/main" val="1"/>
+              </p:ext>
+            </p:extLst>
+          </p:nvPr>
+        </p:nvSpPr>
+        <p:spPr>
+          <a:xfrm>
+            <a:off x="0" y="0"/>
+            <a:ext cx="12192000" cy="6858000"/>
+          </a:xfrm>
+          <a:prstGeom prst="rect">
+            <a:avLst/>
+          </a:prstGeom>
+          <a:ln>
+            <a:noFill/>
+          </a:ln>
+        </p:spPr>
+        <p:style>
+          <a:lnRef idx="2">
+            <a:schemeClr val="accent1">
+              <a:shade val="50000"/>
+            </a:schemeClr>
+          </a:lnRef>
+          <a:fillRef idx="1">
+            <a:schemeClr val="accent1"/>
+          </a:fillRef>
+          <a:effectRef idx="0">
+            <a:schemeClr val="accent1"/>
+          </a:effectRef>
+          <a:fontRef idx="minor">
+            <a:schemeClr val="lt1"/>
+          </a:fontRef>
+        </p:style>
+        <p:txBody>
+          <a:bodyPr rtlCol="0" anchor="ctr"/>
+          <a:lstStyle/>
+          <a:p>
+            <a:pPr algn="ctr"/>
+            <a:endParaRPr lang="en-US"/>
+          </a:p>
+        </p:txBody>
+      </p:sp>
+      <p:pic>
+        <p:nvPicPr>
+          <p:cNvPr id="4" name="Content Placeholder 3" descr="Fundo do vetor de cores vibrantes salpicando">
+            <a:extLst>
+              <a:ext uri="{FF2B5EF4-FFF2-40B4-BE49-F238E27FC236}">
+                <a16:creationId xmlns:a16="http://schemas.microsoft.com/office/drawing/2014/main" id="{088476C5-21AE-2EA0-2DCF-E80A727A5130}"/>
+              </a:ext>
+            </a:extLst>
+          </p:cNvPr>
+          <p:cNvPicPr>
+            <a:picLocks noChangeAspect="1"/>
+          </p:cNvPicPr>
+          <p:nvPr/>
+        </p:nvPicPr>
+        <p:blipFill rotWithShape="1">
+          <a:blip r:embed="rId2"/>
+          <a:srcRect l="10975" r="3072" b="-1"/>
+          <a:stretch>
+            <a:fillRect/>
+          </a:stretch>
+        </p:blipFill>
+        <p:spPr>
+          <a:xfrm>
+            <a:off x="3523488" y="10"/>
+            <a:ext cx="8668512" cy="6857990"/>
+          </a:xfrm>
+          <a:prstGeom prst="rect">
+            <a:avLst/>
+          </a:prstGeom>
+        </p:spPr>
+      </p:pic>
+      <p:sp>
+        <p:nvSpPr>
+          <p:cNvPr id="16" name="Rectangle 15">
+            <a:extLst>
+              <a:ext uri="{FF2B5EF4-FFF2-40B4-BE49-F238E27FC236}">
+                <a16:creationId xmlns:a16="http://schemas.microsoft.com/office/drawing/2014/main" id="{097CD68E-23E3-4007-8847-CD0944C4F7BE}"/>
+              </a:ext>
+              <a:ext uri="{C183D7F6-B498-43B3-948B-1728B52AA6E4}">
+                <adec:decorative xmlns:adec="http://schemas.microsoft.com/office/drawing/2017/decorative" val="1"/>
+              </a:ext>
+            </a:extLst>
+          </p:cNvPr>
+          <p:cNvSpPr>
+            <a:spLocks noGrp="1" noRot="1" noChangeAspect="1" noMove="1" noResize="1" noEditPoints="1" noAdjustHandles="1" noChangeArrowheads="1" noChangeShapeType="1" noTextEdit="1"/>
+          </p:cNvSpPr>
+          <p:nvPr>
+            <p:extLst>
+              <p:ext uri="{386F3935-93C4-4BCD-93E2-E3B085C9AB24}">
+                <p16:designElem xmlns:p16="http://schemas.microsoft.com/office/powerpoint/2015/main" val="1"/>
+              </p:ext>
+            </p:extLst>
+          </p:nvPr>
+        </p:nvSpPr>
+        <p:spPr>
+          <a:xfrm>
+            <a:off x="0" y="0"/>
+            <a:ext cx="9756601" cy="6858000"/>
+          </a:xfrm>
+          <a:prstGeom prst="rect">
+            <a:avLst/>
+          </a:prstGeom>
+          <a:gradFill>
+            <a:gsLst>
+              <a:gs pos="58000">
+                <a:schemeClr val="bg1"/>
+              </a:gs>
+              <a:gs pos="35000">
+                <a:schemeClr val="bg1">
+                  <a:alpha val="79000"/>
+                </a:schemeClr>
+              </a:gs>
+              <a:gs pos="19000">
+                <a:schemeClr val="bg1">
+                  <a:alpha val="38000"/>
+                </a:schemeClr>
+              </a:gs>
+              <a:gs pos="0">
+                <a:schemeClr val="bg1">
+                  <a:alpha val="0"/>
+                </a:schemeClr>
+              </a:gs>
+              <a:gs pos="100000">
+                <a:schemeClr val="bg1"/>
+              </a:gs>
+            </a:gsLst>
+            <a:lin ang="10800000" scaled="0"/>
+          </a:gradFill>
+          <a:ln>
+            <a:noFill/>
+          </a:ln>
+        </p:spPr>
+        <p:style>
+          <a:lnRef idx="2">
+            <a:schemeClr val="accent1">
+              <a:shade val="50000"/>
+            </a:schemeClr>
+          </a:lnRef>
+          <a:fillRef idx="1">
+            <a:schemeClr val="accent1"/>
+          </a:fillRef>
+          <a:effectRef idx="0">
+            <a:schemeClr val="accent1"/>
+          </a:effectRef>
+          <a:fontRef idx="minor">
+            <a:schemeClr val="lt1"/>
+          </a:fontRef>
+        </p:style>
+        <p:txBody>
+          <a:bodyPr rtlCol="0" anchor="ctr"/>
+          <a:lstStyle/>
+          <a:p>
+            <a:pPr algn="ctr"/>
+            <a:endParaRPr lang="en-US" dirty="0"/>
+          </a:p>
+        </p:txBody>
+      </p:sp>
+      <p:sp>
+        <p:nvSpPr>
+          <p:cNvPr id="5" name="Título 1">
+            <a:extLst>
+              <a:ext uri="{FF2B5EF4-FFF2-40B4-BE49-F238E27FC236}">
+                <a16:creationId xmlns:a16="http://schemas.microsoft.com/office/drawing/2014/main" id="{545D98F7-F9E8-C2B8-31CD-2628396F9A5C}"/>
+              </a:ext>
+            </a:extLst>
+          </p:cNvPr>
+          <p:cNvSpPr>
+            <a:spLocks noGrp="1"/>
+          </p:cNvSpPr>
+          <p:nvPr>
+            <p:ph type="title"/>
+          </p:nvPr>
+        </p:nvSpPr>
+        <p:spPr>
+          <a:xfrm>
+            <a:off x="477981" y="1122363"/>
+            <a:ext cx="4023360" cy="3204134"/>
+          </a:xfrm>
+        </p:spPr>
+        <p:txBody>
+          <a:bodyPr vert="horz" lIns="91440" tIns="45720" rIns="91440" bIns="45720" rtlCol="0" anchor="b">
+            <a:normAutofit/>
+          </a:bodyPr>
+          <a:lstStyle/>
+          <a:p>
+            <a:r>
+              <a:rPr lang="en-US" sz="4800" dirty="0"/>
+              <a:t>Aula 11.2 – Inputs no HTML – </a:t>
+            </a:r>
+            <a:r>
+              <a:rPr lang="en-US" sz="4800" dirty="0" err="1"/>
+              <a:t>Parte</a:t>
+            </a:r>
+            <a:r>
+              <a:rPr lang="en-US" sz="4800" dirty="0"/>
+              <a:t> 1</a:t>
+            </a:r>
+          </a:p>
+        </p:txBody>
+      </p:sp>
+      <p:sp>
+        <p:nvSpPr>
+          <p:cNvPr id="18" name="Rectangle 17">
+            <a:extLst>
+              <a:ext uri="{FF2B5EF4-FFF2-40B4-BE49-F238E27FC236}">
+                <a16:creationId xmlns:a16="http://schemas.microsoft.com/office/drawing/2014/main" id="{AF2F604E-43BE-4DC3-B983-E071523364F8}"/>
+              </a:ext>
+              <a:ext uri="{C183D7F6-B498-43B3-948B-1728B52AA6E4}">
+                <adec:decorative xmlns:adec="http://schemas.microsoft.com/office/drawing/2017/decorative" val="1"/>
+              </a:ext>
+            </a:extLst>
+          </p:cNvPr>
+          <p:cNvSpPr>
+            <a:spLocks noGrp="1" noRot="1" noChangeAspect="1" noMove="1" noResize="1" noEditPoints="1" noAdjustHandles="1" noChangeArrowheads="1" noChangeShapeType="1" noTextEdit="1"/>
+          </p:cNvSpPr>
+          <p:nvPr>
+            <p:extLst>
+              <p:ext uri="{386F3935-93C4-4BCD-93E2-E3B085C9AB24}">
+                <p16:designElem xmlns:p16="http://schemas.microsoft.com/office/powerpoint/2015/main" val="1"/>
+              </p:ext>
+            </p:extLst>
+          </p:nvPr>
+        </p:nvSpPr>
+        <p:spPr>
+          <a:xfrm rot="5400000">
+            <a:off x="759921" y="346791"/>
+            <a:ext cx="146304" cy="704088"/>
+          </a:xfrm>
+          <a:prstGeom prst="rect">
+            <a:avLst/>
+          </a:prstGeom>
+          <a:solidFill>
+            <a:schemeClr val="accent1"/>
+          </a:solidFill>
+          <a:ln>
+            <a:noFill/>
+          </a:ln>
+        </p:spPr>
+        <p:style>
+          <a:lnRef idx="2">
+            <a:schemeClr val="accent1">
+              <a:shade val="50000"/>
+            </a:schemeClr>
+          </a:lnRef>
+          <a:fillRef idx="1">
+            <a:schemeClr val="accent1"/>
+          </a:fillRef>
+          <a:effectRef idx="0">
+            <a:schemeClr val="accent1"/>
+          </a:effectRef>
+          <a:fontRef idx="minor">
+            <a:schemeClr val="lt1"/>
+          </a:fontRef>
+        </p:style>
+        <p:txBody>
+          <a:bodyPr rtlCol="0" anchor="ctr"/>
+          <a:lstStyle/>
+          <a:p>
+            <a:pPr marL="0" marR="0" lvl="0" indent="0" algn="ctr" defTabSz="914400" rtl="0" eaLnBrk="1" fontAlgn="auto" latinLnBrk="0" hangingPunct="1">
+              <a:lnSpc>
+                <a:spcPct val="100000"/>
+              </a:lnSpc>
+              <a:spcBef>
+                <a:spcPts val="0"/>
+              </a:spcBef>
+              <a:spcAft>
+                <a:spcPts val="0"/>
+              </a:spcAft>
+              <a:buClrTx/>
+              <a:buSzTx/>
+              <a:buFontTx/>
+              <a:buNone/>
+              <a:tabLst/>
+              <a:defRPr/>
+            </a:pPr>
+            <a:endParaRPr kumimoji="0" lang="en-US" sz="1800" b="0" i="0" u="none" strike="noStrike" kern="1200" cap="none" spc="0" normalizeH="0" baseline="0" noProof="0">
+              <a:ln>
+                <a:noFill/>
+              </a:ln>
+              <a:solidFill>
+                <a:prstClr val="white"/>
+              </a:solidFill>
+              <a:effectLst/>
+              <a:uLnTx/>
+              <a:uFillTx/>
+              <a:latin typeface="Calibri" panose="020F0502020204030204"/>
+              <a:ea typeface="+mn-ea"/>
+              <a:cs typeface="+mn-cs"/>
+            </a:endParaRPr>
+          </a:p>
+        </p:txBody>
+      </p:sp>
+      <p:sp>
+        <p:nvSpPr>
+          <p:cNvPr id="20" name="Rectangle 19">
+            <a:extLst>
+              <a:ext uri="{FF2B5EF4-FFF2-40B4-BE49-F238E27FC236}">
+                <a16:creationId xmlns:a16="http://schemas.microsoft.com/office/drawing/2014/main" id="{08C9B587-E65E-4B52-B37C-ABEBB6E87928}"/>
+              </a:ext>
+              <a:ext uri="{C183D7F6-B498-43B3-948B-1728B52AA6E4}">
+                <adec:decorative xmlns:adec="http://schemas.microsoft.com/office/drawing/2017/decorative" val="1"/>
+              </a:ext>
+            </a:extLst>
+          </p:cNvPr>
+          <p:cNvSpPr>
+            <a:spLocks noGrp="1" noRot="1" noChangeAspect="1" noMove="1" noResize="1" noEditPoints="1" noAdjustHandles="1" noChangeArrowheads="1" noChangeShapeType="1" noTextEdit="1"/>
+          </p:cNvSpPr>
+          <p:nvPr>
+            <p:extLst>
+              <p:ext uri="{386F3935-93C4-4BCD-93E2-E3B085C9AB24}">
+                <p16:designElem xmlns:p16="http://schemas.microsoft.com/office/powerpoint/2015/main" val="1"/>
+              </p:ext>
+            </p:extLst>
+          </p:nvPr>
+        </p:nvSpPr>
+        <p:spPr>
+          <a:xfrm>
+            <a:off x="481029" y="4546920"/>
+            <a:ext cx="3977640" cy="18288"/>
+          </a:xfrm>
+          <a:prstGeom prst="rect">
+            <a:avLst/>
+          </a:prstGeom>
+          <a:solidFill>
+            <a:schemeClr val="tx2">
+              <a:lumMod val="25000"/>
+              <a:lumOff val="75000"/>
+            </a:schemeClr>
+          </a:solidFill>
+          <a:ln w="3175">
+            <a:solidFill>
+              <a:schemeClr val="tx2">
+                <a:lumMod val="25000"/>
+                <a:lumOff val="75000"/>
+              </a:schemeClr>
+            </a:solidFill>
+          </a:ln>
+          <a:effectLst/>
+        </p:spPr>
+        <p:style>
+          <a:lnRef idx="2">
+            <a:schemeClr val="accent1">
+              <a:shade val="50000"/>
+            </a:schemeClr>
+          </a:lnRef>
+          <a:fillRef idx="1">
+            <a:schemeClr val="accent1"/>
+          </a:fillRef>
+          <a:effectRef idx="0">
+            <a:schemeClr val="accent1"/>
+          </a:effectRef>
+          <a:fontRef idx="minor">
+            <a:schemeClr val="lt1"/>
+          </a:fontRef>
+        </p:style>
+        <p:txBody>
+          <a:bodyPr rtlCol="0" anchor="ctr"/>
+          <a:lstStyle/>
+          <a:p>
+            <a:pPr marL="0" marR="0" lvl="0" indent="0" algn="ctr" defTabSz="914400" rtl="0" eaLnBrk="1" fontAlgn="auto" latinLnBrk="0" hangingPunct="1">
+              <a:lnSpc>
+                <a:spcPct val="100000"/>
+              </a:lnSpc>
+              <a:spcBef>
+                <a:spcPts val="0"/>
+              </a:spcBef>
+              <a:spcAft>
+                <a:spcPts val="0"/>
+              </a:spcAft>
+              <a:buClrTx/>
+              <a:buSzTx/>
+              <a:buFontTx/>
+              <a:buNone/>
+              <a:tabLst/>
+              <a:defRPr/>
+            </a:pPr>
+            <a:endParaRPr kumimoji="0" lang="en-US" sz="1800" b="0" i="0" u="none" strike="noStrike" kern="1200" cap="none" spc="0" normalizeH="0" baseline="0" noProof="0">
+              <a:ln>
+                <a:noFill/>
+              </a:ln>
+              <a:solidFill>
+                <a:prstClr val="white"/>
+              </a:solidFill>
+              <a:effectLst/>
+              <a:uLnTx/>
+              <a:uFillTx/>
+              <a:latin typeface="Calibri" panose="020F0502020204030204"/>
+              <a:ea typeface="+mn-ea"/>
+              <a:cs typeface="+mn-cs"/>
+            </a:endParaRPr>
+          </a:p>
+        </p:txBody>
+      </p:sp>
+    </p:spTree>
+    <p:extLst>
+      <p:ext uri="{BB962C8B-B14F-4D97-AF65-F5344CB8AC3E}">
+        <p14:creationId xmlns:p14="http://schemas.microsoft.com/office/powerpoint/2010/main" val="2890743956"/>
+      </p:ext>
+    </p:extLst>
+  </p:cSld>
+  <p:clrMapOvr>
+    <a:masterClrMapping/>
+  </p:clrMapOvr>
+  <p:timing>
+    <p:tnLst>
+      <p:par>
+        <p:cTn id="1" dur="indefinite" restart="never" nodeType="tmRoot">
+          <p:childTnLst>
+            <p:seq concurrent="1" nextAc="seek">
+              <p:cTn id="2" dur="indefinite" nodeType="mainSeq">
+                <p:childTnLst>
+                  <p:par>
+                    <p:cTn id="3" fill="hold">
+                      <p:stCondLst>
+                        <p:cond delay="indefinite"/>
+                        <p:cond evt="onBegin" delay="0">
+                          <p:tn val="2"/>
+                        </p:cond>
+                      </p:stCondLst>
+                      <p:childTnLst>
+                        <p:par>
+                          <p:cTn id="4" fill="hold">
+                            <p:stCondLst>
+                              <p:cond delay="0"/>
+                            </p:stCondLst>
+                            <p:childTnLst>
+                              <p:par>
+                                <p:cTn id="5" presetID="10" presetClass="entr" presetSubtype="0" fill="hold" grpId="0" nodeType="withEffect">
+                                  <p:stCondLst>
+                                    <p:cond delay="1000"/>
+                                  </p:stCondLst>
+                                  <p:iterate type="lt">
+                                    <p:tmPct val="10000"/>
+                                  </p:iterate>
+                                  <p:childTnLst>
+                                    <p:set>
+                                      <p:cBhvr>
+                                        <p:cTn id="6" dur="1" fill="hold">
+                                          <p:stCondLst>
+                                            <p:cond delay="0"/>
+                                          </p:stCondLst>
+                                        </p:cTn>
+                                        <p:tgtEl>
+                                          <p:spTgt spid="5"/>
+                                        </p:tgtEl>
+                                        <p:attrNameLst>
+                                          <p:attrName>style.visibility</p:attrName>
+                                        </p:attrNameLst>
+                                      </p:cBhvr>
+                                      <p:to>
+                                        <p:strVal val="visible"/>
+                                      </p:to>
+                                    </p:set>
+                                    <p:animEffect transition="in" filter="fade">
+                                      <p:cBhvr>
+                                        <p:cTn id="7" dur="400"/>
+                                        <p:tgtEl>
+                                          <p:spTgt spid="5"/>
+                                        </p:tgtEl>
+                                      </p:cBhvr>
+                                    </p:animEffect>
+                                  </p:childTnLst>
+                                </p:cTn>
+                              </p:par>
+                            </p:childTnLst>
+                          </p:cTn>
+                        </p:par>
+                      </p:childTnLst>
+                    </p:cTn>
+                  </p:par>
+                </p:childTnLst>
+              </p:cTn>
+              <p:prevCondLst>
+                <p:cond evt="onPrev" delay="0">
+                  <p:tgtEl>
+                    <p:sldTgt/>
+                  </p:tgtEl>
+                </p:cond>
+              </p:prevCondLst>
+              <p:nextCondLst>
+                <p:cond evt="onNext" delay="0">
+                  <p:tgtEl>
+                    <p:sldTgt/>
+                  </p:tgtEl>
+                </p:cond>
+              </p:nextCondLst>
+            </p:seq>
+          </p:childTnLst>
+        </p:cTn>
+      </p:par>
+    </p:tnLst>
+    <p:bldLst>
+      <p:bldP spid="5" grpId="0"/>
+    </p:bldLst>
+  </p:timing>
+</p:sld>
+</file>
+
+<file path=ppt/slides/slide156.xml><?xml version="1.0" encoding="utf-8"?>
+<p:sld xmlns:a="http://schemas.openxmlformats.org/drawingml/2006/main" xmlns:r="http://schemas.openxmlformats.org/officeDocument/2006/relationships" xmlns:p="http://schemas.openxmlformats.org/presentationml/2006/main">
+  <p:cSld>
+    <p:spTree>
+      <p:nvGrpSpPr>
+        <p:cNvPr id="1" name=""/>
+        <p:cNvGrpSpPr/>
+        <p:nvPr/>
+      </p:nvGrpSpPr>
+      <p:grpSpPr>
+        <a:xfrm>
+          <a:off x="0" y="0"/>
+          <a:ext cx="0" cy="0"/>
+          <a:chOff x="0" y="0"/>
+          <a:chExt cx="0" cy="0"/>
+        </a:xfrm>
+      </p:grpSpPr>
+      <p:sp>
+        <p:nvSpPr>
+          <p:cNvPr id="2" name="Título 1">
+            <a:extLst>
+              <a:ext uri="{FF2B5EF4-FFF2-40B4-BE49-F238E27FC236}">
+                <a16:creationId xmlns:a16="http://schemas.microsoft.com/office/drawing/2014/main" id="{273C69C3-2DF0-B00C-20A2-B8B92EF0FCCA}"/>
+              </a:ext>
+            </a:extLst>
+          </p:cNvPr>
+          <p:cNvSpPr>
+            <a:spLocks noGrp="1"/>
+          </p:cNvSpPr>
+          <p:nvPr>
+            <p:ph type="title"/>
+          </p:nvPr>
+        </p:nvSpPr>
+        <p:spPr/>
+        <p:txBody>
+          <a:bodyPr/>
+          <a:lstStyle/>
+          <a:p>
+            <a:r>
+              <a:rPr lang="pt-BR" dirty="0" err="1"/>
+              <a:t>Tag</a:t>
+            </a:r>
+            <a:r>
+              <a:rPr lang="pt-BR" dirty="0"/>
+              <a:t> Input</a:t>
+            </a:r>
+          </a:p>
+        </p:txBody>
+      </p:sp>
+      <p:sp>
+        <p:nvSpPr>
+          <p:cNvPr id="3" name="Espaço Reservado para Conteúdo 2">
+            <a:extLst>
+              <a:ext uri="{FF2B5EF4-FFF2-40B4-BE49-F238E27FC236}">
+                <a16:creationId xmlns:a16="http://schemas.microsoft.com/office/drawing/2014/main" id="{637DB3D2-E77E-D10B-F908-F24AE1EEAC25}"/>
+              </a:ext>
+            </a:extLst>
+          </p:cNvPr>
+          <p:cNvSpPr>
+            <a:spLocks noGrp="1"/>
+          </p:cNvSpPr>
+          <p:nvPr>
+            <p:ph idx="1"/>
+          </p:nvPr>
+        </p:nvSpPr>
+        <p:spPr/>
+        <p:txBody>
+          <a:bodyPr/>
+          <a:lstStyle/>
+          <a:p>
+            <a:r>
+              <a:rPr lang="pt-BR" dirty="0"/>
+              <a:t>A </a:t>
+            </a:r>
+            <a:r>
+              <a:rPr lang="pt-BR" dirty="0" err="1"/>
+              <a:t>tag</a:t>
+            </a:r>
+            <a:r>
+              <a:rPr lang="pt-BR" dirty="0"/>
+              <a:t> input é a forma de fazer a entrada de dados no contexto da Web. </a:t>
+            </a:r>
+          </a:p>
+          <a:p>
+            <a:r>
+              <a:rPr lang="pt-BR" dirty="0"/>
+              <a:t>Na aula de hoje, mostrarei para vocês alguns </a:t>
+            </a:r>
+            <a:r>
+              <a:rPr lang="pt-BR" dirty="0" err="1"/>
+              <a:t>types</a:t>
+            </a:r>
+            <a:r>
+              <a:rPr lang="pt-BR" dirty="0"/>
+              <a:t> de cada input, especialmente de caracteres e de números. Vamos juntos?</a:t>
+            </a:r>
+          </a:p>
+        </p:txBody>
+      </p:sp>
+    </p:spTree>
+    <p:extLst>
+      <p:ext uri="{BB962C8B-B14F-4D97-AF65-F5344CB8AC3E}">
+        <p14:creationId xmlns:p14="http://schemas.microsoft.com/office/powerpoint/2010/main" val="1864397154"/>
+      </p:ext>
+    </p:extLst>
+  </p:cSld>
+  <p:clrMapOvr>
+    <a:masterClrMapping/>
+  </p:clrMapOvr>
+</p:sld>
+</file>
+
+<file path=ppt/slides/slide157.xml><?xml version="1.0" encoding="utf-8"?>
+<p:sld xmlns:a="http://schemas.openxmlformats.org/drawingml/2006/main" xmlns:r="http://schemas.openxmlformats.org/officeDocument/2006/relationships" xmlns:p="http://schemas.openxmlformats.org/presentationml/2006/main">
+  <p:cSld>
+    <p:spTree>
+      <p:nvGrpSpPr>
+        <p:cNvPr id="1" name=""/>
+        <p:cNvGrpSpPr/>
+        <p:nvPr/>
+      </p:nvGrpSpPr>
+      <p:grpSpPr>
+        <a:xfrm>
+          <a:off x="0" y="0"/>
+          <a:ext cx="0" cy="0"/>
+          <a:chOff x="0" y="0"/>
+          <a:chExt cx="0" cy="0"/>
+        </a:xfrm>
+      </p:grpSpPr>
+      <p:sp>
+        <p:nvSpPr>
+          <p:cNvPr id="2" name="Título 1">
+            <a:extLst>
+              <a:ext uri="{FF2B5EF4-FFF2-40B4-BE49-F238E27FC236}">
+                <a16:creationId xmlns:a16="http://schemas.microsoft.com/office/drawing/2014/main" id="{6F16C873-D51F-C8E6-CF21-BF9D7441859A}"/>
+              </a:ext>
+            </a:extLst>
+          </p:cNvPr>
+          <p:cNvSpPr>
+            <a:spLocks noGrp="1"/>
+          </p:cNvSpPr>
+          <p:nvPr>
+            <p:ph type="title"/>
+          </p:nvPr>
+        </p:nvSpPr>
+        <p:spPr/>
+        <p:txBody>
+          <a:bodyPr/>
+          <a:lstStyle/>
+          <a:p>
+            <a:r>
+              <a:rPr lang="pt-BR" dirty="0"/>
+              <a:t>Tipos de Caracteres</a:t>
+            </a:r>
+          </a:p>
+        </p:txBody>
+      </p:sp>
+      <p:graphicFrame>
+        <p:nvGraphicFramePr>
+          <p:cNvPr id="4" name="Espaço Reservado para Conteúdo 3">
+            <a:extLst>
+              <a:ext uri="{FF2B5EF4-FFF2-40B4-BE49-F238E27FC236}">
+                <a16:creationId xmlns:a16="http://schemas.microsoft.com/office/drawing/2014/main" id="{F7DA1CC8-0256-71BF-8DC9-591391D3AA4D}"/>
+              </a:ext>
+            </a:extLst>
+          </p:cNvPr>
+          <p:cNvGraphicFramePr>
+            <a:graphicFrameLocks noGrp="1"/>
+          </p:cNvGraphicFramePr>
+          <p:nvPr>
+            <p:ph idx="1"/>
+            <p:extLst>
+              <p:ext uri="{D42A27DB-BD31-4B8C-83A1-F6EECF244321}">
+                <p14:modId xmlns:p14="http://schemas.microsoft.com/office/powerpoint/2010/main" val="613881603"/>
+              </p:ext>
+            </p:extLst>
+          </p:nvPr>
+        </p:nvGraphicFramePr>
+        <p:xfrm>
+          <a:off x="1116013" y="2478088"/>
+          <a:ext cx="10167936" cy="2595880"/>
+        </p:xfrm>
+        <a:graphic>
+          <a:graphicData uri="http://schemas.openxmlformats.org/drawingml/2006/table">
+            <a:tbl>
+              <a:tblPr firstRow="1" bandRow="1">
+                <a:tableStyleId>{073A0DAA-6AF3-43AB-8588-CEC1D06C72B9}</a:tableStyleId>
+              </a:tblPr>
+              <a:tblGrid>
+                <a:gridCol w="1834221">
+                  <a:extLst>
+                    <a:ext uri="{9D8B030D-6E8A-4147-A177-3AD203B41FA5}">
+                      <a16:colId xmlns:a16="http://schemas.microsoft.com/office/drawing/2014/main" val="2173140494"/>
+                    </a:ext>
+                  </a:extLst>
+                </a:gridCol>
+                <a:gridCol w="8333715">
+                  <a:extLst>
+                    <a:ext uri="{9D8B030D-6E8A-4147-A177-3AD203B41FA5}">
+                      <a16:colId xmlns:a16="http://schemas.microsoft.com/office/drawing/2014/main" val="2773593355"/>
+                    </a:ext>
+                  </a:extLst>
+                </a:gridCol>
+              </a:tblGrid>
+              <a:tr h="370840">
+                <a:tc>
+                  <a:txBody>
+                    <a:bodyPr/>
+                    <a:lstStyle/>
+                    <a:p>
+                      <a:r>
+                        <a:rPr lang="pt-BR" dirty="0"/>
+                        <a:t>Tipo</a:t>
+                      </a:r>
+                    </a:p>
+                  </a:txBody>
+                  <a:tcPr/>
+                </a:tc>
+                <a:tc>
+                  <a:txBody>
+                    <a:bodyPr/>
+                    <a:lstStyle/>
+                    <a:p>
+                      <a:pPr marL="0" marR="0" lvl="0" indent="0" algn="l" defTabSz="914400" rtl="0" eaLnBrk="1" fontAlgn="auto" latinLnBrk="0" hangingPunct="1">
+                        <a:lnSpc>
+                          <a:spcPct val="100000"/>
+                        </a:lnSpc>
+                        <a:spcBef>
+                          <a:spcPts val="0"/>
+                        </a:spcBef>
+                        <a:spcAft>
+                          <a:spcPts val="0"/>
+                        </a:spcAft>
+                        <a:buClrTx/>
+                        <a:buSzTx/>
+                        <a:buFontTx/>
+                        <a:buNone/>
+                        <a:tabLst/>
+                        <a:defRPr/>
+                      </a:pPr>
+                      <a:r>
+                        <a:rPr lang="pt-BR" sz="1800" b="0" kern="1200" dirty="0">
+                          <a:solidFill>
+                            <a:schemeClr val="lt1"/>
+                          </a:solidFill>
+                          <a:effectLst/>
+                          <a:latin typeface="+mn-lt"/>
+                          <a:ea typeface="+mn-ea"/>
+                          <a:cs typeface="+mn-cs"/>
+                        </a:rPr>
+                        <a:t>Função</a:t>
+                      </a:r>
+                    </a:p>
+                  </a:txBody>
+                  <a:tcPr/>
+                </a:tc>
+                <a:extLst>
+                  <a:ext uri="{0D108BD9-81ED-4DB2-BD59-A6C34878D82A}">
+                    <a16:rowId xmlns:a16="http://schemas.microsoft.com/office/drawing/2014/main" val="319983582"/>
+                  </a:ext>
+                </a:extLst>
+              </a:tr>
+              <a:tr h="370840">
+                <a:tc>
+                  <a:txBody>
+                    <a:bodyPr/>
+                    <a:lstStyle/>
+                    <a:p>
+                      <a:pPr marL="0" marR="0" lvl="0" indent="0" algn="l" defTabSz="914400" rtl="0" eaLnBrk="1" fontAlgn="auto" latinLnBrk="0" hangingPunct="1">
+                        <a:lnSpc>
+                          <a:spcPct val="100000"/>
+                        </a:lnSpc>
+                        <a:spcBef>
+                          <a:spcPts val="0"/>
+                        </a:spcBef>
+                        <a:spcAft>
+                          <a:spcPts val="0"/>
+                        </a:spcAft>
+                        <a:buClrTx/>
+                        <a:buSzTx/>
+                        <a:buFontTx/>
+                        <a:buNone/>
+                        <a:tabLst/>
+                        <a:defRPr/>
+                      </a:pPr>
+                      <a:r>
+                        <a:rPr lang="pt-BR" sz="1800" b="0" kern="1200" dirty="0" err="1">
+                          <a:solidFill>
+                            <a:schemeClr val="dk1"/>
+                          </a:solidFill>
+                          <a:effectLst/>
+                          <a:latin typeface="+mn-lt"/>
+                          <a:ea typeface="+mn-ea"/>
+                          <a:cs typeface="+mn-cs"/>
+                        </a:rPr>
+                        <a:t>text</a:t>
+                      </a:r>
+                      <a:endParaRPr lang="pt-BR" sz="1800" b="0" kern="1200" dirty="0">
+                        <a:solidFill>
+                          <a:schemeClr val="dk1"/>
+                        </a:solidFill>
+                        <a:effectLst/>
+                        <a:latin typeface="+mn-lt"/>
+                        <a:ea typeface="+mn-ea"/>
+                        <a:cs typeface="+mn-cs"/>
+                      </a:endParaRPr>
+                    </a:p>
+                  </a:txBody>
+                  <a:tcPr/>
+                </a:tc>
+                <a:tc>
+                  <a:txBody>
+                    <a:bodyPr/>
+                    <a:lstStyle/>
+                    <a:p>
+                      <a:pPr marL="0" marR="0" lvl="0" indent="0" algn="l" defTabSz="914400" rtl="0" eaLnBrk="1" fontAlgn="auto" latinLnBrk="0" hangingPunct="1">
+                        <a:lnSpc>
+                          <a:spcPct val="100000"/>
+                        </a:lnSpc>
+                        <a:spcBef>
+                          <a:spcPts val="0"/>
+                        </a:spcBef>
+                        <a:spcAft>
+                          <a:spcPts val="0"/>
+                        </a:spcAft>
+                        <a:buClrTx/>
+                        <a:buSzTx/>
+                        <a:buFontTx/>
+                        <a:buNone/>
+                        <a:tabLst/>
+                        <a:defRPr/>
+                      </a:pPr>
+                      <a:r>
+                        <a:rPr lang="pt-BR" sz="1800" b="0" kern="1200" dirty="0">
+                          <a:solidFill>
+                            <a:schemeClr val="dk1"/>
+                          </a:solidFill>
+                          <a:effectLst/>
+                          <a:latin typeface="+mn-lt"/>
+                          <a:ea typeface="+mn-ea"/>
+                          <a:cs typeface="+mn-cs"/>
+                        </a:rPr>
+                        <a:t>Tipo padrão, voltado para </a:t>
+                      </a:r>
+                      <a:r>
+                        <a:rPr lang="pt-BR" sz="1800" b="0" kern="1200" dirty="0" err="1">
+                          <a:solidFill>
+                            <a:schemeClr val="dk1"/>
+                          </a:solidFill>
+                          <a:effectLst/>
+                          <a:latin typeface="+mn-lt"/>
+                          <a:ea typeface="+mn-ea"/>
+                          <a:cs typeface="+mn-cs"/>
+                        </a:rPr>
+                        <a:t>strings</a:t>
+                      </a:r>
+                      <a:r>
+                        <a:rPr lang="pt-BR" sz="1800" b="0" kern="1200" dirty="0">
+                          <a:solidFill>
+                            <a:schemeClr val="dk1"/>
+                          </a:solidFill>
+                          <a:effectLst/>
+                          <a:latin typeface="+mn-lt"/>
+                          <a:ea typeface="+mn-ea"/>
+                          <a:cs typeface="+mn-cs"/>
+                        </a:rPr>
+                        <a:t> normais.</a:t>
+                      </a:r>
+                    </a:p>
+                  </a:txBody>
+                  <a:tcPr/>
+                </a:tc>
+                <a:extLst>
+                  <a:ext uri="{0D108BD9-81ED-4DB2-BD59-A6C34878D82A}">
+                    <a16:rowId xmlns:a16="http://schemas.microsoft.com/office/drawing/2014/main" val="66480468"/>
+                  </a:ext>
+                </a:extLst>
+              </a:tr>
+              <a:tr h="370840">
+                <a:tc>
+                  <a:txBody>
+                    <a:bodyPr/>
+                    <a:lstStyle/>
+                    <a:p>
+                      <a:pPr marL="0" marR="0" lvl="0" indent="0" algn="l" defTabSz="914400" rtl="0" eaLnBrk="1" fontAlgn="auto" latinLnBrk="0" hangingPunct="1">
+                        <a:lnSpc>
+                          <a:spcPct val="100000"/>
+                        </a:lnSpc>
+                        <a:spcBef>
+                          <a:spcPts val="0"/>
+                        </a:spcBef>
+                        <a:spcAft>
+                          <a:spcPts val="0"/>
+                        </a:spcAft>
+                        <a:buClrTx/>
+                        <a:buSzTx/>
+                        <a:buFontTx/>
+                        <a:buNone/>
+                        <a:tabLst/>
+                        <a:defRPr/>
+                      </a:pPr>
+                      <a:r>
+                        <a:rPr lang="pt-BR" sz="1800" b="0" kern="1200" dirty="0" err="1">
+                          <a:solidFill>
+                            <a:schemeClr val="dk1"/>
+                          </a:solidFill>
+                          <a:effectLst/>
+                          <a:latin typeface="+mn-lt"/>
+                          <a:ea typeface="+mn-ea"/>
+                          <a:cs typeface="+mn-cs"/>
+                        </a:rPr>
+                        <a:t>password</a:t>
+                      </a:r>
+                      <a:endParaRPr lang="pt-BR" sz="1800" b="0" kern="1200" dirty="0">
+                        <a:solidFill>
+                          <a:schemeClr val="dk1"/>
+                        </a:solidFill>
+                        <a:effectLst/>
+                        <a:latin typeface="+mn-lt"/>
+                        <a:ea typeface="+mn-ea"/>
+                        <a:cs typeface="+mn-cs"/>
+                      </a:endParaRPr>
+                    </a:p>
+                  </a:txBody>
+                  <a:tcPr/>
+                </a:tc>
+                <a:tc>
+                  <a:txBody>
+                    <a:bodyPr/>
+                    <a:lstStyle/>
+                    <a:p>
+                      <a:pPr marL="0" marR="0" lvl="0" indent="0" algn="l" defTabSz="914400" rtl="0" eaLnBrk="1" fontAlgn="auto" latinLnBrk="0" hangingPunct="1">
+                        <a:lnSpc>
+                          <a:spcPct val="100000"/>
+                        </a:lnSpc>
+                        <a:spcBef>
+                          <a:spcPts val="0"/>
+                        </a:spcBef>
+                        <a:spcAft>
+                          <a:spcPts val="0"/>
+                        </a:spcAft>
+                        <a:buClrTx/>
+                        <a:buSzTx/>
+                        <a:buFontTx/>
+                        <a:buNone/>
+                        <a:tabLst/>
+                        <a:defRPr/>
+                      </a:pPr>
+                      <a:r>
+                        <a:rPr lang="pt-BR" sz="1800" b="0" kern="1200" dirty="0">
+                          <a:solidFill>
+                            <a:schemeClr val="dk1"/>
+                          </a:solidFill>
+                          <a:effectLst/>
+                          <a:latin typeface="+mn-lt"/>
+                          <a:ea typeface="+mn-ea"/>
+                          <a:cs typeface="+mn-cs"/>
+                        </a:rPr>
+                        <a:t>Voltado para senhas, os caracteres permanecem ocultos.</a:t>
+                      </a:r>
+                    </a:p>
+                  </a:txBody>
+                  <a:tcPr/>
+                </a:tc>
+                <a:extLst>
+                  <a:ext uri="{0D108BD9-81ED-4DB2-BD59-A6C34878D82A}">
+                    <a16:rowId xmlns:a16="http://schemas.microsoft.com/office/drawing/2014/main" val="1515798651"/>
+                  </a:ext>
+                </a:extLst>
+              </a:tr>
+              <a:tr h="370840">
+                <a:tc>
+                  <a:txBody>
+                    <a:bodyPr/>
+                    <a:lstStyle/>
+                    <a:p>
+                      <a:pPr marL="0" marR="0" lvl="0" indent="0" algn="l" defTabSz="914400" rtl="0" eaLnBrk="1" fontAlgn="auto" latinLnBrk="0" hangingPunct="1">
+                        <a:lnSpc>
+                          <a:spcPct val="100000"/>
+                        </a:lnSpc>
+                        <a:spcBef>
+                          <a:spcPts val="0"/>
+                        </a:spcBef>
+                        <a:spcAft>
+                          <a:spcPts val="0"/>
+                        </a:spcAft>
+                        <a:buClrTx/>
+                        <a:buSzTx/>
+                        <a:buFontTx/>
+                        <a:buNone/>
+                        <a:tabLst/>
+                        <a:defRPr/>
+                      </a:pPr>
+                      <a:r>
+                        <a:rPr lang="pt-BR" sz="1800" b="0" kern="1200" dirty="0" err="1">
+                          <a:solidFill>
+                            <a:schemeClr val="dk1"/>
+                          </a:solidFill>
+                          <a:effectLst/>
+                          <a:latin typeface="+mn-lt"/>
+                          <a:ea typeface="+mn-ea"/>
+                          <a:cs typeface="+mn-cs"/>
+                        </a:rPr>
+                        <a:t>email</a:t>
+                      </a:r>
+                      <a:endParaRPr lang="pt-BR" sz="1800" b="0" kern="1200" dirty="0">
+                        <a:solidFill>
+                          <a:schemeClr val="dk1"/>
+                        </a:solidFill>
+                        <a:effectLst/>
+                        <a:latin typeface="+mn-lt"/>
+                        <a:ea typeface="+mn-ea"/>
+                        <a:cs typeface="+mn-cs"/>
+                      </a:endParaRPr>
+                    </a:p>
+                  </a:txBody>
+                  <a:tcPr/>
+                </a:tc>
+                <a:tc>
+                  <a:txBody>
+                    <a:bodyPr/>
+                    <a:lstStyle/>
+                    <a:p>
+                      <a:pPr marL="0" marR="0" lvl="0" indent="0" algn="l" defTabSz="914400" rtl="0" eaLnBrk="1" fontAlgn="auto" latinLnBrk="0" hangingPunct="1">
+                        <a:lnSpc>
+                          <a:spcPct val="100000"/>
+                        </a:lnSpc>
+                        <a:spcBef>
+                          <a:spcPts val="0"/>
+                        </a:spcBef>
+                        <a:spcAft>
+                          <a:spcPts val="0"/>
+                        </a:spcAft>
+                        <a:buClrTx/>
+                        <a:buSzTx/>
+                        <a:buFontTx/>
+                        <a:buNone/>
+                        <a:tabLst/>
+                        <a:defRPr/>
+                      </a:pPr>
+                      <a:r>
+                        <a:rPr lang="pt-BR" sz="1800" b="0" kern="1200" dirty="0">
+                          <a:solidFill>
+                            <a:schemeClr val="dk1"/>
+                          </a:solidFill>
+                          <a:effectLst/>
+                          <a:latin typeface="+mn-lt"/>
+                          <a:ea typeface="+mn-ea"/>
+                          <a:cs typeface="+mn-cs"/>
+                        </a:rPr>
+                        <a:t>Voltado para campos de e-mail e inclusive exige um arroba @</a:t>
+                      </a:r>
+                    </a:p>
+                  </a:txBody>
+                  <a:tcPr/>
+                </a:tc>
+                <a:extLst>
+                  <a:ext uri="{0D108BD9-81ED-4DB2-BD59-A6C34878D82A}">
+                    <a16:rowId xmlns:a16="http://schemas.microsoft.com/office/drawing/2014/main" val="3000448058"/>
+                  </a:ext>
+                </a:extLst>
+              </a:tr>
+              <a:tr h="370840">
+                <a:tc>
+                  <a:txBody>
+                    <a:bodyPr/>
+                    <a:lstStyle/>
+                    <a:p>
+                      <a:pPr marL="0" marR="0" lvl="0" indent="0" algn="l" defTabSz="914400" rtl="0" eaLnBrk="1" fontAlgn="auto" latinLnBrk="0" hangingPunct="1">
+                        <a:lnSpc>
+                          <a:spcPct val="100000"/>
+                        </a:lnSpc>
+                        <a:spcBef>
+                          <a:spcPts val="0"/>
+                        </a:spcBef>
+                        <a:spcAft>
+                          <a:spcPts val="0"/>
+                        </a:spcAft>
+                        <a:buClrTx/>
+                        <a:buSzTx/>
+                        <a:buFontTx/>
+                        <a:buNone/>
+                        <a:tabLst/>
+                        <a:defRPr/>
+                      </a:pPr>
+                      <a:r>
+                        <a:rPr lang="pt-BR" sz="1800" b="0" kern="1200" dirty="0" err="1">
+                          <a:solidFill>
+                            <a:schemeClr val="dk1"/>
+                          </a:solidFill>
+                          <a:effectLst/>
+                          <a:latin typeface="+mn-lt"/>
+                          <a:ea typeface="+mn-ea"/>
+                          <a:cs typeface="+mn-cs"/>
+                        </a:rPr>
+                        <a:t>search</a:t>
+                      </a:r>
+                      <a:endParaRPr lang="pt-BR" sz="1800" b="0" kern="1200" dirty="0">
+                        <a:solidFill>
+                          <a:schemeClr val="dk1"/>
+                        </a:solidFill>
+                        <a:effectLst/>
+                        <a:latin typeface="+mn-lt"/>
+                        <a:ea typeface="+mn-ea"/>
+                        <a:cs typeface="+mn-cs"/>
+                      </a:endParaRPr>
+                    </a:p>
+                  </a:txBody>
+                  <a:tcPr/>
+                </a:tc>
+                <a:tc>
+                  <a:txBody>
+                    <a:bodyPr/>
+                    <a:lstStyle/>
+                    <a:p>
+                      <a:pPr marL="0" marR="0" lvl="0" indent="0" algn="l" defTabSz="914400" rtl="0" eaLnBrk="1" fontAlgn="auto" latinLnBrk="0" hangingPunct="1">
+                        <a:lnSpc>
+                          <a:spcPct val="100000"/>
+                        </a:lnSpc>
+                        <a:spcBef>
+                          <a:spcPts val="0"/>
+                        </a:spcBef>
+                        <a:spcAft>
+                          <a:spcPts val="0"/>
+                        </a:spcAft>
+                        <a:buClrTx/>
+                        <a:buSzTx/>
+                        <a:buFontTx/>
+                        <a:buNone/>
+                        <a:tabLst/>
+                        <a:defRPr/>
+                      </a:pPr>
+                      <a:r>
+                        <a:rPr lang="pt-BR" sz="1800" b="0" kern="1200" dirty="0">
+                          <a:solidFill>
+                            <a:schemeClr val="dk1"/>
+                          </a:solidFill>
+                          <a:effectLst/>
+                          <a:latin typeface="+mn-lt"/>
+                          <a:ea typeface="+mn-ea"/>
+                          <a:cs typeface="+mn-cs"/>
+                        </a:rPr>
+                        <a:t>Voltado para permitir que os usuários façam buscas em sua página</a:t>
+                      </a:r>
+                    </a:p>
+                  </a:txBody>
+                  <a:tcPr/>
+                </a:tc>
+                <a:extLst>
+                  <a:ext uri="{0D108BD9-81ED-4DB2-BD59-A6C34878D82A}">
+                    <a16:rowId xmlns:a16="http://schemas.microsoft.com/office/drawing/2014/main" val="2258056580"/>
+                  </a:ext>
+                </a:extLst>
+              </a:tr>
+              <a:tr h="370840">
+                <a:tc>
+                  <a:txBody>
+                    <a:bodyPr/>
+                    <a:lstStyle/>
+                    <a:p>
+                      <a:pPr marL="0" marR="0" lvl="0" indent="0" algn="l" defTabSz="914400" rtl="0" eaLnBrk="1" fontAlgn="auto" latinLnBrk="0" hangingPunct="1">
+                        <a:lnSpc>
+                          <a:spcPct val="100000"/>
+                        </a:lnSpc>
+                        <a:spcBef>
+                          <a:spcPts val="0"/>
+                        </a:spcBef>
+                        <a:spcAft>
+                          <a:spcPts val="0"/>
+                        </a:spcAft>
+                        <a:buClrTx/>
+                        <a:buSzTx/>
+                        <a:buFontTx/>
+                        <a:buNone/>
+                        <a:tabLst/>
+                        <a:defRPr/>
+                      </a:pPr>
+                      <a:r>
+                        <a:rPr lang="pt-BR" sz="1800" b="0" kern="1200" dirty="0" err="1">
+                          <a:solidFill>
+                            <a:schemeClr val="dk1"/>
+                          </a:solidFill>
+                          <a:effectLst/>
+                          <a:latin typeface="+mn-lt"/>
+                          <a:ea typeface="+mn-ea"/>
+                          <a:cs typeface="+mn-cs"/>
+                        </a:rPr>
+                        <a:t>tel</a:t>
+                      </a:r>
+                      <a:endParaRPr lang="pt-BR" sz="1800" b="0" kern="1200" dirty="0">
+                        <a:solidFill>
+                          <a:schemeClr val="dk1"/>
+                        </a:solidFill>
+                        <a:effectLst/>
+                        <a:latin typeface="+mn-lt"/>
+                        <a:ea typeface="+mn-ea"/>
+                        <a:cs typeface="+mn-cs"/>
+                      </a:endParaRPr>
+                    </a:p>
+                  </a:txBody>
+                  <a:tcPr/>
+                </a:tc>
+                <a:tc>
+                  <a:txBody>
+                    <a:bodyPr/>
+                    <a:lstStyle/>
+                    <a:p>
+                      <a:pPr marL="0" marR="0" lvl="0" indent="0" algn="l" defTabSz="914400" rtl="0" eaLnBrk="1" fontAlgn="auto" latinLnBrk="0" hangingPunct="1">
+                        <a:lnSpc>
+                          <a:spcPct val="100000"/>
+                        </a:lnSpc>
+                        <a:spcBef>
+                          <a:spcPts val="0"/>
+                        </a:spcBef>
+                        <a:spcAft>
+                          <a:spcPts val="0"/>
+                        </a:spcAft>
+                        <a:buClrTx/>
+                        <a:buSzTx/>
+                        <a:buFontTx/>
+                        <a:buNone/>
+                        <a:tabLst/>
+                        <a:defRPr/>
+                      </a:pPr>
+                      <a:r>
+                        <a:rPr lang="pt-BR" sz="1800" b="0" kern="1200" dirty="0">
+                          <a:solidFill>
+                            <a:schemeClr val="dk1"/>
+                          </a:solidFill>
+                          <a:effectLst/>
+                          <a:latin typeface="+mn-lt"/>
+                          <a:ea typeface="+mn-ea"/>
+                          <a:cs typeface="+mn-cs"/>
+                        </a:rPr>
+                        <a:t>Voltado para dados de Telefones</a:t>
+                      </a:r>
+                    </a:p>
+                  </a:txBody>
+                  <a:tcPr/>
+                </a:tc>
+                <a:extLst>
+                  <a:ext uri="{0D108BD9-81ED-4DB2-BD59-A6C34878D82A}">
+                    <a16:rowId xmlns:a16="http://schemas.microsoft.com/office/drawing/2014/main" val="831452813"/>
+                  </a:ext>
+                </a:extLst>
+              </a:tr>
+              <a:tr h="370840">
+                <a:tc>
+                  <a:txBody>
+                    <a:bodyPr/>
+                    <a:lstStyle/>
+                    <a:p>
+                      <a:pPr marL="0" marR="0" lvl="0" indent="0" algn="l" defTabSz="914400" rtl="0" eaLnBrk="1" fontAlgn="auto" latinLnBrk="0" hangingPunct="1">
+                        <a:lnSpc>
+                          <a:spcPct val="100000"/>
+                        </a:lnSpc>
+                        <a:spcBef>
+                          <a:spcPts val="0"/>
+                        </a:spcBef>
+                        <a:spcAft>
+                          <a:spcPts val="0"/>
+                        </a:spcAft>
+                        <a:buClrTx/>
+                        <a:buSzTx/>
+                        <a:buFontTx/>
+                        <a:buNone/>
+                        <a:tabLst/>
+                        <a:defRPr/>
+                      </a:pPr>
+                      <a:r>
+                        <a:rPr lang="pt-BR" sz="1800" b="0" kern="1200" dirty="0" err="1">
+                          <a:solidFill>
+                            <a:schemeClr val="dk1"/>
+                          </a:solidFill>
+                          <a:effectLst/>
+                          <a:latin typeface="+mn-lt"/>
+                          <a:ea typeface="+mn-ea"/>
+                          <a:cs typeface="+mn-cs"/>
+                        </a:rPr>
+                        <a:t>url</a:t>
+                      </a:r>
+                      <a:endParaRPr lang="pt-BR" sz="1800" b="0" kern="1200" dirty="0">
+                        <a:solidFill>
+                          <a:schemeClr val="dk1"/>
+                        </a:solidFill>
+                        <a:effectLst/>
+                        <a:latin typeface="+mn-lt"/>
+                        <a:ea typeface="+mn-ea"/>
+                        <a:cs typeface="+mn-cs"/>
+                      </a:endParaRPr>
+                    </a:p>
+                  </a:txBody>
+                  <a:tcPr/>
+                </a:tc>
+                <a:tc>
+                  <a:txBody>
+                    <a:bodyPr/>
+                    <a:lstStyle/>
+                    <a:p>
+                      <a:pPr marL="0" marR="0" lvl="0" indent="0" algn="l" defTabSz="914400" rtl="0" eaLnBrk="1" fontAlgn="auto" latinLnBrk="0" hangingPunct="1">
+                        <a:lnSpc>
+                          <a:spcPct val="100000"/>
+                        </a:lnSpc>
+                        <a:spcBef>
+                          <a:spcPts val="0"/>
+                        </a:spcBef>
+                        <a:spcAft>
+                          <a:spcPts val="0"/>
+                        </a:spcAft>
+                        <a:buClrTx/>
+                        <a:buSzTx/>
+                        <a:buFontTx/>
+                        <a:buNone/>
+                        <a:tabLst/>
+                        <a:defRPr/>
+                      </a:pPr>
+                      <a:r>
+                        <a:rPr lang="pt-BR" sz="1800" b="0" kern="1200" dirty="0">
+                          <a:solidFill>
+                            <a:schemeClr val="dk1"/>
+                          </a:solidFill>
+                          <a:effectLst/>
+                          <a:latin typeface="+mn-lt"/>
+                          <a:ea typeface="+mn-ea"/>
+                          <a:cs typeface="+mn-cs"/>
+                        </a:rPr>
+                        <a:t>Recebe URLs.</a:t>
+                      </a:r>
+                    </a:p>
+                  </a:txBody>
+                  <a:tcPr/>
+                </a:tc>
+                <a:extLst>
+                  <a:ext uri="{0D108BD9-81ED-4DB2-BD59-A6C34878D82A}">
+                    <a16:rowId xmlns:a16="http://schemas.microsoft.com/office/drawing/2014/main" val="4012635317"/>
+                  </a:ext>
+                </a:extLst>
+              </a:tr>
+            </a:tbl>
+          </a:graphicData>
+        </a:graphic>
+      </p:graphicFrame>
+    </p:spTree>
+    <p:extLst>
+      <p:ext uri="{BB962C8B-B14F-4D97-AF65-F5344CB8AC3E}">
+        <p14:creationId xmlns:p14="http://schemas.microsoft.com/office/powerpoint/2010/main" val="387788317"/>
+      </p:ext>
+    </p:extLst>
+  </p:cSld>
+  <p:clrMapOvr>
+    <a:masterClrMapping/>
+  </p:clrMapOvr>
+</p:sld>
+</file>
+
+<file path=ppt/slides/slide158.xml><?xml version="1.0" encoding="utf-8"?>
+<p:sld xmlns:a="http://schemas.openxmlformats.org/drawingml/2006/main" xmlns:r="http://schemas.openxmlformats.org/officeDocument/2006/relationships" xmlns:p="http://schemas.openxmlformats.org/presentationml/2006/main">
+  <p:cSld>
+    <p:spTree>
+      <p:nvGrpSpPr>
+        <p:cNvPr id="1" name=""/>
+        <p:cNvGrpSpPr/>
+        <p:nvPr/>
+      </p:nvGrpSpPr>
+      <p:grpSpPr>
+        <a:xfrm>
+          <a:off x="0" y="0"/>
+          <a:ext cx="0" cy="0"/>
+          <a:chOff x="0" y="0"/>
+          <a:chExt cx="0" cy="0"/>
+        </a:xfrm>
+      </p:grpSpPr>
+      <p:sp>
+        <p:nvSpPr>
+          <p:cNvPr id="2" name="Título 1">
+            <a:extLst>
+              <a:ext uri="{FF2B5EF4-FFF2-40B4-BE49-F238E27FC236}">
+                <a16:creationId xmlns:a16="http://schemas.microsoft.com/office/drawing/2014/main" id="{76C442F7-46A9-9D46-ECB0-93EE082FECA1}"/>
+              </a:ext>
+            </a:extLst>
+          </p:cNvPr>
+          <p:cNvSpPr>
+            <a:spLocks noGrp="1"/>
+          </p:cNvSpPr>
+          <p:nvPr>
+            <p:ph type="title"/>
+          </p:nvPr>
+        </p:nvSpPr>
+        <p:spPr/>
+        <p:txBody>
+          <a:bodyPr/>
+          <a:lstStyle/>
+          <a:p>
+            <a:r>
+              <a:rPr lang="pt-BR" dirty="0"/>
+              <a:t>Validações de Caracteres</a:t>
+            </a:r>
+          </a:p>
+        </p:txBody>
+      </p:sp>
+      <p:graphicFrame>
+        <p:nvGraphicFramePr>
+          <p:cNvPr id="4" name="Espaço Reservado para Conteúdo 3">
+            <a:extLst>
+              <a:ext uri="{FF2B5EF4-FFF2-40B4-BE49-F238E27FC236}">
+                <a16:creationId xmlns:a16="http://schemas.microsoft.com/office/drawing/2014/main" id="{96E32C28-A37D-8912-591D-5465542008C5}"/>
+              </a:ext>
+            </a:extLst>
+          </p:cNvPr>
+          <p:cNvGraphicFramePr>
+            <a:graphicFrameLocks noGrp="1"/>
+          </p:cNvGraphicFramePr>
+          <p:nvPr>
+            <p:ph idx="1"/>
+            <p:extLst>
+              <p:ext uri="{D42A27DB-BD31-4B8C-83A1-F6EECF244321}">
+                <p14:modId xmlns:p14="http://schemas.microsoft.com/office/powerpoint/2010/main" val="1106445383"/>
+              </p:ext>
+            </p:extLst>
+          </p:nvPr>
+        </p:nvGraphicFramePr>
+        <p:xfrm>
+          <a:off x="1115760" y="2501900"/>
+          <a:ext cx="10167936" cy="1854200"/>
+        </p:xfrm>
+        <a:graphic>
+          <a:graphicData uri="http://schemas.openxmlformats.org/drawingml/2006/table">
+            <a:tbl>
+              <a:tblPr firstRow="1" bandRow="1">
+                <a:tableStyleId>{073A0DAA-6AF3-43AB-8588-CEC1D06C72B9}</a:tableStyleId>
+              </a:tblPr>
+              <a:tblGrid>
+                <a:gridCol w="1799715">
+                  <a:extLst>
+                    <a:ext uri="{9D8B030D-6E8A-4147-A177-3AD203B41FA5}">
+                      <a16:colId xmlns:a16="http://schemas.microsoft.com/office/drawing/2014/main" val="3245182891"/>
+                    </a:ext>
+                  </a:extLst>
+                </a:gridCol>
+                <a:gridCol w="8368221">
+                  <a:extLst>
+                    <a:ext uri="{9D8B030D-6E8A-4147-A177-3AD203B41FA5}">
+                      <a16:colId xmlns:a16="http://schemas.microsoft.com/office/drawing/2014/main" val="1329290174"/>
+                    </a:ext>
+                  </a:extLst>
+                </a:gridCol>
+              </a:tblGrid>
+              <a:tr h="370840">
+                <a:tc>
+                  <a:txBody>
+                    <a:bodyPr/>
+                    <a:lstStyle/>
+                    <a:p>
+                      <a:pPr marL="0" marR="0" lvl="0" indent="0" algn="l" defTabSz="914400" rtl="0" eaLnBrk="1" fontAlgn="auto" latinLnBrk="0" hangingPunct="1">
+                        <a:lnSpc>
+                          <a:spcPct val="100000"/>
+                        </a:lnSpc>
+                        <a:spcBef>
+                          <a:spcPts val="0"/>
+                        </a:spcBef>
+                        <a:spcAft>
+                          <a:spcPts val="0"/>
+                        </a:spcAft>
+                        <a:buClrTx/>
+                        <a:buSzTx/>
+                        <a:buFontTx/>
+                        <a:buNone/>
+                        <a:tabLst/>
+                        <a:defRPr/>
+                      </a:pPr>
+                      <a:r>
+                        <a:rPr lang="pt-BR" sz="1800" b="0" kern="1200" dirty="0">
+                          <a:solidFill>
+                            <a:schemeClr val="lt1"/>
+                          </a:solidFill>
+                          <a:effectLst/>
+                          <a:latin typeface="+mn-lt"/>
+                          <a:ea typeface="+mn-ea"/>
+                          <a:cs typeface="+mn-cs"/>
+                        </a:rPr>
+                        <a:t>Tipo</a:t>
+                      </a:r>
+                    </a:p>
+                  </a:txBody>
+                  <a:tcPr/>
+                </a:tc>
+                <a:tc>
+                  <a:txBody>
+                    <a:bodyPr/>
+                    <a:lstStyle/>
+                    <a:p>
+                      <a:pPr marL="0" marR="0" lvl="0" indent="0" algn="l" defTabSz="914400" rtl="0" eaLnBrk="1" fontAlgn="auto" latinLnBrk="0" hangingPunct="1">
+                        <a:lnSpc>
+                          <a:spcPct val="100000"/>
+                        </a:lnSpc>
+                        <a:spcBef>
+                          <a:spcPts val="0"/>
+                        </a:spcBef>
+                        <a:spcAft>
+                          <a:spcPts val="0"/>
+                        </a:spcAft>
+                        <a:buClrTx/>
+                        <a:buSzTx/>
+                        <a:buFontTx/>
+                        <a:buNone/>
+                        <a:tabLst/>
+                        <a:defRPr/>
+                      </a:pPr>
+                      <a:r>
+                        <a:rPr lang="pt-BR" sz="1800" b="0" kern="1200" dirty="0">
+                          <a:solidFill>
+                            <a:schemeClr val="lt1"/>
+                          </a:solidFill>
+                          <a:effectLst/>
+                          <a:latin typeface="+mn-lt"/>
+                          <a:ea typeface="+mn-ea"/>
+                          <a:cs typeface="+mn-cs"/>
+                        </a:rPr>
+                        <a:t>Função</a:t>
+                      </a:r>
+                    </a:p>
+                  </a:txBody>
+                  <a:tcPr/>
+                </a:tc>
+                <a:extLst>
+                  <a:ext uri="{0D108BD9-81ED-4DB2-BD59-A6C34878D82A}">
+                    <a16:rowId xmlns:a16="http://schemas.microsoft.com/office/drawing/2014/main" val="1867831845"/>
+                  </a:ext>
+                </a:extLst>
+              </a:tr>
+              <a:tr h="370840">
+                <a:tc>
+                  <a:txBody>
+                    <a:bodyPr/>
+                    <a:lstStyle/>
+                    <a:p>
+                      <a:pPr marL="0" marR="0" lvl="0" indent="0" algn="l" defTabSz="914400" rtl="0" eaLnBrk="1" fontAlgn="auto" latinLnBrk="0" hangingPunct="1">
+                        <a:lnSpc>
+                          <a:spcPct val="100000"/>
+                        </a:lnSpc>
+                        <a:spcBef>
+                          <a:spcPts val="0"/>
+                        </a:spcBef>
+                        <a:spcAft>
+                          <a:spcPts val="0"/>
+                        </a:spcAft>
+                        <a:buClrTx/>
+                        <a:buSzTx/>
+                        <a:buFontTx/>
+                        <a:buNone/>
+                        <a:tabLst/>
+                        <a:defRPr/>
+                      </a:pPr>
+                      <a:r>
+                        <a:rPr lang="pt-BR" sz="1800" b="0" kern="1200" dirty="0" err="1">
+                          <a:solidFill>
+                            <a:schemeClr val="dk1"/>
+                          </a:solidFill>
+                          <a:effectLst/>
+                          <a:latin typeface="+mn-lt"/>
+                          <a:ea typeface="+mn-ea"/>
+                          <a:cs typeface="+mn-cs"/>
+                        </a:rPr>
+                        <a:t>required</a:t>
+                      </a:r>
+                      <a:endParaRPr lang="pt-BR" sz="1800" b="0" kern="1200" dirty="0">
+                        <a:solidFill>
+                          <a:schemeClr val="dk1"/>
+                        </a:solidFill>
+                        <a:effectLst/>
+                        <a:latin typeface="+mn-lt"/>
+                        <a:ea typeface="+mn-ea"/>
+                        <a:cs typeface="+mn-cs"/>
+                      </a:endParaRPr>
+                    </a:p>
+                  </a:txBody>
+                  <a:tcPr/>
+                </a:tc>
+                <a:tc>
+                  <a:txBody>
+                    <a:bodyPr/>
+                    <a:lstStyle/>
+                    <a:p>
+                      <a:pPr marL="0" marR="0" lvl="0" indent="0" algn="l" defTabSz="914400" rtl="0" eaLnBrk="1" fontAlgn="auto" latinLnBrk="0" hangingPunct="1">
+                        <a:lnSpc>
+                          <a:spcPct val="100000"/>
+                        </a:lnSpc>
+                        <a:spcBef>
+                          <a:spcPts val="0"/>
+                        </a:spcBef>
+                        <a:spcAft>
+                          <a:spcPts val="0"/>
+                        </a:spcAft>
+                        <a:buClrTx/>
+                        <a:buSzTx/>
+                        <a:buFontTx/>
+                        <a:buNone/>
+                        <a:tabLst/>
+                        <a:defRPr/>
+                      </a:pPr>
+                      <a:r>
+                        <a:rPr lang="pt-BR" sz="1800" b="0" kern="1200" dirty="0">
+                          <a:solidFill>
+                            <a:schemeClr val="dk1"/>
+                          </a:solidFill>
+                          <a:effectLst/>
+                          <a:latin typeface="+mn-lt"/>
+                          <a:ea typeface="+mn-ea"/>
+                          <a:cs typeface="+mn-cs"/>
+                        </a:rPr>
+                        <a:t>Mostra que o preenchimento do input é obrigatório.</a:t>
+                      </a:r>
+                    </a:p>
+                  </a:txBody>
+                  <a:tcPr/>
+                </a:tc>
+                <a:extLst>
+                  <a:ext uri="{0D108BD9-81ED-4DB2-BD59-A6C34878D82A}">
+                    <a16:rowId xmlns:a16="http://schemas.microsoft.com/office/drawing/2014/main" val="3137536161"/>
+                  </a:ext>
+                </a:extLst>
+              </a:tr>
+              <a:tr h="370840">
+                <a:tc>
+                  <a:txBody>
+                    <a:bodyPr/>
+                    <a:lstStyle/>
+                    <a:p>
+                      <a:pPr marL="0" marR="0" lvl="0" indent="0" algn="l" defTabSz="914400" rtl="0" eaLnBrk="1" fontAlgn="auto" latinLnBrk="0" hangingPunct="1">
+                        <a:lnSpc>
+                          <a:spcPct val="100000"/>
+                        </a:lnSpc>
+                        <a:spcBef>
+                          <a:spcPts val="0"/>
+                        </a:spcBef>
+                        <a:spcAft>
+                          <a:spcPts val="0"/>
+                        </a:spcAft>
+                        <a:buClrTx/>
+                        <a:buSzTx/>
+                        <a:buFontTx/>
+                        <a:buNone/>
+                        <a:tabLst/>
+                        <a:defRPr/>
+                      </a:pPr>
+                      <a:r>
+                        <a:rPr lang="pt-BR" sz="1800" b="0" kern="1200" dirty="0" err="1">
+                          <a:solidFill>
+                            <a:schemeClr val="dk1"/>
+                          </a:solidFill>
+                          <a:effectLst/>
+                          <a:latin typeface="+mn-lt"/>
+                          <a:ea typeface="+mn-ea"/>
+                          <a:cs typeface="+mn-cs"/>
+                        </a:rPr>
+                        <a:t>maxlength</a:t>
+                      </a:r>
+                      <a:endParaRPr lang="pt-BR" sz="1800" b="0" kern="1200" dirty="0">
+                        <a:solidFill>
+                          <a:schemeClr val="dk1"/>
+                        </a:solidFill>
+                        <a:effectLst/>
+                        <a:latin typeface="+mn-lt"/>
+                        <a:ea typeface="+mn-ea"/>
+                        <a:cs typeface="+mn-cs"/>
+                      </a:endParaRPr>
+                    </a:p>
+                  </a:txBody>
+                  <a:tcPr/>
+                </a:tc>
+                <a:tc>
+                  <a:txBody>
+                    <a:bodyPr/>
+                    <a:lstStyle/>
+                    <a:p>
+                      <a:pPr marL="0" marR="0" lvl="0" indent="0" algn="l" defTabSz="914400" rtl="0" eaLnBrk="1" fontAlgn="auto" latinLnBrk="0" hangingPunct="1">
+                        <a:lnSpc>
+                          <a:spcPct val="100000"/>
+                        </a:lnSpc>
+                        <a:spcBef>
+                          <a:spcPts val="0"/>
+                        </a:spcBef>
+                        <a:spcAft>
+                          <a:spcPts val="0"/>
+                        </a:spcAft>
+                        <a:buClrTx/>
+                        <a:buSzTx/>
+                        <a:buFontTx/>
+                        <a:buNone/>
+                        <a:tabLst/>
+                        <a:defRPr/>
+                      </a:pPr>
+                      <a:r>
+                        <a:rPr lang="pt-BR" sz="1800" b="0" kern="1200" dirty="0">
+                          <a:solidFill>
+                            <a:schemeClr val="dk1"/>
+                          </a:solidFill>
+                          <a:effectLst/>
+                          <a:latin typeface="+mn-lt"/>
+                          <a:ea typeface="+mn-ea"/>
+                          <a:cs typeface="+mn-cs"/>
+                        </a:rPr>
+                        <a:t>Indica o tamanho máximo de caracteres no input.</a:t>
+                      </a:r>
+                    </a:p>
+                  </a:txBody>
+                  <a:tcPr/>
+                </a:tc>
+                <a:extLst>
+                  <a:ext uri="{0D108BD9-81ED-4DB2-BD59-A6C34878D82A}">
+                    <a16:rowId xmlns:a16="http://schemas.microsoft.com/office/drawing/2014/main" val="2858526288"/>
+                  </a:ext>
+                </a:extLst>
+              </a:tr>
+              <a:tr h="370840">
+                <a:tc>
+                  <a:txBody>
+                    <a:bodyPr/>
+                    <a:lstStyle/>
+                    <a:p>
+                      <a:pPr marL="0" marR="0" lvl="0" indent="0" algn="l" defTabSz="914400" rtl="0" eaLnBrk="1" fontAlgn="auto" latinLnBrk="0" hangingPunct="1">
+                        <a:lnSpc>
+                          <a:spcPct val="100000"/>
+                        </a:lnSpc>
+                        <a:spcBef>
+                          <a:spcPts val="0"/>
+                        </a:spcBef>
+                        <a:spcAft>
+                          <a:spcPts val="0"/>
+                        </a:spcAft>
+                        <a:buClrTx/>
+                        <a:buSzTx/>
+                        <a:buFontTx/>
+                        <a:buNone/>
+                        <a:tabLst/>
+                        <a:defRPr/>
+                      </a:pPr>
+                      <a:r>
+                        <a:rPr lang="pt-BR" sz="1800" b="0" kern="1200" dirty="0" err="1">
+                          <a:solidFill>
+                            <a:schemeClr val="dk1"/>
+                          </a:solidFill>
+                          <a:effectLst/>
+                          <a:latin typeface="+mn-lt"/>
+                          <a:ea typeface="+mn-ea"/>
+                          <a:cs typeface="+mn-cs"/>
+                        </a:rPr>
+                        <a:t>placeholder</a:t>
+                      </a:r>
+                      <a:endParaRPr lang="pt-BR" sz="1800" b="0" kern="1200" dirty="0">
+                        <a:solidFill>
+                          <a:schemeClr val="dk1"/>
+                        </a:solidFill>
+                        <a:effectLst/>
+                        <a:latin typeface="+mn-lt"/>
+                        <a:ea typeface="+mn-ea"/>
+                        <a:cs typeface="+mn-cs"/>
+                      </a:endParaRPr>
+                    </a:p>
+                  </a:txBody>
+                  <a:tcPr/>
+                </a:tc>
+                <a:tc>
+                  <a:txBody>
+                    <a:bodyPr/>
+                    <a:lstStyle/>
+                    <a:p>
+                      <a:pPr marL="0" marR="0" lvl="0" indent="0" algn="l" defTabSz="914400" rtl="0" eaLnBrk="1" fontAlgn="auto" latinLnBrk="0" hangingPunct="1">
+                        <a:lnSpc>
+                          <a:spcPct val="100000"/>
+                        </a:lnSpc>
+                        <a:spcBef>
+                          <a:spcPts val="0"/>
+                        </a:spcBef>
+                        <a:spcAft>
+                          <a:spcPts val="0"/>
+                        </a:spcAft>
+                        <a:buClrTx/>
+                        <a:buSzTx/>
+                        <a:buFontTx/>
+                        <a:buNone/>
+                        <a:tabLst/>
+                        <a:defRPr/>
+                      </a:pPr>
+                      <a:r>
+                        <a:rPr lang="pt-BR" sz="1800" b="0" kern="1200" dirty="0">
+                          <a:solidFill>
+                            <a:schemeClr val="dk1"/>
+                          </a:solidFill>
+                          <a:effectLst/>
+                          <a:latin typeface="+mn-lt"/>
+                          <a:ea typeface="+mn-ea"/>
+                          <a:cs typeface="+mn-cs"/>
+                        </a:rPr>
+                        <a:t>Coloca um texto simples enquanto seu input estiver vazio.</a:t>
+                      </a:r>
+                    </a:p>
+                  </a:txBody>
+                  <a:tcPr/>
+                </a:tc>
+                <a:extLst>
+                  <a:ext uri="{0D108BD9-81ED-4DB2-BD59-A6C34878D82A}">
+                    <a16:rowId xmlns:a16="http://schemas.microsoft.com/office/drawing/2014/main" val="3726443150"/>
+                  </a:ext>
+                </a:extLst>
+              </a:tr>
+              <a:tr h="370840">
+                <a:tc>
+                  <a:txBody>
+                    <a:bodyPr/>
+                    <a:lstStyle/>
+                    <a:p>
+                      <a:pPr marL="0" marR="0" lvl="0" indent="0" algn="l" defTabSz="914400" rtl="0" eaLnBrk="1" fontAlgn="auto" latinLnBrk="0" hangingPunct="1">
+                        <a:lnSpc>
+                          <a:spcPct val="100000"/>
+                        </a:lnSpc>
+                        <a:spcBef>
+                          <a:spcPts val="0"/>
+                        </a:spcBef>
+                        <a:spcAft>
+                          <a:spcPts val="0"/>
+                        </a:spcAft>
+                        <a:buClrTx/>
+                        <a:buSzTx/>
+                        <a:buFontTx/>
+                        <a:buNone/>
+                        <a:tabLst/>
+                        <a:defRPr/>
+                      </a:pPr>
+                      <a:r>
+                        <a:rPr lang="pt-BR" sz="1800" b="0" kern="1200" dirty="0" err="1">
+                          <a:solidFill>
+                            <a:schemeClr val="dk1"/>
+                          </a:solidFill>
+                          <a:effectLst/>
+                          <a:latin typeface="+mn-lt"/>
+                          <a:ea typeface="+mn-ea"/>
+                          <a:cs typeface="+mn-cs"/>
+                        </a:rPr>
+                        <a:t>pattern</a:t>
+                      </a:r>
+                      <a:endParaRPr lang="pt-BR" sz="1800" b="0" kern="1200" dirty="0">
+                        <a:solidFill>
+                          <a:schemeClr val="dk1"/>
+                        </a:solidFill>
+                        <a:effectLst/>
+                        <a:latin typeface="+mn-lt"/>
+                        <a:ea typeface="+mn-ea"/>
+                        <a:cs typeface="+mn-cs"/>
+                      </a:endParaRPr>
+                    </a:p>
+                  </a:txBody>
+                  <a:tcPr/>
+                </a:tc>
+                <a:tc>
+                  <a:txBody>
+                    <a:bodyPr/>
+                    <a:lstStyle/>
+                    <a:p>
+                      <a:pPr marL="0" marR="0" lvl="0" indent="0" algn="l" defTabSz="914400" rtl="0" eaLnBrk="1" fontAlgn="auto" latinLnBrk="0" hangingPunct="1">
+                        <a:lnSpc>
+                          <a:spcPct val="100000"/>
+                        </a:lnSpc>
+                        <a:spcBef>
+                          <a:spcPts val="0"/>
+                        </a:spcBef>
+                        <a:spcAft>
+                          <a:spcPts val="0"/>
+                        </a:spcAft>
+                        <a:buClrTx/>
+                        <a:buSzTx/>
+                        <a:buFontTx/>
+                        <a:buNone/>
+                        <a:tabLst/>
+                        <a:defRPr/>
+                      </a:pPr>
+                      <a:r>
+                        <a:rPr lang="pt-BR" sz="1800" b="0" kern="1200" dirty="0">
+                          <a:solidFill>
+                            <a:schemeClr val="dk1"/>
+                          </a:solidFill>
+                          <a:effectLst/>
+                          <a:latin typeface="+mn-lt"/>
+                          <a:ea typeface="+mn-ea"/>
+                          <a:cs typeface="+mn-cs"/>
+                        </a:rPr>
+                        <a:t>Insere um </a:t>
+                      </a:r>
+                      <a:r>
+                        <a:rPr lang="pt-BR" sz="1800" b="0" kern="1200" dirty="0" err="1">
+                          <a:solidFill>
+                            <a:schemeClr val="dk1"/>
+                          </a:solidFill>
+                          <a:effectLst/>
+                          <a:latin typeface="+mn-lt"/>
+                          <a:ea typeface="+mn-ea"/>
+                          <a:cs typeface="+mn-cs"/>
+                        </a:rPr>
+                        <a:t>Regex</a:t>
+                      </a:r>
+                      <a:r>
+                        <a:rPr lang="pt-BR" sz="1800" b="0" kern="1200" dirty="0">
+                          <a:solidFill>
+                            <a:schemeClr val="dk1"/>
+                          </a:solidFill>
+                          <a:effectLst/>
+                          <a:latin typeface="+mn-lt"/>
+                          <a:ea typeface="+mn-ea"/>
+                          <a:cs typeface="+mn-cs"/>
+                        </a:rPr>
+                        <a:t> diretamente no HTML</a:t>
+                      </a:r>
+                    </a:p>
+                  </a:txBody>
+                  <a:tcPr/>
+                </a:tc>
+                <a:extLst>
+                  <a:ext uri="{0D108BD9-81ED-4DB2-BD59-A6C34878D82A}">
+                    <a16:rowId xmlns:a16="http://schemas.microsoft.com/office/drawing/2014/main" val="803960353"/>
+                  </a:ext>
+                </a:extLst>
+              </a:tr>
+            </a:tbl>
+          </a:graphicData>
+        </a:graphic>
+      </p:graphicFrame>
+    </p:spTree>
+    <p:extLst>
+      <p:ext uri="{BB962C8B-B14F-4D97-AF65-F5344CB8AC3E}">
+        <p14:creationId xmlns:p14="http://schemas.microsoft.com/office/powerpoint/2010/main" val="3503833957"/>
+      </p:ext>
+    </p:extLst>
+  </p:cSld>
+  <p:clrMapOvr>
+    <a:masterClrMapping/>
+  </p:clrMapOvr>
+</p:sld>
+</file>
+
+<file path=ppt/slides/slide159.xml><?xml version="1.0" encoding="utf-8"?>
+<p:sld xmlns:a="http://schemas.openxmlformats.org/drawingml/2006/main" xmlns:r="http://schemas.openxmlformats.org/officeDocument/2006/relationships" xmlns:p="http://schemas.openxmlformats.org/presentationml/2006/main">
+  <p:cSld>
+    <p:bg>
+      <p:bgPr>
+        <a:solidFill>
+          <a:schemeClr val="bg1"/>
+        </a:solidFill>
+        <a:effectLst/>
+      </p:bgPr>
+    </p:bg>
+    <p:spTree>
+      <p:nvGrpSpPr>
+        <p:cNvPr id="1" name=""/>
+        <p:cNvGrpSpPr/>
+        <p:nvPr/>
+      </p:nvGrpSpPr>
+      <p:grpSpPr>
+        <a:xfrm>
+          <a:off x="0" y="0"/>
+          <a:ext cx="0" cy="0"/>
+          <a:chOff x="0" y="0"/>
+          <a:chExt cx="0" cy="0"/>
+        </a:xfrm>
+      </p:grpSpPr>
+      <p:sp>
+        <p:nvSpPr>
+          <p:cNvPr id="10" name="Rectangle 9">
+            <a:extLst>
+              <a:ext uri="{FF2B5EF4-FFF2-40B4-BE49-F238E27FC236}">
+                <a16:creationId xmlns:a16="http://schemas.microsoft.com/office/drawing/2014/main" id="{8D06CE56-3881-4ADA-8CEF-D18B02C242A3}"/>
+              </a:ext>
+              <a:ext uri="{C183D7F6-B498-43B3-948B-1728B52AA6E4}">
+                <adec:decorative xmlns:adec="http://schemas.microsoft.com/office/drawing/2017/decorative" val="1"/>
+              </a:ext>
+            </a:extLst>
+          </p:cNvPr>
+          <p:cNvSpPr>
+            <a:spLocks noGrp="1" noRot="1" noChangeAspect="1" noMove="1" noResize="1" noEditPoints="1" noAdjustHandles="1" noChangeArrowheads="1" noChangeShapeType="1" noTextEdit="1"/>
+          </p:cNvSpPr>
+          <p:nvPr>
+            <p:extLst>
+              <p:ext uri="{386F3935-93C4-4BCD-93E2-E3B085C9AB24}">
+                <p16:designElem xmlns:p16="http://schemas.microsoft.com/office/powerpoint/2015/main" val="1"/>
+              </p:ext>
+            </p:extLst>
+          </p:nvPr>
+        </p:nvSpPr>
+        <p:spPr>
+          <a:xfrm rot="5400000">
+            <a:off x="857544" y="346791"/>
+            <a:ext cx="146304" cy="704088"/>
+          </a:xfrm>
+          <a:prstGeom prst="rect">
+            <a:avLst/>
+          </a:prstGeom>
+          <a:solidFill>
+            <a:schemeClr val="accent1"/>
+          </a:solidFill>
+          <a:ln>
+            <a:noFill/>
+          </a:ln>
+        </p:spPr>
+        <p:style>
+          <a:lnRef idx="2">
+            <a:schemeClr val="accent1">
+              <a:shade val="50000"/>
+            </a:schemeClr>
+          </a:lnRef>
+          <a:fillRef idx="1">
+            <a:schemeClr val="accent1"/>
+          </a:fillRef>
+          <a:effectRef idx="0">
+            <a:schemeClr val="accent1"/>
+          </a:effectRef>
+          <a:fontRef idx="minor">
+            <a:schemeClr val="lt1"/>
+          </a:fontRef>
+        </p:style>
+        <p:txBody>
+          <a:bodyPr rtlCol="0" anchor="ctr"/>
+          <a:lstStyle/>
+          <a:p>
+            <a:pPr marL="0" marR="0" lvl="0" indent="0" algn="ctr" defTabSz="914400" rtl="0" eaLnBrk="1" fontAlgn="auto" latinLnBrk="0" hangingPunct="1">
+              <a:lnSpc>
+                <a:spcPct val="100000"/>
+              </a:lnSpc>
+              <a:spcBef>
+                <a:spcPts val="0"/>
+              </a:spcBef>
+              <a:spcAft>
+                <a:spcPts val="0"/>
+              </a:spcAft>
+              <a:buClrTx/>
+              <a:buSzTx/>
+              <a:buFontTx/>
+              <a:buNone/>
+              <a:tabLst/>
+              <a:defRPr/>
+            </a:pPr>
+            <a:endParaRPr kumimoji="0" lang="en-US" sz="1800" b="0" i="0" u="none" strike="noStrike" kern="1200" cap="none" spc="0" normalizeH="0" baseline="0" noProof="0">
+              <a:ln>
+                <a:noFill/>
+              </a:ln>
+              <a:solidFill>
+                <a:prstClr val="white"/>
+              </a:solidFill>
+              <a:effectLst/>
+              <a:uLnTx/>
+              <a:uFillTx/>
+              <a:latin typeface="Calibri" panose="020F0502020204030204"/>
+              <a:ea typeface="+mn-ea"/>
+              <a:cs typeface="+mn-cs"/>
+            </a:endParaRPr>
+          </a:p>
+        </p:txBody>
+      </p:sp>
+      <p:sp>
+        <p:nvSpPr>
+          <p:cNvPr id="12" name="Rectangle 11">
+            <a:extLst>
+              <a:ext uri="{FF2B5EF4-FFF2-40B4-BE49-F238E27FC236}">
+                <a16:creationId xmlns:a16="http://schemas.microsoft.com/office/drawing/2014/main" id="{79F3C543-62EC-4433-9C93-A2CD8764E9B4}"/>
+              </a:ext>
+              <a:ext uri="{C183D7F6-B498-43B3-948B-1728B52AA6E4}">
+                <adec:decorative xmlns:adec="http://schemas.microsoft.com/office/drawing/2017/decorative" val="1"/>
+              </a:ext>
+            </a:extLst>
+          </p:cNvPr>
+          <p:cNvSpPr>
+            <a:spLocks noGrp="1" noRot="1" noChangeAspect="1" noMove="1" noResize="1" noEditPoints="1" noAdjustHandles="1" noChangeArrowheads="1" noChangeShapeType="1" noTextEdit="1"/>
+          </p:cNvSpPr>
+          <p:nvPr>
+            <p:extLst>
+              <p:ext uri="{386F3935-93C4-4BCD-93E2-E3B085C9AB24}">
+                <p16:designElem xmlns:p16="http://schemas.microsoft.com/office/powerpoint/2015/main" val="1"/>
+              </p:ext>
+            </p:extLst>
+          </p:nvPr>
+        </p:nvSpPr>
+        <p:spPr>
+          <a:xfrm flipV="1">
+            <a:off x="578652" y="4501201"/>
+            <a:ext cx="11034696" cy="18288"/>
+          </a:xfrm>
+          <a:prstGeom prst="rect">
+            <a:avLst/>
+          </a:prstGeom>
+          <a:solidFill>
+            <a:schemeClr val="tx2">
+              <a:lumMod val="25000"/>
+              <a:lumOff val="75000"/>
+            </a:schemeClr>
+          </a:solidFill>
+          <a:ln w="3175">
+            <a:noFill/>
+          </a:ln>
+          <a:effectLst/>
+        </p:spPr>
+        <p:style>
+          <a:lnRef idx="2">
+            <a:schemeClr val="accent1">
+              <a:shade val="50000"/>
+            </a:schemeClr>
+          </a:lnRef>
+          <a:fillRef idx="1">
+            <a:schemeClr val="accent1"/>
+          </a:fillRef>
+          <a:effectRef idx="0">
+            <a:schemeClr val="accent1"/>
+          </a:effectRef>
+          <a:fontRef idx="minor">
+            <a:schemeClr val="lt1"/>
+          </a:fontRef>
+        </p:style>
+        <p:txBody>
+          <a:bodyPr rtlCol="0" anchor="ctr"/>
+          <a:lstStyle/>
+          <a:p>
+            <a:pPr marL="0" marR="0" lvl="0" indent="0" algn="ctr" defTabSz="914400" rtl="0" eaLnBrk="1" fontAlgn="auto" latinLnBrk="0" hangingPunct="1">
+              <a:lnSpc>
+                <a:spcPct val="100000"/>
+              </a:lnSpc>
+              <a:spcBef>
+                <a:spcPts val="0"/>
+              </a:spcBef>
+              <a:spcAft>
+                <a:spcPts val="0"/>
+              </a:spcAft>
+              <a:buClrTx/>
+              <a:buSzTx/>
+              <a:buFontTx/>
+              <a:buNone/>
+              <a:tabLst/>
+              <a:defRPr/>
+            </a:pPr>
+            <a:endParaRPr kumimoji="0" lang="en-US" sz="1800" b="0" i="0" u="none" strike="noStrike" kern="1200" cap="none" spc="0" normalizeH="0" baseline="0" noProof="0">
+              <a:ln>
+                <a:noFill/>
+              </a:ln>
+              <a:solidFill>
+                <a:prstClr val="white"/>
+              </a:solidFill>
+              <a:effectLst/>
+              <a:uLnTx/>
+              <a:uFillTx/>
+              <a:latin typeface="Calibri" panose="020F0502020204030204"/>
+              <a:ea typeface="+mn-ea"/>
+              <a:cs typeface="+mn-cs"/>
+            </a:endParaRPr>
+          </a:p>
+        </p:txBody>
+      </p:sp>
+      <p:sp useBgFill="1">
+        <p:nvSpPr>
+          <p:cNvPr id="14" name="Rectangle 13">
+            <a:extLst>
+              <a:ext uri="{FF2B5EF4-FFF2-40B4-BE49-F238E27FC236}">
+                <a16:creationId xmlns:a16="http://schemas.microsoft.com/office/drawing/2014/main" id="{E91DC736-0EF8-4F87-9146-EBF1D2EE4D3D}"/>
+              </a:ext>
+              <a:ext uri="{C183D7F6-B498-43B3-948B-1728B52AA6E4}">
+                <adec:decorative xmlns:adec="http://schemas.microsoft.com/office/drawing/2017/decorative" val="1"/>
+              </a:ext>
+            </a:extLst>
+          </p:cNvPr>
+          <p:cNvSpPr>
+            <a:spLocks noGrp="1" noRot="1" noChangeAspect="1" noMove="1" noResize="1" noEditPoints="1" noAdjustHandles="1" noChangeArrowheads="1" noChangeShapeType="1" noTextEdit="1"/>
+          </p:cNvSpPr>
+          <p:nvPr>
+            <p:extLst>
+              <p:ext uri="{386F3935-93C4-4BCD-93E2-E3B085C9AB24}">
+                <p16:designElem xmlns:p16="http://schemas.microsoft.com/office/powerpoint/2015/main" val="1"/>
+              </p:ext>
+            </p:extLst>
+          </p:nvPr>
+        </p:nvSpPr>
+        <p:spPr>
+          <a:xfrm>
+            <a:off x="0" y="0"/>
+            <a:ext cx="12192000" cy="6858000"/>
+          </a:xfrm>
+          <a:prstGeom prst="rect">
+            <a:avLst/>
+          </a:prstGeom>
+          <a:ln>
+            <a:noFill/>
+          </a:ln>
+        </p:spPr>
+        <p:style>
+          <a:lnRef idx="2">
+            <a:schemeClr val="accent1">
+              <a:shade val="50000"/>
+            </a:schemeClr>
+          </a:lnRef>
+          <a:fillRef idx="1">
+            <a:schemeClr val="accent1"/>
+          </a:fillRef>
+          <a:effectRef idx="0">
+            <a:schemeClr val="accent1"/>
+          </a:effectRef>
+          <a:fontRef idx="minor">
+            <a:schemeClr val="lt1"/>
+          </a:fontRef>
+        </p:style>
+        <p:txBody>
+          <a:bodyPr rtlCol="0" anchor="ctr"/>
+          <a:lstStyle/>
+          <a:p>
+            <a:pPr algn="ctr"/>
+            <a:endParaRPr lang="en-US"/>
+          </a:p>
+        </p:txBody>
+      </p:sp>
+      <p:pic>
+        <p:nvPicPr>
+          <p:cNvPr id="4" name="Content Placeholder 3" descr="Fundo do vetor de cores vibrantes salpicando">
+            <a:extLst>
+              <a:ext uri="{FF2B5EF4-FFF2-40B4-BE49-F238E27FC236}">
+                <a16:creationId xmlns:a16="http://schemas.microsoft.com/office/drawing/2014/main" id="{B50CC0C1-DAB5-BA49-560E-1F1B8306946E}"/>
+              </a:ext>
+            </a:extLst>
+          </p:cNvPr>
+          <p:cNvPicPr>
+            <a:picLocks noChangeAspect="1"/>
+          </p:cNvPicPr>
+          <p:nvPr/>
+        </p:nvPicPr>
+        <p:blipFill rotWithShape="1">
+          <a:blip r:embed="rId2"/>
+          <a:srcRect l="10975" r="3072" b="-1"/>
+          <a:stretch>
+            <a:fillRect/>
+          </a:stretch>
+        </p:blipFill>
+        <p:spPr>
+          <a:xfrm>
+            <a:off x="3523488" y="10"/>
+            <a:ext cx="8668512" cy="6857990"/>
+          </a:xfrm>
+          <a:prstGeom prst="rect">
+            <a:avLst/>
+          </a:prstGeom>
+        </p:spPr>
+      </p:pic>
+      <p:sp>
+        <p:nvSpPr>
+          <p:cNvPr id="16" name="Rectangle 15">
+            <a:extLst>
+              <a:ext uri="{FF2B5EF4-FFF2-40B4-BE49-F238E27FC236}">
+                <a16:creationId xmlns:a16="http://schemas.microsoft.com/office/drawing/2014/main" id="{097CD68E-23E3-4007-8847-CD0944C4F7BE}"/>
+              </a:ext>
+              <a:ext uri="{C183D7F6-B498-43B3-948B-1728B52AA6E4}">
+                <adec:decorative xmlns:adec="http://schemas.microsoft.com/office/drawing/2017/decorative" val="1"/>
+              </a:ext>
+            </a:extLst>
+          </p:cNvPr>
+          <p:cNvSpPr>
+            <a:spLocks noGrp="1" noRot="1" noChangeAspect="1" noMove="1" noResize="1" noEditPoints="1" noAdjustHandles="1" noChangeArrowheads="1" noChangeShapeType="1" noTextEdit="1"/>
+          </p:cNvSpPr>
+          <p:nvPr>
+            <p:extLst>
+              <p:ext uri="{386F3935-93C4-4BCD-93E2-E3B085C9AB24}">
+                <p16:designElem xmlns:p16="http://schemas.microsoft.com/office/powerpoint/2015/main" val="1"/>
+              </p:ext>
+            </p:extLst>
+          </p:nvPr>
+        </p:nvSpPr>
+        <p:spPr>
+          <a:xfrm>
+            <a:off x="0" y="0"/>
+            <a:ext cx="9756601" cy="6858000"/>
+          </a:xfrm>
+          <a:prstGeom prst="rect">
+            <a:avLst/>
+          </a:prstGeom>
+          <a:gradFill>
+            <a:gsLst>
+              <a:gs pos="58000">
+                <a:schemeClr val="bg1"/>
+              </a:gs>
+              <a:gs pos="35000">
+                <a:schemeClr val="bg1">
+                  <a:alpha val="79000"/>
+                </a:schemeClr>
+              </a:gs>
+              <a:gs pos="19000">
+                <a:schemeClr val="bg1">
+                  <a:alpha val="38000"/>
+                </a:schemeClr>
+              </a:gs>
+              <a:gs pos="0">
+                <a:schemeClr val="bg1">
+                  <a:alpha val="0"/>
+                </a:schemeClr>
+              </a:gs>
+              <a:gs pos="100000">
+                <a:schemeClr val="bg1"/>
+              </a:gs>
+            </a:gsLst>
+            <a:lin ang="10800000" scaled="0"/>
+          </a:gradFill>
+          <a:ln>
+            <a:noFill/>
+          </a:ln>
+        </p:spPr>
+        <p:style>
+          <a:lnRef idx="2">
+            <a:schemeClr val="accent1">
+              <a:shade val="50000"/>
+            </a:schemeClr>
+          </a:lnRef>
+          <a:fillRef idx="1">
+            <a:schemeClr val="accent1"/>
+          </a:fillRef>
+          <a:effectRef idx="0">
+            <a:schemeClr val="accent1"/>
+          </a:effectRef>
+          <a:fontRef idx="minor">
+            <a:schemeClr val="lt1"/>
+          </a:fontRef>
+        </p:style>
+        <p:txBody>
+          <a:bodyPr rtlCol="0" anchor="ctr"/>
+          <a:lstStyle/>
+          <a:p>
+            <a:pPr algn="ctr"/>
+            <a:endParaRPr lang="en-US" dirty="0"/>
+          </a:p>
+        </p:txBody>
+      </p:sp>
+      <p:sp>
+        <p:nvSpPr>
+          <p:cNvPr id="5" name="Título 1">
+            <a:extLst>
+              <a:ext uri="{FF2B5EF4-FFF2-40B4-BE49-F238E27FC236}">
+                <a16:creationId xmlns:a16="http://schemas.microsoft.com/office/drawing/2014/main" id="{FF70C69A-0CDC-E0DB-FAF7-F81DA7E738BE}"/>
+              </a:ext>
+            </a:extLst>
+          </p:cNvPr>
+          <p:cNvSpPr>
+            <a:spLocks noGrp="1"/>
+          </p:cNvSpPr>
+          <p:nvPr>
+            <p:ph type="title"/>
+          </p:nvPr>
+        </p:nvSpPr>
+        <p:spPr>
+          <a:xfrm>
+            <a:off x="477981" y="1122363"/>
+            <a:ext cx="4023360" cy="3204134"/>
+          </a:xfrm>
+        </p:spPr>
+        <p:txBody>
+          <a:bodyPr vert="horz" lIns="91440" tIns="45720" rIns="91440" bIns="45720" rtlCol="0" anchor="b">
+            <a:normAutofit/>
+          </a:bodyPr>
+          <a:lstStyle/>
+          <a:p>
+            <a:r>
+              <a:rPr lang="en-US" sz="4800" dirty="0"/>
+              <a:t>Aula 11.3 – Inputs no HTML – </a:t>
+            </a:r>
+            <a:r>
+              <a:rPr lang="en-US" sz="4800" dirty="0" err="1"/>
+              <a:t>Parte</a:t>
+            </a:r>
+            <a:r>
+              <a:rPr lang="en-US" sz="4800" dirty="0"/>
+              <a:t> 2</a:t>
+            </a:r>
+          </a:p>
+        </p:txBody>
+      </p:sp>
+      <p:sp>
+        <p:nvSpPr>
+          <p:cNvPr id="18" name="Rectangle 17">
+            <a:extLst>
+              <a:ext uri="{FF2B5EF4-FFF2-40B4-BE49-F238E27FC236}">
+                <a16:creationId xmlns:a16="http://schemas.microsoft.com/office/drawing/2014/main" id="{AF2F604E-43BE-4DC3-B983-E071523364F8}"/>
+              </a:ext>
+              <a:ext uri="{C183D7F6-B498-43B3-948B-1728B52AA6E4}">
+                <adec:decorative xmlns:adec="http://schemas.microsoft.com/office/drawing/2017/decorative" val="1"/>
+              </a:ext>
+            </a:extLst>
+          </p:cNvPr>
+          <p:cNvSpPr>
+            <a:spLocks noGrp="1" noRot="1" noChangeAspect="1" noMove="1" noResize="1" noEditPoints="1" noAdjustHandles="1" noChangeArrowheads="1" noChangeShapeType="1" noTextEdit="1"/>
+          </p:cNvSpPr>
+          <p:nvPr>
+            <p:extLst>
+              <p:ext uri="{386F3935-93C4-4BCD-93E2-E3B085C9AB24}">
+                <p16:designElem xmlns:p16="http://schemas.microsoft.com/office/powerpoint/2015/main" val="1"/>
+              </p:ext>
+            </p:extLst>
+          </p:nvPr>
+        </p:nvSpPr>
+        <p:spPr>
+          <a:xfrm rot="5400000">
+            <a:off x="759921" y="346791"/>
+            <a:ext cx="146304" cy="704088"/>
+          </a:xfrm>
+          <a:prstGeom prst="rect">
+            <a:avLst/>
+          </a:prstGeom>
+          <a:solidFill>
+            <a:schemeClr val="accent1"/>
+          </a:solidFill>
+          <a:ln>
+            <a:noFill/>
+          </a:ln>
+        </p:spPr>
+        <p:style>
+          <a:lnRef idx="2">
+            <a:schemeClr val="accent1">
+              <a:shade val="50000"/>
+            </a:schemeClr>
+          </a:lnRef>
+          <a:fillRef idx="1">
+            <a:schemeClr val="accent1"/>
+          </a:fillRef>
+          <a:effectRef idx="0">
+            <a:schemeClr val="accent1"/>
+          </a:effectRef>
+          <a:fontRef idx="minor">
+            <a:schemeClr val="lt1"/>
+          </a:fontRef>
+        </p:style>
+        <p:txBody>
+          <a:bodyPr rtlCol="0" anchor="ctr"/>
+          <a:lstStyle/>
+          <a:p>
+            <a:pPr marL="0" marR="0" lvl="0" indent="0" algn="ctr" defTabSz="914400" rtl="0" eaLnBrk="1" fontAlgn="auto" latinLnBrk="0" hangingPunct="1">
+              <a:lnSpc>
+                <a:spcPct val="100000"/>
+              </a:lnSpc>
+              <a:spcBef>
+                <a:spcPts val="0"/>
+              </a:spcBef>
+              <a:spcAft>
+                <a:spcPts val="0"/>
+              </a:spcAft>
+              <a:buClrTx/>
+              <a:buSzTx/>
+              <a:buFontTx/>
+              <a:buNone/>
+              <a:tabLst/>
+              <a:defRPr/>
+            </a:pPr>
+            <a:endParaRPr kumimoji="0" lang="en-US" sz="1800" b="0" i="0" u="none" strike="noStrike" kern="1200" cap="none" spc="0" normalizeH="0" baseline="0" noProof="0">
+              <a:ln>
+                <a:noFill/>
+              </a:ln>
+              <a:solidFill>
+                <a:prstClr val="white"/>
+              </a:solidFill>
+              <a:effectLst/>
+              <a:uLnTx/>
+              <a:uFillTx/>
+              <a:latin typeface="Calibri" panose="020F0502020204030204"/>
+              <a:ea typeface="+mn-ea"/>
+              <a:cs typeface="+mn-cs"/>
+            </a:endParaRPr>
+          </a:p>
+        </p:txBody>
+      </p:sp>
+      <p:sp>
+        <p:nvSpPr>
+          <p:cNvPr id="20" name="Rectangle 19">
+            <a:extLst>
+              <a:ext uri="{FF2B5EF4-FFF2-40B4-BE49-F238E27FC236}">
+                <a16:creationId xmlns:a16="http://schemas.microsoft.com/office/drawing/2014/main" id="{08C9B587-E65E-4B52-B37C-ABEBB6E87928}"/>
+              </a:ext>
+              <a:ext uri="{C183D7F6-B498-43B3-948B-1728B52AA6E4}">
+                <adec:decorative xmlns:adec="http://schemas.microsoft.com/office/drawing/2017/decorative" val="1"/>
+              </a:ext>
+            </a:extLst>
+          </p:cNvPr>
+          <p:cNvSpPr>
+            <a:spLocks noGrp="1" noRot="1" noChangeAspect="1" noMove="1" noResize="1" noEditPoints="1" noAdjustHandles="1" noChangeArrowheads="1" noChangeShapeType="1" noTextEdit="1"/>
+          </p:cNvSpPr>
+          <p:nvPr>
+            <p:extLst>
+              <p:ext uri="{386F3935-93C4-4BCD-93E2-E3B085C9AB24}">
+                <p16:designElem xmlns:p16="http://schemas.microsoft.com/office/powerpoint/2015/main" val="1"/>
+              </p:ext>
+            </p:extLst>
+          </p:nvPr>
+        </p:nvSpPr>
+        <p:spPr>
+          <a:xfrm>
+            <a:off x="481029" y="4546920"/>
+            <a:ext cx="3977640" cy="18288"/>
+          </a:xfrm>
+          <a:prstGeom prst="rect">
+            <a:avLst/>
+          </a:prstGeom>
+          <a:solidFill>
+            <a:schemeClr val="tx2">
+              <a:lumMod val="25000"/>
+              <a:lumOff val="75000"/>
+            </a:schemeClr>
+          </a:solidFill>
+          <a:ln w="3175">
+            <a:solidFill>
+              <a:schemeClr val="tx2">
+                <a:lumMod val="25000"/>
+                <a:lumOff val="75000"/>
+              </a:schemeClr>
+            </a:solidFill>
+          </a:ln>
+          <a:effectLst/>
+        </p:spPr>
+        <p:style>
+          <a:lnRef idx="2">
+            <a:schemeClr val="accent1">
+              <a:shade val="50000"/>
+            </a:schemeClr>
+          </a:lnRef>
+          <a:fillRef idx="1">
+            <a:schemeClr val="accent1"/>
+          </a:fillRef>
+          <a:effectRef idx="0">
+            <a:schemeClr val="accent1"/>
+          </a:effectRef>
+          <a:fontRef idx="minor">
+            <a:schemeClr val="lt1"/>
+          </a:fontRef>
+        </p:style>
+        <p:txBody>
+          <a:bodyPr rtlCol="0" anchor="ctr"/>
+          <a:lstStyle/>
+          <a:p>
+            <a:pPr marL="0" marR="0" lvl="0" indent="0" algn="ctr" defTabSz="914400" rtl="0" eaLnBrk="1" fontAlgn="auto" latinLnBrk="0" hangingPunct="1">
+              <a:lnSpc>
+                <a:spcPct val="100000"/>
+              </a:lnSpc>
+              <a:spcBef>
+                <a:spcPts val="0"/>
+              </a:spcBef>
+              <a:spcAft>
+                <a:spcPts val="0"/>
+              </a:spcAft>
+              <a:buClrTx/>
+              <a:buSzTx/>
+              <a:buFontTx/>
+              <a:buNone/>
+              <a:tabLst/>
+              <a:defRPr/>
+            </a:pPr>
+            <a:endParaRPr kumimoji="0" lang="en-US" sz="1800" b="0" i="0" u="none" strike="noStrike" kern="1200" cap="none" spc="0" normalizeH="0" baseline="0" noProof="0">
+              <a:ln>
+                <a:noFill/>
+              </a:ln>
+              <a:solidFill>
+                <a:prstClr val="white"/>
+              </a:solidFill>
+              <a:effectLst/>
+              <a:uLnTx/>
+              <a:uFillTx/>
+              <a:latin typeface="Calibri" panose="020F0502020204030204"/>
+              <a:ea typeface="+mn-ea"/>
+              <a:cs typeface="+mn-cs"/>
+            </a:endParaRPr>
+          </a:p>
+        </p:txBody>
+      </p:sp>
+    </p:spTree>
+    <p:extLst>
+      <p:ext uri="{BB962C8B-B14F-4D97-AF65-F5344CB8AC3E}">
+        <p14:creationId xmlns:p14="http://schemas.microsoft.com/office/powerpoint/2010/main" val="4130634440"/>
+      </p:ext>
+    </p:extLst>
+  </p:cSld>
+  <p:clrMapOvr>
+    <a:masterClrMapping/>
+  </p:clrMapOvr>
+  <p:timing>
+    <p:tnLst>
+      <p:par>
+        <p:cTn id="1" dur="indefinite" restart="never" nodeType="tmRoot">
+          <p:childTnLst>
+            <p:seq concurrent="1" nextAc="seek">
+              <p:cTn id="2" dur="indefinite" nodeType="mainSeq">
+                <p:childTnLst>
+                  <p:par>
+                    <p:cTn id="3" fill="hold">
+                      <p:stCondLst>
+                        <p:cond delay="indefinite"/>
+                        <p:cond evt="onBegin" delay="0">
+                          <p:tn val="2"/>
+                        </p:cond>
+                      </p:stCondLst>
+                      <p:childTnLst>
+                        <p:par>
+                          <p:cTn id="4" fill="hold">
+                            <p:stCondLst>
+                              <p:cond delay="0"/>
+                            </p:stCondLst>
+                            <p:childTnLst>
+                              <p:par>
+                                <p:cTn id="5" presetID="10" presetClass="entr" presetSubtype="0" fill="hold" grpId="0" nodeType="withEffect">
+                                  <p:stCondLst>
+                                    <p:cond delay="1000"/>
+                                  </p:stCondLst>
+                                  <p:iterate type="lt">
+                                    <p:tmPct val="10000"/>
+                                  </p:iterate>
+                                  <p:childTnLst>
+                                    <p:set>
+                                      <p:cBhvr>
+                                        <p:cTn id="6" dur="1" fill="hold">
+                                          <p:stCondLst>
+                                            <p:cond delay="0"/>
+                                          </p:stCondLst>
+                                        </p:cTn>
+                                        <p:tgtEl>
+                                          <p:spTgt spid="5"/>
+                                        </p:tgtEl>
+                                        <p:attrNameLst>
+                                          <p:attrName>style.visibility</p:attrName>
+                                        </p:attrNameLst>
+                                      </p:cBhvr>
+                                      <p:to>
+                                        <p:strVal val="visible"/>
+                                      </p:to>
+                                    </p:set>
+                                    <p:animEffect transition="in" filter="fade">
+                                      <p:cBhvr>
+                                        <p:cTn id="7" dur="400"/>
+                                        <p:tgtEl>
+                                          <p:spTgt spid="5"/>
+                                        </p:tgtEl>
+                                      </p:cBhvr>
+                                    </p:animEffect>
+                                  </p:childTnLst>
+                                </p:cTn>
+                              </p:par>
+                            </p:childTnLst>
+                          </p:cTn>
+                        </p:par>
+                      </p:childTnLst>
+                    </p:cTn>
+                  </p:par>
+                </p:childTnLst>
+              </p:cTn>
+              <p:prevCondLst>
+                <p:cond evt="onPrev" delay="0">
+                  <p:tgtEl>
+                    <p:sldTgt/>
+                  </p:tgtEl>
+                </p:cond>
+              </p:prevCondLst>
+              <p:nextCondLst>
+                <p:cond evt="onNext" delay="0">
+                  <p:tgtEl>
+                    <p:sldTgt/>
+                  </p:tgtEl>
+                </p:cond>
+              </p:nextCondLst>
+            </p:seq>
+          </p:childTnLst>
+        </p:cTn>
+      </p:par>
+    </p:tnLst>
+    <p:bldLst>
+      <p:bldP spid="5" grpId="0"/>
+    </p:bldLst>
+  </p:timing>
+</p:sld>
+</file>
+
 <file path=ppt/slides/slide16.xml><?xml version="1.0" encoding="utf-8"?>
 <p:sld xmlns:a="http://schemas.openxmlformats.org/drawingml/2006/main" xmlns:r="http://schemas.openxmlformats.org/officeDocument/2006/relationships" xmlns:p="http://schemas.openxmlformats.org/presentationml/2006/main">
   <p:cSld>
@@ -19721,6 +22717,1318 @@
       <p:bldP spid="2" grpId="0"/>
     </p:bldLst>
   </p:timing>
+</p:sld>
+</file>
+
+<file path=ppt/slides/slide160.xml><?xml version="1.0" encoding="utf-8"?>
+<p:sld xmlns:a="http://schemas.openxmlformats.org/drawingml/2006/main" xmlns:r="http://schemas.openxmlformats.org/officeDocument/2006/relationships" xmlns:p="http://schemas.openxmlformats.org/presentationml/2006/main">
+  <p:cSld>
+    <p:spTree>
+      <p:nvGrpSpPr>
+        <p:cNvPr id="1" name=""/>
+        <p:cNvGrpSpPr/>
+        <p:nvPr/>
+      </p:nvGrpSpPr>
+      <p:grpSpPr>
+        <a:xfrm>
+          <a:off x="0" y="0"/>
+          <a:ext cx="0" cy="0"/>
+          <a:chOff x="0" y="0"/>
+          <a:chExt cx="0" cy="0"/>
+        </a:xfrm>
+      </p:grpSpPr>
+      <p:sp>
+        <p:nvSpPr>
+          <p:cNvPr id="2" name="Título 1">
+            <a:extLst>
+              <a:ext uri="{FF2B5EF4-FFF2-40B4-BE49-F238E27FC236}">
+                <a16:creationId xmlns:a16="http://schemas.microsoft.com/office/drawing/2014/main" id="{42A18B5B-0D43-867E-8087-57ABFFBB1557}"/>
+              </a:ext>
+            </a:extLst>
+          </p:cNvPr>
+          <p:cNvSpPr>
+            <a:spLocks noGrp="1"/>
+          </p:cNvSpPr>
+          <p:nvPr>
+            <p:ph type="title"/>
+          </p:nvPr>
+        </p:nvSpPr>
+        <p:spPr/>
+        <p:txBody>
+          <a:bodyPr/>
+          <a:lstStyle/>
+          <a:p>
+            <a:r>
+              <a:rPr lang="pt-BR" dirty="0"/>
+              <a:t>Números e Datas</a:t>
+            </a:r>
+          </a:p>
+        </p:txBody>
+      </p:sp>
+      <p:graphicFrame>
+        <p:nvGraphicFramePr>
+          <p:cNvPr id="4" name="Espaço Reservado para Conteúdo 3">
+            <a:extLst>
+              <a:ext uri="{FF2B5EF4-FFF2-40B4-BE49-F238E27FC236}">
+                <a16:creationId xmlns:a16="http://schemas.microsoft.com/office/drawing/2014/main" id="{5A05D2CA-581E-2C8B-3C1D-8A80A7D5F8D6}"/>
+              </a:ext>
+            </a:extLst>
+          </p:cNvPr>
+          <p:cNvGraphicFramePr>
+            <a:graphicFrameLocks noGrp="1"/>
+          </p:cNvGraphicFramePr>
+          <p:nvPr>
+            <p:ph idx="1"/>
+            <p:extLst>
+              <p:ext uri="{D42A27DB-BD31-4B8C-83A1-F6EECF244321}">
+                <p14:modId xmlns:p14="http://schemas.microsoft.com/office/powerpoint/2010/main" val="3089205501"/>
+              </p:ext>
+            </p:extLst>
+          </p:nvPr>
+        </p:nvGraphicFramePr>
+        <p:xfrm>
+          <a:off x="1116013" y="2478088"/>
+          <a:ext cx="10167936" cy="2595880"/>
+        </p:xfrm>
+        <a:graphic>
+          <a:graphicData uri="http://schemas.openxmlformats.org/drawingml/2006/table">
+            <a:tbl>
+              <a:tblPr firstRow="1" bandRow="1">
+                <a:tableStyleId>{073A0DAA-6AF3-43AB-8588-CEC1D06C72B9}</a:tableStyleId>
+              </a:tblPr>
+              <a:tblGrid>
+                <a:gridCol w="1816968">
+                  <a:extLst>
+                    <a:ext uri="{9D8B030D-6E8A-4147-A177-3AD203B41FA5}">
+                      <a16:colId xmlns:a16="http://schemas.microsoft.com/office/drawing/2014/main" val="3030350153"/>
+                    </a:ext>
+                  </a:extLst>
+                </a:gridCol>
+                <a:gridCol w="8350968">
+                  <a:extLst>
+                    <a:ext uri="{9D8B030D-6E8A-4147-A177-3AD203B41FA5}">
+                      <a16:colId xmlns:a16="http://schemas.microsoft.com/office/drawing/2014/main" val="3398343784"/>
+                    </a:ext>
+                  </a:extLst>
+                </a:gridCol>
+              </a:tblGrid>
+              <a:tr h="370840">
+                <a:tc>
+                  <a:txBody>
+                    <a:bodyPr/>
+                    <a:lstStyle/>
+                    <a:p>
+                      <a:pPr marL="0" marR="0" lvl="0" indent="0" algn="l" defTabSz="914400" rtl="0" eaLnBrk="1" fontAlgn="auto" latinLnBrk="0" hangingPunct="1">
+                        <a:lnSpc>
+                          <a:spcPct val="100000"/>
+                        </a:lnSpc>
+                        <a:spcBef>
+                          <a:spcPts val="0"/>
+                        </a:spcBef>
+                        <a:spcAft>
+                          <a:spcPts val="0"/>
+                        </a:spcAft>
+                        <a:buClrTx/>
+                        <a:buSzTx/>
+                        <a:buFontTx/>
+                        <a:buNone/>
+                        <a:tabLst/>
+                        <a:defRPr/>
+                      </a:pPr>
+                      <a:r>
+                        <a:rPr lang="pt-BR" sz="1800" b="0" kern="1200" dirty="0">
+                          <a:solidFill>
+                            <a:schemeClr val="lt1"/>
+                          </a:solidFill>
+                          <a:effectLst/>
+                          <a:latin typeface="+mn-lt"/>
+                          <a:ea typeface="+mn-ea"/>
+                          <a:cs typeface="+mn-cs"/>
+                        </a:rPr>
+                        <a:t>Tipo</a:t>
+                      </a:r>
+                    </a:p>
+                  </a:txBody>
+                  <a:tcPr/>
+                </a:tc>
+                <a:tc>
+                  <a:txBody>
+                    <a:bodyPr/>
+                    <a:lstStyle/>
+                    <a:p>
+                      <a:pPr marL="0" marR="0" lvl="0" indent="0" algn="l" defTabSz="914400" rtl="0" eaLnBrk="1" fontAlgn="auto" latinLnBrk="0" hangingPunct="1">
+                        <a:lnSpc>
+                          <a:spcPct val="100000"/>
+                        </a:lnSpc>
+                        <a:spcBef>
+                          <a:spcPts val="0"/>
+                        </a:spcBef>
+                        <a:spcAft>
+                          <a:spcPts val="0"/>
+                        </a:spcAft>
+                        <a:buClrTx/>
+                        <a:buSzTx/>
+                        <a:buFontTx/>
+                        <a:buNone/>
+                        <a:tabLst/>
+                        <a:defRPr/>
+                      </a:pPr>
+                      <a:r>
+                        <a:rPr lang="pt-BR" sz="1800" b="0" kern="1200" dirty="0">
+                          <a:solidFill>
+                            <a:schemeClr val="lt1"/>
+                          </a:solidFill>
+                          <a:effectLst/>
+                          <a:latin typeface="+mn-lt"/>
+                          <a:ea typeface="+mn-ea"/>
+                          <a:cs typeface="+mn-cs"/>
+                        </a:rPr>
+                        <a:t>Função</a:t>
+                      </a:r>
+                    </a:p>
+                  </a:txBody>
+                  <a:tcPr/>
+                </a:tc>
+                <a:extLst>
+                  <a:ext uri="{0D108BD9-81ED-4DB2-BD59-A6C34878D82A}">
+                    <a16:rowId xmlns:a16="http://schemas.microsoft.com/office/drawing/2014/main" val="994207079"/>
+                  </a:ext>
+                </a:extLst>
+              </a:tr>
+              <a:tr h="370840">
+                <a:tc>
+                  <a:txBody>
+                    <a:bodyPr/>
+                    <a:lstStyle/>
+                    <a:p>
+                      <a:pPr marL="0" marR="0" lvl="0" indent="0" algn="l" defTabSz="914400" rtl="0" eaLnBrk="1" fontAlgn="auto" latinLnBrk="0" hangingPunct="1">
+                        <a:lnSpc>
+                          <a:spcPct val="100000"/>
+                        </a:lnSpc>
+                        <a:spcBef>
+                          <a:spcPts val="0"/>
+                        </a:spcBef>
+                        <a:spcAft>
+                          <a:spcPts val="0"/>
+                        </a:spcAft>
+                        <a:buClrTx/>
+                        <a:buSzTx/>
+                        <a:buFontTx/>
+                        <a:buNone/>
+                        <a:tabLst/>
+                        <a:defRPr/>
+                      </a:pPr>
+                      <a:r>
+                        <a:rPr lang="pt-BR" sz="1800" b="0" kern="1200" dirty="0" err="1">
+                          <a:solidFill>
+                            <a:schemeClr val="dk1"/>
+                          </a:solidFill>
+                          <a:effectLst/>
+                          <a:latin typeface="+mn-lt"/>
+                          <a:ea typeface="+mn-ea"/>
+                          <a:cs typeface="+mn-cs"/>
+                        </a:rPr>
+                        <a:t>number</a:t>
+                      </a:r>
+                      <a:endParaRPr lang="pt-BR" sz="1800" b="0" kern="1200" dirty="0">
+                        <a:solidFill>
+                          <a:schemeClr val="dk1"/>
+                        </a:solidFill>
+                        <a:effectLst/>
+                        <a:latin typeface="+mn-lt"/>
+                        <a:ea typeface="+mn-ea"/>
+                        <a:cs typeface="+mn-cs"/>
+                      </a:endParaRPr>
+                    </a:p>
+                  </a:txBody>
+                  <a:tcPr/>
+                </a:tc>
+                <a:tc>
+                  <a:txBody>
+                    <a:bodyPr/>
+                    <a:lstStyle/>
+                    <a:p>
+                      <a:pPr marL="0" marR="0" lvl="0" indent="0" algn="l" defTabSz="914400" rtl="0" eaLnBrk="1" fontAlgn="auto" latinLnBrk="0" hangingPunct="1">
+                        <a:lnSpc>
+                          <a:spcPct val="100000"/>
+                        </a:lnSpc>
+                        <a:spcBef>
+                          <a:spcPts val="0"/>
+                        </a:spcBef>
+                        <a:spcAft>
+                          <a:spcPts val="0"/>
+                        </a:spcAft>
+                        <a:buClrTx/>
+                        <a:buSzTx/>
+                        <a:buFontTx/>
+                        <a:buNone/>
+                        <a:tabLst/>
+                        <a:defRPr/>
+                      </a:pPr>
+                      <a:r>
+                        <a:rPr lang="pt-BR" sz="1800" b="0" kern="1200" dirty="0">
+                          <a:solidFill>
+                            <a:schemeClr val="dk1"/>
+                          </a:solidFill>
+                          <a:effectLst/>
+                          <a:latin typeface="+mn-lt"/>
+                          <a:ea typeface="+mn-ea"/>
+                          <a:cs typeface="+mn-cs"/>
+                        </a:rPr>
+                        <a:t>Número simples começando a partir do zero.</a:t>
+                      </a:r>
+                    </a:p>
+                  </a:txBody>
+                  <a:tcPr/>
+                </a:tc>
+                <a:extLst>
+                  <a:ext uri="{0D108BD9-81ED-4DB2-BD59-A6C34878D82A}">
+                    <a16:rowId xmlns:a16="http://schemas.microsoft.com/office/drawing/2014/main" val="2704027380"/>
+                  </a:ext>
+                </a:extLst>
+              </a:tr>
+              <a:tr h="370840">
+                <a:tc>
+                  <a:txBody>
+                    <a:bodyPr/>
+                    <a:lstStyle/>
+                    <a:p>
+                      <a:pPr marL="0" marR="0" lvl="0" indent="0" algn="l" defTabSz="914400" rtl="0" eaLnBrk="1" fontAlgn="auto" latinLnBrk="0" hangingPunct="1">
+                        <a:lnSpc>
+                          <a:spcPct val="100000"/>
+                        </a:lnSpc>
+                        <a:spcBef>
+                          <a:spcPts val="0"/>
+                        </a:spcBef>
+                        <a:spcAft>
+                          <a:spcPts val="0"/>
+                        </a:spcAft>
+                        <a:buClrTx/>
+                        <a:buSzTx/>
+                        <a:buFontTx/>
+                        <a:buNone/>
+                        <a:tabLst/>
+                        <a:defRPr/>
+                      </a:pPr>
+                      <a:r>
+                        <a:rPr lang="pt-BR" sz="1800" b="0" kern="1200" dirty="0">
+                          <a:solidFill>
+                            <a:schemeClr val="dk1"/>
+                          </a:solidFill>
+                          <a:effectLst/>
+                          <a:latin typeface="+mn-lt"/>
+                          <a:ea typeface="+mn-ea"/>
+                          <a:cs typeface="+mn-cs"/>
+                        </a:rPr>
+                        <a:t>range</a:t>
+                      </a:r>
+                    </a:p>
+                  </a:txBody>
+                  <a:tcPr/>
+                </a:tc>
+                <a:tc>
+                  <a:txBody>
+                    <a:bodyPr/>
+                    <a:lstStyle/>
+                    <a:p>
+                      <a:pPr marL="0" marR="0" lvl="0" indent="0" algn="l" defTabSz="914400" rtl="0" eaLnBrk="1" fontAlgn="auto" latinLnBrk="0" hangingPunct="1">
+                        <a:lnSpc>
+                          <a:spcPct val="100000"/>
+                        </a:lnSpc>
+                        <a:spcBef>
+                          <a:spcPts val="0"/>
+                        </a:spcBef>
+                        <a:spcAft>
+                          <a:spcPts val="0"/>
+                        </a:spcAft>
+                        <a:buClrTx/>
+                        <a:buSzTx/>
+                        <a:buFontTx/>
+                        <a:buNone/>
+                        <a:tabLst/>
+                        <a:defRPr/>
+                      </a:pPr>
+                      <a:r>
+                        <a:rPr lang="pt-BR" sz="1800" b="0" kern="1200" dirty="0">
+                          <a:solidFill>
+                            <a:schemeClr val="dk1"/>
+                          </a:solidFill>
+                          <a:effectLst/>
+                          <a:latin typeface="+mn-lt"/>
+                          <a:ea typeface="+mn-ea"/>
+                          <a:cs typeface="+mn-cs"/>
+                        </a:rPr>
+                        <a:t>Muito semelhante ao tipo </a:t>
+                      </a:r>
+                      <a:r>
+                        <a:rPr lang="pt-BR" sz="1800" b="0" kern="1200" dirty="0" err="1">
+                          <a:solidFill>
+                            <a:schemeClr val="dk1"/>
+                          </a:solidFill>
+                          <a:effectLst/>
+                          <a:latin typeface="+mn-lt"/>
+                          <a:ea typeface="+mn-ea"/>
+                          <a:cs typeface="+mn-cs"/>
+                        </a:rPr>
+                        <a:t>number</a:t>
+                      </a:r>
+                      <a:r>
+                        <a:rPr lang="pt-BR" sz="1800" b="0" kern="1200" dirty="0">
+                          <a:solidFill>
+                            <a:schemeClr val="dk1"/>
+                          </a:solidFill>
+                          <a:effectLst/>
+                          <a:latin typeface="+mn-lt"/>
+                          <a:ea typeface="+mn-ea"/>
+                          <a:cs typeface="+mn-cs"/>
+                        </a:rPr>
+                        <a:t> utilizando min e </a:t>
+                      </a:r>
+                      <a:r>
+                        <a:rPr lang="pt-BR" sz="1800" b="0" kern="1200" dirty="0" err="1">
+                          <a:solidFill>
+                            <a:schemeClr val="dk1"/>
+                          </a:solidFill>
+                          <a:effectLst/>
+                          <a:latin typeface="+mn-lt"/>
+                          <a:ea typeface="+mn-ea"/>
+                          <a:cs typeface="+mn-cs"/>
+                        </a:rPr>
+                        <a:t>max</a:t>
+                      </a:r>
+                      <a:r>
+                        <a:rPr lang="pt-BR" sz="1800" b="0" kern="1200" dirty="0">
+                          <a:solidFill>
+                            <a:schemeClr val="dk1"/>
+                          </a:solidFill>
+                          <a:effectLst/>
+                          <a:latin typeface="+mn-lt"/>
+                          <a:ea typeface="+mn-ea"/>
+                          <a:cs typeface="+mn-cs"/>
+                        </a:rPr>
+                        <a:t>, mas é deslizante</a:t>
+                      </a:r>
+                    </a:p>
+                  </a:txBody>
+                  <a:tcPr/>
+                </a:tc>
+                <a:extLst>
+                  <a:ext uri="{0D108BD9-81ED-4DB2-BD59-A6C34878D82A}">
+                    <a16:rowId xmlns:a16="http://schemas.microsoft.com/office/drawing/2014/main" val="3577691102"/>
+                  </a:ext>
+                </a:extLst>
+              </a:tr>
+              <a:tr h="370840">
+                <a:tc>
+                  <a:txBody>
+                    <a:bodyPr/>
+                    <a:lstStyle/>
+                    <a:p>
+                      <a:pPr marL="0" marR="0" lvl="0" indent="0" algn="l" defTabSz="914400" rtl="0" eaLnBrk="1" fontAlgn="auto" latinLnBrk="0" hangingPunct="1">
+                        <a:lnSpc>
+                          <a:spcPct val="100000"/>
+                        </a:lnSpc>
+                        <a:spcBef>
+                          <a:spcPts val="0"/>
+                        </a:spcBef>
+                        <a:spcAft>
+                          <a:spcPts val="0"/>
+                        </a:spcAft>
+                        <a:buClrTx/>
+                        <a:buSzTx/>
+                        <a:buFontTx/>
+                        <a:buNone/>
+                        <a:tabLst/>
+                        <a:defRPr/>
+                      </a:pPr>
+                      <a:r>
+                        <a:rPr lang="pt-BR" sz="1800" b="0" kern="1200" dirty="0">
+                          <a:solidFill>
+                            <a:schemeClr val="dk1"/>
+                          </a:solidFill>
+                          <a:effectLst/>
+                          <a:latin typeface="+mn-lt"/>
+                          <a:ea typeface="+mn-ea"/>
+                          <a:cs typeface="+mn-cs"/>
+                        </a:rPr>
+                        <a:t>date</a:t>
+                      </a:r>
+                    </a:p>
+                  </a:txBody>
+                  <a:tcPr/>
+                </a:tc>
+                <a:tc>
+                  <a:txBody>
+                    <a:bodyPr/>
+                    <a:lstStyle/>
+                    <a:p>
+                      <a:pPr marL="0" marR="0" lvl="0" indent="0" algn="l" defTabSz="914400" rtl="0" eaLnBrk="1" fontAlgn="auto" latinLnBrk="0" hangingPunct="1">
+                        <a:lnSpc>
+                          <a:spcPct val="100000"/>
+                        </a:lnSpc>
+                        <a:spcBef>
+                          <a:spcPts val="0"/>
+                        </a:spcBef>
+                        <a:spcAft>
+                          <a:spcPts val="0"/>
+                        </a:spcAft>
+                        <a:buClrTx/>
+                        <a:buSzTx/>
+                        <a:buFontTx/>
+                        <a:buNone/>
+                        <a:tabLst/>
+                        <a:defRPr/>
+                      </a:pPr>
+                      <a:r>
+                        <a:rPr lang="pt-BR" sz="1800" b="0" kern="1200" dirty="0">
+                          <a:solidFill>
+                            <a:schemeClr val="dk1"/>
+                          </a:solidFill>
+                          <a:effectLst/>
+                          <a:latin typeface="+mn-lt"/>
+                          <a:ea typeface="+mn-ea"/>
+                          <a:cs typeface="+mn-cs"/>
+                        </a:rPr>
+                        <a:t>Voltado para campos de data.</a:t>
+                      </a:r>
+                    </a:p>
+                  </a:txBody>
+                  <a:tcPr/>
+                </a:tc>
+                <a:extLst>
+                  <a:ext uri="{0D108BD9-81ED-4DB2-BD59-A6C34878D82A}">
+                    <a16:rowId xmlns:a16="http://schemas.microsoft.com/office/drawing/2014/main" val="1015715992"/>
+                  </a:ext>
+                </a:extLst>
+              </a:tr>
+              <a:tr h="370840">
+                <a:tc>
+                  <a:txBody>
+                    <a:bodyPr/>
+                    <a:lstStyle/>
+                    <a:p>
+                      <a:pPr marL="0" marR="0" lvl="0" indent="0" algn="l" defTabSz="914400" rtl="0" eaLnBrk="1" fontAlgn="auto" latinLnBrk="0" hangingPunct="1">
+                        <a:lnSpc>
+                          <a:spcPct val="100000"/>
+                        </a:lnSpc>
+                        <a:spcBef>
+                          <a:spcPts val="0"/>
+                        </a:spcBef>
+                        <a:spcAft>
+                          <a:spcPts val="0"/>
+                        </a:spcAft>
+                        <a:buClrTx/>
+                        <a:buSzTx/>
+                        <a:buFontTx/>
+                        <a:buNone/>
+                        <a:tabLst/>
+                        <a:defRPr/>
+                      </a:pPr>
+                      <a:r>
+                        <a:rPr lang="pt-BR" sz="1800" b="0" kern="1200" dirty="0">
+                          <a:solidFill>
+                            <a:schemeClr val="dk1"/>
+                          </a:solidFill>
+                          <a:effectLst/>
+                          <a:latin typeface="+mn-lt"/>
+                          <a:ea typeface="+mn-ea"/>
+                          <a:cs typeface="+mn-cs"/>
+                        </a:rPr>
+                        <a:t>time</a:t>
+                      </a:r>
+                    </a:p>
+                  </a:txBody>
+                  <a:tcPr/>
+                </a:tc>
+                <a:tc>
+                  <a:txBody>
+                    <a:bodyPr/>
+                    <a:lstStyle/>
+                    <a:p>
+                      <a:pPr marL="0" marR="0" lvl="0" indent="0" algn="l" defTabSz="914400" rtl="0" eaLnBrk="1" fontAlgn="auto" latinLnBrk="0" hangingPunct="1">
+                        <a:lnSpc>
+                          <a:spcPct val="100000"/>
+                        </a:lnSpc>
+                        <a:spcBef>
+                          <a:spcPts val="0"/>
+                        </a:spcBef>
+                        <a:spcAft>
+                          <a:spcPts val="0"/>
+                        </a:spcAft>
+                        <a:buClrTx/>
+                        <a:buSzTx/>
+                        <a:buFontTx/>
+                        <a:buNone/>
+                        <a:tabLst/>
+                        <a:defRPr/>
+                      </a:pPr>
+                      <a:r>
+                        <a:rPr lang="pt-BR" sz="1800" b="0" kern="1200" dirty="0">
+                          <a:solidFill>
+                            <a:schemeClr val="dk1"/>
+                          </a:solidFill>
+                          <a:effectLst/>
+                          <a:latin typeface="+mn-lt"/>
+                          <a:ea typeface="+mn-ea"/>
+                          <a:cs typeface="+mn-cs"/>
+                        </a:rPr>
+                        <a:t>Voltado para campos de hora.</a:t>
+                      </a:r>
+                    </a:p>
+                  </a:txBody>
+                  <a:tcPr/>
+                </a:tc>
+                <a:extLst>
+                  <a:ext uri="{0D108BD9-81ED-4DB2-BD59-A6C34878D82A}">
+                    <a16:rowId xmlns:a16="http://schemas.microsoft.com/office/drawing/2014/main" val="2003588833"/>
+                  </a:ext>
+                </a:extLst>
+              </a:tr>
+              <a:tr h="370840">
+                <a:tc>
+                  <a:txBody>
+                    <a:bodyPr/>
+                    <a:lstStyle/>
+                    <a:p>
+                      <a:pPr marL="0" marR="0" lvl="0" indent="0" algn="l" defTabSz="914400" rtl="0" eaLnBrk="1" fontAlgn="auto" latinLnBrk="0" hangingPunct="1">
+                        <a:lnSpc>
+                          <a:spcPct val="100000"/>
+                        </a:lnSpc>
+                        <a:spcBef>
+                          <a:spcPts val="0"/>
+                        </a:spcBef>
+                        <a:spcAft>
+                          <a:spcPts val="0"/>
+                        </a:spcAft>
+                        <a:buClrTx/>
+                        <a:buSzTx/>
+                        <a:buFontTx/>
+                        <a:buNone/>
+                        <a:tabLst/>
+                        <a:defRPr/>
+                      </a:pPr>
+                      <a:r>
+                        <a:rPr lang="pt-BR" sz="1800" b="0" kern="1200" dirty="0" err="1">
+                          <a:solidFill>
+                            <a:schemeClr val="dk1"/>
+                          </a:solidFill>
+                          <a:effectLst/>
+                          <a:latin typeface="+mn-lt"/>
+                          <a:ea typeface="+mn-ea"/>
+                          <a:cs typeface="+mn-cs"/>
+                        </a:rPr>
+                        <a:t>datetime</a:t>
+                      </a:r>
+                      <a:r>
+                        <a:rPr lang="pt-BR" sz="1800" b="0" kern="1200" dirty="0">
+                          <a:solidFill>
+                            <a:schemeClr val="dk1"/>
+                          </a:solidFill>
+                          <a:effectLst/>
+                          <a:latin typeface="+mn-lt"/>
+                          <a:ea typeface="+mn-ea"/>
+                          <a:cs typeface="+mn-cs"/>
+                        </a:rPr>
+                        <a:t>-local</a:t>
+                      </a:r>
+                    </a:p>
+                  </a:txBody>
+                  <a:tcPr/>
+                </a:tc>
+                <a:tc>
+                  <a:txBody>
+                    <a:bodyPr/>
+                    <a:lstStyle/>
+                    <a:p>
+                      <a:pPr marL="0" marR="0" lvl="0" indent="0" algn="l" defTabSz="914400" rtl="0" eaLnBrk="1" fontAlgn="auto" latinLnBrk="0" hangingPunct="1">
+                        <a:lnSpc>
+                          <a:spcPct val="100000"/>
+                        </a:lnSpc>
+                        <a:spcBef>
+                          <a:spcPts val="0"/>
+                        </a:spcBef>
+                        <a:spcAft>
+                          <a:spcPts val="0"/>
+                        </a:spcAft>
+                        <a:buClrTx/>
+                        <a:buSzTx/>
+                        <a:buFontTx/>
+                        <a:buNone/>
+                        <a:tabLst/>
+                        <a:defRPr/>
+                      </a:pPr>
+                      <a:r>
+                        <a:rPr lang="pt-BR" sz="1800" b="0" kern="1200" dirty="0">
+                          <a:solidFill>
+                            <a:schemeClr val="dk1"/>
+                          </a:solidFill>
+                          <a:effectLst/>
+                          <a:latin typeface="+mn-lt"/>
+                          <a:ea typeface="+mn-ea"/>
+                          <a:cs typeface="+mn-cs"/>
+                        </a:rPr>
+                        <a:t>Possibilita ao usuário selecionar uma data e uma hora.</a:t>
+                      </a:r>
+                    </a:p>
+                  </a:txBody>
+                  <a:tcPr/>
+                </a:tc>
+                <a:extLst>
+                  <a:ext uri="{0D108BD9-81ED-4DB2-BD59-A6C34878D82A}">
+                    <a16:rowId xmlns:a16="http://schemas.microsoft.com/office/drawing/2014/main" val="269071695"/>
+                  </a:ext>
+                </a:extLst>
+              </a:tr>
+              <a:tr h="370840">
+                <a:tc>
+                  <a:txBody>
+                    <a:bodyPr/>
+                    <a:lstStyle/>
+                    <a:p>
+                      <a:pPr marL="0" marR="0" lvl="0" indent="0" algn="l" defTabSz="914400" rtl="0" eaLnBrk="1" fontAlgn="auto" latinLnBrk="0" hangingPunct="1">
+                        <a:lnSpc>
+                          <a:spcPct val="100000"/>
+                        </a:lnSpc>
+                        <a:spcBef>
+                          <a:spcPts val="0"/>
+                        </a:spcBef>
+                        <a:spcAft>
+                          <a:spcPts val="0"/>
+                        </a:spcAft>
+                        <a:buClrTx/>
+                        <a:buSzTx/>
+                        <a:buFontTx/>
+                        <a:buNone/>
+                        <a:tabLst/>
+                        <a:defRPr/>
+                      </a:pPr>
+                      <a:r>
+                        <a:rPr lang="pt-BR" sz="1800" b="0" kern="1200" dirty="0" err="1">
+                          <a:solidFill>
+                            <a:schemeClr val="dk1"/>
+                          </a:solidFill>
+                          <a:effectLst/>
+                          <a:latin typeface="+mn-lt"/>
+                          <a:ea typeface="+mn-ea"/>
+                          <a:cs typeface="+mn-cs"/>
+                        </a:rPr>
+                        <a:t>month</a:t>
+                      </a:r>
+                      <a:endParaRPr lang="pt-BR" sz="1800" b="0" kern="1200" dirty="0">
+                        <a:solidFill>
+                          <a:schemeClr val="dk1"/>
+                        </a:solidFill>
+                        <a:effectLst/>
+                        <a:latin typeface="+mn-lt"/>
+                        <a:ea typeface="+mn-ea"/>
+                        <a:cs typeface="+mn-cs"/>
+                      </a:endParaRPr>
+                    </a:p>
+                  </a:txBody>
+                  <a:tcPr/>
+                </a:tc>
+                <a:tc>
+                  <a:txBody>
+                    <a:bodyPr/>
+                    <a:lstStyle/>
+                    <a:p>
+                      <a:pPr marL="0" marR="0" lvl="0" indent="0" algn="l" defTabSz="914400" rtl="0" eaLnBrk="1" fontAlgn="auto" latinLnBrk="0" hangingPunct="1">
+                        <a:lnSpc>
+                          <a:spcPct val="100000"/>
+                        </a:lnSpc>
+                        <a:spcBef>
+                          <a:spcPts val="0"/>
+                        </a:spcBef>
+                        <a:spcAft>
+                          <a:spcPts val="0"/>
+                        </a:spcAft>
+                        <a:buClrTx/>
+                        <a:buSzTx/>
+                        <a:buFontTx/>
+                        <a:buNone/>
+                        <a:tabLst/>
+                        <a:defRPr/>
+                      </a:pPr>
+                      <a:r>
+                        <a:rPr lang="pt-BR" sz="1800" b="0" kern="1200" dirty="0">
+                          <a:solidFill>
+                            <a:schemeClr val="dk1"/>
+                          </a:solidFill>
+                          <a:effectLst/>
+                          <a:latin typeface="+mn-lt"/>
+                          <a:ea typeface="+mn-ea"/>
+                          <a:cs typeface="+mn-cs"/>
+                        </a:rPr>
+                        <a:t>Possibilita ao usuário escolher um mês</a:t>
+                      </a:r>
+                    </a:p>
+                  </a:txBody>
+                  <a:tcPr/>
+                </a:tc>
+                <a:extLst>
+                  <a:ext uri="{0D108BD9-81ED-4DB2-BD59-A6C34878D82A}">
+                    <a16:rowId xmlns:a16="http://schemas.microsoft.com/office/drawing/2014/main" val="498270251"/>
+                  </a:ext>
+                </a:extLst>
+              </a:tr>
+            </a:tbl>
+          </a:graphicData>
+        </a:graphic>
+      </p:graphicFrame>
+    </p:spTree>
+    <p:extLst>
+      <p:ext uri="{BB962C8B-B14F-4D97-AF65-F5344CB8AC3E}">
+        <p14:creationId xmlns:p14="http://schemas.microsoft.com/office/powerpoint/2010/main" val="2654038959"/>
+      </p:ext>
+    </p:extLst>
+  </p:cSld>
+  <p:clrMapOvr>
+    <a:masterClrMapping/>
+  </p:clrMapOvr>
+</p:sld>
+</file>
+
+<file path=ppt/slides/slide161.xml><?xml version="1.0" encoding="utf-8"?>
+<p:sld xmlns:a="http://schemas.openxmlformats.org/drawingml/2006/main" xmlns:r="http://schemas.openxmlformats.org/officeDocument/2006/relationships" xmlns:p="http://schemas.openxmlformats.org/presentationml/2006/main">
+  <p:cSld>
+    <p:spTree>
+      <p:nvGrpSpPr>
+        <p:cNvPr id="1" name=""/>
+        <p:cNvGrpSpPr/>
+        <p:nvPr/>
+      </p:nvGrpSpPr>
+      <p:grpSpPr>
+        <a:xfrm>
+          <a:off x="0" y="0"/>
+          <a:ext cx="0" cy="0"/>
+          <a:chOff x="0" y="0"/>
+          <a:chExt cx="0" cy="0"/>
+        </a:xfrm>
+      </p:grpSpPr>
+      <p:sp>
+        <p:nvSpPr>
+          <p:cNvPr id="2" name="Título 1">
+            <a:extLst>
+              <a:ext uri="{FF2B5EF4-FFF2-40B4-BE49-F238E27FC236}">
+                <a16:creationId xmlns:a16="http://schemas.microsoft.com/office/drawing/2014/main" id="{9CECACE9-A8B5-5586-966F-FD00C0782B6C}"/>
+              </a:ext>
+            </a:extLst>
+          </p:cNvPr>
+          <p:cNvSpPr>
+            <a:spLocks noGrp="1"/>
+          </p:cNvSpPr>
+          <p:nvPr>
+            <p:ph type="title"/>
+          </p:nvPr>
+        </p:nvSpPr>
+        <p:spPr/>
+        <p:txBody>
+          <a:bodyPr/>
+          <a:lstStyle/>
+          <a:p>
+            <a:r>
+              <a:rPr lang="pt-BR" dirty="0"/>
+              <a:t>Validações de Números e Datas</a:t>
+            </a:r>
+          </a:p>
+        </p:txBody>
+      </p:sp>
+      <p:graphicFrame>
+        <p:nvGraphicFramePr>
+          <p:cNvPr id="4" name="Espaço Reservado para Conteúdo 3">
+            <a:extLst>
+              <a:ext uri="{FF2B5EF4-FFF2-40B4-BE49-F238E27FC236}">
+                <a16:creationId xmlns:a16="http://schemas.microsoft.com/office/drawing/2014/main" id="{E71753AB-539A-6DEA-105C-266F955C9008}"/>
+              </a:ext>
+            </a:extLst>
+          </p:cNvPr>
+          <p:cNvGraphicFramePr>
+            <a:graphicFrameLocks noGrp="1"/>
+          </p:cNvGraphicFramePr>
+          <p:nvPr>
+            <p:ph idx="1"/>
+            <p:extLst>
+              <p:ext uri="{D42A27DB-BD31-4B8C-83A1-F6EECF244321}">
+                <p14:modId xmlns:p14="http://schemas.microsoft.com/office/powerpoint/2010/main" val="378575750"/>
+              </p:ext>
+            </p:extLst>
+          </p:nvPr>
+        </p:nvGraphicFramePr>
+        <p:xfrm>
+          <a:off x="1116013" y="2478088"/>
+          <a:ext cx="10167936" cy="1483360"/>
+        </p:xfrm>
+        <a:graphic>
+          <a:graphicData uri="http://schemas.openxmlformats.org/drawingml/2006/table">
+            <a:tbl>
+              <a:tblPr firstRow="1" bandRow="1">
+                <a:tableStyleId>{073A0DAA-6AF3-43AB-8588-CEC1D06C72B9}</a:tableStyleId>
+              </a:tblPr>
+              <a:tblGrid>
+                <a:gridCol w="2041255">
+                  <a:extLst>
+                    <a:ext uri="{9D8B030D-6E8A-4147-A177-3AD203B41FA5}">
+                      <a16:colId xmlns:a16="http://schemas.microsoft.com/office/drawing/2014/main" val="563399824"/>
+                    </a:ext>
+                  </a:extLst>
+                </a:gridCol>
+                <a:gridCol w="8126681">
+                  <a:extLst>
+                    <a:ext uri="{9D8B030D-6E8A-4147-A177-3AD203B41FA5}">
+                      <a16:colId xmlns:a16="http://schemas.microsoft.com/office/drawing/2014/main" val="1913616421"/>
+                    </a:ext>
+                  </a:extLst>
+                </a:gridCol>
+              </a:tblGrid>
+              <a:tr h="370840">
+                <a:tc>
+                  <a:txBody>
+                    <a:bodyPr/>
+                    <a:lstStyle/>
+                    <a:p>
+                      <a:pPr marL="0" marR="0" lvl="0" indent="0" algn="l" defTabSz="914400" rtl="0" eaLnBrk="1" fontAlgn="auto" latinLnBrk="0" hangingPunct="1">
+                        <a:lnSpc>
+                          <a:spcPct val="100000"/>
+                        </a:lnSpc>
+                        <a:spcBef>
+                          <a:spcPts val="0"/>
+                        </a:spcBef>
+                        <a:spcAft>
+                          <a:spcPts val="0"/>
+                        </a:spcAft>
+                        <a:buClrTx/>
+                        <a:buSzTx/>
+                        <a:buFontTx/>
+                        <a:buNone/>
+                        <a:tabLst/>
+                        <a:defRPr/>
+                      </a:pPr>
+                      <a:r>
+                        <a:rPr lang="pt-BR" sz="1800" b="0" kern="1200" dirty="0">
+                          <a:solidFill>
+                            <a:schemeClr val="lt1"/>
+                          </a:solidFill>
+                          <a:effectLst/>
+                          <a:latin typeface="+mn-lt"/>
+                          <a:ea typeface="+mn-ea"/>
+                          <a:cs typeface="+mn-cs"/>
+                        </a:rPr>
+                        <a:t>Tipo</a:t>
+                      </a:r>
+                    </a:p>
+                  </a:txBody>
+                  <a:tcPr/>
+                </a:tc>
+                <a:tc>
+                  <a:txBody>
+                    <a:bodyPr/>
+                    <a:lstStyle/>
+                    <a:p>
+                      <a:pPr marL="0" marR="0" lvl="0" indent="0" algn="l" defTabSz="914400" rtl="0" eaLnBrk="1" fontAlgn="auto" latinLnBrk="0" hangingPunct="1">
+                        <a:lnSpc>
+                          <a:spcPct val="100000"/>
+                        </a:lnSpc>
+                        <a:spcBef>
+                          <a:spcPts val="0"/>
+                        </a:spcBef>
+                        <a:spcAft>
+                          <a:spcPts val="0"/>
+                        </a:spcAft>
+                        <a:buClrTx/>
+                        <a:buSzTx/>
+                        <a:buFontTx/>
+                        <a:buNone/>
+                        <a:tabLst/>
+                        <a:defRPr/>
+                      </a:pPr>
+                      <a:r>
+                        <a:rPr lang="pt-BR" sz="1800" b="0" kern="1200" dirty="0">
+                          <a:solidFill>
+                            <a:schemeClr val="lt1"/>
+                          </a:solidFill>
+                          <a:effectLst/>
+                          <a:latin typeface="+mn-lt"/>
+                          <a:ea typeface="+mn-ea"/>
+                          <a:cs typeface="+mn-cs"/>
+                        </a:rPr>
+                        <a:t>Função</a:t>
+                      </a:r>
+                    </a:p>
+                  </a:txBody>
+                  <a:tcPr/>
+                </a:tc>
+                <a:extLst>
+                  <a:ext uri="{0D108BD9-81ED-4DB2-BD59-A6C34878D82A}">
+                    <a16:rowId xmlns:a16="http://schemas.microsoft.com/office/drawing/2014/main" val="2176526517"/>
+                  </a:ext>
+                </a:extLst>
+              </a:tr>
+              <a:tr h="370840">
+                <a:tc>
+                  <a:txBody>
+                    <a:bodyPr/>
+                    <a:lstStyle/>
+                    <a:p>
+                      <a:pPr marL="0" marR="0" lvl="0" indent="0" algn="l" defTabSz="914400" rtl="0" eaLnBrk="1" fontAlgn="auto" latinLnBrk="0" hangingPunct="1">
+                        <a:lnSpc>
+                          <a:spcPct val="100000"/>
+                        </a:lnSpc>
+                        <a:spcBef>
+                          <a:spcPts val="0"/>
+                        </a:spcBef>
+                        <a:spcAft>
+                          <a:spcPts val="0"/>
+                        </a:spcAft>
+                        <a:buClrTx/>
+                        <a:buSzTx/>
+                        <a:buFontTx/>
+                        <a:buNone/>
+                        <a:tabLst/>
+                        <a:defRPr/>
+                      </a:pPr>
+                      <a:r>
+                        <a:rPr lang="pt-BR" sz="1800" b="0" kern="1200" dirty="0">
+                          <a:solidFill>
+                            <a:schemeClr val="dk1"/>
+                          </a:solidFill>
+                          <a:effectLst/>
+                          <a:latin typeface="+mn-lt"/>
+                          <a:ea typeface="+mn-ea"/>
+                          <a:cs typeface="+mn-cs"/>
+                        </a:rPr>
+                        <a:t>min</a:t>
+                      </a:r>
+                    </a:p>
+                  </a:txBody>
+                  <a:tcPr/>
+                </a:tc>
+                <a:tc>
+                  <a:txBody>
+                    <a:bodyPr/>
+                    <a:lstStyle/>
+                    <a:p>
+                      <a:pPr marL="0" marR="0" lvl="0" indent="0" algn="l" defTabSz="914400" rtl="0" eaLnBrk="1" fontAlgn="auto" latinLnBrk="0" hangingPunct="1">
+                        <a:lnSpc>
+                          <a:spcPct val="100000"/>
+                        </a:lnSpc>
+                        <a:spcBef>
+                          <a:spcPts val="0"/>
+                        </a:spcBef>
+                        <a:spcAft>
+                          <a:spcPts val="0"/>
+                        </a:spcAft>
+                        <a:buClrTx/>
+                        <a:buSzTx/>
+                        <a:buFontTx/>
+                        <a:buNone/>
+                        <a:tabLst/>
+                        <a:defRPr/>
+                      </a:pPr>
+                      <a:r>
+                        <a:rPr lang="pt-BR" sz="1800" b="0" kern="1200" dirty="0">
+                          <a:solidFill>
+                            <a:schemeClr val="dk1"/>
+                          </a:solidFill>
+                          <a:effectLst/>
+                          <a:latin typeface="+mn-lt"/>
+                          <a:ea typeface="+mn-ea"/>
+                          <a:cs typeface="+mn-cs"/>
+                        </a:rPr>
+                        <a:t>Indica o valor mínimo que deve ser exibido no input.</a:t>
+                      </a:r>
+                    </a:p>
+                  </a:txBody>
+                  <a:tcPr/>
+                </a:tc>
+                <a:extLst>
+                  <a:ext uri="{0D108BD9-81ED-4DB2-BD59-A6C34878D82A}">
+                    <a16:rowId xmlns:a16="http://schemas.microsoft.com/office/drawing/2014/main" val="2142338438"/>
+                  </a:ext>
+                </a:extLst>
+              </a:tr>
+              <a:tr h="370840">
+                <a:tc>
+                  <a:txBody>
+                    <a:bodyPr/>
+                    <a:lstStyle/>
+                    <a:p>
+                      <a:pPr marL="0" marR="0" lvl="0" indent="0" algn="l" defTabSz="914400" rtl="0" eaLnBrk="1" fontAlgn="auto" latinLnBrk="0" hangingPunct="1">
+                        <a:lnSpc>
+                          <a:spcPct val="100000"/>
+                        </a:lnSpc>
+                        <a:spcBef>
+                          <a:spcPts val="0"/>
+                        </a:spcBef>
+                        <a:spcAft>
+                          <a:spcPts val="0"/>
+                        </a:spcAft>
+                        <a:buClrTx/>
+                        <a:buSzTx/>
+                        <a:buFontTx/>
+                        <a:buNone/>
+                        <a:tabLst/>
+                        <a:defRPr/>
+                      </a:pPr>
+                      <a:r>
+                        <a:rPr lang="pt-BR" sz="1800" b="0" kern="1200" dirty="0" err="1">
+                          <a:solidFill>
+                            <a:schemeClr val="dk1"/>
+                          </a:solidFill>
+                          <a:effectLst/>
+                          <a:latin typeface="+mn-lt"/>
+                          <a:ea typeface="+mn-ea"/>
+                          <a:cs typeface="+mn-cs"/>
+                        </a:rPr>
+                        <a:t>max</a:t>
+                      </a:r>
+                      <a:endParaRPr lang="pt-BR" sz="1800" b="0" kern="1200" dirty="0">
+                        <a:solidFill>
+                          <a:schemeClr val="dk1"/>
+                        </a:solidFill>
+                        <a:effectLst/>
+                        <a:latin typeface="+mn-lt"/>
+                        <a:ea typeface="+mn-ea"/>
+                        <a:cs typeface="+mn-cs"/>
+                      </a:endParaRPr>
+                    </a:p>
+                  </a:txBody>
+                  <a:tcPr/>
+                </a:tc>
+                <a:tc>
+                  <a:txBody>
+                    <a:bodyPr/>
+                    <a:lstStyle/>
+                    <a:p>
+                      <a:pPr marL="0" marR="0" lvl="0" indent="0" algn="l" defTabSz="914400" rtl="0" eaLnBrk="1" fontAlgn="auto" latinLnBrk="0" hangingPunct="1">
+                        <a:lnSpc>
+                          <a:spcPct val="100000"/>
+                        </a:lnSpc>
+                        <a:spcBef>
+                          <a:spcPts val="0"/>
+                        </a:spcBef>
+                        <a:spcAft>
+                          <a:spcPts val="0"/>
+                        </a:spcAft>
+                        <a:buClrTx/>
+                        <a:buSzTx/>
+                        <a:buFontTx/>
+                        <a:buNone/>
+                        <a:tabLst/>
+                        <a:defRPr/>
+                      </a:pPr>
+                      <a:r>
+                        <a:rPr lang="pt-BR" sz="1800" b="0" kern="1200" dirty="0">
+                          <a:solidFill>
+                            <a:schemeClr val="dk1"/>
+                          </a:solidFill>
+                          <a:effectLst/>
+                          <a:latin typeface="+mn-lt"/>
+                          <a:ea typeface="+mn-ea"/>
+                          <a:cs typeface="+mn-cs"/>
+                        </a:rPr>
+                        <a:t>Indica o valor máximo que deve ser exibido no input.</a:t>
+                      </a:r>
+                    </a:p>
+                  </a:txBody>
+                  <a:tcPr/>
+                </a:tc>
+                <a:extLst>
+                  <a:ext uri="{0D108BD9-81ED-4DB2-BD59-A6C34878D82A}">
+                    <a16:rowId xmlns:a16="http://schemas.microsoft.com/office/drawing/2014/main" val="435038362"/>
+                  </a:ext>
+                </a:extLst>
+              </a:tr>
+              <a:tr h="370840">
+                <a:tc>
+                  <a:txBody>
+                    <a:bodyPr/>
+                    <a:lstStyle/>
+                    <a:p>
+                      <a:pPr marL="0" marR="0" lvl="0" indent="0" algn="l" defTabSz="914400" rtl="0" eaLnBrk="1" fontAlgn="auto" latinLnBrk="0" hangingPunct="1">
+                        <a:lnSpc>
+                          <a:spcPct val="100000"/>
+                        </a:lnSpc>
+                        <a:spcBef>
+                          <a:spcPts val="0"/>
+                        </a:spcBef>
+                        <a:spcAft>
+                          <a:spcPts val="0"/>
+                        </a:spcAft>
+                        <a:buClrTx/>
+                        <a:buSzTx/>
+                        <a:buFontTx/>
+                        <a:buNone/>
+                        <a:tabLst/>
+                        <a:defRPr/>
+                      </a:pPr>
+                      <a:r>
+                        <a:rPr lang="pt-BR" sz="1800" b="0" kern="1200" dirty="0">
+                          <a:solidFill>
+                            <a:schemeClr val="dk1"/>
+                          </a:solidFill>
+                          <a:effectLst/>
+                          <a:latin typeface="+mn-lt"/>
+                          <a:ea typeface="+mn-ea"/>
+                          <a:cs typeface="+mn-cs"/>
+                        </a:rPr>
+                        <a:t>step</a:t>
+                      </a:r>
+                    </a:p>
+                  </a:txBody>
+                  <a:tcPr/>
+                </a:tc>
+                <a:tc>
+                  <a:txBody>
+                    <a:bodyPr/>
+                    <a:lstStyle/>
+                    <a:p>
+                      <a:pPr marL="0" marR="0" lvl="0" indent="0" algn="l" defTabSz="914400" rtl="0" eaLnBrk="1" fontAlgn="auto" latinLnBrk="0" hangingPunct="1">
+                        <a:lnSpc>
+                          <a:spcPct val="100000"/>
+                        </a:lnSpc>
+                        <a:spcBef>
+                          <a:spcPts val="0"/>
+                        </a:spcBef>
+                        <a:spcAft>
+                          <a:spcPts val="0"/>
+                        </a:spcAft>
+                        <a:buClrTx/>
+                        <a:buSzTx/>
+                        <a:buFontTx/>
+                        <a:buNone/>
+                        <a:tabLst/>
+                        <a:defRPr/>
+                      </a:pPr>
+                      <a:r>
+                        <a:rPr lang="pt-BR" sz="1800" b="0" kern="1200" dirty="0">
+                          <a:solidFill>
+                            <a:schemeClr val="dk1"/>
+                          </a:solidFill>
+                          <a:effectLst/>
+                          <a:latin typeface="+mn-lt"/>
+                          <a:ea typeface="+mn-ea"/>
+                          <a:cs typeface="+mn-cs"/>
+                        </a:rPr>
+                        <a:t>É importante para determinar intervalos de valores</a:t>
+                      </a:r>
+                    </a:p>
+                  </a:txBody>
+                  <a:tcPr/>
+                </a:tc>
+                <a:extLst>
+                  <a:ext uri="{0D108BD9-81ED-4DB2-BD59-A6C34878D82A}">
+                    <a16:rowId xmlns:a16="http://schemas.microsoft.com/office/drawing/2014/main" val="1375246557"/>
+                  </a:ext>
+                </a:extLst>
+              </a:tr>
+            </a:tbl>
+          </a:graphicData>
+        </a:graphic>
+      </p:graphicFrame>
+    </p:spTree>
+    <p:extLst>
+      <p:ext uri="{BB962C8B-B14F-4D97-AF65-F5344CB8AC3E}">
+        <p14:creationId xmlns:p14="http://schemas.microsoft.com/office/powerpoint/2010/main" val="98321432"/>
+      </p:ext>
+    </p:extLst>
+  </p:cSld>
+  <p:clrMapOvr>
+    <a:masterClrMapping/>
+  </p:clrMapOvr>
+</p:sld>
+</file>
+
+<file path=ppt/slides/slide162.xml><?xml version="1.0" encoding="utf-8"?>
+<p:sld xmlns:a="http://schemas.openxmlformats.org/drawingml/2006/main" xmlns:r="http://schemas.openxmlformats.org/officeDocument/2006/relationships" xmlns:p="http://schemas.openxmlformats.org/presentationml/2006/main">
+  <p:cSld>
+    <p:spTree>
+      <p:nvGrpSpPr>
+        <p:cNvPr id="1" name=""/>
+        <p:cNvGrpSpPr/>
+        <p:nvPr/>
+      </p:nvGrpSpPr>
+      <p:grpSpPr>
+        <a:xfrm>
+          <a:off x="0" y="0"/>
+          <a:ext cx="0" cy="0"/>
+          <a:chOff x="0" y="0"/>
+          <a:chExt cx="0" cy="0"/>
+        </a:xfrm>
+      </p:grpSpPr>
+      <p:sp>
+        <p:nvSpPr>
+          <p:cNvPr id="2" name="Título 1">
+            <a:extLst>
+              <a:ext uri="{FF2B5EF4-FFF2-40B4-BE49-F238E27FC236}">
+                <a16:creationId xmlns:a16="http://schemas.microsoft.com/office/drawing/2014/main" id="{881C58F2-2DE9-52E3-5897-D7E4795516EC}"/>
+              </a:ext>
+            </a:extLst>
+          </p:cNvPr>
+          <p:cNvSpPr>
+            <a:spLocks noGrp="1"/>
+          </p:cNvSpPr>
+          <p:nvPr>
+            <p:ph type="title"/>
+          </p:nvPr>
+        </p:nvSpPr>
+        <p:spPr/>
+        <p:txBody>
+          <a:bodyPr/>
+          <a:lstStyle/>
+          <a:p>
+            <a:r>
+              <a:rPr lang="pt-BR" dirty="0"/>
+              <a:t>Lição de Casa</a:t>
+            </a:r>
+          </a:p>
+        </p:txBody>
+      </p:sp>
+      <p:sp>
+        <p:nvSpPr>
+          <p:cNvPr id="3" name="Espaço Reservado para Conteúdo 2">
+            <a:extLst>
+              <a:ext uri="{FF2B5EF4-FFF2-40B4-BE49-F238E27FC236}">
+                <a16:creationId xmlns:a16="http://schemas.microsoft.com/office/drawing/2014/main" id="{3001553C-59A3-53E1-E8EE-4C179E48497D}"/>
+              </a:ext>
+            </a:extLst>
+          </p:cNvPr>
+          <p:cNvSpPr>
+            <a:spLocks noGrp="1"/>
+          </p:cNvSpPr>
+          <p:nvPr>
+            <p:ph idx="1"/>
+          </p:nvPr>
+        </p:nvSpPr>
+        <p:spPr/>
+        <p:txBody>
+          <a:bodyPr/>
+          <a:lstStyle/>
+          <a:p>
+            <a:r>
+              <a:rPr lang="pt-BR" dirty="0"/>
+              <a:t>Implemente uma espécie de quiz que possibilite ao usuário responder pelo menos 5 desses tipos de inputs, por exemplo: você pode utilizar a idade utilizando o tipo </a:t>
+            </a:r>
+            <a:r>
+              <a:rPr lang="pt-BR" dirty="0" err="1"/>
+              <a:t>number</a:t>
+            </a:r>
+            <a:r>
+              <a:rPr lang="pt-BR" dirty="0"/>
+              <a:t> ou o range</a:t>
+            </a:r>
+          </a:p>
+        </p:txBody>
+      </p:sp>
+    </p:spTree>
+    <p:extLst>
+      <p:ext uri="{BB962C8B-B14F-4D97-AF65-F5344CB8AC3E}">
+        <p14:creationId xmlns:p14="http://schemas.microsoft.com/office/powerpoint/2010/main" val="1873551223"/>
+      </p:ext>
+    </p:extLst>
+  </p:cSld>
+  <p:clrMapOvr>
+    <a:masterClrMapping/>
+  </p:clrMapOvr>
 </p:sld>
 </file>
 

</xml_diff>